<commit_message>
Update of the powerpoint slide-1
</commit_message>
<xml_diff>
--- a/Power Point Presentations/Presentation Week 3 Group D.pptx
+++ b/Power Point Presentations/Presentation Week 3 Group D.pptx
@@ -5977,11 +5977,11 @@
   <p:clrMapOvr>
     <a:masterClrMapping/>
   </p:clrMapOvr>
-  <mc:AlternateContent xmlns:mc="http://schemas.openxmlformats.org/markup-compatibility/2006">
-    <mc:Choice xmlns:p14="http://schemas.microsoft.com/office/powerpoint/2010/main" Requires="p14">
+  <mc:AlternateContent xmlns:mc="http://schemas.openxmlformats.org/markup-compatibility/2006" xmlns:p14="http://schemas.microsoft.com/office/powerpoint/2010/main">
+    <mc:Choice Requires="p14">
       <p:transition spd="slow" p14:dur="2000" advTm="3835"/>
     </mc:Choice>
-    <mc:Fallback>
+    <mc:Fallback xmlns="">
       <p:transition spd="slow" advTm="3835"/>
     </mc:Fallback>
   </mc:AlternateContent>
@@ -6278,8 +6278,21 @@
                   <a:srgbClr val="FF0000"/>
                 </a:solidFill>
               </a:rPr>
-              <a:t>It contains # columns</a:t>
-            </a:r>
+              <a:t>It contains </a:t>
+            </a:r>
+            <a:r>
+              <a:rPr lang="en-US">
+                <a:solidFill>
+                  <a:srgbClr val="FF0000"/>
+                </a:solidFill>
+              </a:rPr>
+              <a:t># columns222</a:t>
+            </a:r>
+            <a:endParaRPr lang="en-US" dirty="0">
+              <a:solidFill>
+                <a:srgbClr val="FF0000"/>
+              </a:solidFill>
+            </a:endParaRPr>
           </a:p>
           <a:p>
             <a:r>
@@ -8626,24 +8639,6 @@
 </file>
 
 <file path=customXml/item1.xml><?xml version="1.0" encoding="utf-8"?>
-<p:properties xmlns:p="http://schemas.microsoft.com/office/2006/metadata/properties" xmlns:xsi="http://www.w3.org/2001/XMLSchema-instance" xmlns:pc="http://schemas.microsoft.com/office/infopath/2007/PartnerControls">
-  <documentManagement>
-    <Document_x0020_Purpose xmlns="f577acbf-5b0b-4b4f-9948-268e97f8d3a4">Informational</Document_x0020_Purpose>
-    <Initiatives xmlns="f577acbf-5b0b-4b4f-9948-268e97f8d3a4"/>
-  </documentManagement>
-</p:properties>
-</file>
-
-<file path=customXml/item2.xml><?xml version="1.0" encoding="utf-8"?>
-<?mso-contentType ?>
-<FormTemplates xmlns="http://schemas.microsoft.com/sharepoint/v3/contenttype/forms">
-  <Display>DocumentLibraryForm</Display>
-  <Edit>DocumentLibraryForm</Edit>
-  <New>DocumentLibraryForm</New>
-</FormTemplates>
-</file>
-
-<file path=customXml/item3.xml><?xml version="1.0" encoding="utf-8"?>
 <ct:contentTypeSchema xmlns:ct="http://schemas.microsoft.com/office/2006/metadata/contentType" xmlns:ma="http://schemas.microsoft.com/office/2006/metadata/properties/metaAttributes" ct:_="" ma:_="" ma:contentTypeName="Document" ma:contentTypeID="0x010100CD401524DC532D42A0E0ED886331A72B" ma:contentTypeVersion="15" ma:contentTypeDescription="Create a new document." ma:contentTypeScope="" ma:versionID="aba17d7263e5a17e1efe42a3571abb41">
   <xsd:schema xmlns:xsd="http://www.w3.org/2001/XMLSchema" xmlns:xs="http://www.w3.org/2001/XMLSchema" xmlns:p="http://schemas.microsoft.com/office/2006/metadata/properties" xmlns:ns2="f577acbf-5b0b-4b4f-9948-268e97f8d3a4" xmlns:ns3="b1e4d6ee-9f6f-43f8-a618-24f3d84da28f" targetNamespace="http://schemas.microsoft.com/office/2006/metadata/properties" ma:root="true" ma:fieldsID="e4e3c9c8ed1c3d723d02c9f1cb24d19a" ns2:_="" ns3:_="">
     <xsd:import namespace="f577acbf-5b0b-4b4f-9948-268e97f8d3a4"/>
@@ -8899,32 +8894,25 @@
 </ct:contentTypeSchema>
 </file>
 
-<file path=customXml/itemProps1.xml><?xml version="1.0" encoding="utf-8"?>
-<ds:datastoreItem xmlns:ds="http://schemas.openxmlformats.org/officeDocument/2006/customXml" ds:itemID="{617AB1FA-2F28-4684-9230-02ACEB6C0B0A}">
-  <ds:schemaRefs>
-    <ds:schemaRef ds:uri="http://purl.org/dc/elements/1.1/"/>
-    <ds:schemaRef ds:uri="http://schemas.microsoft.com/office/2006/metadata/properties"/>
-    <ds:schemaRef ds:uri="b1e4d6ee-9f6f-43f8-a618-24f3d84da28f"/>
-    <ds:schemaRef ds:uri="http://schemas.microsoft.com/office/2006/documentManagement/types"/>
-    <ds:schemaRef ds:uri="http://purl.org/dc/terms/"/>
-    <ds:schemaRef ds:uri="http://schemas.openxmlformats.org/package/2006/metadata/core-properties"/>
-    <ds:schemaRef ds:uri="f577acbf-5b0b-4b4f-9948-268e97f8d3a4"/>
-    <ds:schemaRef ds:uri="http://purl.org/dc/dcmitype/"/>
-    <ds:schemaRef ds:uri="http://schemas.microsoft.com/office/infopath/2007/PartnerControls"/>
-    <ds:schemaRef ds:uri="http://www.w3.org/XML/1998/namespace"/>
-  </ds:schemaRefs>
-</ds:datastoreItem>
+<file path=customXml/item2.xml><?xml version="1.0" encoding="utf-8"?>
+<?mso-contentType ?>
+<FormTemplates xmlns="http://schemas.microsoft.com/sharepoint/v3/contenttype/forms">
+  <Display>DocumentLibraryForm</Display>
+  <Edit>DocumentLibraryForm</Edit>
+  <New>DocumentLibraryForm</New>
+</FormTemplates>
 </file>
 
-<file path=customXml/itemProps2.xml><?xml version="1.0" encoding="utf-8"?>
-<ds:datastoreItem xmlns:ds="http://schemas.openxmlformats.org/officeDocument/2006/customXml" ds:itemID="{E21AFCC0-734A-4A90-A597-A1CB34860DCD}">
-  <ds:schemaRefs>
-    <ds:schemaRef ds:uri="http://schemas.microsoft.com/sharepoint/v3/contenttype/forms"/>
-  </ds:schemaRefs>
-</ds:datastoreItem>
+<file path=customXml/item3.xml><?xml version="1.0" encoding="utf-8"?>
+<p:properties xmlns:p="http://schemas.microsoft.com/office/2006/metadata/properties" xmlns:xsi="http://www.w3.org/2001/XMLSchema-instance" xmlns:pc="http://schemas.microsoft.com/office/infopath/2007/PartnerControls">
+  <documentManagement>
+    <Document_x0020_Purpose xmlns="f577acbf-5b0b-4b4f-9948-268e97f8d3a4">Informational</Document_x0020_Purpose>
+    <Initiatives xmlns="f577acbf-5b0b-4b4f-9948-268e97f8d3a4"/>
+  </documentManagement>
+</p:properties>
 </file>
 
-<file path=customXml/itemProps3.xml><?xml version="1.0" encoding="utf-8"?>
+<file path=customXml/itemProps1.xml><?xml version="1.0" encoding="utf-8"?>
 <ds:datastoreItem xmlns:ds="http://schemas.openxmlformats.org/officeDocument/2006/customXml" ds:itemID="{1DD29C39-1C4E-4B06-A1F4-2510F2DACF6E}">
   <ds:schemaRefs>
     <ds:schemaRef ds:uri="http://schemas.microsoft.com/office/2006/metadata/contentType"/>
@@ -8941,4 +8929,29 @@
     <ds:schemaRef ds:uri="http://schemas.microsoft.com/internal/obd"/>
   </ds:schemaRefs>
 </ds:datastoreItem>
+</file>
+
+<file path=customXml/itemProps2.xml><?xml version="1.0" encoding="utf-8"?>
+<ds:datastoreItem xmlns:ds="http://schemas.openxmlformats.org/officeDocument/2006/customXml" ds:itemID="{E21AFCC0-734A-4A90-A597-A1CB34860DCD}">
+  <ds:schemaRefs>
+    <ds:schemaRef ds:uri="http://schemas.microsoft.com/sharepoint/v3/contenttype/forms"/>
+  </ds:schemaRefs>
+</ds:datastoreItem>
+</file>
+
+<file path=customXml/itemProps3.xml><?xml version="1.0" encoding="utf-8"?>
+<ds:datastoreItem xmlns:ds="http://schemas.openxmlformats.org/officeDocument/2006/customXml" ds:itemID="{617AB1FA-2F28-4684-9230-02ACEB6C0B0A}">
+  <ds:schemaRefs>
+    <ds:schemaRef ds:uri="http://purl.org/dc/elements/1.1/"/>
+    <ds:schemaRef ds:uri="http://schemas.microsoft.com/office/2006/metadata/properties"/>
+    <ds:schemaRef ds:uri="b1e4d6ee-9f6f-43f8-a618-24f3d84da28f"/>
+    <ds:schemaRef ds:uri="http://schemas.microsoft.com/office/2006/documentManagement/types"/>
+    <ds:schemaRef ds:uri="http://purl.org/dc/terms/"/>
+    <ds:schemaRef ds:uri="http://schemas.openxmlformats.org/package/2006/metadata/core-properties"/>
+    <ds:schemaRef ds:uri="f577acbf-5b0b-4b4f-9948-268e97f8d3a4"/>
+    <ds:schemaRef ds:uri="http://purl.org/dc/dcmitype/"/>
+    <ds:schemaRef ds:uri="http://schemas.microsoft.com/office/infopath/2007/PartnerControls"/>
+    <ds:schemaRef ds:uri="http://www.w3.org/XML/1998/namespace"/>
+  </ds:schemaRefs>
+</ds:datastoreItem>
 </file>
</xml_diff>

<commit_message>
Search For All Unique Crypto and Answered The Question in PPT
</commit_message>
<xml_diff>
--- a/Power Point Presentations/Presentation Week 3 Group D.pptx
+++ b/Power Point Presentations/Presentation Week 3 Group D.pptx
@@ -5956,6 +5956,10 @@
             <a:br>
               <a:rPr lang="en-US" dirty="0"/>
             </a:br>
+            <a:r>
+              <a:rPr lang="en-US" dirty="0"/>
+              <a:t/>
+            </a:r>
             <a:br>
               <a:rPr lang="en-US" dirty="0"/>
             </a:br>
@@ -6281,12 +6285,12 @@
               <a:t>It contains </a:t>
             </a:r>
             <a:r>
-              <a:rPr lang="en-US">
+              <a:rPr lang="en-US" dirty="0" smtClean="0">
                 <a:solidFill>
                   <a:srgbClr val="FF0000"/>
                 </a:solidFill>
               </a:rPr>
-              <a:t># columns222</a:t>
+              <a:t>9 columns</a:t>
             </a:r>
             <a:endParaRPr lang="en-US" dirty="0">
               <a:solidFill>
@@ -6301,17 +6305,23 @@
                   <a:srgbClr val="FF0000"/>
                 </a:solidFill>
               </a:rPr>
-              <a:t>It contains # registers or rows</a:t>
-            </a:r>
-          </a:p>
-          <a:p>
+              <a:t>It contains </a:t>
+            </a:r>
+            <a:r>
+              <a:rPr lang="en-US" dirty="0" smtClean="0">
+                <a:solidFill>
+                  <a:srgbClr val="FF0000"/>
+                </a:solidFill>
+              </a:rPr>
+              <a:t>72946 </a:t>
+            </a:r>
             <a:r>
               <a:rPr lang="en-US" dirty="0">
                 <a:solidFill>
                   <a:srgbClr val="FF0000"/>
                 </a:solidFill>
               </a:rPr>
-              <a:t>It contains info for # different cryptos</a:t>
+              <a:t>registers or rows</a:t>
             </a:r>
           </a:p>
           <a:p>
@@ -6321,17 +6331,23 @@
                   <a:srgbClr val="FF0000"/>
                 </a:solidFill>
               </a:rPr>
-              <a:t>The start and end date for our data is </a:t>
-            </a:r>
-          </a:p>
-          <a:p>
+              <a:t>It contains info for </a:t>
+            </a:r>
+            <a:r>
+              <a:rPr lang="en-US" dirty="0" smtClean="0">
+                <a:solidFill>
+                  <a:srgbClr val="FF0000"/>
+                </a:solidFill>
+              </a:rPr>
+              <a:t>56 </a:t>
+            </a:r>
             <a:r>
               <a:rPr lang="en-US" dirty="0">
                 <a:solidFill>
                   <a:srgbClr val="FF0000"/>
                 </a:solidFill>
               </a:rPr>
-              <a:t>Some potential challenges we saw during the exploration were:</a:t>
+              <a:t>different cryptos</a:t>
             </a:r>
           </a:p>
           <a:p>
@@ -6341,8 +6357,107 @@
                   <a:srgbClr val="FF0000"/>
                 </a:solidFill>
               </a:rPr>
-              <a:t>The columns that we would be using to train our model probably are:</a:t>
-            </a:r>
+              <a:t>The start and end date for our data </a:t>
+            </a:r>
+            <a:r>
+              <a:rPr lang="en-US" dirty="0" smtClean="0">
+                <a:solidFill>
+                  <a:srgbClr val="FF0000"/>
+                </a:solidFill>
+              </a:rPr>
+              <a:t>is 2013-05-05 / 2022-10-23</a:t>
+            </a:r>
+            <a:endParaRPr lang="en-US" dirty="0">
+              <a:solidFill>
+                <a:srgbClr val="FF0000"/>
+              </a:solidFill>
+            </a:endParaRPr>
+          </a:p>
+          <a:p>
+            <a:r>
+              <a:rPr lang="en-US" dirty="0">
+                <a:solidFill>
+                  <a:srgbClr val="FF0000"/>
+                </a:solidFill>
+              </a:rPr>
+              <a:t>Some potential challenges we saw during the exploration were</a:t>
+            </a:r>
+            <a:r>
+              <a:rPr lang="en-US" dirty="0" smtClean="0">
+                <a:solidFill>
+                  <a:srgbClr val="FF0000"/>
+                </a:solidFill>
+              </a:rPr>
+              <a:t>: Value of crypto totally depends upon the investor and market demands. </a:t>
+            </a:r>
+            <a:r>
+              <a:rPr lang="en-US" smtClean="0">
+                <a:solidFill>
+                  <a:srgbClr val="FF0000"/>
+                </a:solidFill>
+              </a:rPr>
+              <a:t>So, </a:t>
+            </a:r>
+            <a:r>
+              <a:rPr lang="en-US">
+                <a:solidFill>
+                  <a:srgbClr val="FF0000"/>
+                </a:solidFill>
+              </a:rPr>
+              <a:t>m</a:t>
+            </a:r>
+            <a:r>
+              <a:rPr lang="en-US" smtClean="0">
+                <a:solidFill>
+                  <a:srgbClr val="FF0000"/>
+                </a:solidFill>
+              </a:rPr>
+              <a:t>arket </a:t>
+            </a:r>
+            <a:r>
+              <a:rPr lang="en-US" dirty="0" smtClean="0">
+                <a:solidFill>
+                  <a:srgbClr val="FF0000"/>
+                </a:solidFill>
+              </a:rPr>
+              <a:t>value can highly be affected by external factor as well.</a:t>
+            </a:r>
+            <a:endParaRPr lang="en-US" dirty="0">
+              <a:solidFill>
+                <a:srgbClr val="FF0000"/>
+              </a:solidFill>
+            </a:endParaRPr>
+          </a:p>
+          <a:p>
+            <a:r>
+              <a:rPr lang="en-US" dirty="0" smtClean="0">
+                <a:solidFill>
+                  <a:srgbClr val="FF0000"/>
+                </a:solidFill>
+              </a:rPr>
+              <a:t>The </a:t>
+            </a:r>
+            <a:r>
+              <a:rPr lang="en-US" dirty="0">
+                <a:solidFill>
+                  <a:srgbClr val="FF0000"/>
+                </a:solidFill>
+              </a:rPr>
+              <a:t>columns that we would be using to train our model probably are</a:t>
+            </a:r>
+            <a:r>
+              <a:rPr lang="en-US" dirty="0" smtClean="0">
+                <a:solidFill>
+                  <a:srgbClr val="FF0000"/>
+                </a:solidFill>
+              </a:rPr>
+              <a:t>: open, low, high, close, volume, crypto name, date</a:t>
+            </a:r>
+            <a:endParaRPr lang="en-US" dirty="0">
+              <a:solidFill>
+                <a:srgbClr val="FF0000"/>
+              </a:solidFill>
+            </a:endParaRPr>
           </a:p>
         </p:txBody>
       </p:sp>
@@ -8639,6 +8754,15 @@
 </file>
 
 <file path=customXml/item1.xml><?xml version="1.0" encoding="utf-8"?>
+<?mso-contentType ?>
+<FormTemplates xmlns="http://schemas.microsoft.com/sharepoint/v3/contenttype/forms">
+  <Display>DocumentLibraryForm</Display>
+  <Edit>DocumentLibraryForm</Edit>
+  <New>DocumentLibraryForm</New>
+</FormTemplates>
+</file>
+
+<file path=customXml/item2.xml><?xml version="1.0" encoding="utf-8"?>
 <ct:contentTypeSchema xmlns:ct="http://schemas.microsoft.com/office/2006/metadata/contentType" xmlns:ma="http://schemas.microsoft.com/office/2006/metadata/properties/metaAttributes" ct:_="" ma:_="" ma:contentTypeName="Document" ma:contentTypeID="0x010100CD401524DC532D42A0E0ED886331A72B" ma:contentTypeVersion="15" ma:contentTypeDescription="Create a new document." ma:contentTypeScope="" ma:versionID="aba17d7263e5a17e1efe42a3571abb41">
   <xsd:schema xmlns:xsd="http://www.w3.org/2001/XMLSchema" xmlns:xs="http://www.w3.org/2001/XMLSchema" xmlns:p="http://schemas.microsoft.com/office/2006/metadata/properties" xmlns:ns2="f577acbf-5b0b-4b4f-9948-268e97f8d3a4" xmlns:ns3="b1e4d6ee-9f6f-43f8-a618-24f3d84da28f" targetNamespace="http://schemas.microsoft.com/office/2006/metadata/properties" ma:root="true" ma:fieldsID="e4e3c9c8ed1c3d723d02c9f1cb24d19a" ns2:_="" ns3:_="">
     <xsd:import namespace="f577acbf-5b0b-4b4f-9948-268e97f8d3a4"/>
@@ -8894,15 +9018,6 @@
 </ct:contentTypeSchema>
 </file>
 
-<file path=customXml/item2.xml><?xml version="1.0" encoding="utf-8"?>
-<?mso-contentType ?>
-<FormTemplates xmlns="http://schemas.microsoft.com/sharepoint/v3/contenttype/forms">
-  <Display>DocumentLibraryForm</Display>
-  <Edit>DocumentLibraryForm</Edit>
-  <New>DocumentLibraryForm</New>
-</FormTemplates>
-</file>
-
 <file path=customXml/item3.xml><?xml version="1.0" encoding="utf-8"?>
 <p:properties xmlns:p="http://schemas.microsoft.com/office/2006/metadata/properties" xmlns:xsi="http://www.w3.org/2001/XMLSchema-instance" xmlns:pc="http://schemas.microsoft.com/office/infopath/2007/PartnerControls">
   <documentManagement>
@@ -8913,6 +9028,14 @@
 </file>
 
 <file path=customXml/itemProps1.xml><?xml version="1.0" encoding="utf-8"?>
+<ds:datastoreItem xmlns:ds="http://schemas.openxmlformats.org/officeDocument/2006/customXml" ds:itemID="{E21AFCC0-734A-4A90-A597-A1CB34860DCD}">
+  <ds:schemaRefs>
+    <ds:schemaRef ds:uri="http://schemas.microsoft.com/sharepoint/v3/contenttype/forms"/>
+  </ds:schemaRefs>
+</ds:datastoreItem>
+</file>
+
+<file path=customXml/itemProps2.xml><?xml version="1.0" encoding="utf-8"?>
 <ds:datastoreItem xmlns:ds="http://schemas.openxmlformats.org/officeDocument/2006/customXml" ds:itemID="{1DD29C39-1C4E-4B06-A1F4-2510F2DACF6E}">
   <ds:schemaRefs>
     <ds:schemaRef ds:uri="http://schemas.microsoft.com/office/2006/metadata/contentType"/>
@@ -8927,14 +9050,6 @@
     <ds:schemaRef ds:uri="http://purl.org/dc/elements/1.1/"/>
     <ds:schemaRef ds:uri="http://purl.org/dc/terms/"/>
     <ds:schemaRef ds:uri="http://schemas.microsoft.com/internal/obd"/>
-  </ds:schemaRefs>
-</ds:datastoreItem>
-</file>
-
-<file path=customXml/itemProps2.xml><?xml version="1.0" encoding="utf-8"?>
-<ds:datastoreItem xmlns:ds="http://schemas.openxmlformats.org/officeDocument/2006/customXml" ds:itemID="{E21AFCC0-734A-4A90-A597-A1CB34860DCD}">
-  <ds:schemaRefs>
-    <ds:schemaRef ds:uri="http://schemas.microsoft.com/sharepoint/v3/contenttype/forms"/>
   </ds:schemaRefs>
 </ds:datastoreItem>
 </file>

</xml_diff>

<commit_message>
changes made to the presentation slides
</commit_message>
<xml_diff>
--- a/Power Point Presentations/Presentation Week 3 Group D.pptx
+++ b/Power Point Presentations/Presentation Week 3 Group D.pptx
@@ -5956,6 +5956,10 @@
             <a:br>
               <a:rPr lang="en-US" dirty="0"/>
             </a:br>
+            <a:r>
+              <a:rPr lang="en-US" dirty="0"/>
+              <a:t/>
+            </a:r>
             <a:br>
               <a:rPr lang="en-US" dirty="0"/>
             </a:br>
@@ -6442,6 +6446,30 @@
           </a:p>
         </p:txBody>
       </p:sp>
+      <p:pic>
+        <p:nvPicPr>
+          <p:cNvPr id="5" name="Picture 4"/>
+          <p:cNvPicPr>
+            <a:picLocks noChangeAspect="1"/>
+          </p:cNvPicPr>
+          <p:nvPr/>
+        </p:nvPicPr>
+        <p:blipFill>
+          <a:blip r:embed="rId2"/>
+          <a:stretch>
+            <a:fillRect/>
+          </a:stretch>
+        </p:blipFill>
+        <p:spPr>
+          <a:xfrm>
+            <a:off x="1037681" y="2703468"/>
+            <a:ext cx="8341450" cy="3467999"/>
+          </a:xfrm>
+          <a:prstGeom prst="rect">
+            <a:avLst/>
+          </a:prstGeom>
+        </p:spPr>
+      </p:pic>
     </p:spTree>
     <p:extLst>
       <p:ext uri="{BB962C8B-B14F-4D97-AF65-F5344CB8AC3E}">
@@ -8245,7 +8273,9 @@
         </p:nvSpPr>
         <p:spPr/>
         <p:txBody>
-          <a:bodyPr/>
+          <a:bodyPr>
+            <a:normAutofit/>
+          </a:bodyPr>
           <a:lstStyle/>
           <a:p>
             <a:r>
@@ -8253,26 +8283,75 @@
               <a:t>First of all lets explain </a:t>
             </a:r>
             <a:r>
-              <a:rPr lang="en-US" dirty="0" err="1"/>
-              <a:t>whats</a:t>
+              <a:rPr lang="en-US" dirty="0" smtClean="0"/>
+              <a:t>what is </a:t>
             </a:r>
             <a:r>
               <a:rPr lang="en-US" dirty="0"/>
-              <a:t> ML and what does it mean to train a model.</a:t>
-            </a:r>
-          </a:p>
-          <a:p>
+              <a:t>ML and what does it mean to train a model.</a:t>
+            </a:r>
+          </a:p>
+          <a:p>
+            <a:r>
+              <a:rPr lang="en-US" dirty="0" smtClean="0"/>
+              <a:t>In </a:t>
+            </a:r>
+            <a:r>
+              <a:rPr lang="en-US" dirty="0" smtClean="0"/>
+              <a:t>Machine </a:t>
+            </a:r>
+            <a:r>
+              <a:rPr lang="en-US" dirty="0"/>
+              <a:t>L</a:t>
+            </a:r>
+            <a:r>
+              <a:rPr lang="en-US" dirty="0" smtClean="0"/>
+              <a:t>earning </a:t>
+            </a:r>
+            <a:r>
+              <a:rPr lang="en-US" dirty="0" smtClean="0"/>
+              <a:t>the machines learn a relationship between input data and the desired output for input data based on an algorithm.</a:t>
+            </a:r>
+          </a:p>
+          <a:p>
+            <a:r>
+              <a:rPr lang="en-US" dirty="0"/>
+              <a:t>Machine learning </a:t>
+            </a:r>
+            <a:r>
+              <a:rPr lang="en-US" dirty="0" smtClean="0"/>
+              <a:t>uses </a:t>
+            </a:r>
+            <a:r>
+              <a:rPr lang="en-US" dirty="0"/>
+              <a:t>supervised, unsupervised and reinforcement </a:t>
+            </a:r>
+            <a:r>
+              <a:rPr lang="en-US" dirty="0" smtClean="0"/>
+              <a:t>learning techniques.  </a:t>
+            </a:r>
+          </a:p>
+          <a:p>
+            <a:r>
+              <a:rPr lang="en-US" dirty="0" smtClean="0"/>
+              <a:t>Supervised learning trains a model based on an algorithm using existing data and corresponding output labels or values and then the trained model is used to make predictions on new data samples.</a:t>
+            </a:r>
             <a:endParaRPr lang="en-US" dirty="0"/>
           </a:p>
           <a:p>
-            <a:endParaRPr lang="en-US" dirty="0"/>
-          </a:p>
-          <a:p>
             <a:r>
               <a:rPr lang="en-US" dirty="0"/>
-              <a:t>In our particular case given that the data that we are using is a continuous set of numbers, we need to use a supervised training to accomplish a regression. </a:t>
-            </a:r>
-            <a:endParaRPr lang="de-DE" dirty="0"/>
+              <a:t>In our particular case given that the data that we are using is a continuous set of numbers, we need to use </a:t>
+            </a:r>
+            <a:r>
+              <a:rPr lang="en-US" dirty="0" smtClean="0"/>
+              <a:t>supervised </a:t>
+            </a:r>
+            <a:r>
+              <a:rPr lang="en-US" dirty="0"/>
+              <a:t>training to accomplish a regression. </a:t>
+            </a:r>
+            <a:endParaRPr lang="en-US" dirty="0" smtClean="0"/>
           </a:p>
         </p:txBody>
       </p:sp>
@@ -8895,21 +8974,21 @@
 </file>
 
 <file path=customXml/item2.xml><?xml version="1.0" encoding="utf-8"?>
+<p:properties xmlns:p="http://schemas.microsoft.com/office/2006/metadata/properties" xmlns:xsi="http://www.w3.org/2001/XMLSchema-instance" xmlns:pc="http://schemas.microsoft.com/office/infopath/2007/PartnerControls">
+  <documentManagement>
+    <Document_x0020_Purpose xmlns="f577acbf-5b0b-4b4f-9948-268e97f8d3a4">Informational</Document_x0020_Purpose>
+    <Initiatives xmlns="f577acbf-5b0b-4b4f-9948-268e97f8d3a4"/>
+  </documentManagement>
+</p:properties>
+</file>
+
+<file path=customXml/item3.xml><?xml version="1.0" encoding="utf-8"?>
 <?mso-contentType ?>
 <FormTemplates xmlns="http://schemas.microsoft.com/sharepoint/v3/contenttype/forms">
   <Display>DocumentLibraryForm</Display>
   <Edit>DocumentLibraryForm</Edit>
   <New>DocumentLibraryForm</New>
 </FormTemplates>
-</file>
-
-<file path=customXml/item3.xml><?xml version="1.0" encoding="utf-8"?>
-<p:properties xmlns:p="http://schemas.microsoft.com/office/2006/metadata/properties" xmlns:xsi="http://www.w3.org/2001/XMLSchema-instance" xmlns:pc="http://schemas.microsoft.com/office/infopath/2007/PartnerControls">
-  <documentManagement>
-    <Document_x0020_Purpose xmlns="f577acbf-5b0b-4b4f-9948-268e97f8d3a4">Informational</Document_x0020_Purpose>
-    <Initiatives xmlns="f577acbf-5b0b-4b4f-9948-268e97f8d3a4"/>
-  </documentManagement>
-</p:properties>
 </file>
 
 <file path=customXml/itemProps1.xml><?xml version="1.0" encoding="utf-8"?>
@@ -8932,14 +9011,6 @@
 </file>
 
 <file path=customXml/itemProps2.xml><?xml version="1.0" encoding="utf-8"?>
-<ds:datastoreItem xmlns:ds="http://schemas.openxmlformats.org/officeDocument/2006/customXml" ds:itemID="{E21AFCC0-734A-4A90-A597-A1CB34860DCD}">
-  <ds:schemaRefs>
-    <ds:schemaRef ds:uri="http://schemas.microsoft.com/sharepoint/v3/contenttype/forms"/>
-  </ds:schemaRefs>
-</ds:datastoreItem>
-</file>
-
-<file path=customXml/itemProps3.xml><?xml version="1.0" encoding="utf-8"?>
 <ds:datastoreItem xmlns:ds="http://schemas.openxmlformats.org/officeDocument/2006/customXml" ds:itemID="{617AB1FA-2F28-4684-9230-02ACEB6C0B0A}">
   <ds:schemaRefs>
     <ds:schemaRef ds:uri="http://purl.org/dc/elements/1.1/"/>
@@ -8954,4 +9025,12 @@
     <ds:schemaRef ds:uri="http://www.w3.org/XML/1998/namespace"/>
   </ds:schemaRefs>
 </ds:datastoreItem>
+</file>
+
+<file path=customXml/itemProps3.xml><?xml version="1.0" encoding="utf-8"?>
+<ds:datastoreItem xmlns:ds="http://schemas.openxmlformats.org/officeDocument/2006/customXml" ds:itemID="{E21AFCC0-734A-4A90-A597-A1CB34860DCD}">
+  <ds:schemaRefs>
+    <ds:schemaRef ds:uri="http://schemas.microsoft.com/sharepoint/v3/contenttype/forms"/>
+  </ds:schemaRefs>
+</ds:datastoreItem>
 </file>
</xml_diff>

<commit_message>
Just added answer to the slide 11 of Presentation week-3
</commit_message>
<xml_diff>
--- a/Power Point Presentations/Presentation Week 3 Group D.pptx
+++ b/Power Point Presentations/Presentation Week 3 Group D.pptx
@@ -5956,10 +5956,6 @@
             <a:br>
               <a:rPr lang="en-US" dirty="0"/>
             </a:br>
-            <a:r>
-              <a:rPr lang="en-US" dirty="0"/>
-              <a:t/>
-            </a:r>
             <a:br>
               <a:rPr lang="en-US" dirty="0"/>
             </a:br>
@@ -6282,21 +6278,18 @@
                   <a:srgbClr val="FF0000"/>
                 </a:solidFill>
               </a:rPr>
-              <a:t>It contains </a:t>
-            </a:r>
-            <a:r>
-              <a:rPr lang="en-US" dirty="0" smtClean="0">
+              <a:t>It contains 9 columns</a:t>
+            </a:r>
+          </a:p>
+          <a:p>
+            <a:r>
+              <a:rPr lang="en-US" dirty="0">
                 <a:solidFill>
                   <a:srgbClr val="FF0000"/>
                 </a:solidFill>
               </a:rPr>
-              <a:t>9 columns</a:t>
-            </a:r>
-            <a:endParaRPr lang="en-US" dirty="0">
-              <a:solidFill>
-                <a:srgbClr val="FF0000"/>
-              </a:solidFill>
-            </a:endParaRPr>
+              <a:t>It contains 72946 registers or rows</a:t>
+            </a:r>
           </a:p>
           <a:p>
             <a:r>
@@ -6305,159 +6298,54 @@
                   <a:srgbClr val="FF0000"/>
                 </a:solidFill>
               </a:rPr>
-              <a:t>It contains </a:t>
-            </a:r>
-            <a:r>
-              <a:rPr lang="en-US" dirty="0" smtClean="0">
+              <a:t>It contains info for 56 different cryptos</a:t>
+            </a:r>
+          </a:p>
+          <a:p>
+            <a:r>
+              <a:rPr lang="en-US" dirty="0">
                 <a:solidFill>
                   <a:srgbClr val="FF0000"/>
                 </a:solidFill>
               </a:rPr>
-              <a:t>72946 </a:t>
-            </a:r>
+              <a:t>The start and end date for our data is 2013-05-05 / 2022-10-23</a:t>
+            </a:r>
+          </a:p>
+          <a:p>
             <a:r>
               <a:rPr lang="en-US" dirty="0">
                 <a:solidFill>
                   <a:srgbClr val="FF0000"/>
                 </a:solidFill>
               </a:rPr>
-              <a:t>registers or rows</a:t>
-            </a:r>
-          </a:p>
-          <a:p>
+              <a:t>Some potential challenges we saw during the exploration were: Value of crypto totally depends upon the investor and market demands. </a:t>
+            </a:r>
+            <a:r>
+              <a:rPr lang="en-US">
+                <a:solidFill>
+                  <a:srgbClr val="FF0000"/>
+                </a:solidFill>
+              </a:rPr>
+              <a:t>So, market </a:t>
+            </a:r>
             <a:r>
               <a:rPr lang="en-US" dirty="0">
-                <a:solidFill>
-                  <a:srgbClr val="FF0000"/>
-                </a:solidFill>
-              </a:rPr>
-              <a:t>It contains info for </a:t>
-            </a:r>
-            <a:r>
-              <a:rPr lang="en-US" dirty="0" smtClean="0">
-                <a:solidFill>
-                  <a:srgbClr val="FF0000"/>
-                </a:solidFill>
-              </a:rPr>
-              <a:t>56 </a:t>
-            </a:r>
-            <a:r>
-              <a:rPr lang="en-US" dirty="0">
-                <a:solidFill>
-                  <a:srgbClr val="FF0000"/>
-                </a:solidFill>
-              </a:rPr>
-              <a:t>different cryptos</a:t>
-            </a:r>
-          </a:p>
-          <a:p>
-            <a:r>
-              <a:rPr lang="en-US" dirty="0">
-                <a:solidFill>
-                  <a:srgbClr val="FF0000"/>
-                </a:solidFill>
-              </a:rPr>
-              <a:t>The start and end date for our data </a:t>
-            </a:r>
-            <a:r>
-              <a:rPr lang="en-US" dirty="0" smtClean="0">
-                <a:solidFill>
-                  <a:srgbClr val="FF0000"/>
-                </a:solidFill>
-              </a:rPr>
-              <a:t>is 2013-05-05 / 2022-10-23</a:t>
-            </a:r>
-            <a:endParaRPr lang="en-US" dirty="0">
-              <a:solidFill>
-                <a:srgbClr val="FF0000"/>
-              </a:solidFill>
-            </a:endParaRPr>
-          </a:p>
-          <a:p>
-            <a:r>
-              <a:rPr lang="en-US" dirty="0">
-                <a:solidFill>
-                  <a:srgbClr val="FF0000"/>
-                </a:solidFill>
-              </a:rPr>
-              <a:t>Some potential challenges we saw during the exploration were</a:t>
-            </a:r>
-            <a:r>
-              <a:rPr lang="en-US" dirty="0" smtClean="0">
-                <a:solidFill>
-                  <a:srgbClr val="FF0000"/>
-                </a:solidFill>
-              </a:rPr>
-              <a:t>: Value of crypto totally depends upon the investor and market demands. </a:t>
-            </a:r>
-            <a:r>
-              <a:rPr lang="en-US" smtClean="0">
-                <a:solidFill>
-                  <a:srgbClr val="FF0000"/>
-                </a:solidFill>
-              </a:rPr>
-              <a:t>So, </a:t>
-            </a:r>
-            <a:r>
-              <a:rPr lang="en-US">
-                <a:solidFill>
-                  <a:srgbClr val="FF0000"/>
-                </a:solidFill>
-              </a:rPr>
-              <a:t>m</a:t>
-            </a:r>
-            <a:r>
-              <a:rPr lang="en-US" smtClean="0">
-                <a:solidFill>
-                  <a:srgbClr val="FF0000"/>
-                </a:solidFill>
-              </a:rPr>
-              <a:t>arket </a:t>
-            </a:r>
-            <a:r>
-              <a:rPr lang="en-US" dirty="0" smtClean="0">
                 <a:solidFill>
                   <a:srgbClr val="FF0000"/>
                 </a:solidFill>
               </a:rPr>
               <a:t>value can highly be affected by external factor as well.</a:t>
             </a:r>
-            <a:endParaRPr lang="en-US" dirty="0">
-              <a:solidFill>
-                <a:srgbClr val="FF0000"/>
-              </a:solidFill>
-            </a:endParaRPr>
-          </a:p>
-          <a:p>
-            <a:r>
-              <a:rPr lang="en-US" dirty="0" smtClean="0">
+          </a:p>
+          <a:p>
+            <a:r>
+              <a:rPr lang="en-US" dirty="0">
                 <a:solidFill>
                   <a:srgbClr val="FF0000"/>
                 </a:solidFill>
               </a:rPr>
-              <a:t>The </a:t>
-            </a:r>
-            <a:r>
-              <a:rPr lang="en-US" dirty="0">
-                <a:solidFill>
-                  <a:srgbClr val="FF0000"/>
-                </a:solidFill>
-              </a:rPr>
-              <a:t>columns that we would be using to train our model probably are</a:t>
-            </a:r>
-            <a:r>
-              <a:rPr lang="en-US" dirty="0" smtClean="0">
-                <a:solidFill>
-                  <a:srgbClr val="FF0000"/>
-                </a:solidFill>
-              </a:rPr>
-              <a:t>: open, low, high, close, volume, crypto name, date</a:t>
-            </a:r>
-            <a:endParaRPr lang="en-US" dirty="0">
-              <a:solidFill>
-                <a:srgbClr val="FF0000"/>
-              </a:solidFill>
-            </a:endParaRPr>
+              <a:t>The columns that we would be using to train our model probably are: open, low, high, close, volume, crypto name, date</a:t>
+            </a:r>
           </a:p>
         </p:txBody>
       </p:sp>
@@ -8444,11 +8332,7 @@
           <a:p>
             <a:r>
               <a:rPr lang="en-US" dirty="0"/>
-              <a:t>What is a </a:t>
-            </a:r>
-            <a:r>
-              <a:rPr lang="en-US" dirty="0" err="1"/>
-              <a:t>regresion</a:t>
+              <a:t>What is a regression</a:t>
             </a:r>
             <a:endParaRPr lang="de-DE" dirty="0"/>
           </a:p>
@@ -8477,7 +8361,31 @@
           <a:p>
             <a:r>
               <a:rPr lang="en-US" dirty="0"/>
-              <a:t>A regression is  </a:t>
+              <a:t>A statistical method known as regression establishes a relationship between a dependent variable and one or more independent (explanatory) variables.</a:t>
+            </a:r>
+          </a:p>
+          <a:p>
+            <a:r>
+              <a:rPr lang="en-US" dirty="0"/>
+              <a:t>A regression model can show whether changes observed in the dependent variable are associated with changes in one or more of the explanatory variables.</a:t>
+            </a:r>
+          </a:p>
+          <a:p>
+            <a:r>
+              <a:rPr lang="en-US" dirty="0"/>
+              <a:t>In essence, it fits a best-fit line and observes how the data is distributed around it to do this.</a:t>
+            </a:r>
+          </a:p>
+          <a:p>
+            <a:r>
+              <a:rPr lang="en-US" dirty="0"/>
+              <a:t>It helps the analyst to help to make asset valuations and making prediction.</a:t>
+            </a:r>
+          </a:p>
+          <a:p>
+            <a:r>
+              <a:rPr lang="en-US" dirty="0"/>
+              <a:t>There are two basic regression types Linear and Multiple linear regression.</a:t>
             </a:r>
             <a:endParaRPr lang="de-DE" dirty="0"/>
           </a:p>
@@ -8754,15 +8662,6 @@
 </file>
 
 <file path=customXml/item1.xml><?xml version="1.0" encoding="utf-8"?>
-<?mso-contentType ?>
-<FormTemplates xmlns="http://schemas.microsoft.com/sharepoint/v3/contenttype/forms">
-  <Display>DocumentLibraryForm</Display>
-  <Edit>DocumentLibraryForm</Edit>
-  <New>DocumentLibraryForm</New>
-</FormTemplates>
-</file>
-
-<file path=customXml/item2.xml><?xml version="1.0" encoding="utf-8"?>
 <ct:contentTypeSchema xmlns:ct="http://schemas.microsoft.com/office/2006/metadata/contentType" xmlns:ma="http://schemas.microsoft.com/office/2006/metadata/properties/metaAttributes" ct:_="" ma:_="" ma:contentTypeName="Document" ma:contentTypeID="0x010100CD401524DC532D42A0E0ED886331A72B" ma:contentTypeVersion="15" ma:contentTypeDescription="Create a new document." ma:contentTypeScope="" ma:versionID="aba17d7263e5a17e1efe42a3571abb41">
   <xsd:schema xmlns:xsd="http://www.w3.org/2001/XMLSchema" xmlns:xs="http://www.w3.org/2001/XMLSchema" xmlns:p="http://schemas.microsoft.com/office/2006/metadata/properties" xmlns:ns2="f577acbf-5b0b-4b4f-9948-268e97f8d3a4" xmlns:ns3="b1e4d6ee-9f6f-43f8-a618-24f3d84da28f" targetNamespace="http://schemas.microsoft.com/office/2006/metadata/properties" ma:root="true" ma:fieldsID="e4e3c9c8ed1c3d723d02c9f1cb24d19a" ns2:_="" ns3:_="">
     <xsd:import namespace="f577acbf-5b0b-4b4f-9948-268e97f8d3a4"/>
@@ -9018,6 +8917,15 @@
 </ct:contentTypeSchema>
 </file>
 
+<file path=customXml/item2.xml><?xml version="1.0" encoding="utf-8"?>
+<?mso-contentType ?>
+<FormTemplates xmlns="http://schemas.microsoft.com/sharepoint/v3/contenttype/forms">
+  <Display>DocumentLibraryForm</Display>
+  <Edit>DocumentLibraryForm</Edit>
+  <New>DocumentLibraryForm</New>
+</FormTemplates>
+</file>
+
 <file path=customXml/item3.xml><?xml version="1.0" encoding="utf-8"?>
 <p:properties xmlns:p="http://schemas.microsoft.com/office/2006/metadata/properties" xmlns:xsi="http://www.w3.org/2001/XMLSchema-instance" xmlns:pc="http://schemas.microsoft.com/office/infopath/2007/PartnerControls">
   <documentManagement>
@@ -9028,14 +8936,6 @@
 </file>
 
 <file path=customXml/itemProps1.xml><?xml version="1.0" encoding="utf-8"?>
-<ds:datastoreItem xmlns:ds="http://schemas.openxmlformats.org/officeDocument/2006/customXml" ds:itemID="{E21AFCC0-734A-4A90-A597-A1CB34860DCD}">
-  <ds:schemaRefs>
-    <ds:schemaRef ds:uri="http://schemas.microsoft.com/sharepoint/v3/contenttype/forms"/>
-  </ds:schemaRefs>
-</ds:datastoreItem>
-</file>
-
-<file path=customXml/itemProps2.xml><?xml version="1.0" encoding="utf-8"?>
 <ds:datastoreItem xmlns:ds="http://schemas.openxmlformats.org/officeDocument/2006/customXml" ds:itemID="{1DD29C39-1C4E-4B06-A1F4-2510F2DACF6E}">
   <ds:schemaRefs>
     <ds:schemaRef ds:uri="http://schemas.microsoft.com/office/2006/metadata/contentType"/>
@@ -9050,6 +8950,14 @@
     <ds:schemaRef ds:uri="http://purl.org/dc/elements/1.1/"/>
     <ds:schemaRef ds:uri="http://purl.org/dc/terms/"/>
     <ds:schemaRef ds:uri="http://schemas.microsoft.com/internal/obd"/>
+  </ds:schemaRefs>
+</ds:datastoreItem>
+</file>
+
+<file path=customXml/itemProps2.xml><?xml version="1.0" encoding="utf-8"?>
+<ds:datastoreItem xmlns:ds="http://schemas.openxmlformats.org/officeDocument/2006/customXml" ds:itemID="{E21AFCC0-734A-4A90-A597-A1CB34860DCD}">
+  <ds:schemaRefs>
+    <ds:schemaRef ds:uri="http://schemas.microsoft.com/sharepoint/v3/contenttype/forms"/>
   </ds:schemaRefs>
 </ds:datastoreItem>
 </file>

</xml_diff>

<commit_message>
generation of Graph & 7, 11 slide modifiication
</commit_message>
<xml_diff>
--- a/Power Point Presentations/Presentation Week 3 Group D.pptx
+++ b/Power Point Presentations/Presentation Week 3 Group D.pptx
@@ -1,26 +1,26 @@
 
 <file path=ppt/presentation.xml><?xml version="1.0" encoding="utf-8"?>
-<p:presentation xmlns:a="http://schemas.openxmlformats.org/drawingml/2006/main" xmlns:r="http://schemas.openxmlformats.org/officeDocument/2006/relationships" xmlns:p="http://schemas.openxmlformats.org/presentationml/2006/main" saveSubsetFonts="1" autoCompressPictures="0">
+<p:presentation xmlns:a="http://schemas.openxmlformats.org/drawingml/2006/main" xmlns:r="http://schemas.openxmlformats.org/officeDocument/2006/relationships" xmlns:p="http://schemas.openxmlformats.org/presentationml/2006/main" autoCompressPictures="0">
   <p:sldMasterIdLst>
-    <p:sldMasterId id="2147483660" r:id="rId4"/>
+    <p:sldMasterId id="2147483648" r:id="rId1"/>
   </p:sldMasterIdLst>
   <p:sldIdLst>
-    <p:sldId id="256" r:id="rId5"/>
-    <p:sldId id="268" r:id="rId6"/>
-    <p:sldId id="261" r:id="rId7"/>
-    <p:sldId id="257" r:id="rId8"/>
-    <p:sldId id="265" r:id="rId9"/>
-    <p:sldId id="266" r:id="rId10"/>
-    <p:sldId id="267" r:id="rId11"/>
-    <p:sldId id="258" r:id="rId12"/>
-    <p:sldId id="259" r:id="rId13"/>
-    <p:sldId id="260" r:id="rId14"/>
-    <p:sldId id="262" r:id="rId15"/>
-    <p:sldId id="264" r:id="rId16"/>
-    <p:sldId id="263" r:id="rId17"/>
-    <p:sldId id="269" r:id="rId18"/>
-    <p:sldId id="270" r:id="rId19"/>
-    <p:sldId id="271" r:id="rId20"/>
+    <p:sldId id="256" r:id="rId3"/>
+    <p:sldId id="268" r:id="rId4"/>
+    <p:sldId id="261" r:id="rId5"/>
+    <p:sldId id="257" r:id="rId6"/>
+    <p:sldId id="265" r:id="rId7"/>
+    <p:sldId id="266" r:id="rId8"/>
+    <p:sldId id="267" r:id="rId9"/>
+    <p:sldId id="258" r:id="rId10"/>
+    <p:sldId id="259" r:id="rId11"/>
+    <p:sldId id="260" r:id="rId12"/>
+    <p:sldId id="262" r:id="rId13"/>
+    <p:sldId id="264" r:id="rId14"/>
+    <p:sldId id="263" r:id="rId15"/>
+    <p:sldId id="269" r:id="rId16"/>
+    <p:sldId id="270" r:id="rId17"/>
+    <p:sldId id="271" r:id="rId18"/>
   </p:sldIdLst>
   <p:sldSz cx="12192000" cy="6858000"/>
   <p:notesSz cx="6858000" cy="9144000"/>
@@ -119,24 +119,11 @@
       </a:defRPr>
     </a:lvl9pPr>
   </p:defaultTextStyle>
-  <p:extLst>
-    <p:ext uri="{EFAFB233-063F-42B5-8137-9DF3F51BA10A}">
-      <p15:sldGuideLst xmlns:p15="http://schemas.microsoft.com/office/powerpoint/2012/main"/>
-    </p:ext>
-  </p:extLst>
 </p:presentation>
 </file>
 
-<file path=ppt/revisionInfo.xml><?xml version="1.0" encoding="utf-8"?>
-<p1510:revInfo xmlns:a="http://schemas.openxmlformats.org/drawingml/2006/main" xmlns:r="http://schemas.openxmlformats.org/officeDocument/2006/relationships" xmlns:p1510="http://schemas.microsoft.com/office/powerpoint/2015/10/main">
-  <p1510:revLst>
-    <p1510:client id="{87BC108F-2AB8-48DA-AB49-F9E86BDDFE2F}" v="6" dt="2018-08-08T09:06:44.784"/>
-  </p1510:revLst>
-</p1510:revInfo>
-</file>
-
 <file path=ppt/slideLayouts/slideLayout1.xml><?xml version="1.0" encoding="utf-8"?>
-<p:sldLayout xmlns:a="http://schemas.openxmlformats.org/drawingml/2006/main" xmlns:r="http://schemas.openxmlformats.org/officeDocument/2006/relationships" xmlns:p="http://schemas.openxmlformats.org/presentationml/2006/main" showMasterSp="0" type="title" preserve="1">
+<p:sldLayout xmlns:a="http://schemas.openxmlformats.org/drawingml/2006/main" xmlns:r="http://schemas.openxmlformats.org/officeDocument/2006/relationships" xmlns:p="http://schemas.openxmlformats.org/presentationml/2006/main" type="title" preserve="1" showMasterSp="0">
   <p:cSld name="Title Slide">
     <p:spTree>
       <p:nvGrpSpPr>
@@ -857,7 +844,6 @@
           <a:p>
             <a:fld id="{37A2730A-859E-B540-ADF3-E97069AD1FDB}" type="datetimeFigureOut">
               <a:rPr lang="en-US" smtClean="0"/>
-              <a:t>2/2/2024</a:t>
             </a:fld>
             <a:endParaRPr lang="en-US"/>
           </a:p>
@@ -899,18 +885,12 @@
           <a:p>
             <a:fld id="{8E05DC9C-C50D-D242-B083-59CEE07163F1}" type="slidenum">
               <a:rPr lang="en-US" smtClean="0"/>
-              <a:t>‹#›</a:t>
             </a:fld>
             <a:endParaRPr lang="en-US"/>
           </a:p>
         </p:txBody>
       </p:sp>
     </p:spTree>
-    <p:extLst>
-      <p:ext uri="{BB962C8B-B14F-4D97-AF65-F5344CB8AC3E}">
-        <p14:creationId xmlns:p14="http://schemas.microsoft.com/office/powerpoint/2010/main" val="142639626"/>
-      </p:ext>
-    </p:extLst>
   </p:cSld>
   <p:clrMapOvr>
     <a:masterClrMapping/>
@@ -1088,6 +1068,7 @@
               <a:rPr lang="en-US"/>
               <a:t>Click to edit Master text styles</a:t>
             </a:r>
+            <a:endParaRPr lang="en-US"/>
           </a:p>
         </p:txBody>
       </p:sp>
@@ -1108,7 +1089,6 @@
           <a:p>
             <a:fld id="{37A2730A-859E-B540-ADF3-E97069AD1FDB}" type="datetimeFigureOut">
               <a:rPr lang="en-US" smtClean="0"/>
-              <a:t>2/2/2024</a:t>
             </a:fld>
             <a:endParaRPr lang="en-US"/>
           </a:p>
@@ -1150,18 +1130,12 @@
           <a:p>
             <a:fld id="{8E05DC9C-C50D-D242-B083-59CEE07163F1}" type="slidenum">
               <a:rPr lang="en-US" smtClean="0"/>
-              <a:t>‹#›</a:t>
             </a:fld>
             <a:endParaRPr lang="en-US"/>
           </a:p>
         </p:txBody>
       </p:sp>
     </p:spTree>
-    <p:extLst>
-      <p:ext uri="{BB962C8B-B14F-4D97-AF65-F5344CB8AC3E}">
-        <p14:creationId xmlns:p14="http://schemas.microsoft.com/office/powerpoint/2010/main" val="2641029608"/>
-      </p:ext>
-    </p:extLst>
   </p:cSld>
   <p:clrMapOvr>
     <a:masterClrMapping/>
@@ -1280,6 +1254,7 @@
               <a:rPr lang="en-US"/>
               <a:t>Click to edit Master text styles</a:t>
             </a:r>
+            <a:endParaRPr lang="en-US"/>
           </a:p>
         </p:txBody>
       </p:sp>
@@ -1402,6 +1377,7 @@
               <a:rPr lang="en-US"/>
               <a:t>Click to edit Master text styles</a:t>
             </a:r>
+            <a:endParaRPr lang="en-US"/>
           </a:p>
         </p:txBody>
       </p:sp>
@@ -1422,7 +1398,6 @@
           <a:p>
             <a:fld id="{37A2730A-859E-B540-ADF3-E97069AD1FDB}" type="datetimeFigureOut">
               <a:rPr lang="en-US" smtClean="0"/>
-              <a:t>2/2/2024</a:t>
             </a:fld>
             <a:endParaRPr lang="en-US"/>
           </a:p>
@@ -1464,7 +1439,6 @@
           <a:p>
             <a:fld id="{8E05DC9C-C50D-D242-B083-59CEE07163F1}" type="slidenum">
               <a:rPr lang="en-US" smtClean="0"/>
-              <a:t>‹#›</a:t>
             </a:fld>
             <a:endParaRPr lang="en-US"/>
           </a:p>
@@ -1504,10 +1478,23 @@
                   </a:schemeClr>
                 </a:solidFill>
                 <a:effectLst/>
-                <a:latin typeface="Arial"/>
+                <a:latin typeface="Arial" panose="020B0604020202020204"/>
               </a:rPr>
               <a:t>“</a:t>
             </a:r>
+            <a:endParaRPr lang="en-US" sz="8000" baseline="0" dirty="0">
+              <a:ln w="3175" cmpd="sng">
+                <a:noFill/>
+              </a:ln>
+              <a:solidFill>
+                <a:schemeClr val="accent1">
+                  <a:lumMod val="60000"/>
+                  <a:lumOff val="40000"/>
+                </a:schemeClr>
+              </a:solidFill>
+              <a:effectLst/>
+              <a:latin typeface="Arial" panose="020B0604020202020204"/>
+            </a:endParaRPr>
           </a:p>
         </p:txBody>
       </p:sp>
@@ -1544,7 +1531,7 @@
                     <a:lumOff val="40000"/>
                   </a:schemeClr>
                 </a:solidFill>
-                <a:latin typeface="Arial"/>
+                <a:latin typeface="Arial" panose="020B0604020202020204"/>
               </a:rPr>
               <a:t>”</a:t>
             </a:r>
@@ -1555,17 +1542,12 @@
                   <a:lumOff val="40000"/>
                 </a:schemeClr>
               </a:solidFill>
-              <a:latin typeface="Arial"/>
+              <a:latin typeface="Arial" panose="020B0604020202020204"/>
             </a:endParaRPr>
           </a:p>
         </p:txBody>
       </p:sp>
     </p:spTree>
-    <p:extLst>
-      <p:ext uri="{BB962C8B-B14F-4D97-AF65-F5344CB8AC3E}">
-        <p14:creationId xmlns:p14="http://schemas.microsoft.com/office/powerpoint/2010/main" val="69195683"/>
-      </p:ext>
-    </p:extLst>
   </p:cSld>
   <p:clrMapOvr>
     <a:masterClrMapping/>
@@ -1743,6 +1725,7 @@
               <a:rPr lang="en-US"/>
               <a:t>Click to edit Master text styles</a:t>
             </a:r>
+            <a:endParaRPr lang="en-US"/>
           </a:p>
         </p:txBody>
       </p:sp>
@@ -1763,7 +1746,6 @@
           <a:p>
             <a:fld id="{37A2730A-859E-B540-ADF3-E97069AD1FDB}" type="datetimeFigureOut">
               <a:rPr lang="en-US" smtClean="0"/>
-              <a:t>2/2/2024</a:t>
             </a:fld>
             <a:endParaRPr lang="en-US"/>
           </a:p>
@@ -1805,18 +1787,12 @@
           <a:p>
             <a:fld id="{8E05DC9C-C50D-D242-B083-59CEE07163F1}" type="slidenum">
               <a:rPr lang="en-US" smtClean="0"/>
-              <a:t>‹#›</a:t>
             </a:fld>
             <a:endParaRPr lang="en-US"/>
           </a:p>
         </p:txBody>
       </p:sp>
     </p:spTree>
-    <p:extLst>
-      <p:ext uri="{BB962C8B-B14F-4D97-AF65-F5344CB8AC3E}">
-        <p14:creationId xmlns:p14="http://schemas.microsoft.com/office/powerpoint/2010/main" val="933481662"/>
-      </p:ext>
-    </p:extLst>
   </p:cSld>
   <p:clrMapOvr>
     <a:masterClrMapping/>
@@ -1935,6 +1911,7 @@
               <a:rPr lang="en-US"/>
               <a:t>Click to edit Master text styles</a:t>
             </a:r>
+            <a:endParaRPr lang="en-US"/>
           </a:p>
         </p:txBody>
       </p:sp>
@@ -2057,6 +2034,7 @@
               <a:rPr lang="en-US"/>
               <a:t>Click to edit Master text styles</a:t>
             </a:r>
+            <a:endParaRPr lang="en-US"/>
           </a:p>
         </p:txBody>
       </p:sp>
@@ -2077,7 +2055,6 @@
           <a:p>
             <a:fld id="{37A2730A-859E-B540-ADF3-E97069AD1FDB}" type="datetimeFigureOut">
               <a:rPr lang="en-US" smtClean="0"/>
-              <a:t>2/2/2024</a:t>
             </a:fld>
             <a:endParaRPr lang="en-US"/>
           </a:p>
@@ -2119,7 +2096,6 @@
           <a:p>
             <a:fld id="{8E05DC9C-C50D-D242-B083-59CEE07163F1}" type="slidenum">
               <a:rPr lang="en-US" smtClean="0"/>
-              <a:t>‹#›</a:t>
             </a:fld>
             <a:endParaRPr lang="en-US"/>
           </a:p>
@@ -2159,10 +2135,23 @@
                   </a:schemeClr>
                 </a:solidFill>
                 <a:effectLst/>
-                <a:latin typeface="Arial"/>
+                <a:latin typeface="Arial" panose="020B0604020202020204"/>
               </a:rPr>
               <a:t>“</a:t>
             </a:r>
+            <a:endParaRPr lang="en-US" sz="8000" baseline="0" dirty="0">
+              <a:ln w="3175" cmpd="sng">
+                <a:noFill/>
+              </a:ln>
+              <a:solidFill>
+                <a:schemeClr val="accent1">
+                  <a:lumMod val="60000"/>
+                  <a:lumOff val="40000"/>
+                </a:schemeClr>
+              </a:solidFill>
+              <a:effectLst/>
+              <a:latin typeface="Arial" panose="020B0604020202020204"/>
+            </a:endParaRPr>
           </a:p>
         </p:txBody>
       </p:sp>
@@ -2200,19 +2189,27 @@
                   </a:schemeClr>
                 </a:solidFill>
                 <a:effectLst/>
-                <a:latin typeface="Arial"/>
+                <a:latin typeface="Arial" panose="020B0604020202020204"/>
               </a:rPr>
               <a:t>”</a:t>
             </a:r>
+            <a:endParaRPr lang="en-US" sz="8000" baseline="0" dirty="0">
+              <a:ln w="3175" cmpd="sng">
+                <a:noFill/>
+              </a:ln>
+              <a:solidFill>
+                <a:schemeClr val="accent1">
+                  <a:lumMod val="60000"/>
+                  <a:lumOff val="40000"/>
+                </a:schemeClr>
+              </a:solidFill>
+              <a:effectLst/>
+              <a:latin typeface="Arial" panose="020B0604020202020204"/>
+            </a:endParaRPr>
           </a:p>
         </p:txBody>
       </p:sp>
     </p:spTree>
-    <p:extLst>
-      <p:ext uri="{BB962C8B-B14F-4D97-AF65-F5344CB8AC3E}">
-        <p14:creationId xmlns:p14="http://schemas.microsoft.com/office/powerpoint/2010/main" val="4027619619"/>
-      </p:ext>
-    </p:extLst>
   </p:cSld>
   <p:clrMapOvr>
     <a:masterClrMapping/>
@@ -2328,6 +2325,7 @@
               <a:rPr lang="en-US"/>
               <a:t>Click to edit Master text styles</a:t>
             </a:r>
+            <a:endParaRPr lang="en-US"/>
           </a:p>
         </p:txBody>
       </p:sp>
@@ -2450,6 +2448,7 @@
               <a:rPr lang="en-US"/>
               <a:t>Click to edit Master text styles</a:t>
             </a:r>
+            <a:endParaRPr lang="en-US"/>
           </a:p>
         </p:txBody>
       </p:sp>
@@ -2470,7 +2469,6 @@
           <a:p>
             <a:fld id="{37A2730A-859E-B540-ADF3-E97069AD1FDB}" type="datetimeFigureOut">
               <a:rPr lang="en-US" smtClean="0"/>
-              <a:t>2/2/2024</a:t>
             </a:fld>
             <a:endParaRPr lang="en-US"/>
           </a:p>
@@ -2512,18 +2510,12 @@
           <a:p>
             <a:fld id="{8E05DC9C-C50D-D242-B083-59CEE07163F1}" type="slidenum">
               <a:rPr lang="en-US" smtClean="0"/>
-              <a:t>‹#›</a:t>
             </a:fld>
             <a:endParaRPr lang="en-US"/>
           </a:p>
         </p:txBody>
       </p:sp>
     </p:spTree>
-    <p:extLst>
-      <p:ext uri="{BB962C8B-B14F-4D97-AF65-F5344CB8AC3E}">
-        <p14:creationId xmlns:p14="http://schemas.microsoft.com/office/powerpoint/2010/main" val="2437262274"/>
-      </p:ext>
-    </p:extLst>
   </p:cSld>
   <p:clrMapOvr>
     <a:masterClrMapping/>
@@ -2591,6 +2583,7 @@
               <a:rPr lang="en-US"/>
               <a:t>Click to edit Master text styles</a:t>
             </a:r>
+            <a:endParaRPr lang="en-US"/>
           </a:p>
           <a:p>
             <a:pPr lvl="1"/>
@@ -2598,6 +2591,7 @@
               <a:rPr lang="en-US"/>
               <a:t>Second level</a:t>
             </a:r>
+            <a:endParaRPr lang="en-US"/>
           </a:p>
           <a:p>
             <a:pPr lvl="2"/>
@@ -2605,6 +2599,7 @@
               <a:rPr lang="en-US"/>
               <a:t>Third level</a:t>
             </a:r>
+            <a:endParaRPr lang="en-US"/>
           </a:p>
           <a:p>
             <a:pPr lvl="3"/>
@@ -2612,6 +2607,7 @@
               <a:rPr lang="en-US"/>
               <a:t>Fourth level</a:t>
             </a:r>
+            <a:endParaRPr lang="en-US"/>
           </a:p>
           <a:p>
             <a:pPr lvl="4"/>
@@ -2640,7 +2636,6 @@
           <a:p>
             <a:fld id="{37A2730A-859E-B540-ADF3-E97069AD1FDB}" type="datetimeFigureOut">
               <a:rPr lang="en-US" smtClean="0"/>
-              <a:t>2/2/2024</a:t>
             </a:fld>
             <a:endParaRPr lang="en-US"/>
           </a:p>
@@ -2682,18 +2677,12 @@
           <a:p>
             <a:fld id="{8E05DC9C-C50D-D242-B083-59CEE07163F1}" type="slidenum">
               <a:rPr lang="en-US" smtClean="0"/>
-              <a:t>‹#›</a:t>
             </a:fld>
             <a:endParaRPr lang="en-US"/>
           </a:p>
         </p:txBody>
       </p:sp>
     </p:spTree>
-    <p:extLst>
-      <p:ext uri="{BB962C8B-B14F-4D97-AF65-F5344CB8AC3E}">
-        <p14:creationId xmlns:p14="http://schemas.microsoft.com/office/powerpoint/2010/main" val="1774411472"/>
-      </p:ext>
-    </p:extLst>
   </p:cSld>
   <p:clrMapOvr>
     <a:masterClrMapping/>
@@ -2771,6 +2760,7 @@
               <a:rPr lang="en-US"/>
               <a:t>Click to edit Master text styles</a:t>
             </a:r>
+            <a:endParaRPr lang="en-US"/>
           </a:p>
           <a:p>
             <a:pPr lvl="1"/>
@@ -2778,6 +2768,7 @@
               <a:rPr lang="en-US"/>
               <a:t>Second level</a:t>
             </a:r>
+            <a:endParaRPr lang="en-US"/>
           </a:p>
           <a:p>
             <a:pPr lvl="2"/>
@@ -2785,6 +2776,7 @@
               <a:rPr lang="en-US"/>
               <a:t>Third level</a:t>
             </a:r>
+            <a:endParaRPr lang="en-US"/>
           </a:p>
           <a:p>
             <a:pPr lvl="3"/>
@@ -2792,6 +2784,7 @@
               <a:rPr lang="en-US"/>
               <a:t>Fourth level</a:t>
             </a:r>
+            <a:endParaRPr lang="en-US"/>
           </a:p>
           <a:p>
             <a:pPr lvl="4"/>
@@ -2820,7 +2813,6 @@
           <a:p>
             <a:fld id="{37A2730A-859E-B540-ADF3-E97069AD1FDB}" type="datetimeFigureOut">
               <a:rPr lang="en-US" smtClean="0"/>
-              <a:t>2/2/2024</a:t>
             </a:fld>
             <a:endParaRPr lang="en-US"/>
           </a:p>
@@ -2862,18 +2854,12 @@
           <a:p>
             <a:fld id="{8E05DC9C-C50D-D242-B083-59CEE07163F1}" type="slidenum">
               <a:rPr lang="en-US" smtClean="0"/>
-              <a:t>‹#›</a:t>
             </a:fld>
             <a:endParaRPr lang="en-US"/>
           </a:p>
         </p:txBody>
       </p:sp>
     </p:spTree>
-    <p:extLst>
-      <p:ext uri="{BB962C8B-B14F-4D97-AF65-F5344CB8AC3E}">
-        <p14:creationId xmlns:p14="http://schemas.microsoft.com/office/powerpoint/2010/main" val="590877126"/>
-      </p:ext>
-    </p:extLst>
   </p:cSld>
   <p:clrMapOvr>
     <a:masterClrMapping/>
@@ -2947,6 +2933,7 @@
               <a:rPr lang="en-US"/>
               <a:t>Click to edit Master text styles</a:t>
             </a:r>
+            <a:endParaRPr lang="en-US"/>
           </a:p>
           <a:p>
             <a:pPr lvl="1"/>
@@ -2954,6 +2941,7 @@
               <a:rPr lang="en-US"/>
               <a:t>Second level</a:t>
             </a:r>
+            <a:endParaRPr lang="en-US"/>
           </a:p>
           <a:p>
             <a:pPr lvl="2"/>
@@ -2961,6 +2949,7 @@
               <a:rPr lang="en-US"/>
               <a:t>Third level</a:t>
             </a:r>
+            <a:endParaRPr lang="en-US"/>
           </a:p>
           <a:p>
             <a:pPr lvl="3"/>
@@ -2968,6 +2957,7 @@
               <a:rPr lang="en-US"/>
               <a:t>Fourth level</a:t>
             </a:r>
+            <a:endParaRPr lang="en-US"/>
           </a:p>
           <a:p>
             <a:pPr lvl="4"/>
@@ -2996,7 +2986,6 @@
           <a:p>
             <a:fld id="{37A2730A-859E-B540-ADF3-E97069AD1FDB}" type="datetimeFigureOut">
               <a:rPr lang="en-US" smtClean="0"/>
-              <a:t>2/2/2024</a:t>
             </a:fld>
             <a:endParaRPr lang="en-US"/>
           </a:p>
@@ -3038,18 +3027,12 @@
           <a:p>
             <a:fld id="{8E05DC9C-C50D-D242-B083-59CEE07163F1}" type="slidenum">
               <a:rPr lang="en-US" smtClean="0"/>
-              <a:t>‹#›</a:t>
             </a:fld>
             <a:endParaRPr lang="en-US"/>
           </a:p>
         </p:txBody>
       </p:sp>
     </p:spTree>
-    <p:extLst>
-      <p:ext uri="{BB962C8B-B14F-4D97-AF65-F5344CB8AC3E}">
-        <p14:creationId xmlns:p14="http://schemas.microsoft.com/office/powerpoint/2010/main" val="666414228"/>
-      </p:ext>
-    </p:extLst>
   </p:cSld>
   <p:clrMapOvr>
     <a:masterClrMapping/>
@@ -3223,6 +3206,7 @@
               <a:rPr lang="en-US"/>
               <a:t>Click to edit Master text styles</a:t>
             </a:r>
+            <a:endParaRPr lang="en-US"/>
           </a:p>
         </p:txBody>
       </p:sp>
@@ -3243,7 +3227,6 @@
           <a:p>
             <a:fld id="{37A2730A-859E-B540-ADF3-E97069AD1FDB}" type="datetimeFigureOut">
               <a:rPr lang="en-US" smtClean="0"/>
-              <a:t>2/2/2024</a:t>
             </a:fld>
             <a:endParaRPr lang="en-US"/>
           </a:p>
@@ -3285,18 +3268,12 @@
           <a:p>
             <a:fld id="{8E05DC9C-C50D-D242-B083-59CEE07163F1}" type="slidenum">
               <a:rPr lang="en-US" smtClean="0"/>
-              <a:t>‹#›</a:t>
             </a:fld>
             <a:endParaRPr lang="en-US"/>
           </a:p>
         </p:txBody>
       </p:sp>
     </p:spTree>
-    <p:extLst>
-      <p:ext uri="{BB962C8B-B14F-4D97-AF65-F5344CB8AC3E}">
-        <p14:creationId xmlns:p14="http://schemas.microsoft.com/office/powerpoint/2010/main" val="11932292"/>
-      </p:ext>
-    </p:extLst>
   </p:cSld>
   <p:clrMapOvr>
     <a:masterClrMapping/>
@@ -3369,6 +3346,7 @@
               <a:rPr lang="en-US"/>
               <a:t>Click to edit Master text styles</a:t>
             </a:r>
+            <a:endParaRPr lang="en-US"/>
           </a:p>
           <a:p>
             <a:pPr lvl="1"/>
@@ -3376,6 +3354,7 @@
               <a:rPr lang="en-US"/>
               <a:t>Second level</a:t>
             </a:r>
+            <a:endParaRPr lang="en-US"/>
           </a:p>
           <a:p>
             <a:pPr lvl="2"/>
@@ -3383,6 +3362,7 @@
               <a:rPr lang="en-US"/>
               <a:t>Third level</a:t>
             </a:r>
+            <a:endParaRPr lang="en-US"/>
           </a:p>
           <a:p>
             <a:pPr lvl="3"/>
@@ -3390,6 +3370,7 @@
               <a:rPr lang="en-US"/>
               <a:t>Fourth level</a:t>
             </a:r>
+            <a:endParaRPr lang="en-US"/>
           </a:p>
           <a:p>
             <a:pPr lvl="4"/>
@@ -3426,6 +3407,7 @@
               <a:rPr lang="en-US"/>
               <a:t>Click to edit Master text styles</a:t>
             </a:r>
+            <a:endParaRPr lang="en-US"/>
           </a:p>
           <a:p>
             <a:pPr lvl="1"/>
@@ -3433,6 +3415,7 @@
               <a:rPr lang="en-US"/>
               <a:t>Second level</a:t>
             </a:r>
+            <a:endParaRPr lang="en-US"/>
           </a:p>
           <a:p>
             <a:pPr lvl="2"/>
@@ -3440,6 +3423,7 @@
               <a:rPr lang="en-US"/>
               <a:t>Third level</a:t>
             </a:r>
+            <a:endParaRPr lang="en-US"/>
           </a:p>
           <a:p>
             <a:pPr lvl="3"/>
@@ -3447,6 +3431,7 @@
               <a:rPr lang="en-US"/>
               <a:t>Fourth level</a:t>
             </a:r>
+            <a:endParaRPr lang="en-US"/>
           </a:p>
           <a:p>
             <a:pPr lvl="4"/>
@@ -3475,7 +3460,6 @@
           <a:p>
             <a:fld id="{37A2730A-859E-B540-ADF3-E97069AD1FDB}" type="datetimeFigureOut">
               <a:rPr lang="en-US" smtClean="0"/>
-              <a:t>2/2/2024</a:t>
             </a:fld>
             <a:endParaRPr lang="en-US"/>
           </a:p>
@@ -3517,18 +3501,12 @@
           <a:p>
             <a:fld id="{8E05DC9C-C50D-D242-B083-59CEE07163F1}" type="slidenum">
               <a:rPr lang="en-US" smtClean="0"/>
-              <a:t>‹#›</a:t>
             </a:fld>
             <a:endParaRPr lang="en-US"/>
           </a:p>
         </p:txBody>
       </p:sp>
     </p:spTree>
-    <p:extLst>
-      <p:ext uri="{BB962C8B-B14F-4D97-AF65-F5344CB8AC3E}">
-        <p14:creationId xmlns:p14="http://schemas.microsoft.com/office/powerpoint/2010/main" val="114528057"/>
-      </p:ext>
-    </p:extLst>
   </p:cSld>
   <p:clrMapOvr>
     <a:masterClrMapping/>
@@ -3644,6 +3622,7 @@
               <a:rPr lang="en-US"/>
               <a:t>Click to edit Master text styles</a:t>
             </a:r>
+            <a:endParaRPr lang="en-US"/>
           </a:p>
         </p:txBody>
       </p:sp>
@@ -3674,6 +3653,7 @@
               <a:rPr lang="en-US"/>
               <a:t>Click to edit Master text styles</a:t>
             </a:r>
+            <a:endParaRPr lang="en-US"/>
           </a:p>
           <a:p>
             <a:pPr lvl="1"/>
@@ -3681,6 +3661,7 @@
               <a:rPr lang="en-US"/>
               <a:t>Second level</a:t>
             </a:r>
+            <a:endParaRPr lang="en-US"/>
           </a:p>
           <a:p>
             <a:pPr lvl="2"/>
@@ -3688,6 +3669,7 @@
               <a:rPr lang="en-US"/>
               <a:t>Third level</a:t>
             </a:r>
+            <a:endParaRPr lang="en-US"/>
           </a:p>
           <a:p>
             <a:pPr lvl="3"/>
@@ -3695,6 +3677,7 @@
               <a:rPr lang="en-US"/>
               <a:t>Fourth level</a:t>
             </a:r>
+            <a:endParaRPr lang="en-US"/>
           </a:p>
           <a:p>
             <a:pPr lvl="4"/>
@@ -3770,6 +3753,7 @@
               <a:rPr lang="en-US"/>
               <a:t>Click to edit Master text styles</a:t>
             </a:r>
+            <a:endParaRPr lang="en-US"/>
           </a:p>
         </p:txBody>
       </p:sp>
@@ -3800,6 +3784,7 @@
               <a:rPr lang="en-US"/>
               <a:t>Click to edit Master text styles</a:t>
             </a:r>
+            <a:endParaRPr lang="en-US"/>
           </a:p>
           <a:p>
             <a:pPr lvl="1"/>
@@ -3807,6 +3792,7 @@
               <a:rPr lang="en-US"/>
               <a:t>Second level</a:t>
             </a:r>
+            <a:endParaRPr lang="en-US"/>
           </a:p>
           <a:p>
             <a:pPr lvl="2"/>
@@ -3814,6 +3800,7 @@
               <a:rPr lang="en-US"/>
               <a:t>Third level</a:t>
             </a:r>
+            <a:endParaRPr lang="en-US"/>
           </a:p>
           <a:p>
             <a:pPr lvl="3"/>
@@ -3821,6 +3808,7 @@
               <a:rPr lang="en-US"/>
               <a:t>Fourth level</a:t>
             </a:r>
+            <a:endParaRPr lang="en-US"/>
           </a:p>
           <a:p>
             <a:pPr lvl="4"/>
@@ -3849,7 +3837,6 @@
           <a:p>
             <a:fld id="{37A2730A-859E-B540-ADF3-E97069AD1FDB}" type="datetimeFigureOut">
               <a:rPr lang="en-US" smtClean="0"/>
-              <a:t>2/2/2024</a:t>
             </a:fld>
             <a:endParaRPr lang="en-US"/>
           </a:p>
@@ -3891,18 +3878,12 @@
           <a:p>
             <a:fld id="{8E05DC9C-C50D-D242-B083-59CEE07163F1}" type="slidenum">
               <a:rPr lang="en-US" smtClean="0"/>
-              <a:t>‹#›</a:t>
             </a:fld>
             <a:endParaRPr lang="en-US"/>
           </a:p>
         </p:txBody>
       </p:sp>
     </p:spTree>
-    <p:extLst>
-      <p:ext uri="{BB962C8B-B14F-4D97-AF65-F5344CB8AC3E}">
-        <p14:creationId xmlns:p14="http://schemas.microsoft.com/office/powerpoint/2010/main" val="2414878905"/>
-      </p:ext>
-    </p:extLst>
   </p:cSld>
   <p:clrMapOvr>
     <a:masterClrMapping/>
@@ -3972,7 +3953,6 @@
           <a:p>
             <a:fld id="{37A2730A-859E-B540-ADF3-E97069AD1FDB}" type="datetimeFigureOut">
               <a:rPr lang="en-US" smtClean="0"/>
-              <a:t>2/2/2024</a:t>
             </a:fld>
             <a:endParaRPr lang="en-US"/>
           </a:p>
@@ -4014,18 +3994,12 @@
           <a:p>
             <a:fld id="{8E05DC9C-C50D-D242-B083-59CEE07163F1}" type="slidenum">
               <a:rPr lang="en-US" smtClean="0"/>
-              <a:t>‹#›</a:t>
             </a:fld>
             <a:endParaRPr lang="en-US"/>
           </a:p>
         </p:txBody>
       </p:sp>
     </p:spTree>
-    <p:extLst>
-      <p:ext uri="{BB962C8B-B14F-4D97-AF65-F5344CB8AC3E}">
-        <p14:creationId xmlns:p14="http://schemas.microsoft.com/office/powerpoint/2010/main" val="3601418635"/>
-      </p:ext>
-    </p:extLst>
   </p:cSld>
   <p:clrMapOvr>
     <a:masterClrMapping/>
@@ -4067,7 +4041,6 @@
           <a:p>
             <a:fld id="{37A2730A-859E-B540-ADF3-E97069AD1FDB}" type="datetimeFigureOut">
               <a:rPr lang="en-US" smtClean="0"/>
-              <a:t>2/2/2024</a:t>
             </a:fld>
             <a:endParaRPr lang="en-US"/>
           </a:p>
@@ -4109,18 +4082,12 @@
           <a:p>
             <a:fld id="{8E05DC9C-C50D-D242-B083-59CEE07163F1}" type="slidenum">
               <a:rPr lang="en-US" smtClean="0"/>
-              <a:t>‹#›</a:t>
             </a:fld>
             <a:endParaRPr lang="en-US"/>
           </a:p>
         </p:txBody>
       </p:sp>
     </p:spTree>
-    <p:extLst>
-      <p:ext uri="{BB962C8B-B14F-4D97-AF65-F5344CB8AC3E}">
-        <p14:creationId xmlns:p14="http://schemas.microsoft.com/office/powerpoint/2010/main" val="1329540561"/>
-      </p:ext>
-    </p:extLst>
   </p:cSld>
   <p:clrMapOvr>
     <a:masterClrMapping/>
@@ -4206,6 +4173,7 @@
               <a:rPr lang="en-US"/>
               <a:t>Click to edit Master text styles</a:t>
             </a:r>
+            <a:endParaRPr lang="en-US"/>
           </a:p>
           <a:p>
             <a:pPr lvl="1"/>
@@ -4213,6 +4181,7 @@
               <a:rPr lang="en-US"/>
               <a:t>Second level</a:t>
             </a:r>
+            <a:endParaRPr lang="en-US"/>
           </a:p>
           <a:p>
             <a:pPr lvl="2"/>
@@ -4220,6 +4189,7 @@
               <a:rPr lang="en-US"/>
               <a:t>Third level</a:t>
             </a:r>
+            <a:endParaRPr lang="en-US"/>
           </a:p>
           <a:p>
             <a:pPr lvl="3"/>
@@ -4227,6 +4197,7 @@
               <a:rPr lang="en-US"/>
               <a:t>Fourth level</a:t>
             </a:r>
+            <a:endParaRPr lang="en-US"/>
           </a:p>
           <a:p>
             <a:pPr lvl="4"/>
@@ -4263,35 +4234,35 @@
               <a:buNone/>
               <a:defRPr sz="1400"/>
             </a:lvl1pPr>
-            <a:lvl2pPr marL="457063" indent="0">
+            <a:lvl2pPr marL="457200" indent="0">
               <a:buNone/>
               <a:defRPr sz="1400"/>
             </a:lvl2pPr>
-            <a:lvl3pPr marL="914126" indent="0">
+            <a:lvl3pPr marL="914400" indent="0">
               <a:buNone/>
               <a:defRPr sz="1200"/>
             </a:lvl3pPr>
-            <a:lvl4pPr marL="1371189" indent="0">
+            <a:lvl4pPr marL="1370965" indent="0">
               <a:buNone/>
               <a:defRPr sz="1000"/>
             </a:lvl4pPr>
-            <a:lvl5pPr marL="1828251" indent="0">
+            <a:lvl5pPr marL="1828165" indent="0">
               <a:buNone/>
               <a:defRPr sz="1000"/>
             </a:lvl5pPr>
-            <a:lvl6pPr marL="2285314" indent="0">
+            <a:lvl6pPr marL="2285365" indent="0">
               <a:buNone/>
               <a:defRPr sz="1000"/>
             </a:lvl6pPr>
-            <a:lvl7pPr marL="2742377" indent="0">
+            <a:lvl7pPr marL="2742565" indent="0">
               <a:buNone/>
               <a:defRPr sz="1000"/>
             </a:lvl7pPr>
-            <a:lvl8pPr marL="3199440" indent="0">
+            <a:lvl8pPr marL="3199130" indent="0">
               <a:buNone/>
               <a:defRPr sz="1000"/>
             </a:lvl8pPr>
-            <a:lvl9pPr marL="3656503" indent="0">
+            <a:lvl9pPr marL="3656330" indent="0">
               <a:buNone/>
               <a:defRPr sz="1000"/>
             </a:lvl9pPr>
@@ -4302,6 +4273,7 @@
               <a:rPr lang="en-US"/>
               <a:t>Click to edit Master text styles</a:t>
             </a:r>
+            <a:endParaRPr lang="en-US"/>
           </a:p>
         </p:txBody>
       </p:sp>
@@ -4322,7 +4294,6 @@
           <a:p>
             <a:fld id="{37A2730A-859E-B540-ADF3-E97069AD1FDB}" type="datetimeFigureOut">
               <a:rPr lang="en-US" smtClean="0"/>
-              <a:t>2/2/2024</a:t>
             </a:fld>
             <a:endParaRPr lang="en-US"/>
           </a:p>
@@ -4364,18 +4335,12 @@
           <a:p>
             <a:fld id="{8E05DC9C-C50D-D242-B083-59CEE07163F1}" type="slidenum">
               <a:rPr lang="en-US" smtClean="0"/>
-              <a:t>‹#›</a:t>
             </a:fld>
             <a:endParaRPr lang="en-US"/>
           </a:p>
         </p:txBody>
       </p:sp>
     </p:spTree>
-    <p:extLst>
-      <p:ext uri="{BB962C8B-B14F-4D97-AF65-F5344CB8AC3E}">
-        <p14:creationId xmlns:p14="http://schemas.microsoft.com/office/powerpoint/2010/main" val="3605385670"/>
-      </p:ext>
-    </p:extLst>
   </p:cSld>
   <p:clrMapOvr>
     <a:masterClrMapping/>
@@ -4565,6 +4530,7 @@
               <a:rPr lang="en-US"/>
               <a:t>Click to edit Master text styles</a:t>
             </a:r>
+            <a:endParaRPr lang="en-US"/>
           </a:p>
         </p:txBody>
       </p:sp>
@@ -4585,7 +4551,6 @@
           <a:p>
             <a:fld id="{37A2730A-859E-B540-ADF3-E97069AD1FDB}" type="datetimeFigureOut">
               <a:rPr lang="en-US" smtClean="0"/>
-              <a:t>2/2/2024</a:t>
             </a:fld>
             <a:endParaRPr lang="en-US"/>
           </a:p>
@@ -4627,18 +4592,12 @@
           <a:p>
             <a:fld id="{8E05DC9C-C50D-D242-B083-59CEE07163F1}" type="slidenum">
               <a:rPr lang="en-US" smtClean="0"/>
-              <a:t>‹#›</a:t>
             </a:fld>
             <a:endParaRPr lang="en-US"/>
           </a:p>
         </p:txBody>
       </p:sp>
     </p:spTree>
-    <p:extLst>
-      <p:ext uri="{BB962C8B-B14F-4D97-AF65-F5344CB8AC3E}">
-        <p14:creationId xmlns:p14="http://schemas.microsoft.com/office/powerpoint/2010/main" val="1052685599"/>
-      </p:ext>
-    </p:extLst>
   </p:cSld>
   <p:clrMapOvr>
     <a:masterClrMapping/>
@@ -5261,6 +5220,7 @@
               <a:rPr lang="en-US"/>
               <a:t>Click to edit Master text styles</a:t>
             </a:r>
+            <a:endParaRPr lang="en-US"/>
           </a:p>
           <a:p>
             <a:pPr lvl="1"/>
@@ -5268,6 +5228,7 @@
               <a:rPr lang="en-US"/>
               <a:t>Second level</a:t>
             </a:r>
+            <a:endParaRPr lang="en-US"/>
           </a:p>
           <a:p>
             <a:pPr lvl="2"/>
@@ -5275,6 +5236,7 @@
               <a:rPr lang="en-US"/>
               <a:t>Third level</a:t>
             </a:r>
+            <a:endParaRPr lang="en-US"/>
           </a:p>
           <a:p>
             <a:pPr lvl="3"/>
@@ -5282,6 +5244,7 @@
               <a:rPr lang="en-US"/>
               <a:t>Fourth level</a:t>
             </a:r>
+            <a:endParaRPr lang="en-US"/>
           </a:p>
           <a:p>
             <a:pPr lvl="4"/>
@@ -5328,7 +5291,6 @@
           <a:p>
             <a:fld id="{37A2730A-859E-B540-ADF3-E97069AD1FDB}" type="datetimeFigureOut">
               <a:rPr lang="en-US" smtClean="0"/>
-              <a:t>2/2/2024</a:t>
             </a:fld>
             <a:endParaRPr lang="en-US"/>
           </a:p>
@@ -5404,37 +5366,31 @@
           <a:p>
             <a:fld id="{8E05DC9C-C50D-D242-B083-59CEE07163F1}" type="slidenum">
               <a:rPr lang="en-US" smtClean="0"/>
-              <a:t>‹#›</a:t>
             </a:fld>
             <a:endParaRPr lang="en-US"/>
           </a:p>
         </p:txBody>
       </p:sp>
     </p:spTree>
-    <p:extLst>
-      <p:ext uri="{BB962C8B-B14F-4D97-AF65-F5344CB8AC3E}">
-        <p14:creationId xmlns:p14="http://schemas.microsoft.com/office/powerpoint/2010/main" val="3158477016"/>
-      </p:ext>
-    </p:extLst>
   </p:cSld>
   <p:clrMap bg1="lt1" tx1="dk1" bg2="lt2" tx2="dk2" accent1="accent1" accent2="accent2" accent3="accent3" accent4="accent4" accent5="accent5" accent6="accent6" hlink="hlink" folHlink="folHlink"/>
   <p:sldLayoutIdLst>
-    <p:sldLayoutId id="2147483661" r:id="rId1"/>
-    <p:sldLayoutId id="2147483662" r:id="rId2"/>
-    <p:sldLayoutId id="2147483663" r:id="rId3"/>
-    <p:sldLayoutId id="2147483664" r:id="rId4"/>
-    <p:sldLayoutId id="2147483665" r:id="rId5"/>
-    <p:sldLayoutId id="2147483666" r:id="rId6"/>
-    <p:sldLayoutId id="2147483667" r:id="rId7"/>
-    <p:sldLayoutId id="2147483668" r:id="rId8"/>
-    <p:sldLayoutId id="2147483669" r:id="rId9"/>
-    <p:sldLayoutId id="2147483670" r:id="rId10"/>
-    <p:sldLayoutId id="2147483671" r:id="rId11"/>
-    <p:sldLayoutId id="2147483672" r:id="rId12"/>
-    <p:sldLayoutId id="2147483673" r:id="rId13"/>
-    <p:sldLayoutId id="2147483674" r:id="rId14"/>
-    <p:sldLayoutId id="2147483675" r:id="rId15"/>
-    <p:sldLayoutId id="2147483676" r:id="rId16"/>
+    <p:sldLayoutId id="2147483649" r:id="rId1"/>
+    <p:sldLayoutId id="2147483650" r:id="rId2"/>
+    <p:sldLayoutId id="2147483651" r:id="rId3"/>
+    <p:sldLayoutId id="2147483652" r:id="rId4"/>
+    <p:sldLayoutId id="2147483653" r:id="rId5"/>
+    <p:sldLayoutId id="2147483654" r:id="rId6"/>
+    <p:sldLayoutId id="2147483655" r:id="rId7"/>
+    <p:sldLayoutId id="2147483656" r:id="rId8"/>
+    <p:sldLayoutId id="2147483657" r:id="rId9"/>
+    <p:sldLayoutId id="2147483658" r:id="rId10"/>
+    <p:sldLayoutId id="2147483659" r:id="rId11"/>
+    <p:sldLayoutId id="2147483660" r:id="rId12"/>
+    <p:sldLayoutId id="2147483661" r:id="rId13"/>
+    <p:sldLayoutId id="2147483662" r:id="rId14"/>
+    <p:sldLayoutId id="2147483663" r:id="rId15"/>
+    <p:sldLayoutId id="2147483664" r:id="rId16"/>
   </p:sldLayoutIdLst>
   <p:txStyles>
     <p:titleStyle>
@@ -5521,7 +5477,7 @@
           <a:schemeClr val="accent1"/>
         </a:buClr>
         <a:buSzPct val="80000"/>
-        <a:buFont typeface="Wingdings 3" charset="2"/>
+        <a:buFont typeface="Wingdings 3" panose="05040102010807070707" charset="2"/>
         <a:buChar char=""/>
         <a:defRPr sz="1800" kern="1200">
           <a:solidFill>
@@ -5546,7 +5502,7 @@
           <a:schemeClr val="accent1"/>
         </a:buClr>
         <a:buSzPct val="80000"/>
-        <a:buFont typeface="Wingdings 3" charset="2"/>
+        <a:buFont typeface="Wingdings 3" panose="05040102010807070707" charset="2"/>
         <a:buChar char=""/>
         <a:defRPr sz="1600" kern="1200">
           <a:solidFill>
@@ -5571,7 +5527,7 @@
           <a:schemeClr val="accent1"/>
         </a:buClr>
         <a:buSzPct val="80000"/>
-        <a:buFont typeface="Wingdings 3" charset="2"/>
+        <a:buFont typeface="Wingdings 3" panose="05040102010807070707" charset="2"/>
         <a:buChar char=""/>
         <a:defRPr sz="1400" kern="1200">
           <a:solidFill>
@@ -5596,7 +5552,7 @@
           <a:schemeClr val="accent1"/>
         </a:buClr>
         <a:buSzPct val="80000"/>
-        <a:buFont typeface="Wingdings 3" charset="2"/>
+        <a:buFont typeface="Wingdings 3" panose="05040102010807070707" charset="2"/>
         <a:buChar char=""/>
         <a:defRPr sz="1200" kern="1200">
           <a:solidFill>
@@ -5621,7 +5577,7 @@
           <a:schemeClr val="accent1"/>
         </a:buClr>
         <a:buSzPct val="80000"/>
-        <a:buFont typeface="Wingdings 3" charset="2"/>
+        <a:buFont typeface="Wingdings 3" panose="05040102010807070707" charset="2"/>
         <a:buChar char=""/>
         <a:defRPr sz="1200" kern="1200">
           <a:solidFill>
@@ -5646,7 +5602,7 @@
           <a:schemeClr val="accent1"/>
         </a:buClr>
         <a:buSzPct val="80000"/>
-        <a:buFont typeface="Wingdings 3" charset="2"/>
+        <a:buFont typeface="Wingdings 3" panose="05040102010807070707" charset="2"/>
         <a:buChar char=""/>
         <a:defRPr sz="1200" kern="1200">
           <a:solidFill>
@@ -5671,7 +5627,7 @@
           <a:schemeClr val="accent1"/>
         </a:buClr>
         <a:buSzPct val="80000"/>
-        <a:buFont typeface="Wingdings 3" charset="2"/>
+        <a:buFont typeface="Wingdings 3" panose="05040102010807070707" charset="2"/>
         <a:buChar char=""/>
         <a:defRPr sz="1200" kern="1200">
           <a:solidFill>
@@ -5696,7 +5652,7 @@
           <a:schemeClr val="accent1"/>
         </a:buClr>
         <a:buSzPct val="80000"/>
-        <a:buFont typeface="Wingdings 3" charset="2"/>
+        <a:buFont typeface="Wingdings 3" panose="05040102010807070707" charset="2"/>
         <a:buChar char=""/>
         <a:defRPr sz="1200" kern="1200">
           <a:solidFill>
@@ -5721,7 +5677,7 @@
           <a:schemeClr val="accent1"/>
         </a:buClr>
         <a:buSzPct val="80000"/>
-        <a:buFont typeface="Wingdings 3" charset="2"/>
+        <a:buFont typeface="Wingdings 3" panose="05040102010807070707" charset="2"/>
         <a:buChar char=""/>
         <a:defRPr sz="1200" kern="1200">
           <a:solidFill>
@@ -5862,22 +5818,18 @@
       </p:grpSpPr>
       <p:pic>
         <p:nvPicPr>
-          <p:cNvPr id="28" name="Picture 27" descr="Digital stock icons in closeup">
-            <a:extLst>
-              <a:ext uri="{FF2B5EF4-FFF2-40B4-BE49-F238E27FC236}">
-                <a16:creationId xmlns:a16="http://schemas.microsoft.com/office/drawing/2014/main" id="{12661FFE-E247-8C55-661C-A5315583657E}"/>
-              </a:ext>
-            </a:extLst>
-          </p:cNvPr>
+          <p:cNvPr id="28" name="Picture 27" descr="Digital stock icons in closeup"/>
           <p:cNvPicPr>
             <a:picLocks noChangeAspect="1"/>
           </p:cNvPicPr>
           <p:nvPr/>
         </p:nvPicPr>
         <p:blipFill rotWithShape="1">
-          <a:blip r:embed="rId2"/>
+          <a:blip r:embed="rId1"/>
           <a:srcRect l="34682" r="21069"/>
-          <a:stretch/>
+          <a:stretch>
+            <a:fillRect/>
+          </a:stretch>
         </p:blipFill>
         <p:spPr>
           <a:xfrm>
@@ -5918,13 +5870,7 @@
       </p:pic>
       <p:sp>
         <p:nvSpPr>
-          <p:cNvPr id="4" name="Title 3">
-            <a:extLst>
-              <a:ext uri="{FF2B5EF4-FFF2-40B4-BE49-F238E27FC236}">
-                <a16:creationId xmlns:a16="http://schemas.microsoft.com/office/drawing/2014/main" id="{C30C9169-D263-610D-E655-7692A06B0B38}"/>
-              </a:ext>
-            </a:extLst>
-          </p:cNvPr>
+          <p:cNvPr id="4" name="Title 3"/>
           <p:cNvSpPr>
             <a:spLocks noGrp="1"/>
           </p:cNvSpPr>
@@ -5968,20 +5914,15 @@
         </p:txBody>
       </p:sp>
     </p:spTree>
-    <p:extLst>
-      <p:ext uri="{BB962C8B-B14F-4D97-AF65-F5344CB8AC3E}">
-        <p14:creationId xmlns:p14="http://schemas.microsoft.com/office/powerpoint/2010/main" val="3211859542"/>
-      </p:ext>
-    </p:extLst>
   </p:cSld>
   <p:clrMapOvr>
     <a:masterClrMapping/>
   </p:clrMapOvr>
-  <mc:AlternateContent xmlns:mc="http://schemas.openxmlformats.org/markup-compatibility/2006" xmlns:p14="http://schemas.microsoft.com/office/powerpoint/2010/main">
-    <mc:Choice Requires="p14">
+  <mc:AlternateContent xmlns:mc="http://schemas.openxmlformats.org/markup-compatibility/2006">
+    <mc:Choice xmlns:p14="http://schemas.microsoft.com/office/powerpoint/2010/main" Requires="p14">
       <p:transition spd="slow" p14:dur="2000" advTm="3835"/>
     </mc:Choice>
-    <mc:Fallback xmlns="">
+    <mc:Fallback>
       <p:transition spd="slow" advTm="3835"/>
     </mc:Fallback>
   </mc:AlternateContent>
@@ -6099,13 +6040,7 @@
       </p:grpSpPr>
       <p:sp>
         <p:nvSpPr>
-          <p:cNvPr id="2" name="Title 1">
-            <a:extLst>
-              <a:ext uri="{FF2B5EF4-FFF2-40B4-BE49-F238E27FC236}">
-                <a16:creationId xmlns:a16="http://schemas.microsoft.com/office/drawing/2014/main" id="{97F8B0A8-CFEC-6291-E3DD-19E5531239BC}"/>
-              </a:ext>
-            </a:extLst>
-          </p:cNvPr>
+          <p:cNvPr id="2" name="Title 1"/>
           <p:cNvSpPr>
             <a:spLocks noGrp="1"/>
           </p:cNvSpPr>
@@ -6128,13 +6063,7 @@
       </p:sp>
       <p:sp>
         <p:nvSpPr>
-          <p:cNvPr id="3" name="Content Placeholder 2">
-            <a:extLst>
-              <a:ext uri="{FF2B5EF4-FFF2-40B4-BE49-F238E27FC236}">
-                <a16:creationId xmlns:a16="http://schemas.microsoft.com/office/drawing/2014/main" id="{52110522-E394-9D44-2168-ACAC46B5AECA}"/>
-              </a:ext>
-            </a:extLst>
-          </p:cNvPr>
+          <p:cNvPr id="3" name="Content Placeholder 2"/>
           <p:cNvSpPr>
             <a:spLocks noGrp="1"/>
           </p:cNvSpPr>
@@ -6154,6 +6083,7 @@
               <a:rPr lang="en-US" dirty="0"/>
               <a:t>We retrieved our data from Kaggle, which is a subsidiary from Google, and it’s an online community for engineers of all fields, that allows the users to find and access datasets used to build AI models.</a:t>
             </a:r>
+            <a:endParaRPr lang="en-US" dirty="0"/>
           </a:p>
           <a:p>
             <a:pPr marL="0" indent="0">
@@ -6173,6 +6103,20 @@
               </a:rPr>
               <a:t>This is the link for our dataset: </a:t>
             </a:r>
+            <a:r>
+              <a:rPr lang="en-US" dirty="0">
+                <a:solidFill>
+                  <a:srgbClr val="0070C0"/>
+                </a:solidFill>
+                <a:sym typeface="+mn-ea"/>
+              </a:rPr>
+              <a:t>https://www.kaggle.com/datasets/maharshipandya/-cryptocurrency-historical-prices-dataset</a:t>
+            </a:r>
+            <a:endParaRPr lang="en-US" dirty="0">
+              <a:solidFill>
+                <a:srgbClr val="FF0000"/>
+              </a:solidFill>
+            </a:endParaRPr>
           </a:p>
           <a:p>
             <a:pPr marL="0" indent="0">
@@ -6193,11 +6137,6 @@
         </p:txBody>
       </p:sp>
     </p:spTree>
-    <p:extLst>
-      <p:ext uri="{BB962C8B-B14F-4D97-AF65-F5344CB8AC3E}">
-        <p14:creationId xmlns:p14="http://schemas.microsoft.com/office/powerpoint/2010/main" val="4241765821"/>
-      </p:ext>
-    </p:extLst>
   </p:cSld>
   <p:clrMapOvr>
     <a:masterClrMapping/>
@@ -6224,13 +6163,7 @@
       </p:grpSpPr>
       <p:sp>
         <p:nvSpPr>
-          <p:cNvPr id="2" name="Title 1">
-            <a:extLst>
-              <a:ext uri="{FF2B5EF4-FFF2-40B4-BE49-F238E27FC236}">
-                <a16:creationId xmlns:a16="http://schemas.microsoft.com/office/drawing/2014/main" id="{62977D03-87F3-3CA9-EABF-E2A66BD68AAB}"/>
-              </a:ext>
-            </a:extLst>
-          </p:cNvPr>
+          <p:cNvPr id="2" name="Title 1"/>
           <p:cNvSpPr>
             <a:spLocks noGrp="1"/>
           </p:cNvSpPr>
@@ -6253,13 +6186,7 @@
       </p:sp>
       <p:sp>
         <p:nvSpPr>
-          <p:cNvPr id="3" name="Content Placeholder 2">
-            <a:extLst>
-              <a:ext uri="{FF2B5EF4-FFF2-40B4-BE49-F238E27FC236}">
-                <a16:creationId xmlns:a16="http://schemas.microsoft.com/office/drawing/2014/main" id="{300DBDE3-1DED-E493-912D-142DFD24FFD2}"/>
-              </a:ext>
-            </a:extLst>
-          </p:cNvPr>
+          <p:cNvPr id="3" name="Content Placeholder 2"/>
           <p:cNvSpPr>
             <a:spLocks noGrp="1"/>
           </p:cNvSpPr>
@@ -6280,6 +6207,11 @@
               </a:rPr>
               <a:t>It contains 9 columns</a:t>
             </a:r>
+            <a:endParaRPr lang="en-US" dirty="0">
+              <a:solidFill>
+                <a:srgbClr val="FF0000"/>
+              </a:solidFill>
+            </a:endParaRPr>
           </a:p>
           <a:p>
             <a:r>
@@ -6290,6 +6222,11 @@
               </a:rPr>
               <a:t>It contains 72946 registers or rows</a:t>
             </a:r>
+            <a:endParaRPr lang="en-US" dirty="0">
+              <a:solidFill>
+                <a:srgbClr val="FF0000"/>
+              </a:solidFill>
+            </a:endParaRPr>
           </a:p>
           <a:p>
             <a:r>
@@ -6300,6 +6237,11 @@
               </a:rPr>
               <a:t>It contains info for 56 different cryptos</a:t>
             </a:r>
+            <a:endParaRPr lang="en-US" dirty="0">
+              <a:solidFill>
+                <a:srgbClr val="FF0000"/>
+              </a:solidFill>
+            </a:endParaRPr>
           </a:p>
           <a:p>
             <a:r>
@@ -6310,6 +6252,11 @@
               </a:rPr>
               <a:t>The start and end date for our data is 2013-05-05 / 2022-10-23</a:t>
             </a:r>
+            <a:endParaRPr lang="en-US" dirty="0">
+              <a:solidFill>
+                <a:srgbClr val="FF0000"/>
+              </a:solidFill>
+            </a:endParaRPr>
           </a:p>
           <a:p>
             <a:r>
@@ -6336,6 +6283,11 @@
               </a:rPr>
               <a:t>value can highly be affected by external factor as well.</a:t>
             </a:r>
+            <a:endParaRPr lang="en-US" dirty="0">
+              <a:solidFill>
+                <a:srgbClr val="FF0000"/>
+              </a:solidFill>
+            </a:endParaRPr>
           </a:p>
           <a:p>
             <a:r>
@@ -6346,15 +6298,15 @@
               </a:rPr>
               <a:t>The columns that we would be using to train our model probably are: open, low, high, close, volume, crypto name, date</a:t>
             </a:r>
+            <a:endParaRPr lang="en-US" dirty="0">
+              <a:solidFill>
+                <a:srgbClr val="FF0000"/>
+              </a:solidFill>
+            </a:endParaRPr>
           </a:p>
         </p:txBody>
       </p:sp>
     </p:spTree>
-    <p:extLst>
-      <p:ext uri="{BB962C8B-B14F-4D97-AF65-F5344CB8AC3E}">
-        <p14:creationId xmlns:p14="http://schemas.microsoft.com/office/powerpoint/2010/main" val="924905389"/>
-      </p:ext>
-    </p:extLst>
   </p:cSld>
   <p:clrMapOvr>
     <a:masterClrMapping/>
@@ -6381,13 +6333,7 @@
       </p:grpSpPr>
       <p:sp>
         <p:nvSpPr>
-          <p:cNvPr id="2" name="Title 1">
-            <a:extLst>
-              <a:ext uri="{FF2B5EF4-FFF2-40B4-BE49-F238E27FC236}">
-                <a16:creationId xmlns:a16="http://schemas.microsoft.com/office/drawing/2014/main" id="{39ECCC8C-750E-C4EF-08C6-2B22EA0792D7}"/>
-              </a:ext>
-            </a:extLst>
-          </p:cNvPr>
+          <p:cNvPr id="2" name="Title 1"/>
           <p:cNvSpPr>
             <a:spLocks noGrp="1"/>
           </p:cNvSpPr>
@@ -6410,13 +6356,7 @@
       </p:sp>
       <p:sp>
         <p:nvSpPr>
-          <p:cNvPr id="3" name="Content Placeholder 2">
-            <a:extLst>
-              <a:ext uri="{FF2B5EF4-FFF2-40B4-BE49-F238E27FC236}">
-                <a16:creationId xmlns:a16="http://schemas.microsoft.com/office/drawing/2014/main" id="{2D92B151-181A-5B51-6406-BDB97E03A57D}"/>
-              </a:ext>
-            </a:extLst>
-          </p:cNvPr>
+          <p:cNvPr id="3" name="Content Placeholder 2"/>
           <p:cNvSpPr>
             <a:spLocks noGrp="1"/>
           </p:cNvSpPr>
@@ -6446,11 +6386,6 @@
         </p:txBody>
       </p:sp>
     </p:spTree>
-    <p:extLst>
-      <p:ext uri="{BB962C8B-B14F-4D97-AF65-F5344CB8AC3E}">
-        <p14:creationId xmlns:p14="http://schemas.microsoft.com/office/powerpoint/2010/main" val="4108300992"/>
-      </p:ext>
-    </p:extLst>
   </p:cSld>
   <p:clrMapOvr>
     <a:masterClrMapping/>
@@ -6477,13 +6412,7 @@
       </p:grpSpPr>
       <p:sp>
         <p:nvSpPr>
-          <p:cNvPr id="2" name="Title 1">
-            <a:extLst>
-              <a:ext uri="{FF2B5EF4-FFF2-40B4-BE49-F238E27FC236}">
-                <a16:creationId xmlns:a16="http://schemas.microsoft.com/office/drawing/2014/main" id="{542DE904-68C1-135F-F057-04C84D641405}"/>
-              </a:ext>
-            </a:extLst>
-          </p:cNvPr>
+          <p:cNvPr id="2" name="Title 1"/>
           <p:cNvSpPr>
             <a:spLocks noGrp="1"/>
           </p:cNvSpPr>
@@ -6506,13 +6435,7 @@
       </p:sp>
       <p:sp>
         <p:nvSpPr>
-          <p:cNvPr id="3" name="Content Placeholder 2">
-            <a:extLst>
-              <a:ext uri="{FF2B5EF4-FFF2-40B4-BE49-F238E27FC236}">
-                <a16:creationId xmlns:a16="http://schemas.microsoft.com/office/drawing/2014/main" id="{045BE9EA-4981-A0F1-EDBA-DC46CF63C3F3}"/>
-              </a:ext>
-            </a:extLst>
-          </p:cNvPr>
+          <p:cNvPr id="3" name="Content Placeholder 2"/>
           <p:cNvSpPr>
             <a:spLocks noGrp="1"/>
           </p:cNvSpPr>
@@ -6537,12 +6460,14 @@
               <a:rPr lang="en-US" dirty="0"/>
               <a:t> notebook, pandas and python. </a:t>
             </a:r>
+            <a:endParaRPr lang="en-US" dirty="0"/>
           </a:p>
           <a:p>
             <a:r>
               <a:rPr lang="en-US" dirty="0"/>
               <a:t>By doing so we give each member of both teams the basic tools they need to access and start manipulating the data. </a:t>
             </a:r>
+            <a:endParaRPr lang="en-US" dirty="0"/>
           </a:p>
           <a:p>
             <a:endParaRPr lang="en-US" dirty="0"/>
@@ -6565,11 +6490,6 @@
         </p:txBody>
       </p:sp>
     </p:spTree>
-    <p:extLst>
-      <p:ext uri="{BB962C8B-B14F-4D97-AF65-F5344CB8AC3E}">
-        <p14:creationId xmlns:p14="http://schemas.microsoft.com/office/powerpoint/2010/main" val="1904715310"/>
-      </p:ext>
-    </p:extLst>
   </p:cSld>
   <p:clrMapOvr>
     <a:masterClrMapping/>
@@ -6596,13 +6516,7 @@
       </p:grpSpPr>
       <p:sp>
         <p:nvSpPr>
-          <p:cNvPr id="2" name="Title 1">
-            <a:extLst>
-              <a:ext uri="{FF2B5EF4-FFF2-40B4-BE49-F238E27FC236}">
-                <a16:creationId xmlns:a16="http://schemas.microsoft.com/office/drawing/2014/main" id="{7A79DED7-1FB0-FF32-F611-ABB3E9B772ED}"/>
-              </a:ext>
-            </a:extLst>
-          </p:cNvPr>
+          <p:cNvPr id="2" name="Title 1"/>
           <p:cNvSpPr>
             <a:spLocks noGrp="1"/>
           </p:cNvSpPr>
@@ -6625,13 +6539,7 @@
       </p:sp>
       <p:sp>
         <p:nvSpPr>
-          <p:cNvPr id="3" name="Content Placeholder 2">
-            <a:extLst>
-              <a:ext uri="{FF2B5EF4-FFF2-40B4-BE49-F238E27FC236}">
-                <a16:creationId xmlns:a16="http://schemas.microsoft.com/office/drawing/2014/main" id="{1631655A-3702-85E0-315C-1F0866EE770C}"/>
-              </a:ext>
-            </a:extLst>
-          </p:cNvPr>
+          <p:cNvPr id="3" name="Content Placeholder 2"/>
           <p:cNvSpPr>
             <a:spLocks noGrp="1"/>
           </p:cNvSpPr>
@@ -6661,11 +6569,6 @@
         </p:txBody>
       </p:sp>
     </p:spTree>
-    <p:extLst>
-      <p:ext uri="{BB962C8B-B14F-4D97-AF65-F5344CB8AC3E}">
-        <p14:creationId xmlns:p14="http://schemas.microsoft.com/office/powerpoint/2010/main" val="4160254735"/>
-      </p:ext>
-    </p:extLst>
   </p:cSld>
   <p:clrMapOvr>
     <a:masterClrMapping/>
@@ -6692,13 +6595,7 @@
       </p:grpSpPr>
       <p:sp>
         <p:nvSpPr>
-          <p:cNvPr id="2" name="Title 1">
-            <a:extLst>
-              <a:ext uri="{FF2B5EF4-FFF2-40B4-BE49-F238E27FC236}">
-                <a16:creationId xmlns:a16="http://schemas.microsoft.com/office/drawing/2014/main" id="{9791C351-EA13-D2A7-84FE-D12419BDD5C7}"/>
-              </a:ext>
-            </a:extLst>
-          </p:cNvPr>
+          <p:cNvPr id="2" name="Title 1"/>
           <p:cNvSpPr>
             <a:spLocks noGrp="1"/>
           </p:cNvSpPr>
@@ -6721,13 +6618,7 @@
       </p:sp>
       <p:sp>
         <p:nvSpPr>
-          <p:cNvPr id="3" name="Content Placeholder 2">
-            <a:extLst>
-              <a:ext uri="{FF2B5EF4-FFF2-40B4-BE49-F238E27FC236}">
-                <a16:creationId xmlns:a16="http://schemas.microsoft.com/office/drawing/2014/main" id="{CB1F343A-7577-8CDB-3722-21719E434FCF}"/>
-              </a:ext>
-            </a:extLst>
-          </p:cNvPr>
+          <p:cNvPr id="3" name="Content Placeholder 2"/>
           <p:cNvSpPr>
             <a:spLocks noGrp="1"/>
           </p:cNvSpPr>
@@ -6750,20 +6641,14 @@
       </p:sp>
       <p:pic>
         <p:nvPicPr>
-          <p:cNvPr id="5" name="Picture 4">
-            <a:extLst>
-              <a:ext uri="{FF2B5EF4-FFF2-40B4-BE49-F238E27FC236}">
-                <a16:creationId xmlns:a16="http://schemas.microsoft.com/office/drawing/2014/main" id="{144DCB69-25D3-FB2F-C0D8-7B637566DDBD}"/>
-              </a:ext>
-            </a:extLst>
-          </p:cNvPr>
+          <p:cNvPr id="5" name="Picture 4"/>
           <p:cNvPicPr>
             <a:picLocks noChangeAspect="1"/>
           </p:cNvPicPr>
           <p:nvPr/>
         </p:nvPicPr>
         <p:blipFill>
-          <a:blip r:embed="rId2"/>
+          <a:blip r:embed="rId1"/>
           <a:stretch>
             <a:fillRect/>
           </a:stretch>
@@ -6779,11 +6664,6 @@
         </p:spPr>
       </p:pic>
     </p:spTree>
-    <p:extLst>
-      <p:ext uri="{BB962C8B-B14F-4D97-AF65-F5344CB8AC3E}">
-        <p14:creationId xmlns:p14="http://schemas.microsoft.com/office/powerpoint/2010/main" val="3102432703"/>
-      </p:ext>
-    </p:extLst>
   </p:cSld>
   <p:clrMapOvr>
     <a:masterClrMapping/>
@@ -6810,13 +6690,7 @@
       </p:grpSpPr>
       <p:sp>
         <p:nvSpPr>
-          <p:cNvPr id="2" name="Title 1">
-            <a:extLst>
-              <a:ext uri="{FF2B5EF4-FFF2-40B4-BE49-F238E27FC236}">
-                <a16:creationId xmlns:a16="http://schemas.microsoft.com/office/drawing/2014/main" id="{E2C491D9-0FAB-4A9F-048A-C0DC6916C0D6}"/>
-              </a:ext>
-            </a:extLst>
-          </p:cNvPr>
+          <p:cNvPr id="2" name="Title 1"/>
           <p:cNvSpPr>
             <a:spLocks noGrp="1"/>
           </p:cNvSpPr>
@@ -6839,13 +6713,7 @@
       </p:sp>
       <p:sp>
         <p:nvSpPr>
-          <p:cNvPr id="3" name="Content Placeholder 2">
-            <a:extLst>
-              <a:ext uri="{FF2B5EF4-FFF2-40B4-BE49-F238E27FC236}">
-                <a16:creationId xmlns:a16="http://schemas.microsoft.com/office/drawing/2014/main" id="{C8B33890-A4D3-94AB-4102-590E64F091E1}"/>
-              </a:ext>
-            </a:extLst>
-          </p:cNvPr>
+          <p:cNvPr id="3" name="Content Placeholder 2"/>
           <p:cNvSpPr>
             <a:spLocks noGrp="1"/>
           </p:cNvSpPr>
@@ -6867,11 +6735,6 @@
         </p:txBody>
       </p:sp>
     </p:spTree>
-    <p:extLst>
-      <p:ext uri="{BB962C8B-B14F-4D97-AF65-F5344CB8AC3E}">
-        <p14:creationId xmlns:p14="http://schemas.microsoft.com/office/powerpoint/2010/main" val="304533955"/>
-      </p:ext>
-    </p:extLst>
   </p:cSld>
   <p:clrMapOvr>
     <a:masterClrMapping/>
@@ -6898,13 +6761,7 @@
       </p:grpSpPr>
       <p:sp>
         <p:nvSpPr>
-          <p:cNvPr id="2" name="Title 1">
-            <a:extLst>
-              <a:ext uri="{FF2B5EF4-FFF2-40B4-BE49-F238E27FC236}">
-                <a16:creationId xmlns:a16="http://schemas.microsoft.com/office/drawing/2014/main" id="{28E2C01C-3EF8-DF79-5521-C5FDE7E1AB2F}"/>
-              </a:ext>
-            </a:extLst>
-          </p:cNvPr>
+          <p:cNvPr id="2" name="Title 1"/>
           <p:cNvSpPr>
             <a:spLocks noGrp="1"/>
           </p:cNvSpPr>
@@ -6927,13 +6784,7 @@
       </p:sp>
       <p:sp>
         <p:nvSpPr>
-          <p:cNvPr id="3" name="Content Placeholder 2">
-            <a:extLst>
-              <a:ext uri="{FF2B5EF4-FFF2-40B4-BE49-F238E27FC236}">
-                <a16:creationId xmlns:a16="http://schemas.microsoft.com/office/drawing/2014/main" id="{4102E979-6CC0-80C7-63DD-36CAEB7B0051}"/>
-              </a:ext>
-            </a:extLst>
-          </p:cNvPr>
+          <p:cNvPr id="3" name="Content Placeholder 2"/>
           <p:cNvSpPr>
             <a:spLocks noGrp="1"/>
           </p:cNvSpPr>
@@ -6955,23 +6806,11 @@
       </p:sp>
       <p:graphicFrame>
         <p:nvGraphicFramePr>
-          <p:cNvPr id="4" name="Table 3">
-            <a:extLst>
-              <a:ext uri="{FF2B5EF4-FFF2-40B4-BE49-F238E27FC236}">
-                <a16:creationId xmlns:a16="http://schemas.microsoft.com/office/drawing/2014/main" id="{5F3321CE-2CB4-68BC-A913-8E3149AD0940}"/>
-              </a:ext>
-            </a:extLst>
-          </p:cNvPr>
+          <p:cNvPr id="4" name="Table 3"/>
           <p:cNvGraphicFramePr>
             <a:graphicFrameLocks noGrp="1"/>
           </p:cNvGraphicFramePr>
-          <p:nvPr>
-            <p:extLst>
-              <p:ext uri="{D42A27DB-BD31-4B8C-83A1-F6EECF244321}">
-                <p14:modId xmlns:p14="http://schemas.microsoft.com/office/powerpoint/2010/main" val="2657403321"/>
-              </p:ext>
-            </p:extLst>
-          </p:nvPr>
+          <p:nvPr/>
         </p:nvGraphicFramePr>
         <p:xfrm>
           <a:off x="677334" y="2160589"/>
@@ -6984,20 +6823,8 @@
                 <a:tableStyleId>{5C22544A-7EE6-4342-B048-85BDC9FD1C3A}</a:tableStyleId>
               </a:tblPr>
               <a:tblGrid>
-                <a:gridCol w="2553666">
-                  <a:extLst>
-                    <a:ext uri="{9D8B030D-6E8A-4147-A177-3AD203B41FA5}">
-                      <a16:colId xmlns:a16="http://schemas.microsoft.com/office/drawing/2014/main" val="1775805652"/>
-                    </a:ext>
-                  </a:extLst>
-                </a:gridCol>
-                <a:gridCol w="3432796">
-                  <a:extLst>
-                    <a:ext uri="{9D8B030D-6E8A-4147-A177-3AD203B41FA5}">
-                      <a16:colId xmlns:a16="http://schemas.microsoft.com/office/drawing/2014/main" val="1405168392"/>
-                    </a:ext>
-                  </a:extLst>
-                </a:gridCol>
+                <a:gridCol w="2553666"/>
+                <a:gridCol w="3432796"/>
               </a:tblGrid>
               <a:tr h="372886">
                 <a:tc>
@@ -7046,11 +6873,6 @@
                   </a:txBody>
                   <a:tcPr marL="3810" marR="3810" marT="3810" marB="0" anchor="b"/>
                 </a:tc>
-                <a:extLst>
-                  <a:ext uri="{0D108BD9-81ED-4DB2-BD59-A6C34878D82A}">
-                    <a16:rowId xmlns:a16="http://schemas.microsoft.com/office/drawing/2014/main" val="3795349629"/>
-                  </a:ext>
-                </a:extLst>
               </a:tr>
               <a:tr h="372886">
                 <a:tc>
@@ -7099,11 +6921,6 @@
                   </a:txBody>
                   <a:tcPr marL="3810" marR="3810" marT="3810" marB="0" anchor="b"/>
                 </a:tc>
-                <a:extLst>
-                  <a:ext uri="{0D108BD9-81ED-4DB2-BD59-A6C34878D82A}">
-                    <a16:rowId xmlns:a16="http://schemas.microsoft.com/office/drawing/2014/main" val="160843770"/>
-                  </a:ext>
-                </a:extLst>
               </a:tr>
               <a:tr h="372886">
                 <a:tc>
@@ -7152,11 +6969,6 @@
                   </a:txBody>
                   <a:tcPr marL="3810" marR="3810" marT="3810" marB="0" anchor="b"/>
                 </a:tc>
-                <a:extLst>
-                  <a:ext uri="{0D108BD9-81ED-4DB2-BD59-A6C34878D82A}">
-                    <a16:rowId xmlns:a16="http://schemas.microsoft.com/office/drawing/2014/main" val="3854711201"/>
-                  </a:ext>
-                </a:extLst>
               </a:tr>
               <a:tr h="372886">
                 <a:tc>
@@ -7205,11 +7017,6 @@
                   </a:txBody>
                   <a:tcPr marL="3810" marR="3810" marT="3810" marB="0" anchor="b"/>
                 </a:tc>
-                <a:extLst>
-                  <a:ext uri="{0D108BD9-81ED-4DB2-BD59-A6C34878D82A}">
-                    <a16:rowId xmlns:a16="http://schemas.microsoft.com/office/drawing/2014/main" val="1925159628"/>
-                  </a:ext>
-                </a:extLst>
               </a:tr>
               <a:tr h="372886">
                 <a:tc>
@@ -7258,11 +7065,6 @@
                   </a:txBody>
                   <a:tcPr marL="3810" marR="3810" marT="3810" marB="0" anchor="b"/>
                 </a:tc>
-                <a:extLst>
-                  <a:ext uri="{0D108BD9-81ED-4DB2-BD59-A6C34878D82A}">
-                    <a16:rowId xmlns:a16="http://schemas.microsoft.com/office/drawing/2014/main" val="2476180268"/>
-                  </a:ext>
-                </a:extLst>
               </a:tr>
               <a:tr h="372886">
                 <a:tc>
@@ -7311,11 +7113,6 @@
                   </a:txBody>
                   <a:tcPr marL="3810" marR="3810" marT="3810" marB="0" anchor="b"/>
                 </a:tc>
-                <a:extLst>
-                  <a:ext uri="{0D108BD9-81ED-4DB2-BD59-A6C34878D82A}">
-                    <a16:rowId xmlns:a16="http://schemas.microsoft.com/office/drawing/2014/main" val="136822427"/>
-                  </a:ext>
-                </a:extLst>
               </a:tr>
               <a:tr h="372886">
                 <a:tc>
@@ -7364,11 +7161,6 @@
                   </a:txBody>
                   <a:tcPr marL="3810" marR="3810" marT="3810" marB="0" anchor="b"/>
                 </a:tc>
-                <a:extLst>
-                  <a:ext uri="{0D108BD9-81ED-4DB2-BD59-A6C34878D82A}">
-                    <a16:rowId xmlns:a16="http://schemas.microsoft.com/office/drawing/2014/main" val="2728332771"/>
-                  </a:ext>
-                </a:extLst>
               </a:tr>
               <a:tr h="372886">
                 <a:tc>
@@ -7417,11 +7209,6 @@
                   </a:txBody>
                   <a:tcPr marL="3810" marR="3810" marT="3810" marB="0" anchor="b"/>
                 </a:tc>
-                <a:extLst>
-                  <a:ext uri="{0D108BD9-81ED-4DB2-BD59-A6C34878D82A}">
-                    <a16:rowId xmlns:a16="http://schemas.microsoft.com/office/drawing/2014/main" val="1082809056"/>
-                  </a:ext>
-                </a:extLst>
               </a:tr>
               <a:tr h="372886">
                 <a:tc>
@@ -7470,22 +7257,12 @@
                   </a:txBody>
                   <a:tcPr marL="3810" marR="3810" marT="3810" marB="0" anchor="b"/>
                 </a:tc>
-                <a:extLst>
-                  <a:ext uri="{0D108BD9-81ED-4DB2-BD59-A6C34878D82A}">
-                    <a16:rowId xmlns:a16="http://schemas.microsoft.com/office/drawing/2014/main" val="618295490"/>
-                  </a:ext>
-                </a:extLst>
               </a:tr>
             </a:tbl>
           </a:graphicData>
         </a:graphic>
       </p:graphicFrame>
     </p:spTree>
-    <p:extLst>
-      <p:ext uri="{BB962C8B-B14F-4D97-AF65-F5344CB8AC3E}">
-        <p14:creationId xmlns:p14="http://schemas.microsoft.com/office/powerpoint/2010/main" val="9369117"/>
-      </p:ext>
-    </p:extLst>
   </p:cSld>
   <p:clrMapOvr>
     <a:masterClrMapping/>
@@ -7512,13 +7289,7 @@
       </p:grpSpPr>
       <p:sp>
         <p:nvSpPr>
-          <p:cNvPr id="2" name="Title 1">
-            <a:extLst>
-              <a:ext uri="{FF2B5EF4-FFF2-40B4-BE49-F238E27FC236}">
-                <a16:creationId xmlns:a16="http://schemas.microsoft.com/office/drawing/2014/main" id="{28E2C01C-3EF8-DF79-5521-C5FDE7E1AB2F}"/>
-              </a:ext>
-            </a:extLst>
-          </p:cNvPr>
+          <p:cNvPr id="2" name="Title 1"/>
           <p:cNvSpPr>
             <a:spLocks noGrp="1"/>
           </p:cNvSpPr>
@@ -7541,13 +7312,7 @@
       </p:sp>
       <p:sp>
         <p:nvSpPr>
-          <p:cNvPr id="3" name="Content Placeholder 2">
-            <a:extLst>
-              <a:ext uri="{FF2B5EF4-FFF2-40B4-BE49-F238E27FC236}">
-                <a16:creationId xmlns:a16="http://schemas.microsoft.com/office/drawing/2014/main" id="{4102E979-6CC0-80C7-63DD-36CAEB7B0051}"/>
-              </a:ext>
-            </a:extLst>
-          </p:cNvPr>
+          <p:cNvPr id="3" name="Content Placeholder 2"/>
           <p:cNvSpPr>
             <a:spLocks noGrp="1"/>
           </p:cNvSpPr>
@@ -7564,18 +7329,21 @@
               <a:rPr lang="en-US" dirty="0"/>
               <a:t>We choose this topic for some reasons:</a:t>
             </a:r>
+            <a:endParaRPr lang="en-US" dirty="0"/>
           </a:p>
           <a:p>
             <a:r>
               <a:rPr lang="en-US" dirty="0"/>
               <a:t>1-Our main topic included image processing which supposed a more advance project with topics that we still haven’t seen on college, so we decided to choose a project that let us put in practice some of the concepts we’ve seen so far.</a:t>
             </a:r>
+            <a:endParaRPr lang="en-US" dirty="0"/>
           </a:p>
           <a:p>
             <a:r>
               <a:rPr lang="en-US" dirty="0"/>
               <a:t>2-Considering that the majority of projects in school tend to be about house pricing or health, we wanted to avoid the common projects.</a:t>
             </a:r>
+            <a:endParaRPr lang="en-US" dirty="0"/>
           </a:p>
           <a:p>
             <a:r>
@@ -7587,11 +7355,6 @@
         </p:txBody>
       </p:sp>
     </p:spTree>
-    <p:extLst>
-      <p:ext uri="{BB962C8B-B14F-4D97-AF65-F5344CB8AC3E}">
-        <p14:creationId xmlns:p14="http://schemas.microsoft.com/office/powerpoint/2010/main" val="2124562304"/>
-      </p:ext>
-    </p:extLst>
   </p:cSld>
   <p:clrMapOvr>
     <a:masterClrMapping/>
@@ -7618,13 +7381,7 @@
       </p:grpSpPr>
       <p:sp>
         <p:nvSpPr>
-          <p:cNvPr id="2" name="Title 1">
-            <a:extLst>
-              <a:ext uri="{FF2B5EF4-FFF2-40B4-BE49-F238E27FC236}">
-                <a16:creationId xmlns:a16="http://schemas.microsoft.com/office/drawing/2014/main" id="{C1EE60C3-25E2-384F-FBDF-00F5645066D5}"/>
-              </a:ext>
-            </a:extLst>
-          </p:cNvPr>
+          <p:cNvPr id="2" name="Title 1"/>
           <p:cNvSpPr>
             <a:spLocks noGrp="1"/>
           </p:cNvSpPr>
@@ -7647,13 +7404,7 @@
       </p:sp>
       <p:sp>
         <p:nvSpPr>
-          <p:cNvPr id="3" name="Content Placeholder 2">
-            <a:extLst>
-              <a:ext uri="{FF2B5EF4-FFF2-40B4-BE49-F238E27FC236}">
-                <a16:creationId xmlns:a16="http://schemas.microsoft.com/office/drawing/2014/main" id="{EC39F444-44BE-4711-1457-7CCE591D5E3F}"/>
-              </a:ext>
-            </a:extLst>
-          </p:cNvPr>
+          <p:cNvPr id="3" name="Content Placeholder 2"/>
           <p:cNvSpPr>
             <a:spLocks noGrp="1"/>
           </p:cNvSpPr>
@@ -7670,6 +7421,7 @@
               <a:rPr lang="en-US" dirty="0"/>
               <a:t>In simple terms based on the historical data of the crypto currency prices we want to predict the trend of prices for the future values of the price.</a:t>
             </a:r>
+            <a:endParaRPr lang="en-US" dirty="0"/>
           </a:p>
           <a:p>
             <a:endParaRPr lang="en-US" dirty="0"/>
@@ -7684,11 +7436,6 @@
         </p:txBody>
       </p:sp>
     </p:spTree>
-    <p:extLst>
-      <p:ext uri="{BB962C8B-B14F-4D97-AF65-F5344CB8AC3E}">
-        <p14:creationId xmlns:p14="http://schemas.microsoft.com/office/powerpoint/2010/main" val="4091888315"/>
-      </p:ext>
-    </p:extLst>
   </p:cSld>
   <p:clrMapOvr>
     <a:masterClrMapping/>
@@ -7715,13 +7462,7 @@
       </p:grpSpPr>
       <p:sp>
         <p:nvSpPr>
-          <p:cNvPr id="2" name="Title 1">
-            <a:extLst>
-              <a:ext uri="{FF2B5EF4-FFF2-40B4-BE49-F238E27FC236}">
-                <a16:creationId xmlns:a16="http://schemas.microsoft.com/office/drawing/2014/main" id="{B802B6B2-6BE0-821D-9B72-184C415F1841}"/>
-              </a:ext>
-            </a:extLst>
-          </p:cNvPr>
+          <p:cNvPr id="2" name="Title 1"/>
           <p:cNvSpPr>
             <a:spLocks noGrp="1"/>
           </p:cNvSpPr>
@@ -7744,13 +7485,7 @@
       </p:sp>
       <p:sp>
         <p:nvSpPr>
-          <p:cNvPr id="7" name="Content Placeholder 2">
-            <a:extLst>
-              <a:ext uri="{FF2B5EF4-FFF2-40B4-BE49-F238E27FC236}">
-                <a16:creationId xmlns:a16="http://schemas.microsoft.com/office/drawing/2014/main" id="{3CC6C005-8C92-3693-F8BA-2E03519EEB6D}"/>
-              </a:ext>
-            </a:extLst>
-          </p:cNvPr>
+          <p:cNvPr id="7" name="Content Placeholder 2"/>
           <p:cNvSpPr>
             <a:spLocks noGrp="1"/>
           </p:cNvSpPr>
@@ -7789,13 +7524,7 @@
       </p:sp>
       <p:sp>
         <p:nvSpPr>
-          <p:cNvPr id="4" name="AutoShape 2">
-            <a:extLst>
-              <a:ext uri="{FF2B5EF4-FFF2-40B4-BE49-F238E27FC236}">
-                <a16:creationId xmlns:a16="http://schemas.microsoft.com/office/drawing/2014/main" id="{AFB53C00-32A4-3246-756F-AB736E098B5F}"/>
-              </a:ext>
-            </a:extLst>
-          </p:cNvPr>
+          <p:cNvPr id="4" name="AutoShape 2"/>
           <p:cNvSpPr>
             <a:spLocks noChangeAspect="1" noChangeArrowheads="1"/>
           </p:cNvSpPr>
@@ -7821,11 +7550,7 @@
           </a:extLst>
         </p:spPr>
         <p:txBody>
-          <a:bodyPr vert="horz" wrap="square" lIns="91440" tIns="45720" rIns="91440" bIns="45720" numCol="1" anchor="t" anchorCtr="0" compatLnSpc="1">
-            <a:prstTxWarp prst="textNoShape">
-              <a:avLst/>
-            </a:prstTxWarp>
-          </a:bodyPr>
+          <a:bodyPr vert="horz" wrap="square" lIns="91440" tIns="45720" rIns="91440" bIns="45720" numCol="1" anchor="t" anchorCtr="0" compatLnSpc="1"/>
           <a:lstStyle/>
           <a:p>
             <a:endParaRPr lang="de-DE"/>
@@ -7834,13 +7559,7 @@
       </p:sp>
       <p:sp>
         <p:nvSpPr>
-          <p:cNvPr id="6" name="TextBox 5">
-            <a:extLst>
-              <a:ext uri="{FF2B5EF4-FFF2-40B4-BE49-F238E27FC236}">
-                <a16:creationId xmlns:a16="http://schemas.microsoft.com/office/drawing/2014/main" id="{69A1B6CE-308E-E117-42B3-C1662F03C068}"/>
-              </a:ext>
-            </a:extLst>
-          </p:cNvPr>
+          <p:cNvPr id="6" name="TextBox 5"/>
           <p:cNvSpPr txBox="1"/>
           <p:nvPr/>
         </p:nvSpPr>
@@ -7862,7 +7581,7 @@
           <a:p>
             <a:r>
               <a:rPr lang="de-DE" dirty="0">
-                <a:hlinkClick r:id="rId2"/>
+                <a:hlinkClick r:id="rId1"/>
               </a:rPr>
               <a:t>https://app.clickup.com/9017184916/v/g/8cqemmm-417</a:t>
             </a:r>
@@ -7875,20 +7594,14 @@
       </p:sp>
       <p:pic>
         <p:nvPicPr>
-          <p:cNvPr id="9" name="Picture 8">
-            <a:extLst>
-              <a:ext uri="{FF2B5EF4-FFF2-40B4-BE49-F238E27FC236}">
-                <a16:creationId xmlns:a16="http://schemas.microsoft.com/office/drawing/2014/main" id="{9EC62FD5-C349-4440-ECFF-59B3A98EC861}"/>
-              </a:ext>
-            </a:extLst>
-          </p:cNvPr>
+          <p:cNvPr id="9" name="Picture 8"/>
           <p:cNvPicPr>
             <a:picLocks noChangeAspect="1"/>
           </p:cNvPicPr>
           <p:nvPr/>
         </p:nvPicPr>
         <p:blipFill>
-          <a:blip r:embed="rId3"/>
+          <a:blip r:embed="rId2"/>
           <a:stretch>
             <a:fillRect/>
           </a:stretch>
@@ -7904,11 +7617,6 @@
         </p:spPr>
       </p:pic>
     </p:spTree>
-    <p:extLst>
-      <p:ext uri="{BB962C8B-B14F-4D97-AF65-F5344CB8AC3E}">
-        <p14:creationId xmlns:p14="http://schemas.microsoft.com/office/powerpoint/2010/main" val="3312888813"/>
-      </p:ext>
-    </p:extLst>
   </p:cSld>
   <p:clrMapOvr>
     <a:masterClrMapping/>
@@ -7935,13 +7643,7 @@
       </p:grpSpPr>
       <p:sp>
         <p:nvSpPr>
-          <p:cNvPr id="2" name="Title 1">
-            <a:extLst>
-              <a:ext uri="{FF2B5EF4-FFF2-40B4-BE49-F238E27FC236}">
-                <a16:creationId xmlns:a16="http://schemas.microsoft.com/office/drawing/2014/main" id="{9004A648-85CD-0CF4-D2EE-A23BD26A776B}"/>
-              </a:ext>
-            </a:extLst>
-          </p:cNvPr>
+          <p:cNvPr id="2" name="Title 1"/>
           <p:cNvSpPr>
             <a:spLocks noGrp="1"/>
           </p:cNvSpPr>
@@ -7964,13 +7666,7 @@
       </p:sp>
       <p:sp>
         <p:nvSpPr>
-          <p:cNvPr id="3" name="Content Placeholder 2">
-            <a:extLst>
-              <a:ext uri="{FF2B5EF4-FFF2-40B4-BE49-F238E27FC236}">
-                <a16:creationId xmlns:a16="http://schemas.microsoft.com/office/drawing/2014/main" id="{A069CB20-D92D-7DA0-4335-ED9246A803FF}"/>
-              </a:ext>
-            </a:extLst>
-          </p:cNvPr>
+          <p:cNvPr id="3" name="Content Placeholder 2"/>
           <p:cNvSpPr>
             <a:spLocks noGrp="1"/>
           </p:cNvSpPr>
@@ -8014,20 +7710,14 @@
       </p:sp>
       <p:pic>
         <p:nvPicPr>
-          <p:cNvPr id="5" name="Picture 4">
-            <a:extLst>
-              <a:ext uri="{FF2B5EF4-FFF2-40B4-BE49-F238E27FC236}">
-                <a16:creationId xmlns:a16="http://schemas.microsoft.com/office/drawing/2014/main" id="{C5D67C6E-DE88-22D7-A1A4-ECD6BC8A87E4}"/>
-              </a:ext>
-            </a:extLst>
-          </p:cNvPr>
+          <p:cNvPr id="5" name="Picture 4"/>
           <p:cNvPicPr>
             <a:picLocks noChangeAspect="1"/>
           </p:cNvPicPr>
           <p:nvPr/>
         </p:nvPicPr>
         <p:blipFill>
-          <a:blip r:embed="rId2"/>
+          <a:blip r:embed="rId1"/>
           <a:stretch>
             <a:fillRect/>
           </a:stretch>
@@ -8043,11 +7733,6 @@
         </p:spPr>
       </p:pic>
     </p:spTree>
-    <p:extLst>
-      <p:ext uri="{BB962C8B-B14F-4D97-AF65-F5344CB8AC3E}">
-        <p14:creationId xmlns:p14="http://schemas.microsoft.com/office/powerpoint/2010/main" val="3254795579"/>
-      </p:ext>
-    </p:extLst>
   </p:cSld>
   <p:clrMapOvr>
     <a:masterClrMapping/>
@@ -8074,13 +7759,7 @@
       </p:grpSpPr>
       <p:sp>
         <p:nvSpPr>
-          <p:cNvPr id="2" name="Title 1">
-            <a:extLst>
-              <a:ext uri="{FF2B5EF4-FFF2-40B4-BE49-F238E27FC236}">
-                <a16:creationId xmlns:a16="http://schemas.microsoft.com/office/drawing/2014/main" id="{57931690-31BD-0EA0-42FA-36C3A67AC969}"/>
-              </a:ext>
-            </a:extLst>
-          </p:cNvPr>
+          <p:cNvPr id="2" name="Title 1"/>
           <p:cNvSpPr>
             <a:spLocks noGrp="1"/>
           </p:cNvSpPr>
@@ -8103,13 +7782,7 @@
       </p:sp>
       <p:sp>
         <p:nvSpPr>
-          <p:cNvPr id="3" name="Content Placeholder 2">
-            <a:extLst>
-              <a:ext uri="{FF2B5EF4-FFF2-40B4-BE49-F238E27FC236}">
-                <a16:creationId xmlns:a16="http://schemas.microsoft.com/office/drawing/2014/main" id="{4E0994E5-D7A5-321E-6EE0-E538A929FA37}"/>
-              </a:ext>
-            </a:extLst>
-          </p:cNvPr>
+          <p:cNvPr id="3" name="Content Placeholder 2"/>
           <p:cNvSpPr>
             <a:spLocks noGrp="1"/>
           </p:cNvSpPr>
@@ -8117,51 +7790,70 @@
             <p:ph idx="1"/>
           </p:nvPr>
         </p:nvSpPr>
-        <p:spPr/>
+        <p:spPr>
+          <a:xfrm>
+            <a:off x="677545" y="2160905"/>
+            <a:ext cx="6844665" cy="3880485"/>
+          </a:xfrm>
+        </p:spPr>
         <p:txBody>
           <a:bodyPr/>
           <a:lstStyle/>
           <a:p>
             <a:r>
-              <a:rPr lang="en-US" dirty="0">
-                <a:solidFill>
-                  <a:srgbClr val="FF0000"/>
-                </a:solidFill>
+              <a:rPr lang="en-IN" altLang="en-US" dirty="0">
+                <a:solidFill>
+                  <a:schemeClr val="tx1"/>
+                </a:solidFill>
+                <a:sym typeface="+mn-ea"/>
               </a:rPr>
-              <a:t>Please add a histogram chart for 2 cryptos showing the change in time of the closing price so x should be the date and Y should be the closing price. Here we should have then 2 histograms, one for bitcoin for example and other for XRP.</a:t>
-            </a:r>
+              <a:t>Scattere plot b/w colse value and date for BitCoin</a:t>
+            </a:r>
+            <a:endParaRPr lang="en-IN" altLang="en-US" dirty="0">
+              <a:solidFill>
+                <a:schemeClr val="tx1"/>
+              </a:solidFill>
+            </a:endParaRPr>
+          </a:p>
+          <a:p>
+            <a:endParaRPr lang="en-IN" altLang="en-US" dirty="0">
+              <a:solidFill>
+                <a:schemeClr val="tx1"/>
+              </a:solidFill>
+            </a:endParaRPr>
+          </a:p>
+          <a:p>
+            <a:r>
+              <a:rPr lang="en-IN" altLang="en-US" dirty="0">
+                <a:solidFill>
+                  <a:schemeClr val="tx1"/>
+                </a:solidFill>
+                <a:sym typeface="+mn-ea"/>
+              </a:rPr>
+              <a:t>Scattere plot b/w colse value and date for BitCoin</a:t>
+            </a:r>
+            <a:endParaRPr lang="en-IN" altLang="en-US" dirty="0">
+              <a:solidFill>
+                <a:schemeClr val="tx1"/>
+              </a:solidFill>
+            </a:endParaRPr>
           </a:p>
           <a:p>
             <a:endParaRPr lang="en-US" dirty="0">
               <a:solidFill>
-                <a:srgbClr val="FF0000"/>
+                <a:schemeClr val="tx1"/>
               </a:solidFill>
             </a:endParaRPr>
           </a:p>
           <a:p>
             <a:r>
-              <a:rPr lang="en-US" dirty="0">
-                <a:solidFill>
-                  <a:srgbClr val="FF0000"/>
-                </a:solidFill>
+              <a:rPr lang="en-IN" altLang="de-DE" dirty="0">
+                <a:solidFill>
+                  <a:schemeClr val="tx1"/>
+                </a:solidFill>
+                <a:sym typeface="+mn-ea"/>
               </a:rPr>
-              <a:t>Mention if there’s any null value on the data, value of cero, missing data, mention that we have more or less information depending on the crypto, this should be very similar to the </a:t>
-            </a:r>
-            <a:r>
-              <a:rPr lang="en-US" dirty="0" err="1">
-                <a:solidFill>
-                  <a:srgbClr val="FF0000"/>
-                </a:solidFill>
-              </a:rPr>
-              <a:t>finidings</a:t>
-            </a:r>
-            <a:r>
-              <a:rPr lang="en-US" dirty="0">
-                <a:solidFill>
-                  <a:srgbClr val="FF0000"/>
-                </a:solidFill>
-              </a:rPr>
-              <a:t> of last week.</a:t>
+              <a:t>No Null (or) Empty values, Missing data in any of the column in the dataset.</a:t>
             </a:r>
             <a:endParaRPr lang="de-DE" dirty="0">
               <a:solidFill>
@@ -8171,12 +7863,55 @@
           </a:p>
         </p:txBody>
       </p:sp>
+      <p:pic>
+        <p:nvPicPr>
+          <p:cNvPr id="4" name="Picture 3"/>
+          <p:cNvPicPr>
+            <a:picLocks noChangeAspect="1"/>
+          </p:cNvPicPr>
+          <p:nvPr/>
+        </p:nvPicPr>
+        <p:blipFill>
+          <a:blip r:embed="rId1"/>
+          <a:stretch>
+            <a:fillRect/>
+          </a:stretch>
+        </p:blipFill>
+        <p:spPr>
+          <a:xfrm>
+            <a:off x="8134985" y="195580"/>
+            <a:ext cx="5015230" cy="2807335"/>
+          </a:xfrm>
+          <a:prstGeom prst="rect">
+            <a:avLst/>
+          </a:prstGeom>
+        </p:spPr>
+      </p:pic>
+      <p:pic>
+        <p:nvPicPr>
+          <p:cNvPr id="5" name="Picture 4"/>
+          <p:cNvPicPr>
+            <a:picLocks noChangeAspect="1"/>
+          </p:cNvPicPr>
+          <p:nvPr/>
+        </p:nvPicPr>
+        <p:blipFill>
+          <a:blip r:embed="rId2"/>
+          <a:stretch>
+            <a:fillRect/>
+          </a:stretch>
+        </p:blipFill>
+        <p:spPr>
+          <a:xfrm>
+            <a:off x="8242935" y="2525395"/>
+            <a:ext cx="3192780" cy="2479675"/>
+          </a:xfrm>
+          <a:prstGeom prst="rect">
+            <a:avLst/>
+          </a:prstGeom>
+        </p:spPr>
+      </p:pic>
     </p:spTree>
-    <p:extLst>
-      <p:ext uri="{BB962C8B-B14F-4D97-AF65-F5344CB8AC3E}">
-        <p14:creationId xmlns:p14="http://schemas.microsoft.com/office/powerpoint/2010/main" val="139925003"/>
-      </p:ext>
-    </p:extLst>
   </p:cSld>
   <p:clrMapOvr>
     <a:masterClrMapping/>
@@ -8203,13 +7938,7 @@
       </p:grpSpPr>
       <p:sp>
         <p:nvSpPr>
-          <p:cNvPr id="2" name="Title 1">
-            <a:extLst>
-              <a:ext uri="{FF2B5EF4-FFF2-40B4-BE49-F238E27FC236}">
-                <a16:creationId xmlns:a16="http://schemas.microsoft.com/office/drawing/2014/main" id="{BE9371D3-F649-3F16-769E-5D2E918E0C8C}"/>
-              </a:ext>
-            </a:extLst>
-          </p:cNvPr>
+          <p:cNvPr id="2" name="Title 1"/>
           <p:cNvSpPr>
             <a:spLocks noGrp="1"/>
           </p:cNvSpPr>
@@ -8232,13 +7961,7 @@
       </p:sp>
       <p:sp>
         <p:nvSpPr>
-          <p:cNvPr id="3" name="Content Placeholder 2">
-            <a:extLst>
-              <a:ext uri="{FF2B5EF4-FFF2-40B4-BE49-F238E27FC236}">
-                <a16:creationId xmlns:a16="http://schemas.microsoft.com/office/drawing/2014/main" id="{B331F3FA-370A-DE0C-20EF-FC203F77420A}"/>
-              </a:ext>
-            </a:extLst>
-          </p:cNvPr>
+          <p:cNvPr id="3" name="Content Placeholder 2"/>
           <p:cNvSpPr>
             <a:spLocks noGrp="1"/>
           </p:cNvSpPr>
@@ -8263,6 +7986,7 @@
               <a:rPr lang="en-US" dirty="0"/>
               <a:t> ML and what does it mean to train a model.</a:t>
             </a:r>
+            <a:endParaRPr lang="en-US" dirty="0"/>
           </a:p>
           <a:p>
             <a:endParaRPr lang="en-US" dirty="0"/>
@@ -8280,11 +8004,6 @@
         </p:txBody>
       </p:sp>
     </p:spTree>
-    <p:extLst>
-      <p:ext uri="{BB962C8B-B14F-4D97-AF65-F5344CB8AC3E}">
-        <p14:creationId xmlns:p14="http://schemas.microsoft.com/office/powerpoint/2010/main" val="1176923444"/>
-      </p:ext>
-    </p:extLst>
   </p:cSld>
   <p:clrMapOvr>
     <a:masterClrMapping/>
@@ -8311,13 +8030,7 @@
       </p:grpSpPr>
       <p:sp>
         <p:nvSpPr>
-          <p:cNvPr id="2" name="Title 1">
-            <a:extLst>
-              <a:ext uri="{FF2B5EF4-FFF2-40B4-BE49-F238E27FC236}">
-                <a16:creationId xmlns:a16="http://schemas.microsoft.com/office/drawing/2014/main" id="{35F93C1A-552B-A03D-3432-57B8280C09ED}"/>
-              </a:ext>
-            </a:extLst>
-          </p:cNvPr>
+          <p:cNvPr id="2" name="Title 1"/>
           <p:cNvSpPr>
             <a:spLocks noGrp="1"/>
           </p:cNvSpPr>
@@ -8340,13 +8053,7 @@
       </p:sp>
       <p:sp>
         <p:nvSpPr>
-          <p:cNvPr id="3" name="Content Placeholder 2">
-            <a:extLst>
-              <a:ext uri="{FF2B5EF4-FFF2-40B4-BE49-F238E27FC236}">
-                <a16:creationId xmlns:a16="http://schemas.microsoft.com/office/drawing/2014/main" id="{7F863158-CD9B-3553-D562-CC17B40F56CB}"/>
-              </a:ext>
-            </a:extLst>
-          </p:cNvPr>
+          <p:cNvPr id="3" name="Content Placeholder 2"/>
           <p:cNvSpPr>
             <a:spLocks noGrp="1"/>
           </p:cNvSpPr>
@@ -8363,24 +8070,28 @@
               <a:rPr lang="en-US" dirty="0"/>
               <a:t>A statistical method known as regression establishes a relationship between a dependent variable and one or more independent (explanatory) variables.</a:t>
             </a:r>
+            <a:endParaRPr lang="en-US" dirty="0"/>
           </a:p>
           <a:p>
             <a:r>
               <a:rPr lang="en-US" dirty="0"/>
               <a:t>A regression model can show whether changes observed in the dependent variable are associated with changes in one or more of the explanatory variables.</a:t>
             </a:r>
+            <a:endParaRPr lang="en-US" dirty="0"/>
           </a:p>
           <a:p>
             <a:r>
               <a:rPr lang="en-US" dirty="0"/>
               <a:t>In essence, it fits a best-fit line and observes how the data is distributed around it to do this.</a:t>
             </a:r>
+            <a:endParaRPr lang="en-US" dirty="0"/>
           </a:p>
           <a:p>
             <a:r>
               <a:rPr lang="en-US" dirty="0"/>
               <a:t>It helps the analyst to help to make asset valuations and making prediction.</a:t>
             </a:r>
+            <a:endParaRPr lang="en-US" dirty="0"/>
           </a:p>
           <a:p>
             <a:r>
@@ -8392,11 +8103,6 @@
         </p:txBody>
       </p:sp>
     </p:spTree>
-    <p:extLst>
-      <p:ext uri="{BB962C8B-B14F-4D97-AF65-F5344CB8AC3E}">
-        <p14:creationId xmlns:p14="http://schemas.microsoft.com/office/powerpoint/2010/main" val="958846511"/>
-      </p:ext>
-    </p:extLst>
   </p:cSld>
   <p:clrMapOvr>
     <a:masterClrMapping/>
@@ -8447,7 +8153,7 @@
     </a:clrScheme>
     <a:fontScheme name="Facet">
       <a:majorFont>
-        <a:latin typeface="Trebuchet MS" panose="020B0603020202020204"/>
+        <a:latin typeface="Trebuchet MS"/>
         <a:ea typeface=""/>
         <a:cs typeface=""/>
         <a:font script="Jpan" typeface="メイリオ"/>
@@ -8482,7 +8188,7 @@
         <a:font script="Geor" typeface="Sylfaen"/>
       </a:majorFont>
       <a:minorFont>
-        <a:latin typeface="Trebuchet MS" panose="020B0603020202020204"/>
+        <a:latin typeface="Trebuchet MS"/>
         <a:ea typeface=""/>
         <a:cs typeface=""/>
         <a:font script="Jpan" typeface="メイリオ"/>
@@ -8651,330 +8357,541 @@
       </a:bgFillStyleLst>
     </a:fmtScheme>
   </a:themeElements>
-  <a:objectDefaults/>
-  <a:extraClrSchemeLst/>
   <a:extLst>
     <a:ext uri="{05A4C25C-085E-4340-85A3-A5531E510DB2}">
-      <thm15:themeFamily xmlns:thm15="http://schemas.microsoft.com/office/thememl/2012/main" name="Facet" id="{C0C680CD-088A-49FC-A102-D699147F32B2}" vid="{CFBC31BA-B70F-4F30-BCAA-4F3011E16C4D}"/>
+      <thm15:themeFamily xmlns:thm15="http://schemas.microsoft.com/office/thememl/2012/main" name="Office Theme" id="{62F939B6-93AF-4DB8-9C6B-D6C7DFDC589F}" vid="{4A3C46E8-61CC-4603-A589-7422A47A8E4A}"/>
     </a:ext>
   </a:extLst>
 </a:theme>
 </file>
 
-<file path=customXml/item1.xml><?xml version="1.0" encoding="utf-8"?>
-<ct:contentTypeSchema xmlns:ct="http://schemas.microsoft.com/office/2006/metadata/contentType" xmlns:ma="http://schemas.microsoft.com/office/2006/metadata/properties/metaAttributes" ct:_="" ma:_="" ma:contentTypeName="Document" ma:contentTypeID="0x010100CD401524DC532D42A0E0ED886331A72B" ma:contentTypeVersion="15" ma:contentTypeDescription="Create a new document." ma:contentTypeScope="" ma:versionID="aba17d7263e5a17e1efe42a3571abb41">
-  <xsd:schema xmlns:xsd="http://www.w3.org/2001/XMLSchema" xmlns:xs="http://www.w3.org/2001/XMLSchema" xmlns:p="http://schemas.microsoft.com/office/2006/metadata/properties" xmlns:ns2="f577acbf-5b0b-4b4f-9948-268e97f8d3a4" xmlns:ns3="b1e4d6ee-9f6f-43f8-a618-24f3d84da28f" targetNamespace="http://schemas.microsoft.com/office/2006/metadata/properties" ma:root="true" ma:fieldsID="e4e3c9c8ed1c3d723d02c9f1cb24d19a" ns2:_="" ns3:_="">
-    <xsd:import namespace="f577acbf-5b0b-4b4f-9948-268e97f8d3a4"/>
-    <xsd:import namespace="b1e4d6ee-9f6f-43f8-a618-24f3d84da28f"/>
-    <xsd:element name="properties">
-      <xsd:complexType>
-        <xsd:sequence>
-          <xsd:element name="documentManagement">
-            <xsd:complexType>
-              <xsd:all>
-                <xsd:element ref="ns2:MediaServiceMetadata" minOccurs="0"/>
-                <xsd:element ref="ns2:MediaServiceFastMetadata" minOccurs="0"/>
-                <xsd:element ref="ns3:SharedWithUsers" minOccurs="0"/>
-                <xsd:element ref="ns3:SharedWithDetails" minOccurs="0"/>
-                <xsd:element ref="ns3:LastSharedByUser" minOccurs="0"/>
-                <xsd:element ref="ns3:LastSharedByTime" minOccurs="0"/>
-                <xsd:element ref="ns2:Document_x0020_Purpose" minOccurs="0"/>
-                <xsd:element ref="ns2:Initiatives" minOccurs="0"/>
-                <xsd:element ref="ns2:MediaServiceDateTaken" minOccurs="0"/>
-                <xsd:element ref="ns2:MediaServiceAutoTags" minOccurs="0"/>
-                <xsd:element ref="ns2:MediaServiceOCR" minOccurs="0"/>
-                <xsd:element ref="ns2:MediaServiceLocation" minOccurs="0"/>
-                <xsd:element ref="ns2:MediaServiceEventHashCode" minOccurs="0"/>
-                <xsd:element ref="ns2:MediaServiceGenerationTime" minOccurs="0"/>
-              </xsd:all>
-            </xsd:complexType>
-          </xsd:element>
-        </xsd:sequence>
-      </xsd:complexType>
-    </xsd:element>
-  </xsd:schema>
-  <xsd:schema xmlns:xsd="http://www.w3.org/2001/XMLSchema" xmlns:xs="http://www.w3.org/2001/XMLSchema" xmlns:dms="http://schemas.microsoft.com/office/2006/documentManagement/types" xmlns:pc="http://schemas.microsoft.com/office/infopath/2007/PartnerControls" targetNamespace="f577acbf-5b0b-4b4f-9948-268e97f8d3a4" elementFormDefault="qualified">
-    <xsd:import namespace="http://schemas.microsoft.com/office/2006/documentManagement/types"/>
-    <xsd:import namespace="http://schemas.microsoft.com/office/infopath/2007/PartnerControls"/>
-    <xsd:element name="MediaServiceMetadata" ma:index="8" nillable="true" ma:displayName="MediaServiceMetadata" ma:hidden="true" ma:internalName="MediaServiceMetadata" ma:readOnly="true">
-      <xsd:simpleType>
-        <xsd:restriction base="dms:Note"/>
-      </xsd:simpleType>
-    </xsd:element>
-    <xsd:element name="MediaServiceFastMetadata" ma:index="9" nillable="true" ma:displayName="MediaServiceFastMetadata" ma:hidden="true" ma:internalName="MediaServiceFastMetadata" ma:readOnly="true">
-      <xsd:simpleType>
-        <xsd:restriction base="dms:Note"/>
-      </xsd:simpleType>
-    </xsd:element>
-    <xsd:element name="Document_x0020_Purpose" ma:index="14" nillable="true" ma:displayName="Document Purpose" ma:default="Informational" ma:format="Dropdown" ma:internalName="Document_x0020_Purpose">
-      <xsd:simpleType>
-        <xsd:restriction base="dms:Choice">
-          <xsd:enumeration value="Informational"/>
-          <xsd:enumeration value="Feature Spec"/>
-          <xsd:enumeration value="Engineering Design"/>
-          <xsd:enumeration value="Planning"/>
-        </xsd:restriction>
-      </xsd:simpleType>
-    </xsd:element>
-    <xsd:element name="Initiatives" ma:index="15" nillable="true" ma:displayName="Initiatives" ma:description="List of initiatives related to this document" ma:internalName="Initiatives">
-      <xsd:complexType>
-        <xsd:complexContent>
-          <xsd:extension base="dms:MultiChoice">
-            <xsd:sequence>
-              <xsd:element name="Value" maxOccurs="unbounded" minOccurs="0" nillable="true">
-                <xsd:simpleType>
-                  <xsd:restriction base="dms:Choice">
-                    <xsd:enumeration value="Add-in MAU"/>
-                    <xsd:enumeration value="Custom Functions"/>
-                    <xsd:enumeration value="Data &amp; Analytics"/>
-                    <xsd:enumeration value="DevEx: Portals &amp; Programs"/>
-                    <xsd:enumeration value="DevEx: Tools &amp; Libraries"/>
-                    <xsd:enumeration value="Engineering"/>
-                    <xsd:enumeration value="Excel API"/>
-                    <xsd:enumeration value="In-Market Support"/>
-                    <xsd:enumeration value="Maker Access"/>
-                    <xsd:enumeration value="SDX Runtime &amp; Partners"/>
-                    <xsd:enumeration value="SDX Service Delivery"/>
-                    <xsd:enumeration value="SDX API &amp; Pipeline"/>
-                    <xsd:enumeration value="Shield &amp; OCE"/>
-                  </xsd:restriction>
-                </xsd:simpleType>
-              </xsd:element>
-            </xsd:sequence>
-          </xsd:extension>
-        </xsd:complexContent>
-      </xsd:complexType>
-    </xsd:element>
-    <xsd:element name="MediaServiceDateTaken" ma:index="16" nillable="true" ma:displayName="MediaServiceDateTaken" ma:hidden="true" ma:internalName="MediaServiceDateTaken" ma:readOnly="true">
-      <xsd:simpleType>
-        <xsd:restriction base="dms:Text"/>
-      </xsd:simpleType>
-    </xsd:element>
-    <xsd:element name="MediaServiceAutoTags" ma:index="17" nillable="true" ma:displayName="MediaServiceAutoTags" ma:internalName="MediaServiceAutoTags" ma:readOnly="true">
-      <xsd:simpleType>
-        <xsd:restriction base="dms:Text"/>
-      </xsd:simpleType>
-    </xsd:element>
-    <xsd:element name="MediaServiceOCR" ma:index="18" nillable="true" ma:displayName="MediaServiceOCR" ma:internalName="MediaServiceOCR" ma:readOnly="true">
-      <xsd:simpleType>
-        <xsd:restriction base="dms:Note">
-          <xsd:maxLength value="255"/>
-        </xsd:restriction>
-      </xsd:simpleType>
-    </xsd:element>
-    <xsd:element name="MediaServiceLocation" ma:index="19" nillable="true" ma:displayName="MediaServiceLocation" ma:internalName="MediaServiceLocation" ma:readOnly="true">
-      <xsd:simpleType>
-        <xsd:restriction base="dms:Text"/>
-      </xsd:simpleType>
-    </xsd:element>
-    <xsd:element name="MediaServiceEventHashCode" ma:index="20" nillable="true" ma:displayName="MediaServiceEventHashCode" ma:hidden="true" ma:internalName="MediaServiceEventHashCode" ma:readOnly="true">
-      <xsd:simpleType>
-        <xsd:restriction base="dms:Text"/>
-      </xsd:simpleType>
-    </xsd:element>
-    <xsd:element name="MediaServiceGenerationTime" ma:index="21" nillable="true" ma:displayName="MediaServiceGenerationTime" ma:hidden="true" ma:internalName="MediaServiceGenerationTime" ma:readOnly="true">
-      <xsd:simpleType>
-        <xsd:restriction base="dms:Text"/>
-      </xsd:simpleType>
-    </xsd:element>
-  </xsd:schema>
-  <xsd:schema xmlns:xsd="http://www.w3.org/2001/XMLSchema" xmlns:xs="http://www.w3.org/2001/XMLSchema" xmlns:dms="http://schemas.microsoft.com/office/2006/documentManagement/types" xmlns:pc="http://schemas.microsoft.com/office/infopath/2007/PartnerControls" targetNamespace="b1e4d6ee-9f6f-43f8-a618-24f3d84da28f" elementFormDefault="qualified">
-    <xsd:import namespace="http://schemas.microsoft.com/office/2006/documentManagement/types"/>
-    <xsd:import namespace="http://schemas.microsoft.com/office/infopath/2007/PartnerControls"/>
-    <xsd:element name="SharedWithUsers" ma:index="10" nillable="true" ma:displayName="Shared With" ma:internalName="SharedWithUsers" ma:readOnly="true">
-      <xsd:complexType>
-        <xsd:complexContent>
-          <xsd:extension base="dms:UserMulti">
-            <xsd:sequence>
-              <xsd:element name="UserInfo" minOccurs="0" maxOccurs="unbounded">
-                <xsd:complexType>
-                  <xsd:sequence>
-                    <xsd:element name="DisplayName" type="xsd:string" minOccurs="0"/>
-                    <xsd:element name="AccountId" type="dms:UserId" minOccurs="0" nillable="true"/>
-                    <xsd:element name="AccountType" type="xsd:string" minOccurs="0"/>
-                  </xsd:sequence>
-                </xsd:complexType>
-              </xsd:element>
-            </xsd:sequence>
-          </xsd:extension>
-        </xsd:complexContent>
-      </xsd:complexType>
-    </xsd:element>
-    <xsd:element name="SharedWithDetails" ma:index="11" nillable="true" ma:displayName="Shared With Details" ma:internalName="SharedWithDetails" ma:readOnly="true">
-      <xsd:simpleType>
-        <xsd:restriction base="dms:Note">
-          <xsd:maxLength value="255"/>
-        </xsd:restriction>
-      </xsd:simpleType>
-    </xsd:element>
-    <xsd:element name="LastSharedByUser" ma:index="12" nillable="true" ma:displayName="Last Shared By User" ma:hidden="true" ma:internalName="LastSharedByUser" ma:readOnly="true">
-      <xsd:simpleType>
-        <xsd:restriction base="dms:Note"/>
-      </xsd:simpleType>
-    </xsd:element>
-    <xsd:element name="LastSharedByTime" ma:index="13" nillable="true" ma:displayName="Last Shared By Time" ma:hidden="true" ma:internalName="LastSharedByTime" ma:readOnly="true">
-      <xsd:simpleType>
-        <xsd:restriction base="dms:DateTime"/>
-      </xsd:simpleType>
-    </xsd:element>
-  </xsd:schema>
-  <xsd:schema xmlns="http://schemas.openxmlformats.org/package/2006/metadata/core-properties" xmlns:xsd="http://www.w3.org/2001/XMLSchema" xmlns:xsi="http://www.w3.org/2001/XMLSchema-instance" xmlns:dc="http://purl.org/dc/elements/1.1/" xmlns:dcterms="http://purl.org/dc/terms/" xmlns:odoc="http://schemas.microsoft.com/internal/obd" targetNamespace="http://schemas.openxmlformats.org/package/2006/metadata/core-properties" elementFormDefault="qualified" attributeFormDefault="unqualified" blockDefault="#all">
-    <xsd:import namespace="http://purl.org/dc/elements/1.1/" schemaLocation="http://dublincore.org/schemas/xmls/qdc/2003/04/02/dc.xsd"/>
-    <xsd:import namespace="http://purl.org/dc/terms/" schemaLocation="http://dublincore.org/schemas/xmls/qdc/2003/04/02/dcterms.xsd"/>
-    <xsd:element name="coreProperties" type="CT_coreProperties"/>
-    <xsd:complexType name="CT_coreProperties">
-      <xsd:all>
-        <xsd:element ref="dc:creator" minOccurs="0" maxOccurs="1"/>
-        <xsd:element ref="dcterms:created" minOccurs="0" maxOccurs="1"/>
-        <xsd:element ref="dc:identifier" minOccurs="0" maxOccurs="1"/>
-        <xsd:element name="contentType" minOccurs="0" maxOccurs="1" type="xsd:string" ma:index="0" ma:displayName="Content Type"/>
-        <xsd:element ref="dc:title" minOccurs="0" maxOccurs="1" ma:index="4" ma:displayName="Title"/>
-        <xsd:element ref="dc:subject" minOccurs="0" maxOccurs="1"/>
-        <xsd:element ref="dc:description" minOccurs="0" maxOccurs="1"/>
-        <xsd:element name="keywords" minOccurs="0" maxOccurs="1" type="xsd:string"/>
-        <xsd:element ref="dc:language" minOccurs="0" maxOccurs="1"/>
-        <xsd:element name="category" minOccurs="0" maxOccurs="1" type="xsd:string"/>
-        <xsd:element name="version" minOccurs="0" maxOccurs="1" type="xsd:string"/>
-        <xsd:element name="revision" minOccurs="0" maxOccurs="1" type="xsd:string">
-          <xsd:annotation>
-            <xsd:documentation>
-                        This value indicates the number of saves or revisions. The application is responsible for updating this value after each revision.
-                    </xsd:documentation>
-          </xsd:annotation>
-        </xsd:element>
-        <xsd:element name="lastModifiedBy" minOccurs="0" maxOccurs="1" type="xsd:string"/>
-        <xsd:element ref="dcterms:modified" minOccurs="0" maxOccurs="1"/>
-        <xsd:element name="contentStatus" minOccurs="0" maxOccurs="1" type="xsd:string"/>
-      </xsd:all>
-    </xsd:complexType>
-  </xsd:schema>
-  <xs:schema xmlns:pc="http://schemas.microsoft.com/office/infopath/2007/PartnerControls" xmlns:xs="http://www.w3.org/2001/XMLSchema" targetNamespace="http://schemas.microsoft.com/office/infopath/2007/PartnerControls" elementFormDefault="qualified" attributeFormDefault="unqualified">
-    <xs:element name="Person">
-      <xs:complexType>
-        <xs:sequence>
-          <xs:element ref="pc:DisplayName" minOccurs="0"/>
-          <xs:element ref="pc:AccountId" minOccurs="0"/>
-          <xs:element ref="pc:AccountType" minOccurs="0"/>
-        </xs:sequence>
-      </xs:complexType>
-    </xs:element>
-    <xs:element name="DisplayName" type="xs:string"/>
-    <xs:element name="AccountId" type="xs:string"/>
-    <xs:element name="AccountType" type="xs:string"/>
-    <xs:element name="BDCAssociatedEntity">
-      <xs:complexType>
-        <xs:sequence>
-          <xs:element ref="pc:BDCEntity" minOccurs="0" maxOccurs="unbounded"/>
-        </xs:sequence>
-        <xs:attribute ref="pc:EntityNamespace"/>
-        <xs:attribute ref="pc:EntityName"/>
-        <xs:attribute ref="pc:SystemInstanceName"/>
-        <xs:attribute ref="pc:AssociationName"/>
-      </xs:complexType>
-    </xs:element>
-    <xs:attribute name="EntityNamespace" type="xs:string"/>
-    <xs:attribute name="EntityName" type="xs:string"/>
-    <xs:attribute name="SystemInstanceName" type="xs:string"/>
-    <xs:attribute name="AssociationName" type="xs:string"/>
-    <xs:element name="BDCEntity">
-      <xs:complexType>
-        <xs:sequence>
-          <xs:element ref="pc:EntityDisplayName" minOccurs="0"/>
-          <xs:element ref="pc:EntityInstanceReference" minOccurs="0"/>
-          <xs:element ref="pc:EntityId1" minOccurs="0"/>
-          <xs:element ref="pc:EntityId2" minOccurs="0"/>
-          <xs:element ref="pc:EntityId3" minOccurs="0"/>
-          <xs:element ref="pc:EntityId4" minOccurs="0"/>
-          <xs:element ref="pc:EntityId5" minOccurs="0"/>
-        </xs:sequence>
-      </xs:complexType>
-    </xs:element>
-    <xs:element name="EntityDisplayName" type="xs:string"/>
-    <xs:element name="EntityInstanceReference" type="xs:string"/>
-    <xs:element name="EntityId1" type="xs:string"/>
-    <xs:element name="EntityId2" type="xs:string"/>
-    <xs:element name="EntityId3" type="xs:string"/>
-    <xs:element name="EntityId4" type="xs:string"/>
-    <xs:element name="EntityId5" type="xs:string"/>
-    <xs:element name="Terms">
-      <xs:complexType>
-        <xs:sequence>
-          <xs:element ref="pc:TermInfo" minOccurs="0" maxOccurs="unbounded"/>
-        </xs:sequence>
-      </xs:complexType>
-    </xs:element>
-    <xs:element name="TermInfo">
-      <xs:complexType>
-        <xs:sequence>
-          <xs:element ref="pc:TermName" minOccurs="0"/>
-          <xs:element ref="pc:TermId" minOccurs="0"/>
-        </xs:sequence>
-      </xs:complexType>
-    </xs:element>
-    <xs:element name="TermName" type="xs:string"/>
-    <xs:element name="TermId" type="xs:string"/>
-  </xs:schema>
-</ct:contentTypeSchema>
+<file path=customXml/item1.xml>��< ? x m l   v e r s i o n = " 1 . 0 " ? > < c t : c o n t e n t T y p e S c h e m a   c t : _ = " "   m a : _ = " "   m a : c o n t e n t T y p e N a m e = " D o c u m e n t "   m a : c o n t e n t T y p e I D = " 0 x 0 1 0 1 0 0 C D 4 0 1 5 2 4 D C 5 3 2 D 4 2 A 0 E 0 E D 8 8 6 3 3 1 A 7 2 B "   m a : c o n t e n t T y p e V e r s i o n = " 1 5 "   m a : c o n t e n t T y p e D e s c r i p t i o n = " C r e a t e   a   n e w   d o c u m e n t . "   m a : c o n t e n t T y p e S c o p e = " "   m a : v e r s i o n I D = " a b a 1 7 d 7 2 6 3 e 5 a 1 7 e 1 e f e 4 2 a 3 5 7 1 a b b 4 1 "   x m l n s : c t = " h t t p : / / s c h e m a s . m i c r o s o f t . c o m / o f f i c e / 2 0 0 6 / m e t a d a t a / c o n t e n t T y p e "   x m l n s : m a = " h t t p : / / s c h e m a s . m i c r o s o f t . c o m / o f f i c e / 2 0 0 6 / m e t a d a t a / p r o p e r t i e s / m e t a A t t r i b u t e s " > + 
+ < x s d : s c h e m a   t a r g e t N a m e s p a c e = " h t t p : / / s c h e m a s . m i c r o s o f t . c o m / o f f i c e / 2 0 0 6 / m e t a d a t a / p r o p e r t i e s "   m a : r o o t = " t r u e "   m a : f i e l d s I D = " e 4 e 3 c 9 c 8 e d 1 c 3 d 7 2 3 d 0 2 c 9 f 1 c b 2 4 d 1 9 a "   n s 2 : _ = " "   n s 3 : _ = " "   x m l n s : x s d = " h t t p : / / w w w . w 3 . o r g / 2 0 0 1 / X M L S c h e m a "   x m l n s : x s = " h t t p : / / w w w . w 3 . o r g / 2 0 0 1 / X M L S c h e m a "   x m l n s : p = " h t t p : / / s c h e m a s . m i c r o s o f t . c o m / o f f i c e / 2 0 0 6 / m e t a d a t a / p r o p e r t i e s "   x m l n s : n s 2 = " f 5 7 7 a c b f - 5 b 0 b - 4 b 4 f - 9 9 4 8 - 2 6 8 e 9 7 f 8 d 3 a 4 "   x m l n s : n s 3 = " b 1 e 4 d 6 e e - 9 f 6 f - 4 3 f 8 - a 6 1 8 - 2 4 f 3 d 8 4 d a 2 8 f " > + 
+ < x s d : i m p o r t   n a m e s p a c e = " f 5 7 7 a c b f - 5 b 0 b - 4 b 4 f - 9 9 4 8 - 2 6 8 e 9 7 f 8 d 3 a 4 " / > + 
+ < x s d : i m p o r t   n a m e s p a c e = " b 1 e 4 d 6 e e - 9 f 6 f - 4 3 f 8 - a 6 1 8 - 2 4 f 3 d 8 4 d a 2 8 f " / > + 
+ < x s d : e l e m e n t   n a m e = " p r o p e r t i e s " > + 
+ < x s d : c o m p l e x T y p e > + 
+ < x s d : s e q u e n c e > + 
+ < x s d : e l e m e n t   n a m e = " d o c u m e n t M a n a g e m e n t " > + 
+ < x s d : c o m p l e x T y p e > + 
+ < x s d : a l l > + 
+ < x s d : e l e m e n t   r e f = " n s 2 : M e d i a S e r v i c e M e t a d a t a "   m i n O c c u r s = " 0 " / > + 
+ < x s d : e l e m e n t   r e f = " n s 2 : M e d i a S e r v i c e F a s t M e t a d a t a "   m i n O c c u r s = " 0 " / > + 
+ < x s d : e l e m e n t   r e f = " n s 3 : S h a r e d W i t h U s e r s "   m i n O c c u r s = " 0 " / > + 
+ < x s d : e l e m e n t   r e f = " n s 3 : S h a r e d W i t h D e t a i l s "   m i n O c c u r s = " 0 " / > + 
+ < x s d : e l e m e n t   r e f = " n s 3 : L a s t S h a r e d B y U s e r "   m i n O c c u r s = " 0 " / > + 
+ < x s d : e l e m e n t   r e f = " n s 3 : L a s t S h a r e d B y T i m e "   m i n O c c u r s = " 0 " / > + 
+ < x s d : e l e m e n t   r e f = " n s 2 : D o c u m e n t _ x 0 0 2 0 _ P u r p o s e "   m i n O c c u r s = " 0 " / > + 
+ < x s d : e l e m e n t   r e f = " n s 2 : I n i t i a t i v e s "   m i n O c c u r s = " 0 " / > + 
+ < x s d : e l e m e n t   r e f = " n s 2 : M e d i a S e r v i c e D a t e T a k e n "   m i n O c c u r s = " 0 " / > + 
+ < x s d : e l e m e n t   r e f = " n s 2 : M e d i a S e r v i c e A u t o T a g s "   m i n O c c u r s = " 0 " / > + 
+ < x s d : e l e m e n t   r e f = " n s 2 : M e d i a S e r v i c e O C R "   m i n O c c u r s = " 0 " / > + 
+ < x s d : e l e m e n t   r e f = " n s 2 : M e d i a S e r v i c e L o c a t i o n "   m i n O c c u r s = " 0 " / > + 
+ < x s d : e l e m e n t   r e f = " n s 2 : M e d i a S e r v i c e E v e n t H a s h C o d e "   m i n O c c u r s = " 0 " / > + 
+ < x s d : e l e m e n t   r e f = " n s 2 : M e d i a S e r v i c e G e n e r a t i o n T i m e "   m i n O c c u r s = " 0 " / > + 
+ < / x s d : a l l > + 
+ < / x s d : c o m p l e x T y p e > + 
+ < / x s d : e l e m e n t > + 
+ < / x s d : s e q u e n c e > + 
+ < / x s d : c o m p l e x T y p e > + 
+ < / x s d : e l e m e n t > + 
+ < / x s d : s c h e m a > + 
+ < x s d : s c h e m a   t a r g e t N a m e s p a c e = " f 5 7 7 a c b f - 5 b 0 b - 4 b 4 f - 9 9 4 8 - 2 6 8 e 9 7 f 8 d 3 a 4 "   e l e m e n t F o r m D e f a u l t = " q u a l i f i e d "   x m l n s : x s d = " h t t p : / / w w w . w 3 . o r g / 2 0 0 1 / X M L S c h e m a "   x m l n s : x s = " h t t p : / / w w w . w 3 . o r g / 2 0 0 1 / X M L S c h e m a "   x m l n s : d m s = " h t t p : / / s c h e m a s . m i c r o s o f t . c o m / o f f i c e / 2 0 0 6 / d o c u m e n t M a n a g e m e n t / t y p e s "   x m l n s : p c = " h t t p : / / s c h e m a s . m i c r o s o f t . c o m / o f f i c e / i n f o p a t h / 2 0 0 7 / P a r t n e r C o n t r o l s " > + 
+ < x s d : i m p o r t   n a m e s p a c e = " h t t p : / / s c h e m a s . m i c r o s o f t . c o m / o f f i c e / 2 0 0 6 / d o c u m e n t M a n a g e m e n t / t y p e s " / > + 
+ < x s d : i m p o r t   n a m e s p a c e = " h t t p : / / s c h e m a s . m i c r o s o f t . c o m / o f f i c e / i n f o p a t h / 2 0 0 7 / P a r t n e r C o n t r o l s " / > + 
+ < x s d : e l e m e n t   n a m e = " M e d i a S e r v i c e M e t a d a t a "   m a : i n d e x = " 8 "   n i l l a b l e = " t r u e "   m a : d i s p l a y N a m e = " M e d i a S e r v i c e M e t a d a t a "   m a : h i d d e n = " t r u e "   m a : i n t e r n a l N a m e = " M e d i a S e r v i c e M e t a d a t a "   m a : r e a d O n l y = " t r u e " > + 
+ < x s d : s i m p l e T y p e > + 
+ < x s d : r e s t r i c t i o n   b a s e = " d m s : N o t e " / > + 
+ < / x s d : s i m p l e T y p e > + 
+ < / x s d : e l e m e n t > + 
+ < x s d : e l e m e n t   n a m e = " M e d i a S e r v i c e F a s t M e t a d a t a "   m a : i n d e x = " 9 "   n i l l a b l e = " t r u e "   m a : d i s p l a y N a m e = " M e d i a S e r v i c e F a s t M e t a d a t a "   m a : h i d d e n = " t r u e "   m a : i n t e r n a l N a m e = " M e d i a S e r v i c e F a s t M e t a d a t a "   m a : r e a d O n l y = " t r u e " > + 
+ < x s d : s i m p l e T y p e > + 
+ < x s d : r e s t r i c t i o n   b a s e = " d m s : N o t e " / > + 
+ < / x s d : s i m p l e T y p e > + 
+ < / x s d : e l e m e n t > + 
+ < x s d : e l e m e n t   n a m e = " D o c u m e n t _ x 0 0 2 0 _ P u r p o s e "   m a : i n d e x = " 1 4 "   n i l l a b l e = " t r u e "   m a : d i s p l a y N a m e = " D o c u m e n t   P u r p o s e "   m a : d e f a u l t = " I n f o r m a t i o n a l "   m a : f o r m a t = " D r o p d o w n "   m a : i n t e r n a l N a m e = " D o c u m e n t _ x 0 0 2 0 _ P u r p o s e " > + 
+ < x s d : s i m p l e T y p e > + 
+ < x s d : r e s t r i c t i o n   b a s e = " d m s : C h o i c e " > + 
+ < x s d : e n u m e r a t i o n   v a l u e = " I n f o r m a t i o n a l " / > + 
+ < x s d : e n u m e r a t i o n   v a l u e = " F e a t u r e   S p e c " / > + 
+ < x s d : e n u m e r a t i o n   v a l u e = " E n g i n e e r i n g   D e s i g n " / > + 
+ < x s d : e n u m e r a t i o n   v a l u e = " P l a n n i n g " / > + 
+ < / x s d : r e s t r i c t i o n > + 
+ < / x s d : s i m p l e T y p e > + 
+ < / x s d : e l e m e n t > + 
+ < x s d : e l e m e n t   n a m e = " I n i t i a t i v e s "   m a : i n d e x = " 1 5 "   n i l l a b l e = " t r u e "   m a : d i s p l a y N a m e = " I n i t i a t i v e s "   m a : d e s c r i p t i o n = " L i s t   o f   i n i t i a t i v e s   r e l a t e d   t o   t h i s   d o c u m e n t "   m a : i n t e r n a l N a m e = " I n i t i a t i v e s " > + 
+ < x s d : c o m p l e x T y p e > + 
+ < x s d : c o m p l e x C o n t e n t > + 
+ < x s d : e x t e n s i o n   b a s e = " d m s : M u l t i C h o i c e " > + 
+ < x s d : s e q u e n c e > + 
+ < x s d : e l e m e n t   n a m e = " V a l u e "   m a x O c c u r s = " u n b o u n d e d "   m i n O c c u r s = " 0 "   n i l l a b l e = " t r u e " > + 
+ < x s d : s i m p l e T y p e > + 
+ < x s d : r e s t r i c t i o n   b a s e = " d m s : C h o i c e " > + 
+ < x s d : e n u m e r a t i o n   v a l u e = " A d d - i n   M A U " / > + 
+ < x s d : e n u m e r a t i o n   v a l u e = " C u s t o m   F u n c t i o n s " / > + 
+ < x s d : e n u m e r a t i o n   v a l u e = " D a t a   & a m p ;   A n a l y t i c s " / > + 
+ < x s d : e n u m e r a t i o n   v a l u e = " D e v E x :   P o r t a l s   & a m p ;   P r o g r a m s " / > + 
+ < x s d : e n u m e r a t i o n   v a l u e = " D e v E x :   T o o l s   & a m p ;   L i b r a r i e s " / > + 
+ < x s d : e n u m e r a t i o n   v a l u e = " E n g i n e e r i n g " / > + 
+ < x s d : e n u m e r a t i o n   v a l u e = " E x c e l   A P I " / > + 
+ < x s d : e n u m e r a t i o n   v a l u e = " I n - M a r k e t   S u p p o r t " / > + 
+ < x s d : e n u m e r a t i o n   v a l u e = " M a k e r   A c c e s s " / > + 
+ < x s d : e n u m e r a t i o n   v a l u e = " S D X   R u n t i m e   & a m p ;   P a r t n e r s " / > + 
+ < x s d : e n u m e r a t i o n   v a l u e = " S D X   S e r v i c e   D e l i v e r y " / > + 
+ < x s d : e n u m e r a t i o n   v a l u e = " S D X   A P I   & a m p ;   P i p e l i n e " / > + 
+ < x s d : e n u m e r a t i o n   v a l u e = " S h i e l d   & a m p ;   O C E " / > + 
+ < / x s d : r e s t r i c t i o n > + 
+ < / x s d : s i m p l e T y p e > + 
+ < / x s d : e l e m e n t > + 
+ < / x s d : s e q u e n c e > + 
+ < / x s d : e x t e n s i o n > + 
+ < / x s d : c o m p l e x C o n t e n t > + 
+ < / x s d : c o m p l e x T y p e > + 
+ < / x s d : e l e m e n t > + 
+ < x s d : e l e m e n t   n a m e = " M e d i a S e r v i c e D a t e T a k e n "   m a : i n d e x = " 1 6 "   n i l l a b l e = " t r u e "   m a : d i s p l a y N a m e = " M e d i a S e r v i c e D a t e T a k e n "   m a : h i d d e n = " t r u e "   m a : i n t e r n a l N a m e = " M e d i a S e r v i c e D a t e T a k e n "   m a : r e a d O n l y = " t r u e " > + 
+ < x s d : s i m p l e T y p e > + 
+ < x s d : r e s t r i c t i o n   b a s e = " d m s : T e x t " / > + 
+ < / x s d : s i m p l e T y p e > + 
+ < / x s d : e l e m e n t > + 
+ < x s d : e l e m e n t   n a m e = " M e d i a S e r v i c e A u t o T a g s "   m a : i n d e x = " 1 7 "   n i l l a b l e = " t r u e "   m a : d i s p l a y N a m e = " M e d i a S e r v i c e A u t o T a g s "   m a : i n t e r n a l N a m e = " M e d i a S e r v i c e A u t o T a g s "   m a : r e a d O n l y = " t r u e " > + 
+ < x s d : s i m p l e T y p e > + 
+ < x s d : r e s t r i c t i o n   b a s e = " d m s : T e x t " / > + 
+ < / x s d : s i m p l e T y p e > + 
+ < / x s d : e l e m e n t > + 
+ < x s d : e l e m e n t   n a m e = " M e d i a S e r v i c e O C R "   m a : i n d e x = " 1 8 "   n i l l a b l e = " t r u e "   m a : d i s p l a y N a m e = " M e d i a S e r v i c e O C R "   m a : i n t e r n a l N a m e = " M e d i a S e r v i c e O C R "   m a : r e a d O n l y = " t r u e " > + 
+ < x s d : s i m p l e T y p e > + 
+ < x s d : r e s t r i c t i o n   b a s e = " d m s : N o t e " > + 
+ < x s d : m a x L e n g t h   v a l u e = " 2 5 5 " / > + 
+ < / x s d : r e s t r i c t i o n > + 
+ < / x s d : s i m p l e T y p e > + 
+ < / x s d : e l e m e n t > + 
+ < x s d : e l e m e n t   n a m e = " M e d i a S e r v i c e L o c a t i o n "   m a : i n d e x = " 1 9 "   n i l l a b l e = " t r u e "   m a : d i s p l a y N a m e = " M e d i a S e r v i c e L o c a t i o n "   m a : i n t e r n a l N a m e = " M e d i a S e r v i c e L o c a t i o n "   m a : r e a d O n l y = " t r u e " > + 
+ < x s d : s i m p l e T y p e > + 
+ < x s d : r e s t r i c t i o n   b a s e = " d m s : T e x t " / > + 
+ < / x s d : s i m p l e T y p e > + 
+ < / x s d : e l e m e n t > + 
+ < x s d : e l e m e n t   n a m e = " M e d i a S e r v i c e E v e n t H a s h C o d e "   m a : i n d e x = " 2 0 "   n i l l a b l e = " t r u e "   m a : d i s p l a y N a m e = " M e d i a S e r v i c e E v e n t H a s h C o d e "   m a : h i d d e n = " t r u e "   m a : i n t e r n a l N a m e = " M e d i a S e r v i c e E v e n t H a s h C o d e "   m a : r e a d O n l y = " t r u e " > + 
+ < x s d : s i m p l e T y p e > + 
+ < x s d : r e s t r i c t i o n   b a s e = " d m s : T e x t " / > + 
+ < / x s d : s i m p l e T y p e > + 
+ < / x s d : e l e m e n t > + 
+ < x s d : e l e m e n t   n a m e = " M e d i a S e r v i c e G e n e r a t i o n T i m e "   m a : i n d e x = " 2 1 "   n i l l a b l e = " t r u e "   m a : d i s p l a y N a m e = " M e d i a S e r v i c e G e n e r a t i o n T i m e "   m a : h i d d e n = " t r u e "   m a : i n t e r n a l N a m e = " M e d i a S e r v i c e G e n e r a t i o n T i m e "   m a : r e a d O n l y = " t r u e " > + 
+ < x s d : s i m p l e T y p e > + 
+ < x s d : r e s t r i c t i o n   b a s e = " d m s : T e x t " / > + 
+ < / x s d : s i m p l e T y p e > + 
+ < / x s d : e l e m e n t > + 
+ < / x s d : s c h e m a > + 
+ < x s d : s c h e m a   t a r g e t N a m e s p a c e = " b 1 e 4 d 6 e e - 9 f 6 f - 4 3 f 8 - a 6 1 8 - 2 4 f 3 d 8 4 d a 2 8 f "   e l e m e n t F o r m D e f a u l t = " q u a l i f i e d "   x m l n s : x s d = " h t t p : / / w w w . w 3 . o r g / 2 0 0 1 / X M L S c h e m a "   x m l n s : x s = " h t t p : / / w w w . w 3 . o r g / 2 0 0 1 / X M L S c h e m a "   x m l n s : d m s = " h t t p : / / s c h e m a s . m i c r o s o f t . c o m / o f f i c e / 2 0 0 6 / d o c u m e n t M a n a g e m e n t / t y p e s "   x m l n s : p c = " h t t p : / / s c h e m a s . m i c r o s o f t . c o m / o f f i c e / i n f o p a t h / 2 0 0 7 / P a r t n e r C o n t r o l s " > + 
+ < x s d : i m p o r t   n a m e s p a c e = " h t t p : / / s c h e m a s . m i c r o s o f t . c o m / o f f i c e / 2 0 0 6 / d o c u m e n t M a n a g e m e n t / t y p e s " / > + 
+ < x s d : i m p o r t   n a m e s p a c e = " h t t p : / / s c h e m a s . m i c r o s o f t . c o m / o f f i c e / i n f o p a t h / 2 0 0 7 / P a r t n e r C o n t r o l s " / > + 
+ < x s d : e l e m e n t   n a m e = " S h a r e d W i t h U s e r s "   m a : i n d e x = " 1 0 "   n i l l a b l e = " t r u e "   m a : d i s p l a y N a m e = " S h a r e d   W i t h "   m a : i n t e r n a l N a m e = " S h a r e d W i t h U s e r s "   m a : r e a d O n l y = " t r u e " > + 
+ < x s d : c o m p l e x T y p e > + 
+ < x s d : c o m p l e x C o n t e n t > + 
+ < x s d : e x t e n s i o n   b a s e = " d m s : U s e r M u l t i " > + 
+ < x s d : s e q u e n c e > + 
+ < x s d : e l e m e n t   n a m e = " U s e r I n f o "   m i n O c c u r s = " 0 "   m a x O c c u r s = " u n b o u n d e d " > + 
+ < x s d : c o m p l e x T y p e > + 
+ < x s d : s e q u e n c e > + 
+ < x s d : e l e m e n t   n a m e = " D i s p l a y N a m e "   t y p e = " x s d : s t r i n g "   m i n O c c u r s = " 0 " / > + 
+ < x s d : e l e m e n t   n a m e = " A c c o u n t I d "   t y p e = " d m s : U s e r I d "   m i n O c c u r s = " 0 "   n i l l a b l e = " t r u e " / > + 
+ < x s d : e l e m e n t   n a m e = " A c c o u n t T y p e "   t y p e = " x s d : s t r i n g "   m i n O c c u r s = " 0 " / > + 
+ < / x s d : s e q u e n c e > + 
+ < / x s d : c o m p l e x T y p e > + 
+ < / x s d : e l e m e n t > + 
+ < / x s d : s e q u e n c e > + 
+ < / x s d : e x t e n s i o n > + 
+ < / x s d : c o m p l e x C o n t e n t > + 
+ < / x s d : c o m p l e x T y p e > + 
+ < / x s d : e l e m e n t > + 
+ < x s d : e l e m e n t   n a m e = " S h a r e d W i t h D e t a i l s "   m a : i n d e x = " 1 1 "   n i l l a b l e = " t r u e "   m a : d i s p l a y N a m e = " S h a r e d   W i t h   D e t a i l s "   m a : i n t e r n a l N a m e = " S h a r e d W i t h D e t a i l s "   m a : r e a d O n l y = " t r u e " > + 
+ < x s d : s i m p l e T y p e > + 
+ < x s d : r e s t r i c t i o n   b a s e = " d m s : N o t e " > + 
+ < x s d : m a x L e n g t h   v a l u e = " 2 5 5 " / > + 
+ < / x s d : r e s t r i c t i o n > + 
+ < / x s d : s i m p l e T y p e > + 
+ < / x s d : e l e m e n t > + 
+ < x s d : e l e m e n t   n a m e = " L a s t S h a r e d B y U s e r "   m a : i n d e x = " 1 2 "   n i l l a b l e = " t r u e "   m a : d i s p l a y N a m e = " L a s t   S h a r e d   B y   U s e r "   m a : h i d d e n = " t r u e "   m a : i n t e r n a l N a m e = " L a s t S h a r e d B y U s e r "   m a : r e a d O n l y = " t r u e " > + 
+ < x s d : s i m p l e T y p e > + 
+ < x s d : r e s t r i c t i o n   b a s e = " d m s : N o t e " / > + 
+ < / x s d : s i m p l e T y p e > + 
+ < / x s d : e l e m e n t > + 
+ < x s d : e l e m e n t   n a m e = " L a s t S h a r e d B y T i m e "   m a : i n d e x = " 1 3 "   n i l l a b l e = " t r u e "   m a : d i s p l a y N a m e = " L a s t   S h a r e d   B y   T i m e "   m a : h i d d e n = " t r u e "   m a : i n t e r n a l N a m e = " L a s t S h a r e d B y T i m e "   m a : r e a d O n l y = " t r u e " > + 
+ < x s d : s i m p l e T y p e > + 
+ < x s d : r e s t r i c t i o n   b a s e = " d m s : D a t e T i m e " / > + 
+ < / x s d : s i m p l e T y p e > + 
+ < / x s d : e l e m e n t > + 
+ < / x s d : s c h e m a > + 
+ < x s d : s c h e m a   t a r g e t N a m e s p a c e = " h t t p : / / s c h e m a s . o p e n x m l f o r m a t s . o r g / p a c k a g e / 2 0 0 6 / m e t a d a t a / c o r e - p r o p e r t i e s "   e l e m e n t F o r m D e f a u l t = " q u a l i f i e d "   a t t r i b u t e F o r m D e f a u l t = " u n q u a l i f i e d "   b l o c k D e f a u l t = " # a l l "   x m l n s = " h t t p : / / s c h e m a s . o p e n x m l f o r m a t s . o r g / p a c k a g e / 2 0 0 6 / m e t a d a t a / c o r e - p r o p e r t i e s "   x m l n s : x s d = " h t t p : / / w w w . w 3 . o r g / 2 0 0 1 / X M L S c h e m a "   x m l n s : x s i = " h t t p : / / w w w . w 3 . o r g / 2 0 0 1 / X M L S c h e m a - i n s t a n c e "   x m l n s : d c = " h t t p : / / p u r l . o r g / d c / e l e m e n t s / 1 . 1 / "   x m l n s : d c t e r m s = " h t t p : / / p u r l . o r g / d c / t e r m s / "   x m l n s : o d o c = " h t t p : / / s c h e m a s . m i c r o s o f t . c o m / i n t e r n a l / o b d " > + 
+ < x s d : i m p o r t   n a m e s p a c e = " h t t p : / / p u r l . o r g / d c / e l e m e n t s / 1 . 1 / "   s c h e m a L o c a t i o n = " h t t p : / / d u b l i n c o r e . o r g / s c h e m a s / x m l s / q d c / 2 0 0 3 / 0 4 / 0 2 / d c . x s d " / > + 
+ < x s d : i m p o r t   n a m e s p a c e = " h t t p : / / p u r l . o r g / d c / t e r m s / "   s c h e m a L o c a t i o n = " h t t p : / / d u b l i n c o r e . o r g / s c h e m a s / x m l s / q d c / 2 0 0 3 / 0 4 / 0 2 / d c t e r m s . x s d " / > + 
+ < x s d : e l e m e n t   n a m e = " c o r e P r o p e r t i e s "   t y p e = " C T _ c o r e P r o p e r t i e s " / > + 
+ < x s d : c o m p l e x T y p e   n a m e = " C T _ c o r e P r o p e r t i e s " > + 
+ < x s d : a l l > + 
+ < x s d : e l e m e n t   r e f = " d c : c r e a t o r "   m i n O c c u r s = " 0 "   m a x O c c u r s = " 1 " / > + 
+ < x s d : e l e m e n t   r e f = " d c t e r m s : c r e a t e d "   m i n O c c u r s = " 0 "   m a x O c c u r s = " 1 " / > + 
+ < x s d : e l e m e n t   r e f = " d c : i d e n t i f i e r "   m i n O c c u r s = " 0 "   m a x O c c u r s = " 1 " / > + 
+ < x s d : e l e m e n t   n a m e = " c o n t e n t T y p e "   m i n O c c u r s = " 0 "   m a x O c c u r s = " 1 "   t y p e = " x s d : s t r i n g "   m a : i n d e x = " 0 "   m a : d i s p l a y N a m e = " C o n t e n t   T y p e " / > + 
+ < x s d : e l e m e n t   r e f = " d c : t i t l e "   m i n O c c u r s = " 0 "   m a x O c c u r s = " 1 "   m a : i n d e x = " 4 "   m a : d i s p l a y N a m e = " T i t l e " / > + 
+ < x s d : e l e m e n t   r e f = " d c : s u b j e c t "   m i n O c c u r s = " 0 "   m a x O c c u r s = " 1 " / > + 
+ < x s d : e l e m e n t   r e f = " d c : d e s c r i p t i o n "   m i n O c c u r s = " 0 "   m a x O c c u r s = " 1 " / > + 
+ < x s d : e l e m e n t   n a m e = " k e y w o r d s "   m i n O c c u r s = " 0 "   m a x O c c u r s = " 1 "   t y p e = " x s d : s t r i n g " / > + 
+ < x s d : e l e m e n t   r e f = " d c : l a n g u a g e "   m i n O c c u r s = " 0 "   m a x O c c u r s = " 1 " / > + 
+ < x s d : e l e m e n t   n a m e = " c a t e g o r y "   m i n O c c u r s = " 0 "   m a x O c c u r s = " 1 "   t y p e = " x s d : s t r i n g " / > + 
+ < x s d : e l e m e n t   n a m e = " v e r s i o n "   m i n O c c u r s = " 0 "   m a x O c c u r s = " 1 "   t y p e = " x s d : s t r i n g " / > + 
+ < x s d : e l e m e n t   n a m e = " r e v i s i o n "   m i n O c c u r s = " 0 "   m a x O c c u r s = " 1 "   t y p e = " x s d : s t r i n g " > + 
+ < x s d : a n n o t a t i o n > + 
+ < x s d : d o c u m e n t a t i o n > + 
+                                                 T h i s   v a l u e   i n d i c a t e s   t h e   n u m b e r   o f   s a v e s   o r   r e v i s i o n s .   T h e   a p p l i c a t i o n   i s   r e s p o n s i b l e   f o r   u p d a t i n g   t h i s   v a l u e   a f t e r   e a c h   r e v i s i o n . + 
+                                         < / x s d : d o c u m e n t a t i o n > + 
+ < / x s d : a n n o t a t i o n > + 
+ < / x s d : e l e m e n t > + 
+ < x s d : e l e m e n t   n a m e = " l a s t M o d i f i e d B y "   m i n O c c u r s = " 0 "   m a x O c c u r s = " 1 "   t y p e = " x s d : s t r i n g " / > + 
+ < x s d : e l e m e n t   r e f = " d c t e r m s : m o d i f i e d "   m i n O c c u r s = " 0 "   m a x O c c u r s = " 1 " / > + 
+ < x s d : e l e m e n t   n a m e = " c o n t e n t S t a t u s "   m i n O c c u r s = " 0 "   m a x O c c u r s = " 1 "   t y p e = " x s d : s t r i n g " / > + 
+ < / x s d : a l l > + 
+ < / x s d : c o m p l e x T y p e > + 
+ < / x s d : s c h e m a > + 
+ < x s : s c h e m a   t a r g e t N a m e s p a c e = " h t t p : / / s c h e m a s . m i c r o s o f t . c o m / o f f i c e / i n f o p a t h / 2 0 0 7 / P a r t n e r C o n t r o l s "   e l e m e n t F o r m D e f a u l t = " q u a l i f i e d "   a t t r i b u t e F o r m D e f a u l t = " u n q u a l i f i e d "   x m l n s : p c = " h t t p : / / s c h e m a s . m i c r o s o f t . c o m / o f f i c e / i n f o p a t h / 2 0 0 7 / P a r t n e r C o n t r o l s "   x m l n s : x s = " h t t p : / / w w w . w 3 . o r g / 2 0 0 1 / X M L S c h e m a " > + 
+ < x s : e l e m e n t   n a m e = " P e r s o n " > + 
+ < x s : c o m p l e x T y p e > + 
+ < x s : s e q u e n c e > + 
+ < x s : e l e m e n t   r e f = " p c : D i s p l a y N a m e "   m i n O c c u r s = " 0 " > < / x s : e l e m e n t > + 
+ < x s : e l e m e n t   r e f = " p c : A c c o u n t I d "   m i n O c c u r s = " 0 " > < / x s : e l e m e n t > + 
+ < x s : e l e m e n t   r e f = " p c : A c c o u n t T y p e "   m i n O c c u r s = " 0 " > < / x s : e l e m e n t > + 
+ < / x s : s e q u e n c e > + 
+ < / x s : c o m p l e x T y p e > + 
+ < / x s : e l e m e n t > + 
+ < x s : e l e m e n t   n a m e = " D i s p l a y N a m e "   t y p e = " x s : s t r i n g " > < / x s : e l e m e n t > + 
+ < x s : e l e m e n t   n a m e = " A c c o u n t I d "   t y p e = " x s : s t r i n g " > < / x s : e l e m e n t > + 
+ < x s : e l e m e n t   n a m e = " A c c o u n t T y p e "   t y p e = " x s : s t r i n g " > < / x s : e l e m e n t > + 
+ < x s : e l e m e n t   n a m e = " B D C A s s o c i a t e d E n t i t y " > + 
+ < x s : c o m p l e x T y p e > + 
+ < x s : s e q u e n c e > + 
+ < x s : e l e m e n t   r e f = " p c : B D C E n t i t y "   m i n O c c u r s = " 0 "   m a x O c c u r s = " u n b o u n d e d " > < / x s : e l e m e n t > + 
+ < / x s : s e q u e n c e > + 
+ < x s : a t t r i b u t e   r e f = " p c : E n t i t y N a m e s p a c e " > < / x s : a t t r i b u t e > + 
+ < x s : a t t r i b u t e   r e f = " p c : E n t i t y N a m e " > < / x s : a t t r i b u t e > + 
+ < x s : a t t r i b u t e   r e f = " p c : S y s t e m I n s t a n c e N a m e " > < / x s : a t t r i b u t e > + 
+ < x s : a t t r i b u t e   r e f = " p c : A s s o c i a t i o n N a m e " > < / x s : a t t r i b u t e > + 
+ < / x s : c o m p l e x T y p e > + 
+ < / x s : e l e m e n t > + 
+ < x s : a t t r i b u t e   n a m e = " E n t i t y N a m e s p a c e "   t y p e = " x s : s t r i n g " > < / x s : a t t r i b u t e > + 
+ < x s : a t t r i b u t e   n a m e = " E n t i t y N a m e "   t y p e = " x s : s t r i n g " > < / x s : a t t r i b u t e > + 
+ < x s : a t t r i b u t e   n a m e = " S y s t e m I n s t a n c e N a m e "   t y p e = " x s : s t r i n g " > < / x s : a t t r i b u t e > + 
+ < x s : a t t r i b u t e   n a m e = " A s s o c i a t i o n N a m e "   t y p e = " x s : s t r i n g " > < / x s : a t t r i b u t e > + 
+ < x s : e l e m e n t   n a m e = " B D C E n t i t y " > + 
+ < x s : c o m p l e x T y p e > + 
+ < x s : s e q u e n c e > + 
+ < x s : e l e m e n t   r e f = " p c : E n t i t y D i s p l a y N a m e "   m i n O c c u r s = " 0 " > < / x s : e l e m e n t > + 
+ < x s : e l e m e n t   r e f = " p c : E n t i t y I n s t a n c e R e f e r e n c e "   m i n O c c u r s = " 0 " > < / x s : e l e m e n t > + 
+ < x s : e l e m e n t   r e f = " p c : E n t i t y I d 1 "   m i n O c c u r s = " 0 " > < / x s : e l e m e n t > + 
+ < x s : e l e m e n t   r e f = " p c : E n t i t y I d 2 "   m i n O c c u r s = " 0 " > < / x s : e l e m e n t > + 
+ < x s : e l e m e n t   r e f = " p c : E n t i t y I d 3 "   m i n O c c u r s = " 0 " > < / x s : e l e m e n t > + 
+ < x s : e l e m e n t   r e f = " p c : E n t i t y I d 4 "   m i n O c c u r s = " 0 " > < / x s : e l e m e n t > + 
+ < x s : e l e m e n t   r e f = " p c : E n t i t y I d 5 "   m i n O c c u r s = " 0 " > < / x s : e l e m e n t > + 
+ < / x s : s e q u e n c e > + 
+ < / x s : c o m p l e x T y p e > + 
+ < / x s : e l e m e n t > + 
+ < x s : e l e m e n t   n a m e = " E n t i t y D i s p l a y N a m e "   t y p e = " x s : s t r i n g " > < / x s : e l e m e n t > + 
+ < x s : e l e m e n t   n a m e = " E n t i t y I n s t a n c e R e f e r e n c e "   t y p e = " x s : s t r i n g " > < / x s : e l e m e n t > + 
+ < x s : e l e m e n t   n a m e = " E n t i t y I d 1 "   t y p e = " x s : s t r i n g " > < / x s : e l e m e n t > + 
+ < x s : e l e m e n t   n a m e = " E n t i t y I d 2 "   t y p e = " x s : s t r i n g " > < / x s : e l e m e n t > + 
+ < x s : e l e m e n t   n a m e = " E n t i t y I d 3 "   t y p e = " x s : s t r i n g " > < / x s : e l e m e n t > + 
+ < x s : e l e m e n t   n a m e = " E n t i t y I d 4 "   t y p e = " x s : s t r i n g " > < / x s : e l e m e n t > + 
+ < x s : e l e m e n t   n a m e = " E n t i t y I d 5 "   t y p e = " x s : s t r i n g " > < / x s : e l e m e n t > + 
+ < x s : e l e m e n t   n a m e = " T e r m s " > + 
+ < x s : c o m p l e x T y p e > + 
+ < x s : s e q u e n c e > + 
+ < x s : e l e m e n t   r e f = " p c : T e r m I n f o "   m i n O c c u r s = " 0 "   m a x O c c u r s = " u n b o u n d e d " > < / x s : e l e m e n t > + 
+ < / x s : s e q u e n c e > + 
+ < / x s : c o m p l e x T y p e > + 
+ < / x s : e l e m e n t > + 
+ < x s : e l e m e n t   n a m e = " T e r m I n f o " > + 
+ < x s : c o m p l e x T y p e > + 
+ < x s : s e q u e n c e > + 
+ < x s : e l e m e n t   r e f = " p c : T e r m N a m e "   m i n O c c u r s = " 0 " > < / x s : e l e m e n t > + 
+ < x s : e l e m e n t   r e f = " p c : T e r m I d "   m i n O c c u r s = " 0 " > < / x s : e l e m e n t > + 
+ < / x s : s e q u e n c e > + 
+ < / x s : c o m p l e x T y p e > + 
+ < / x s : e l e m e n t > + 
+ < x s : e l e m e n t   n a m e = " T e r m N a m e "   t y p e = " x s : s t r i n g " > < / x s : e l e m e n t > + 
+ < x s : e l e m e n t   n a m e = " T e r m I d "   t y p e = " x s : s t r i n g " > < / x s : e l e m e n t > + 
+ < / x s : s c h e m a > + 
+ < / c t : c o n t e n t T y p e S c h e m a > 
 </file>
 
-<file path=customXml/item2.xml><?xml version="1.0" encoding="utf-8"?>
-<?mso-contentType ?>
-<FormTemplates xmlns="http://schemas.microsoft.com/sharepoint/v3/contenttype/forms">
-  <Display>DocumentLibraryForm</Display>
-  <Edit>DocumentLibraryForm</Edit>
-  <New>DocumentLibraryForm</New>
-</FormTemplates>
+<file path=customXml/item2.xml>��< ? m s o - c o n t e n t T y p e ? > < F o r m T e m p l a t e s   x m l n s = " h t t p : / / s c h e m a s . m i c r o s o f t . c o m / s h a r e p o i n t / v 3 / c o n t e n t t y p e / f o r m s " > < D i s p l a y > D o c u m e n t L i b r a r y F o r m < / D i s p l a y > < E d i t > D o c u m e n t L i b r a r y F o r m < / E d i t > < N e w > D o c u m e n t L i b r a r y F o r m < / N e w > < / F o r m T e m p l a t e s > 
 </file>
 
-<file path=customXml/item3.xml><?xml version="1.0" encoding="utf-8"?>
-<p:properties xmlns:p="http://schemas.microsoft.com/office/2006/metadata/properties" xmlns:xsi="http://www.w3.org/2001/XMLSchema-instance" xmlns:pc="http://schemas.microsoft.com/office/infopath/2007/PartnerControls">
-  <documentManagement>
-    <Document_x0020_Purpose xmlns="f577acbf-5b0b-4b4f-9948-268e97f8d3a4">Informational</Document_x0020_Purpose>
-    <Initiatives xmlns="f577acbf-5b0b-4b4f-9948-268e97f8d3a4"/>
-  </documentManagement>
-</p:properties>
+<file path=customXml/item3.xml>��< ? x m l   v e r s i o n = " 1 . 0 " ? > < p : p r o p e r t i e s   x m l n s : p = " h t t p : / / s c h e m a s . m i c r o s o f t . c o m / o f f i c e / 2 0 0 6 / m e t a d a t a / p r o p e r t i e s "   x m l n s : x s i = " h t t p : / / w w w . w 3 . o r g / 2 0 0 1 / X M L S c h e m a - i n s t a n c e "   x m l n s : p c = " h t t p : / / s c h e m a s . m i c r o s o f t . c o m / o f f i c e / i n f o p a t h / 2 0 0 7 / P a r t n e r C o n t r o l s " > < d o c u m e n t M a n a g e m e n t > < D o c u m e n t _ x 0 0 2 0 _ P u r p o s e   x m l n s = " f 5 7 7 a c b f - 5 b 0 b - 4 b 4 f - 9 9 4 8 - 2 6 8 e 9 7 f 8 d 3 a 4 " > I n f o r m a t i o n a l < / D o c u m e n t _ x 0 0 2 0 _ P u r p o s e > < I n i t i a t i v e s   x m l n s = " f 5 7 7 a c b f - 5 b 0 b - 4 b 4 f - 9 9 4 8 - 2 6 8 e 9 7 f 8 d 3 a 4 " / > < / d o c u m e n t M a n a g e m e n t > < / p : p r o p e r t i e s > 
 </file>
 
 <file path=customXml/itemProps1.xml><?xml version="1.0" encoding="utf-8"?>
 <ds:datastoreItem xmlns:ds="http://schemas.openxmlformats.org/officeDocument/2006/customXml" ds:itemID="{1DD29C39-1C4E-4B06-A1F4-2510F2DACF6E}">
-  <ds:schemaRefs>
-    <ds:schemaRef ds:uri="http://schemas.microsoft.com/office/2006/metadata/contentType"/>
-    <ds:schemaRef ds:uri="http://schemas.microsoft.com/office/2006/metadata/properties/metaAttributes"/>
-    <ds:schemaRef ds:uri="http://www.w3.org/2001/XMLSchema"/>
-    <ds:schemaRef ds:uri="http://schemas.microsoft.com/office/2006/metadata/properties"/>
-    <ds:schemaRef ds:uri="f577acbf-5b0b-4b4f-9948-268e97f8d3a4"/>
-    <ds:schemaRef ds:uri="b1e4d6ee-9f6f-43f8-a618-24f3d84da28f"/>
-    <ds:schemaRef ds:uri="http://schemas.microsoft.com/office/2006/documentManagement/types"/>
-    <ds:schemaRef ds:uri="http://schemas.microsoft.com/office/infopath/2007/PartnerControls"/>
-    <ds:schemaRef ds:uri="http://schemas.openxmlformats.org/package/2006/metadata/core-properties"/>
-    <ds:schemaRef ds:uri="http://purl.org/dc/elements/1.1/"/>
-    <ds:schemaRef ds:uri="http://purl.org/dc/terms/"/>
-    <ds:schemaRef ds:uri="http://schemas.microsoft.com/internal/obd"/>
-  </ds:schemaRefs>
+  <ds:schemaRefs/>
 </ds:datastoreItem>
 </file>
 
 <file path=customXml/itemProps2.xml><?xml version="1.0" encoding="utf-8"?>
 <ds:datastoreItem xmlns:ds="http://schemas.openxmlformats.org/officeDocument/2006/customXml" ds:itemID="{E21AFCC0-734A-4A90-A597-A1CB34860DCD}">
-  <ds:schemaRefs>
-    <ds:schemaRef ds:uri="http://schemas.microsoft.com/sharepoint/v3/contenttype/forms"/>
-  </ds:schemaRefs>
+  <ds:schemaRefs/>
 </ds:datastoreItem>
 </file>
 
 <file path=customXml/itemProps3.xml><?xml version="1.0" encoding="utf-8"?>
 <ds:datastoreItem xmlns:ds="http://schemas.openxmlformats.org/officeDocument/2006/customXml" ds:itemID="{617AB1FA-2F28-4684-9230-02ACEB6C0B0A}">
-  <ds:schemaRefs>
-    <ds:schemaRef ds:uri="http://purl.org/dc/elements/1.1/"/>
-    <ds:schemaRef ds:uri="http://schemas.microsoft.com/office/2006/metadata/properties"/>
-    <ds:schemaRef ds:uri="b1e4d6ee-9f6f-43f8-a618-24f3d84da28f"/>
-    <ds:schemaRef ds:uri="http://schemas.microsoft.com/office/2006/documentManagement/types"/>
-    <ds:schemaRef ds:uri="http://purl.org/dc/terms/"/>
-    <ds:schemaRef ds:uri="http://schemas.openxmlformats.org/package/2006/metadata/core-properties"/>
-    <ds:schemaRef ds:uri="f577acbf-5b0b-4b4f-9948-268e97f8d3a4"/>
-    <ds:schemaRef ds:uri="http://purl.org/dc/dcmitype/"/>
-    <ds:schemaRef ds:uri="http://schemas.microsoft.com/office/infopath/2007/PartnerControls"/>
-    <ds:schemaRef ds:uri="http://www.w3.org/XML/1998/namespace"/>
-  </ds:schemaRefs>
+  <ds:schemaRefs/>
 </ds:datastoreItem>
 </file>
</xml_diff>

<commit_message>
Update Presentation Week 3 Group D.pptx
</commit_message>
<xml_diff>
--- a/Power Point Presentations/Presentation Week 3 Group D.pptx
+++ b/Power Point Presentations/Presentation Week 3 Group D.pptx
@@ -2,25 +2,25 @@
 <file path=ppt/presentation.xml><?xml version="1.0" encoding="utf-8"?>
 <p:presentation xmlns:a="http://schemas.openxmlformats.org/drawingml/2006/main" xmlns:r="http://schemas.openxmlformats.org/officeDocument/2006/relationships" xmlns:p="http://schemas.openxmlformats.org/presentationml/2006/main" autoCompressPictures="0">
   <p:sldMasterIdLst>
-    <p:sldMasterId id="2147483648" r:id="rId4"/>
+    <p:sldMasterId id="2147483648" r:id="rId1"/>
   </p:sldMasterIdLst>
   <p:sldIdLst>
-    <p:sldId id="256" r:id="rId5"/>
-    <p:sldId id="268" r:id="rId6"/>
-    <p:sldId id="261" r:id="rId7"/>
-    <p:sldId id="257" r:id="rId8"/>
-    <p:sldId id="265" r:id="rId9"/>
-    <p:sldId id="266" r:id="rId10"/>
-    <p:sldId id="267" r:id="rId11"/>
-    <p:sldId id="258" r:id="rId12"/>
-    <p:sldId id="259" r:id="rId13"/>
-    <p:sldId id="260" r:id="rId14"/>
-    <p:sldId id="262" r:id="rId15"/>
-    <p:sldId id="264" r:id="rId16"/>
-    <p:sldId id="263" r:id="rId17"/>
-    <p:sldId id="269" r:id="rId18"/>
-    <p:sldId id="270" r:id="rId19"/>
-    <p:sldId id="271" r:id="rId20"/>
+    <p:sldId id="256" r:id="rId3"/>
+    <p:sldId id="268" r:id="rId4"/>
+    <p:sldId id="261" r:id="rId5"/>
+    <p:sldId id="257" r:id="rId6"/>
+    <p:sldId id="265" r:id="rId7"/>
+    <p:sldId id="266" r:id="rId8"/>
+    <p:sldId id="267" r:id="rId9"/>
+    <p:sldId id="258" r:id="rId10"/>
+    <p:sldId id="259" r:id="rId11"/>
+    <p:sldId id="260" r:id="rId12"/>
+    <p:sldId id="262" r:id="rId13"/>
+    <p:sldId id="264" r:id="rId14"/>
+    <p:sldId id="263" r:id="rId15"/>
+    <p:sldId id="269" r:id="rId16"/>
+    <p:sldId id="270" r:id="rId17"/>
+    <p:sldId id="271" r:id="rId18"/>
   </p:sldIdLst>
   <p:sldSz cx="12192000" cy="6858000"/>
   <p:notesSz cx="6858000" cy="9144000"/>
@@ -119,16 +119,11 @@
       </a:defRPr>
     </a:lvl9pPr>
   </p:defaultTextStyle>
-  <p:extLst>
-    <p:ext uri="{EFAFB233-063F-42B5-8137-9DF3F51BA10A}">
-      <p15:sldGuideLst xmlns:p15="http://schemas.microsoft.com/office/powerpoint/2012/main"/>
-    </p:ext>
-  </p:extLst>
 </p:presentation>
 </file>
 
 <file path=ppt/slideLayouts/slideLayout1.xml><?xml version="1.0" encoding="utf-8"?>
-<p:sldLayout xmlns:a="http://schemas.openxmlformats.org/drawingml/2006/main" xmlns:r="http://schemas.openxmlformats.org/officeDocument/2006/relationships" xmlns:p="http://schemas.openxmlformats.org/presentationml/2006/main" showMasterSp="0" type="title" preserve="1">
+<p:sldLayout xmlns:a="http://schemas.openxmlformats.org/drawingml/2006/main" xmlns:r="http://schemas.openxmlformats.org/officeDocument/2006/relationships" xmlns:p="http://schemas.openxmlformats.org/presentationml/2006/main" type="title" preserve="1" showMasterSp="0">
   <p:cSld name="Title Slide">
     <p:spTree>
       <p:nvGrpSpPr>
@@ -849,7 +844,6 @@
           <a:p>
             <a:fld id="{37A2730A-859E-B540-ADF3-E97069AD1FDB}" type="datetimeFigureOut">
               <a:rPr lang="en-US" smtClean="0"/>
-              <a:t>2/2/2024</a:t>
             </a:fld>
             <a:endParaRPr lang="en-US"/>
           </a:p>
@@ -891,7 +885,6 @@
           <a:p>
             <a:fld id="{8E05DC9C-C50D-D242-B083-59CEE07163F1}" type="slidenum">
               <a:rPr lang="en-US" smtClean="0"/>
-              <a:t>‹#›</a:t>
             </a:fld>
             <a:endParaRPr lang="en-US"/>
           </a:p>
@@ -1075,6 +1068,7 @@
               <a:rPr lang="en-US"/>
               <a:t>Click to edit Master text styles</a:t>
             </a:r>
+            <a:endParaRPr lang="en-US"/>
           </a:p>
         </p:txBody>
       </p:sp>
@@ -1095,7 +1089,6 @@
           <a:p>
             <a:fld id="{37A2730A-859E-B540-ADF3-E97069AD1FDB}" type="datetimeFigureOut">
               <a:rPr lang="en-US" smtClean="0"/>
-              <a:t>2/2/2024</a:t>
             </a:fld>
             <a:endParaRPr lang="en-US"/>
           </a:p>
@@ -1137,7 +1130,6 @@
           <a:p>
             <a:fld id="{8E05DC9C-C50D-D242-B083-59CEE07163F1}" type="slidenum">
               <a:rPr lang="en-US" smtClean="0"/>
-              <a:t>‹#›</a:t>
             </a:fld>
             <a:endParaRPr lang="en-US"/>
           </a:p>
@@ -1262,6 +1254,7 @@
               <a:rPr lang="en-US"/>
               <a:t>Click to edit Master text styles</a:t>
             </a:r>
+            <a:endParaRPr lang="en-US"/>
           </a:p>
         </p:txBody>
       </p:sp>
@@ -1384,6 +1377,7 @@
               <a:rPr lang="en-US"/>
               <a:t>Click to edit Master text styles</a:t>
             </a:r>
+            <a:endParaRPr lang="en-US"/>
           </a:p>
         </p:txBody>
       </p:sp>
@@ -1404,7 +1398,6 @@
           <a:p>
             <a:fld id="{37A2730A-859E-B540-ADF3-E97069AD1FDB}" type="datetimeFigureOut">
               <a:rPr lang="en-US" smtClean="0"/>
-              <a:t>2/2/2024</a:t>
             </a:fld>
             <a:endParaRPr lang="en-US"/>
           </a:p>
@@ -1446,7 +1439,6 @@
           <a:p>
             <a:fld id="{8E05DC9C-C50D-D242-B083-59CEE07163F1}" type="slidenum">
               <a:rPr lang="en-US" smtClean="0"/>
-              <a:t>‹#›</a:t>
             </a:fld>
             <a:endParaRPr lang="en-US"/>
           </a:p>
@@ -1490,6 +1482,19 @@
               </a:rPr>
               <a:t>“</a:t>
             </a:r>
+            <a:endParaRPr lang="en-US" sz="8000" baseline="0" dirty="0">
+              <a:ln w="3175" cmpd="sng">
+                <a:noFill/>
+              </a:ln>
+              <a:solidFill>
+                <a:schemeClr val="accent1">
+                  <a:lumMod val="60000"/>
+                  <a:lumOff val="40000"/>
+                </a:schemeClr>
+              </a:solidFill>
+              <a:effectLst/>
+              <a:latin typeface="Arial" panose="020B0604020202020204"/>
+            </a:endParaRPr>
           </a:p>
         </p:txBody>
       </p:sp>
@@ -1720,6 +1725,7 @@
               <a:rPr lang="en-US"/>
               <a:t>Click to edit Master text styles</a:t>
             </a:r>
+            <a:endParaRPr lang="en-US"/>
           </a:p>
         </p:txBody>
       </p:sp>
@@ -1740,7 +1746,6 @@
           <a:p>
             <a:fld id="{37A2730A-859E-B540-ADF3-E97069AD1FDB}" type="datetimeFigureOut">
               <a:rPr lang="en-US" smtClean="0"/>
-              <a:t>2/2/2024</a:t>
             </a:fld>
             <a:endParaRPr lang="en-US"/>
           </a:p>
@@ -1782,7 +1787,6 @@
           <a:p>
             <a:fld id="{8E05DC9C-C50D-D242-B083-59CEE07163F1}" type="slidenum">
               <a:rPr lang="en-US" smtClean="0"/>
-              <a:t>‹#›</a:t>
             </a:fld>
             <a:endParaRPr lang="en-US"/>
           </a:p>
@@ -1907,6 +1911,7 @@
               <a:rPr lang="en-US"/>
               <a:t>Click to edit Master text styles</a:t>
             </a:r>
+            <a:endParaRPr lang="en-US"/>
           </a:p>
         </p:txBody>
       </p:sp>
@@ -2029,6 +2034,7 @@
               <a:rPr lang="en-US"/>
               <a:t>Click to edit Master text styles</a:t>
             </a:r>
+            <a:endParaRPr lang="en-US"/>
           </a:p>
         </p:txBody>
       </p:sp>
@@ -2049,7 +2055,6 @@
           <a:p>
             <a:fld id="{37A2730A-859E-B540-ADF3-E97069AD1FDB}" type="datetimeFigureOut">
               <a:rPr lang="en-US" smtClean="0"/>
-              <a:t>2/2/2024</a:t>
             </a:fld>
             <a:endParaRPr lang="en-US"/>
           </a:p>
@@ -2091,7 +2096,6 @@
           <a:p>
             <a:fld id="{8E05DC9C-C50D-D242-B083-59CEE07163F1}" type="slidenum">
               <a:rPr lang="en-US" smtClean="0"/>
-              <a:t>‹#›</a:t>
             </a:fld>
             <a:endParaRPr lang="en-US"/>
           </a:p>
@@ -2135,6 +2139,19 @@
               </a:rPr>
               <a:t>“</a:t>
             </a:r>
+            <a:endParaRPr lang="en-US" sz="8000" baseline="0" dirty="0">
+              <a:ln w="3175" cmpd="sng">
+                <a:noFill/>
+              </a:ln>
+              <a:solidFill>
+                <a:schemeClr val="accent1">
+                  <a:lumMod val="60000"/>
+                  <a:lumOff val="40000"/>
+                </a:schemeClr>
+              </a:solidFill>
+              <a:effectLst/>
+              <a:latin typeface="Arial" panose="020B0604020202020204"/>
+            </a:endParaRPr>
           </a:p>
         </p:txBody>
       </p:sp>
@@ -2176,6 +2193,19 @@
               </a:rPr>
               <a:t>”</a:t>
             </a:r>
+            <a:endParaRPr lang="en-US" sz="8000" baseline="0" dirty="0">
+              <a:ln w="3175" cmpd="sng">
+                <a:noFill/>
+              </a:ln>
+              <a:solidFill>
+                <a:schemeClr val="accent1">
+                  <a:lumMod val="60000"/>
+                  <a:lumOff val="40000"/>
+                </a:schemeClr>
+              </a:solidFill>
+              <a:effectLst/>
+              <a:latin typeface="Arial" panose="020B0604020202020204"/>
+            </a:endParaRPr>
           </a:p>
         </p:txBody>
       </p:sp>
@@ -2295,6 +2325,7 @@
               <a:rPr lang="en-US"/>
               <a:t>Click to edit Master text styles</a:t>
             </a:r>
+            <a:endParaRPr lang="en-US"/>
           </a:p>
         </p:txBody>
       </p:sp>
@@ -2417,6 +2448,7 @@
               <a:rPr lang="en-US"/>
               <a:t>Click to edit Master text styles</a:t>
             </a:r>
+            <a:endParaRPr lang="en-US"/>
           </a:p>
         </p:txBody>
       </p:sp>
@@ -2437,7 +2469,6 @@
           <a:p>
             <a:fld id="{37A2730A-859E-B540-ADF3-E97069AD1FDB}" type="datetimeFigureOut">
               <a:rPr lang="en-US" smtClean="0"/>
-              <a:t>2/2/2024</a:t>
             </a:fld>
             <a:endParaRPr lang="en-US"/>
           </a:p>
@@ -2479,7 +2510,6 @@
           <a:p>
             <a:fld id="{8E05DC9C-C50D-D242-B083-59CEE07163F1}" type="slidenum">
               <a:rPr lang="en-US" smtClean="0"/>
-              <a:t>‹#›</a:t>
             </a:fld>
             <a:endParaRPr lang="en-US"/>
           </a:p>
@@ -2553,6 +2583,7 @@
               <a:rPr lang="en-US"/>
               <a:t>Click to edit Master text styles</a:t>
             </a:r>
+            <a:endParaRPr lang="en-US"/>
           </a:p>
           <a:p>
             <a:pPr lvl="1"/>
@@ -2560,6 +2591,7 @@
               <a:rPr lang="en-US"/>
               <a:t>Second level</a:t>
             </a:r>
+            <a:endParaRPr lang="en-US"/>
           </a:p>
           <a:p>
             <a:pPr lvl="2"/>
@@ -2567,6 +2599,7 @@
               <a:rPr lang="en-US"/>
               <a:t>Third level</a:t>
             </a:r>
+            <a:endParaRPr lang="en-US"/>
           </a:p>
           <a:p>
             <a:pPr lvl="3"/>
@@ -2574,6 +2607,7 @@
               <a:rPr lang="en-US"/>
               <a:t>Fourth level</a:t>
             </a:r>
+            <a:endParaRPr lang="en-US"/>
           </a:p>
           <a:p>
             <a:pPr lvl="4"/>
@@ -2602,7 +2636,6 @@
           <a:p>
             <a:fld id="{37A2730A-859E-B540-ADF3-E97069AD1FDB}" type="datetimeFigureOut">
               <a:rPr lang="en-US" smtClean="0"/>
-              <a:t>2/2/2024</a:t>
             </a:fld>
             <a:endParaRPr lang="en-US"/>
           </a:p>
@@ -2644,7 +2677,6 @@
           <a:p>
             <a:fld id="{8E05DC9C-C50D-D242-B083-59CEE07163F1}" type="slidenum">
               <a:rPr lang="en-US" smtClean="0"/>
-              <a:t>‹#›</a:t>
             </a:fld>
             <a:endParaRPr lang="en-US"/>
           </a:p>
@@ -2728,6 +2760,7 @@
               <a:rPr lang="en-US"/>
               <a:t>Click to edit Master text styles</a:t>
             </a:r>
+            <a:endParaRPr lang="en-US"/>
           </a:p>
           <a:p>
             <a:pPr lvl="1"/>
@@ -2735,6 +2768,7 @@
               <a:rPr lang="en-US"/>
               <a:t>Second level</a:t>
             </a:r>
+            <a:endParaRPr lang="en-US"/>
           </a:p>
           <a:p>
             <a:pPr lvl="2"/>
@@ -2742,6 +2776,7 @@
               <a:rPr lang="en-US"/>
               <a:t>Third level</a:t>
             </a:r>
+            <a:endParaRPr lang="en-US"/>
           </a:p>
           <a:p>
             <a:pPr lvl="3"/>
@@ -2749,6 +2784,7 @@
               <a:rPr lang="en-US"/>
               <a:t>Fourth level</a:t>
             </a:r>
+            <a:endParaRPr lang="en-US"/>
           </a:p>
           <a:p>
             <a:pPr lvl="4"/>
@@ -2777,7 +2813,6 @@
           <a:p>
             <a:fld id="{37A2730A-859E-B540-ADF3-E97069AD1FDB}" type="datetimeFigureOut">
               <a:rPr lang="en-US" smtClean="0"/>
-              <a:t>2/2/2024</a:t>
             </a:fld>
             <a:endParaRPr lang="en-US"/>
           </a:p>
@@ -2819,7 +2854,6 @@
           <a:p>
             <a:fld id="{8E05DC9C-C50D-D242-B083-59CEE07163F1}" type="slidenum">
               <a:rPr lang="en-US" smtClean="0"/>
-              <a:t>‹#›</a:t>
             </a:fld>
             <a:endParaRPr lang="en-US"/>
           </a:p>
@@ -2899,6 +2933,7 @@
               <a:rPr lang="en-US"/>
               <a:t>Click to edit Master text styles</a:t>
             </a:r>
+            <a:endParaRPr lang="en-US"/>
           </a:p>
           <a:p>
             <a:pPr lvl="1"/>
@@ -2906,6 +2941,7 @@
               <a:rPr lang="en-US"/>
               <a:t>Second level</a:t>
             </a:r>
+            <a:endParaRPr lang="en-US"/>
           </a:p>
           <a:p>
             <a:pPr lvl="2"/>
@@ -2913,6 +2949,7 @@
               <a:rPr lang="en-US"/>
               <a:t>Third level</a:t>
             </a:r>
+            <a:endParaRPr lang="en-US"/>
           </a:p>
           <a:p>
             <a:pPr lvl="3"/>
@@ -2920,6 +2957,7 @@
               <a:rPr lang="en-US"/>
               <a:t>Fourth level</a:t>
             </a:r>
+            <a:endParaRPr lang="en-US"/>
           </a:p>
           <a:p>
             <a:pPr lvl="4"/>
@@ -2948,7 +2986,6 @@
           <a:p>
             <a:fld id="{37A2730A-859E-B540-ADF3-E97069AD1FDB}" type="datetimeFigureOut">
               <a:rPr lang="en-US" smtClean="0"/>
-              <a:t>2/2/2024</a:t>
             </a:fld>
             <a:endParaRPr lang="en-US"/>
           </a:p>
@@ -2990,7 +3027,6 @@
           <a:p>
             <a:fld id="{8E05DC9C-C50D-D242-B083-59CEE07163F1}" type="slidenum">
               <a:rPr lang="en-US" smtClean="0"/>
-              <a:t>‹#›</a:t>
             </a:fld>
             <a:endParaRPr lang="en-US"/>
           </a:p>
@@ -3170,6 +3206,7 @@
               <a:rPr lang="en-US"/>
               <a:t>Click to edit Master text styles</a:t>
             </a:r>
+            <a:endParaRPr lang="en-US"/>
           </a:p>
         </p:txBody>
       </p:sp>
@@ -3190,7 +3227,6 @@
           <a:p>
             <a:fld id="{37A2730A-859E-B540-ADF3-E97069AD1FDB}" type="datetimeFigureOut">
               <a:rPr lang="en-US" smtClean="0"/>
-              <a:t>2/2/2024</a:t>
             </a:fld>
             <a:endParaRPr lang="en-US"/>
           </a:p>
@@ -3232,7 +3268,6 @@
           <a:p>
             <a:fld id="{8E05DC9C-C50D-D242-B083-59CEE07163F1}" type="slidenum">
               <a:rPr lang="en-US" smtClean="0"/>
-              <a:t>‹#›</a:t>
             </a:fld>
             <a:endParaRPr lang="en-US"/>
           </a:p>
@@ -3311,6 +3346,7 @@
               <a:rPr lang="en-US"/>
               <a:t>Click to edit Master text styles</a:t>
             </a:r>
+            <a:endParaRPr lang="en-US"/>
           </a:p>
           <a:p>
             <a:pPr lvl="1"/>
@@ -3318,6 +3354,7 @@
               <a:rPr lang="en-US"/>
               <a:t>Second level</a:t>
             </a:r>
+            <a:endParaRPr lang="en-US"/>
           </a:p>
           <a:p>
             <a:pPr lvl="2"/>
@@ -3325,6 +3362,7 @@
               <a:rPr lang="en-US"/>
               <a:t>Third level</a:t>
             </a:r>
+            <a:endParaRPr lang="en-US"/>
           </a:p>
           <a:p>
             <a:pPr lvl="3"/>
@@ -3332,6 +3370,7 @@
               <a:rPr lang="en-US"/>
               <a:t>Fourth level</a:t>
             </a:r>
+            <a:endParaRPr lang="en-US"/>
           </a:p>
           <a:p>
             <a:pPr lvl="4"/>
@@ -3368,6 +3407,7 @@
               <a:rPr lang="en-US"/>
               <a:t>Click to edit Master text styles</a:t>
             </a:r>
+            <a:endParaRPr lang="en-US"/>
           </a:p>
           <a:p>
             <a:pPr lvl="1"/>
@@ -3375,6 +3415,7 @@
               <a:rPr lang="en-US"/>
               <a:t>Second level</a:t>
             </a:r>
+            <a:endParaRPr lang="en-US"/>
           </a:p>
           <a:p>
             <a:pPr lvl="2"/>
@@ -3382,6 +3423,7 @@
               <a:rPr lang="en-US"/>
               <a:t>Third level</a:t>
             </a:r>
+            <a:endParaRPr lang="en-US"/>
           </a:p>
           <a:p>
             <a:pPr lvl="3"/>
@@ -3389,6 +3431,7 @@
               <a:rPr lang="en-US"/>
               <a:t>Fourth level</a:t>
             </a:r>
+            <a:endParaRPr lang="en-US"/>
           </a:p>
           <a:p>
             <a:pPr lvl="4"/>
@@ -3417,7 +3460,6 @@
           <a:p>
             <a:fld id="{37A2730A-859E-B540-ADF3-E97069AD1FDB}" type="datetimeFigureOut">
               <a:rPr lang="en-US" smtClean="0"/>
-              <a:t>2/2/2024</a:t>
             </a:fld>
             <a:endParaRPr lang="en-US"/>
           </a:p>
@@ -3459,7 +3501,6 @@
           <a:p>
             <a:fld id="{8E05DC9C-C50D-D242-B083-59CEE07163F1}" type="slidenum">
               <a:rPr lang="en-US" smtClean="0"/>
-              <a:t>‹#›</a:t>
             </a:fld>
             <a:endParaRPr lang="en-US"/>
           </a:p>
@@ -3581,6 +3622,7 @@
               <a:rPr lang="en-US"/>
               <a:t>Click to edit Master text styles</a:t>
             </a:r>
+            <a:endParaRPr lang="en-US"/>
           </a:p>
         </p:txBody>
       </p:sp>
@@ -3611,6 +3653,7 @@
               <a:rPr lang="en-US"/>
               <a:t>Click to edit Master text styles</a:t>
             </a:r>
+            <a:endParaRPr lang="en-US"/>
           </a:p>
           <a:p>
             <a:pPr lvl="1"/>
@@ -3618,6 +3661,7 @@
               <a:rPr lang="en-US"/>
               <a:t>Second level</a:t>
             </a:r>
+            <a:endParaRPr lang="en-US"/>
           </a:p>
           <a:p>
             <a:pPr lvl="2"/>
@@ -3625,6 +3669,7 @@
               <a:rPr lang="en-US"/>
               <a:t>Third level</a:t>
             </a:r>
+            <a:endParaRPr lang="en-US"/>
           </a:p>
           <a:p>
             <a:pPr lvl="3"/>
@@ -3632,6 +3677,7 @@
               <a:rPr lang="en-US"/>
               <a:t>Fourth level</a:t>
             </a:r>
+            <a:endParaRPr lang="en-US"/>
           </a:p>
           <a:p>
             <a:pPr lvl="4"/>
@@ -3707,6 +3753,7 @@
               <a:rPr lang="en-US"/>
               <a:t>Click to edit Master text styles</a:t>
             </a:r>
+            <a:endParaRPr lang="en-US"/>
           </a:p>
         </p:txBody>
       </p:sp>
@@ -3737,6 +3784,7 @@
               <a:rPr lang="en-US"/>
               <a:t>Click to edit Master text styles</a:t>
             </a:r>
+            <a:endParaRPr lang="en-US"/>
           </a:p>
           <a:p>
             <a:pPr lvl="1"/>
@@ -3744,6 +3792,7 @@
               <a:rPr lang="en-US"/>
               <a:t>Second level</a:t>
             </a:r>
+            <a:endParaRPr lang="en-US"/>
           </a:p>
           <a:p>
             <a:pPr lvl="2"/>
@@ -3751,6 +3800,7 @@
               <a:rPr lang="en-US"/>
               <a:t>Third level</a:t>
             </a:r>
+            <a:endParaRPr lang="en-US"/>
           </a:p>
           <a:p>
             <a:pPr lvl="3"/>
@@ -3758,6 +3808,7 @@
               <a:rPr lang="en-US"/>
               <a:t>Fourth level</a:t>
             </a:r>
+            <a:endParaRPr lang="en-US"/>
           </a:p>
           <a:p>
             <a:pPr lvl="4"/>
@@ -3786,7 +3837,6 @@
           <a:p>
             <a:fld id="{37A2730A-859E-B540-ADF3-E97069AD1FDB}" type="datetimeFigureOut">
               <a:rPr lang="en-US" smtClean="0"/>
-              <a:t>2/2/2024</a:t>
             </a:fld>
             <a:endParaRPr lang="en-US"/>
           </a:p>
@@ -3828,7 +3878,6 @@
           <a:p>
             <a:fld id="{8E05DC9C-C50D-D242-B083-59CEE07163F1}" type="slidenum">
               <a:rPr lang="en-US" smtClean="0"/>
-              <a:t>‹#›</a:t>
             </a:fld>
             <a:endParaRPr lang="en-US"/>
           </a:p>
@@ -3904,7 +3953,6 @@
           <a:p>
             <a:fld id="{37A2730A-859E-B540-ADF3-E97069AD1FDB}" type="datetimeFigureOut">
               <a:rPr lang="en-US" smtClean="0"/>
-              <a:t>2/2/2024</a:t>
             </a:fld>
             <a:endParaRPr lang="en-US"/>
           </a:p>
@@ -3946,7 +3994,6 @@
           <a:p>
             <a:fld id="{8E05DC9C-C50D-D242-B083-59CEE07163F1}" type="slidenum">
               <a:rPr lang="en-US" smtClean="0"/>
-              <a:t>‹#›</a:t>
             </a:fld>
             <a:endParaRPr lang="en-US"/>
           </a:p>
@@ -3994,7 +4041,6 @@
           <a:p>
             <a:fld id="{37A2730A-859E-B540-ADF3-E97069AD1FDB}" type="datetimeFigureOut">
               <a:rPr lang="en-US" smtClean="0"/>
-              <a:t>2/2/2024</a:t>
             </a:fld>
             <a:endParaRPr lang="en-US"/>
           </a:p>
@@ -4036,7 +4082,6 @@
           <a:p>
             <a:fld id="{8E05DC9C-C50D-D242-B083-59CEE07163F1}" type="slidenum">
               <a:rPr lang="en-US" smtClean="0"/>
-              <a:t>‹#›</a:t>
             </a:fld>
             <a:endParaRPr lang="en-US"/>
           </a:p>
@@ -4128,6 +4173,7 @@
               <a:rPr lang="en-US"/>
               <a:t>Click to edit Master text styles</a:t>
             </a:r>
+            <a:endParaRPr lang="en-US"/>
           </a:p>
           <a:p>
             <a:pPr lvl="1"/>
@@ -4135,6 +4181,7 @@
               <a:rPr lang="en-US"/>
               <a:t>Second level</a:t>
             </a:r>
+            <a:endParaRPr lang="en-US"/>
           </a:p>
           <a:p>
             <a:pPr lvl="2"/>
@@ -4142,6 +4189,7 @@
               <a:rPr lang="en-US"/>
               <a:t>Third level</a:t>
             </a:r>
+            <a:endParaRPr lang="en-US"/>
           </a:p>
           <a:p>
             <a:pPr lvl="3"/>
@@ -4149,6 +4197,7 @@
               <a:rPr lang="en-US"/>
               <a:t>Fourth level</a:t>
             </a:r>
+            <a:endParaRPr lang="en-US"/>
           </a:p>
           <a:p>
             <a:pPr lvl="4"/>
@@ -4224,6 +4273,7 @@
               <a:rPr lang="en-US"/>
               <a:t>Click to edit Master text styles</a:t>
             </a:r>
+            <a:endParaRPr lang="en-US"/>
           </a:p>
         </p:txBody>
       </p:sp>
@@ -4244,7 +4294,6 @@
           <a:p>
             <a:fld id="{37A2730A-859E-B540-ADF3-E97069AD1FDB}" type="datetimeFigureOut">
               <a:rPr lang="en-US" smtClean="0"/>
-              <a:t>2/2/2024</a:t>
             </a:fld>
             <a:endParaRPr lang="en-US"/>
           </a:p>
@@ -4286,7 +4335,6 @@
           <a:p>
             <a:fld id="{8E05DC9C-C50D-D242-B083-59CEE07163F1}" type="slidenum">
               <a:rPr lang="en-US" smtClean="0"/>
-              <a:t>‹#›</a:t>
             </a:fld>
             <a:endParaRPr lang="en-US"/>
           </a:p>
@@ -4482,6 +4530,7 @@
               <a:rPr lang="en-US"/>
               <a:t>Click to edit Master text styles</a:t>
             </a:r>
+            <a:endParaRPr lang="en-US"/>
           </a:p>
         </p:txBody>
       </p:sp>
@@ -4502,7 +4551,6 @@
           <a:p>
             <a:fld id="{37A2730A-859E-B540-ADF3-E97069AD1FDB}" type="datetimeFigureOut">
               <a:rPr lang="en-US" smtClean="0"/>
-              <a:t>2/2/2024</a:t>
             </a:fld>
             <a:endParaRPr lang="en-US"/>
           </a:p>
@@ -4544,7 +4592,6 @@
           <a:p>
             <a:fld id="{8E05DC9C-C50D-D242-B083-59CEE07163F1}" type="slidenum">
               <a:rPr lang="en-US" smtClean="0"/>
-              <a:t>‹#›</a:t>
             </a:fld>
             <a:endParaRPr lang="en-US"/>
           </a:p>
@@ -5173,6 +5220,7 @@
               <a:rPr lang="en-US"/>
               <a:t>Click to edit Master text styles</a:t>
             </a:r>
+            <a:endParaRPr lang="en-US"/>
           </a:p>
           <a:p>
             <a:pPr lvl="1"/>
@@ -5180,6 +5228,7 @@
               <a:rPr lang="en-US"/>
               <a:t>Second level</a:t>
             </a:r>
+            <a:endParaRPr lang="en-US"/>
           </a:p>
           <a:p>
             <a:pPr lvl="2"/>
@@ -5187,6 +5236,7 @@
               <a:rPr lang="en-US"/>
               <a:t>Third level</a:t>
             </a:r>
+            <a:endParaRPr lang="en-US"/>
           </a:p>
           <a:p>
             <a:pPr lvl="3"/>
@@ -5194,6 +5244,7 @@
               <a:rPr lang="en-US"/>
               <a:t>Fourth level</a:t>
             </a:r>
+            <a:endParaRPr lang="en-US"/>
           </a:p>
           <a:p>
             <a:pPr lvl="4"/>
@@ -5240,7 +5291,6 @@
           <a:p>
             <a:fld id="{37A2730A-859E-B540-ADF3-E97069AD1FDB}" type="datetimeFigureOut">
               <a:rPr lang="en-US" smtClean="0"/>
-              <a:t>2/2/2024</a:t>
             </a:fld>
             <a:endParaRPr lang="en-US"/>
           </a:p>
@@ -5316,7 +5366,6 @@
           <a:p>
             <a:fld id="{8E05DC9C-C50D-D242-B083-59CEE07163F1}" type="slidenum">
               <a:rPr lang="en-US" smtClean="0"/>
-              <a:t>‹#›</a:t>
             </a:fld>
             <a:endParaRPr lang="en-US"/>
           </a:p>
@@ -5776,7 +5825,7 @@
           <p:nvPr/>
         </p:nvPicPr>
         <p:blipFill rotWithShape="1">
-          <a:blip r:embed="rId2"/>
+          <a:blip r:embed="rId1"/>
           <a:srcRect l="34682" r="21069"/>
           <a:stretch>
             <a:fillRect/>
@@ -5853,10 +5902,6 @@
             <a:br>
               <a:rPr lang="en-US" dirty="0"/>
             </a:br>
-            <a:r>
-              <a:rPr lang="en-US" dirty="0"/>
-              <a:t/>
-            </a:r>
             <a:br>
               <a:rPr lang="en-US" dirty="0"/>
             </a:br>
@@ -5873,11 +5918,11 @@
   <p:clrMapOvr>
     <a:masterClrMapping/>
   </p:clrMapOvr>
-  <mc:AlternateContent xmlns:mc="http://schemas.openxmlformats.org/markup-compatibility/2006" xmlns:p14="http://schemas.microsoft.com/office/powerpoint/2010/main">
-    <mc:Choice Requires="p14">
+  <mc:AlternateContent xmlns:mc="http://schemas.openxmlformats.org/markup-compatibility/2006">
+    <mc:Choice xmlns:p14="http://schemas.microsoft.com/office/powerpoint/2010/main" Requires="p14">
       <p:transition spd="slow" p14:dur="2000" advTm="3835"/>
     </mc:Choice>
-    <mc:Fallback xmlns="">
+    <mc:Fallback>
       <p:transition spd="slow" advTm="3835"/>
     </mc:Fallback>
   </mc:AlternateContent>
@@ -6038,6 +6083,7 @@
               <a:rPr lang="en-US" dirty="0"/>
               <a:t>We retrieved our data from Kaggle, which is a subsidiary from Google, and it’s an online community for engineers of all fields, that allows the users to find and access datasets used to build AI models.</a:t>
             </a:r>
+            <a:endParaRPr lang="en-US" dirty="0"/>
           </a:p>
           <a:p>
             <a:pPr marL="0" indent="0">
@@ -6161,6 +6207,11 @@
               </a:rPr>
               <a:t>It contains 9 columns</a:t>
             </a:r>
+            <a:endParaRPr lang="en-US" dirty="0">
+              <a:solidFill>
+                <a:srgbClr val="FF0000"/>
+              </a:solidFill>
+            </a:endParaRPr>
           </a:p>
           <a:p>
             <a:r>
@@ -6171,6 +6222,11 @@
               </a:rPr>
               <a:t>It contains 72946 registers or rows</a:t>
             </a:r>
+            <a:endParaRPr lang="en-US" dirty="0">
+              <a:solidFill>
+                <a:srgbClr val="FF0000"/>
+              </a:solidFill>
+            </a:endParaRPr>
           </a:p>
           <a:p>
             <a:r>
@@ -6181,6 +6237,11 @@
               </a:rPr>
               <a:t>It contains info for 56 different cryptos</a:t>
             </a:r>
+            <a:endParaRPr lang="en-US" dirty="0">
+              <a:solidFill>
+                <a:srgbClr val="FF0000"/>
+              </a:solidFill>
+            </a:endParaRPr>
           </a:p>
           <a:p>
             <a:r>
@@ -6191,6 +6252,11 @@
               </a:rPr>
               <a:t>The start and end date for our data is 2013-05-05 / 2022-10-23</a:t>
             </a:r>
+            <a:endParaRPr lang="en-US" dirty="0">
+              <a:solidFill>
+                <a:srgbClr val="FF0000"/>
+              </a:solidFill>
+            </a:endParaRPr>
           </a:p>
           <a:p>
             <a:r>
@@ -6217,6 +6283,11 @@
               </a:rPr>
               <a:t>value can highly be affected by external factor as well.</a:t>
             </a:r>
+            <a:endParaRPr lang="en-US" dirty="0">
+              <a:solidFill>
+                <a:srgbClr val="FF0000"/>
+              </a:solidFill>
+            </a:endParaRPr>
           </a:p>
           <a:p>
             <a:r>
@@ -6227,6 +6298,11 @@
               </a:rPr>
               <a:t>The columns that we would be using to train our model probably are: open, low, high, close, volume, crypto name, date</a:t>
             </a:r>
+            <a:endParaRPr lang="en-US" dirty="0">
+              <a:solidFill>
+                <a:srgbClr val="FF0000"/>
+              </a:solidFill>
+            </a:endParaRPr>
           </a:p>
         </p:txBody>
       </p:sp>
@@ -6309,28 +6385,6 @@
           </a:p>
         </p:txBody>
       </p:sp>
-      <p:pic>
-        <p:nvPicPr>
-          <p:cNvPr id="4" name="Picture 3"/>
-          <p:cNvPicPr/>
-          <p:nvPr/>
-        </p:nvPicPr>
-        <p:blipFill>
-          <a:blip r:embed="rId2"/>
-          <a:stretch>
-            <a:fillRect/>
-          </a:stretch>
-        </p:blipFill>
-        <p:spPr>
-          <a:xfrm>
-            <a:off x="1073331" y="2768373"/>
-            <a:ext cx="7926978" cy="3449547"/>
-          </a:xfrm>
-          <a:prstGeom prst="rect">
-            <a:avLst/>
-          </a:prstGeom>
-        </p:spPr>
-      </p:pic>
     </p:spTree>
   </p:cSld>
   <p:clrMapOvr>
@@ -6406,12 +6460,14 @@
               <a:rPr lang="en-US" dirty="0"/>
               <a:t> notebook, pandas and python. </a:t>
             </a:r>
+            <a:endParaRPr lang="en-US" dirty="0"/>
           </a:p>
           <a:p>
             <a:r>
               <a:rPr lang="en-US" dirty="0"/>
               <a:t>By doing so we give each member of both teams the basic tools they need to access and start manipulating the data. </a:t>
             </a:r>
+            <a:endParaRPr lang="en-US" dirty="0"/>
           </a:p>
           <a:p>
             <a:endParaRPr lang="en-US" dirty="0"/>
@@ -6592,7 +6648,7 @@
           <p:nvPr/>
         </p:nvPicPr>
         <p:blipFill>
-          <a:blip r:embed="rId2"/>
+          <a:blip r:embed="rId1"/>
           <a:stretch>
             <a:fillRect/>
           </a:stretch>
@@ -6767,20 +6823,8 @@
                 <a:tableStyleId>{5C22544A-7EE6-4342-B048-85BDC9FD1C3A}</a:tableStyleId>
               </a:tblPr>
               <a:tblGrid>
-                <a:gridCol w="2553666">
-                  <a:extLst>
-                    <a:ext uri="{9D8B030D-6E8A-4147-A177-3AD203B41FA5}">
-                      <a16:colId xmlns:a16="http://schemas.microsoft.com/office/drawing/2014/main" val="20000"/>
-                    </a:ext>
-                  </a:extLst>
-                </a:gridCol>
-                <a:gridCol w="3432796">
-                  <a:extLst>
-                    <a:ext uri="{9D8B030D-6E8A-4147-A177-3AD203B41FA5}">
-                      <a16:colId xmlns:a16="http://schemas.microsoft.com/office/drawing/2014/main" val="20001"/>
-                    </a:ext>
-                  </a:extLst>
-                </a:gridCol>
+                <a:gridCol w="2553666"/>
+                <a:gridCol w="3432796"/>
               </a:tblGrid>
               <a:tr h="372886">
                 <a:tc>
@@ -6829,11 +6873,6 @@
                   </a:txBody>
                   <a:tcPr marL="3810" marR="3810" marT="3810" marB="0" anchor="b"/>
                 </a:tc>
-                <a:extLst>
-                  <a:ext uri="{0D108BD9-81ED-4DB2-BD59-A6C34878D82A}">
-                    <a16:rowId xmlns:a16="http://schemas.microsoft.com/office/drawing/2014/main" val="10000"/>
-                  </a:ext>
-                </a:extLst>
               </a:tr>
               <a:tr h="372886">
                 <a:tc>
@@ -6882,11 +6921,6 @@
                   </a:txBody>
                   <a:tcPr marL="3810" marR="3810" marT="3810" marB="0" anchor="b"/>
                 </a:tc>
-                <a:extLst>
-                  <a:ext uri="{0D108BD9-81ED-4DB2-BD59-A6C34878D82A}">
-                    <a16:rowId xmlns:a16="http://schemas.microsoft.com/office/drawing/2014/main" val="10001"/>
-                  </a:ext>
-                </a:extLst>
               </a:tr>
               <a:tr h="372886">
                 <a:tc>
@@ -6935,11 +6969,6 @@
                   </a:txBody>
                   <a:tcPr marL="3810" marR="3810" marT="3810" marB="0" anchor="b"/>
                 </a:tc>
-                <a:extLst>
-                  <a:ext uri="{0D108BD9-81ED-4DB2-BD59-A6C34878D82A}">
-                    <a16:rowId xmlns:a16="http://schemas.microsoft.com/office/drawing/2014/main" val="10002"/>
-                  </a:ext>
-                </a:extLst>
               </a:tr>
               <a:tr h="372886">
                 <a:tc>
@@ -6988,11 +7017,6 @@
                   </a:txBody>
                   <a:tcPr marL="3810" marR="3810" marT="3810" marB="0" anchor="b"/>
                 </a:tc>
-                <a:extLst>
-                  <a:ext uri="{0D108BD9-81ED-4DB2-BD59-A6C34878D82A}">
-                    <a16:rowId xmlns:a16="http://schemas.microsoft.com/office/drawing/2014/main" val="10003"/>
-                  </a:ext>
-                </a:extLst>
               </a:tr>
               <a:tr h="372886">
                 <a:tc>
@@ -7041,11 +7065,6 @@
                   </a:txBody>
                   <a:tcPr marL="3810" marR="3810" marT="3810" marB="0" anchor="b"/>
                 </a:tc>
-                <a:extLst>
-                  <a:ext uri="{0D108BD9-81ED-4DB2-BD59-A6C34878D82A}">
-                    <a16:rowId xmlns:a16="http://schemas.microsoft.com/office/drawing/2014/main" val="10004"/>
-                  </a:ext>
-                </a:extLst>
               </a:tr>
               <a:tr h="372886">
                 <a:tc>
@@ -7094,11 +7113,6 @@
                   </a:txBody>
                   <a:tcPr marL="3810" marR="3810" marT="3810" marB="0" anchor="b"/>
                 </a:tc>
-                <a:extLst>
-                  <a:ext uri="{0D108BD9-81ED-4DB2-BD59-A6C34878D82A}">
-                    <a16:rowId xmlns:a16="http://schemas.microsoft.com/office/drawing/2014/main" val="10005"/>
-                  </a:ext>
-                </a:extLst>
               </a:tr>
               <a:tr h="372886">
                 <a:tc>
@@ -7147,11 +7161,6 @@
                   </a:txBody>
                   <a:tcPr marL="3810" marR="3810" marT="3810" marB="0" anchor="b"/>
                 </a:tc>
-                <a:extLst>
-                  <a:ext uri="{0D108BD9-81ED-4DB2-BD59-A6C34878D82A}">
-                    <a16:rowId xmlns:a16="http://schemas.microsoft.com/office/drawing/2014/main" val="10006"/>
-                  </a:ext>
-                </a:extLst>
               </a:tr>
               <a:tr h="372886">
                 <a:tc>
@@ -7200,11 +7209,6 @@
                   </a:txBody>
                   <a:tcPr marL="3810" marR="3810" marT="3810" marB="0" anchor="b"/>
                 </a:tc>
-                <a:extLst>
-                  <a:ext uri="{0D108BD9-81ED-4DB2-BD59-A6C34878D82A}">
-                    <a16:rowId xmlns:a16="http://schemas.microsoft.com/office/drawing/2014/main" val="10007"/>
-                  </a:ext>
-                </a:extLst>
               </a:tr>
               <a:tr h="372886">
                 <a:tc>
@@ -7253,11 +7257,6 @@
                   </a:txBody>
                   <a:tcPr marL="3810" marR="3810" marT="3810" marB="0" anchor="b"/>
                 </a:tc>
-                <a:extLst>
-                  <a:ext uri="{0D108BD9-81ED-4DB2-BD59-A6C34878D82A}">
-                    <a16:rowId xmlns:a16="http://schemas.microsoft.com/office/drawing/2014/main" val="10008"/>
-                  </a:ext>
-                </a:extLst>
               </a:tr>
             </a:tbl>
           </a:graphicData>
@@ -7330,18 +7329,21 @@
               <a:rPr lang="en-US" dirty="0"/>
               <a:t>We choose this topic for some reasons:</a:t>
             </a:r>
+            <a:endParaRPr lang="en-US" dirty="0"/>
           </a:p>
           <a:p>
             <a:r>
               <a:rPr lang="en-US" dirty="0"/>
               <a:t>1-Our main topic included image processing which supposed a more advance project with topics that we still haven’t seen on college, so we decided to choose a project that let us put in practice some of the concepts we’ve seen so far.</a:t>
             </a:r>
+            <a:endParaRPr lang="en-US" dirty="0"/>
           </a:p>
           <a:p>
             <a:r>
               <a:rPr lang="en-US" dirty="0"/>
               <a:t>2-Considering that the majority of projects in school tend to be about house pricing or health, we wanted to avoid the common projects.</a:t>
             </a:r>
+            <a:endParaRPr lang="en-US" dirty="0"/>
           </a:p>
           <a:p>
             <a:r>
@@ -7419,6 +7421,7 @@
               <a:rPr lang="en-US" dirty="0"/>
               <a:t>In simple terms based on the historical data of the crypto currency prices we want to predict the trend of prices for the future values of the price.</a:t>
             </a:r>
+            <a:endParaRPr lang="en-US" dirty="0"/>
           </a:p>
           <a:p>
             <a:endParaRPr lang="en-US" dirty="0"/>
@@ -7578,7 +7581,7 @@
           <a:p>
             <a:r>
               <a:rPr lang="de-DE" dirty="0">
-                <a:hlinkClick r:id="rId2"/>
+                <a:hlinkClick r:id="rId1"/>
               </a:rPr>
               <a:t>https://app.clickup.com/9017184916/v/g/8cqemmm-417</a:t>
             </a:r>
@@ -7598,7 +7601,7 @@
           <p:nvPr/>
         </p:nvPicPr>
         <p:blipFill>
-          <a:blip r:embed="rId3"/>
+          <a:blip r:embed="rId2"/>
           <a:stretch>
             <a:fillRect/>
           </a:stretch>
@@ -7714,7 +7717,7 @@
           <p:nvPr/>
         </p:nvPicPr>
         <p:blipFill>
-          <a:blip r:embed="rId2"/>
+          <a:blip r:embed="rId1"/>
           <a:stretch>
             <a:fillRect/>
           </a:stretch>
@@ -7869,7 +7872,7 @@
           <p:nvPr/>
         </p:nvPicPr>
         <p:blipFill>
-          <a:blip r:embed="rId2"/>
+          <a:blip r:embed="rId1"/>
           <a:stretch>
             <a:fillRect/>
           </a:stretch>
@@ -7893,7 +7896,7 @@
           <p:nvPr/>
         </p:nvPicPr>
         <p:blipFill>
-          <a:blip r:embed="rId3"/>
+          <a:blip r:embed="rId2"/>
           <a:stretch>
             <a:fillRect/>
           </a:stretch>
@@ -7968,54 +7971,35 @@
         </p:nvSpPr>
         <p:spPr/>
         <p:txBody>
-          <a:bodyPr>
-            <a:normAutofit/>
-          </a:bodyPr>
-          <a:lstStyle/>
-          <a:p>
-            <a:pPr marL="0" indent="0">
-              <a:buNone/>
-            </a:pPr>
+          <a:bodyPr/>
+          <a:lstStyle/>
+          <a:p>
             <a:r>
               <a:rPr lang="en-US" dirty="0"/>
               <a:t>First of all lets explain </a:t>
             </a:r>
             <a:r>
-              <a:rPr lang="en-US" dirty="0" smtClean="0"/>
-              <a:t>what is </a:t>
+              <a:rPr lang="en-US" dirty="0" err="1"/>
+              <a:t>whats</a:t>
             </a:r>
             <a:r>
               <a:rPr lang="en-US" dirty="0"/>
-              <a:t>ML and what does it mean to train a model.</a:t>
-            </a:r>
-          </a:p>
-          <a:p>
-            <a:pPr lvl="0"/>
+              <a:t> ML and what does it mean to train a model.</a:t>
+            </a:r>
+            <a:endParaRPr lang="en-US" dirty="0"/>
+          </a:p>
+          <a:p>
+            <a:endParaRPr lang="en-US" dirty="0"/>
+          </a:p>
+          <a:p>
+            <a:endParaRPr lang="en-US" dirty="0"/>
+          </a:p>
+          <a:p>
             <a:r>
               <a:rPr lang="en-US" dirty="0"/>
-              <a:t>In Machine Learning(ML) the machines learn a relationship between input data and the desired output for input data based on an algorithm.</a:t>
-            </a:r>
-          </a:p>
-          <a:p>
-            <a:pPr lvl="0"/>
-            <a:r>
-              <a:rPr lang="en-US" dirty="0"/>
-              <a:t>Machine learning uses supervised, unsupervised and reinforcement learning techniques.  </a:t>
-            </a:r>
-          </a:p>
-          <a:p>
-            <a:pPr lvl="0"/>
-            <a:r>
-              <a:rPr lang="en-US" dirty="0"/>
-              <a:t>Supervised learning trains a model based on an algorithm using existing data and corresponding output labels or values and then the trained model is used to make predictions on new data samples.</a:t>
-            </a:r>
-          </a:p>
-          <a:p>
-            <a:pPr lvl="0"/>
-            <a:r>
-              <a:rPr lang="en-US" dirty="0"/>
-              <a:t>In our particular case given that the data that we are using is a continuous set of numbers, we need to use supervised training to accomplish a regression. </a:t>
-            </a:r>
+              <a:t>In our particular case given that the data that we are using is a continuous set of numbers, we need to use a supervised training to accomplish a regression. </a:t>
+            </a:r>
+            <a:endParaRPr lang="de-DE" dirty="0"/>
           </a:p>
         </p:txBody>
       </p:sp>
@@ -8086,24 +8070,28 @@
               <a:rPr lang="en-US" dirty="0"/>
               <a:t>A statistical method known as regression establishes a relationship between a dependent variable and one or more independent (explanatory) variables.</a:t>
             </a:r>
+            <a:endParaRPr lang="en-US" dirty="0"/>
           </a:p>
           <a:p>
             <a:r>
               <a:rPr lang="en-US" dirty="0"/>
               <a:t>A regression model can show whether changes observed in the dependent variable are associated with changes in one or more of the explanatory variables.</a:t>
             </a:r>
+            <a:endParaRPr lang="en-US" dirty="0"/>
           </a:p>
           <a:p>
             <a:r>
               <a:rPr lang="en-US" dirty="0"/>
               <a:t>In essence, it fits a best-fit line and observes how the data is distributed around it to do this.</a:t>
             </a:r>
+            <a:endParaRPr lang="en-US" dirty="0"/>
           </a:p>
           <a:p>
             <a:r>
               <a:rPr lang="en-US" dirty="0"/>
               <a:t>It helps the analyst to help to make asset valuations and making prediction.</a:t>
             </a:r>
+            <a:endParaRPr lang="en-US" dirty="0"/>
           </a:p>
           <a:p>
             <a:r>
@@ -8369,8 +8357,6 @@
       </a:bgFillStyleLst>
     </a:fmtScheme>
   </a:themeElements>
-  <a:objectDefaults/>
-  <a:extraClrSchemeLst/>
   <a:extLst>
     <a:ext uri="{05A4C25C-085E-4340-85A3-A5531E510DB2}">
       <thm15:themeFamily xmlns:thm15="http://schemas.microsoft.com/office/thememl/2012/main" name="Office Theme" id="{62F939B6-93AF-4DB8-9C6B-D6C7DFDC589F}" vid="{4A3C46E8-61CC-4603-A589-7422A47A8E4A}"/>
@@ -8379,282 +8365,521 @@
 </a:theme>
 </file>
 
-<file path=customXml/item1.xml><?xml version="1.0" encoding="utf-8"?>
-<p:properties xmlns:p="http://schemas.microsoft.com/office/2006/metadata/properties" xmlns:xsi="http://www.w3.org/2001/XMLSchema-instance" xmlns:pc="http://schemas.microsoft.com/office/infopath/2007/PartnerControls">
-  <documentManagement>
-    <Document_x0020_Purpose xmlns="f577acbf-5b0b-4b4f-9948-268e97f8d3a4">Informational</Document_x0020_Purpose>
-    <Initiatives xmlns="f577acbf-5b0b-4b4f-9948-268e97f8d3a4"/>
-  </documentManagement>
-</p:properties>
+<file path=customXml/item1.xml>��< ? x m l   v e r s i o n = " 1 . 0 " ? > < c t : c o n t e n t T y p e S c h e m a   c t : _ = " "   m a : _ = " "   m a : c o n t e n t T y p e N a m e = " D o c u m e n t "   m a : c o n t e n t T y p e I D = " 0 x 0 1 0 1 0 0 C D 4 0 1 5 2 4 D C 5 3 2 D 4 2 A 0 E 0 E D 8 8 6 3 3 1 A 7 2 B "   m a : c o n t e n t T y p e V e r s i o n = " 1 5 "   m a : c o n t e n t T y p e D e s c r i p t i o n = " C r e a t e   a   n e w   d o c u m e n t . "   m a : c o n t e n t T y p e S c o p e = " "   m a : v e r s i o n I D = " a b a 1 7 d 7 2 6 3 e 5 a 1 7 e 1 e f e 4 2 a 3 5 7 1 a b b 4 1 "   x m l n s : c t = " h t t p : / / s c h e m a s . m i c r o s o f t . c o m / o f f i c e / 2 0 0 6 / m e t a d a t a / c o n t e n t T y p e "   x m l n s : m a = " h t t p : / / s c h e m a s . m i c r o s o f t . c o m / o f f i c e / 2 0 0 6 / m e t a d a t a / p r o p e r t i e s / m e t a A t t r i b u t e s " > + 
+ < x s d : s c h e m a   t a r g e t N a m e s p a c e = " h t t p : / / s c h e m a s . m i c r o s o f t . c o m / o f f i c e / 2 0 0 6 / m e t a d a t a / p r o p e r t i e s "   m a : r o o t = " t r u e "   m a : f i e l d s I D = " e 4 e 3 c 9 c 8 e d 1 c 3 d 7 2 3 d 0 2 c 9 f 1 c b 2 4 d 1 9 a "   n s 2 : _ = " "   n s 3 : _ = " "   x m l n s : x s d = " h t t p : / / w w w . w 3 . o r g / 2 0 0 1 / X M L S c h e m a "   x m l n s : x s = " h t t p : / / w w w . w 3 . o r g / 2 0 0 1 / X M L S c h e m a "   x m l n s : p = " h t t p : / / s c h e m a s . m i c r o s o f t . c o m / o f f i c e / 2 0 0 6 / m e t a d a t a / p r o p e r t i e s "   x m l n s : n s 2 = " f 5 7 7 a c b f - 5 b 0 b - 4 b 4 f - 9 9 4 8 - 2 6 8 e 9 7 f 8 d 3 a 4 "   x m l n s : n s 3 = " b 1 e 4 d 6 e e - 9 f 6 f - 4 3 f 8 - a 6 1 8 - 2 4 f 3 d 8 4 d a 2 8 f " > + 
+ < x s d : i m p o r t   n a m e s p a c e = " f 5 7 7 a c b f - 5 b 0 b - 4 b 4 f - 9 9 4 8 - 2 6 8 e 9 7 f 8 d 3 a 4 " / > + 
+ < x s d : i m p o r t   n a m e s p a c e = " b 1 e 4 d 6 e e - 9 f 6 f - 4 3 f 8 - a 6 1 8 - 2 4 f 3 d 8 4 d a 2 8 f " / > + 
+ < x s d : e l e m e n t   n a m e = " p r o p e r t i e s " > + 
+ < x s d : c o m p l e x T y p e > + 
+ < x s d : s e q u e n c e > + 
+ < x s d : e l e m e n t   n a m e = " d o c u m e n t M a n a g e m e n t " > + 
+ < x s d : c o m p l e x T y p e > + 
+ < x s d : a l l > + 
+ < x s d : e l e m e n t   r e f = " n s 2 : M e d i a S e r v i c e M e t a d a t a "   m i n O c c u r s = " 0 " / > + 
+ < x s d : e l e m e n t   r e f = " n s 2 : M e d i a S e r v i c e F a s t M e t a d a t a "   m i n O c c u r s = " 0 " / > + 
+ < x s d : e l e m e n t   r e f = " n s 3 : S h a r e d W i t h U s e r s "   m i n O c c u r s = " 0 " / > + 
+ < x s d : e l e m e n t   r e f = " n s 3 : S h a r e d W i t h D e t a i l s "   m i n O c c u r s = " 0 " / > + 
+ < x s d : e l e m e n t   r e f = " n s 3 : L a s t S h a r e d B y U s e r "   m i n O c c u r s = " 0 " / > + 
+ < x s d : e l e m e n t   r e f = " n s 3 : L a s t S h a r e d B y T i m e "   m i n O c c u r s = " 0 " / > + 
+ < x s d : e l e m e n t   r e f = " n s 2 : D o c u m e n t _ x 0 0 2 0 _ P u r p o s e "   m i n O c c u r s = " 0 " / > + 
+ < x s d : e l e m e n t   r e f = " n s 2 : I n i t i a t i v e s "   m i n O c c u r s = " 0 " / > + 
+ < x s d : e l e m e n t   r e f = " n s 2 : M e d i a S e r v i c e D a t e T a k e n "   m i n O c c u r s = " 0 " / > + 
+ < x s d : e l e m e n t   r e f = " n s 2 : M e d i a S e r v i c e A u t o T a g s "   m i n O c c u r s = " 0 " / > + 
+ < x s d : e l e m e n t   r e f = " n s 2 : M e d i a S e r v i c e O C R "   m i n O c c u r s = " 0 " / > + 
+ < x s d : e l e m e n t   r e f = " n s 2 : M e d i a S e r v i c e L o c a t i o n "   m i n O c c u r s = " 0 " / > + 
+ < x s d : e l e m e n t   r e f = " n s 2 : M e d i a S e r v i c e E v e n t H a s h C o d e "   m i n O c c u r s = " 0 " / > + 
+ < x s d : e l e m e n t   r e f = " n s 2 : M e d i a S e r v i c e G e n e r a t i o n T i m e "   m i n O c c u r s = " 0 " / > + 
+ < / x s d : a l l > + 
+ < / x s d : c o m p l e x T y p e > + 
+ < / x s d : e l e m e n t > + 
+ < / x s d : s e q u e n c e > + 
+ < / x s d : c o m p l e x T y p e > + 
+ < / x s d : e l e m e n t > + 
+ < / x s d : s c h e m a > + 
+ < x s d : s c h e m a   t a r g e t N a m e s p a c e = " f 5 7 7 a c b f - 5 b 0 b - 4 b 4 f - 9 9 4 8 - 2 6 8 e 9 7 f 8 d 3 a 4 "   e l e m e n t F o r m D e f a u l t = " q u a l i f i e d "   x m l n s : x s d = " h t t p : / / w w w . w 3 . o r g / 2 0 0 1 / X M L S c h e m a "   x m l n s : x s = " h t t p : / / w w w . w 3 . o r g / 2 0 0 1 / X M L S c h e m a "   x m l n s : d m s = " h t t p : / / s c h e m a s . m i c r o s o f t . c o m / o f f i c e / 2 0 0 6 / d o c u m e n t M a n a g e m e n t / t y p e s "   x m l n s : p c = " h t t p : / / s c h e m a s . m i c r o s o f t . c o m / o f f i c e / i n f o p a t h / 2 0 0 7 / P a r t n e r C o n t r o l s " > + 
+ < x s d : i m p o r t   n a m e s p a c e = " h t t p : / / s c h e m a s . m i c r o s o f t . c o m / o f f i c e / 2 0 0 6 / d o c u m e n t M a n a g e m e n t / t y p e s " / > + 
+ < x s d : i m p o r t   n a m e s p a c e = " h t t p : / / s c h e m a s . m i c r o s o f t . c o m / o f f i c e / i n f o p a t h / 2 0 0 7 / P a r t n e r C o n t r o l s " / > + 
+ < x s d : e l e m e n t   n a m e = " M e d i a S e r v i c e M e t a d a t a "   m a : i n d e x = " 8 "   n i l l a b l e = " t r u e "   m a : d i s p l a y N a m e = " M e d i a S e r v i c e M e t a d a t a "   m a : h i d d e n = " t r u e "   m a : i n t e r n a l N a m e = " M e d i a S e r v i c e M e t a d a t a "   m a : r e a d O n l y = " t r u e " > + 
+ < x s d : s i m p l e T y p e > + 
+ < x s d : r e s t r i c t i o n   b a s e = " d m s : N o t e " / > + 
+ < / x s d : s i m p l e T y p e > + 
+ < / x s d : e l e m e n t > + 
+ < x s d : e l e m e n t   n a m e = " M e d i a S e r v i c e F a s t M e t a d a t a "   m a : i n d e x = " 9 "   n i l l a b l e = " t r u e "   m a : d i s p l a y N a m e = " M e d i a S e r v i c e F a s t M e t a d a t a "   m a : h i d d e n = " t r u e "   m a : i n t e r n a l N a m e = " M e d i a S e r v i c e F a s t M e t a d a t a "   m a : r e a d O n l y = " t r u e " > + 
+ < x s d : s i m p l e T y p e > + 
+ < x s d : r e s t r i c t i o n   b a s e = " d m s : N o t e " / > + 
+ < / x s d : s i m p l e T y p e > + 
+ < / x s d : e l e m e n t > + 
+ < x s d : e l e m e n t   n a m e = " D o c u m e n t _ x 0 0 2 0 _ P u r p o s e "   m a : i n d e x = " 1 4 "   n i l l a b l e = " t r u e "   m a : d i s p l a y N a m e = " D o c u m e n t   P u r p o s e "   m a : d e f a u l t = " I n f o r m a t i o n a l "   m a : f o r m a t = " D r o p d o w n "   m a : i n t e r n a l N a m e = " D o c u m e n t _ x 0 0 2 0 _ P u r p o s e " > + 
+ < x s d : s i m p l e T y p e > + 
+ < x s d : r e s t r i c t i o n   b a s e = " d m s : C h o i c e " > + 
+ < x s d : e n u m e r a t i o n   v a l u e = " I n f o r m a t i o n a l " / > + 
+ < x s d : e n u m e r a t i o n   v a l u e = " F e a t u r e   S p e c " / > + 
+ < x s d : e n u m e r a t i o n   v a l u e = " E n g i n e e r i n g   D e s i g n " / > + 
+ < x s d : e n u m e r a t i o n   v a l u e = " P l a n n i n g " / > + 
+ < / x s d : r e s t r i c t i o n > + 
+ < / x s d : s i m p l e T y p e > + 
+ < / x s d : e l e m e n t > + 
+ < x s d : e l e m e n t   n a m e = " I n i t i a t i v e s "   m a : i n d e x = " 1 5 "   n i l l a b l e = " t r u e "   m a : d i s p l a y N a m e = " I n i t i a t i v e s "   m a : d e s c r i p t i o n = " L i s t   o f   i n i t i a t i v e s   r e l a t e d   t o   t h i s   d o c u m e n t "   m a : i n t e r n a l N a m e = " I n i t i a t i v e s " > + 
+ < x s d : c o m p l e x T y p e > + 
+ < x s d : c o m p l e x C o n t e n t > + 
+ < x s d : e x t e n s i o n   b a s e = " d m s : M u l t i C h o i c e " > + 
+ < x s d : s e q u e n c e > + 
+ < x s d : e l e m e n t   n a m e = " V a l u e "   m a x O c c u r s = " u n b o u n d e d "   m i n O c c u r s = " 0 "   n i l l a b l e = " t r u e " > + 
+ < x s d : s i m p l e T y p e > + 
+ < x s d : r e s t r i c t i o n   b a s e = " d m s : C h o i c e " > + 
+ < x s d : e n u m e r a t i o n   v a l u e = " A d d - i n   M A U " / > + 
+ < x s d : e n u m e r a t i o n   v a l u e = " C u s t o m   F u n c t i o n s " / > + 
+ < x s d : e n u m e r a t i o n   v a l u e = " D a t a   & a m p ;   A n a l y t i c s " / > + 
+ < x s d : e n u m e r a t i o n   v a l u e = " D e v E x :   P o r t a l s   & a m p ;   P r o g r a m s " / > + 
+ < x s d : e n u m e r a t i o n   v a l u e = " D e v E x :   T o o l s   & a m p ;   L i b r a r i e s " / > + 
+ < x s d : e n u m e r a t i o n   v a l u e = " E n g i n e e r i n g " / > + 
+ < x s d : e n u m e r a t i o n   v a l u e = " E x c e l   A P I " / > + 
+ < x s d : e n u m e r a t i o n   v a l u e = " I n - M a r k e t   S u p p o r t " / > + 
+ < x s d : e n u m e r a t i o n   v a l u e = " M a k e r   A c c e s s " / > + 
+ < x s d : e n u m e r a t i o n   v a l u e = " S D X   R u n t i m e   & a m p ;   P a r t n e r s " / > + 
+ < x s d : e n u m e r a t i o n   v a l u e = " S D X   S e r v i c e   D e l i v e r y " / > + 
+ < x s d : e n u m e r a t i o n   v a l u e = " S D X   A P I   & a m p ;   P i p e l i n e " / > + 
+ < x s d : e n u m e r a t i o n   v a l u e = " S h i e l d   & a m p ;   O C E " / > + 
+ < / x s d : r e s t r i c t i o n > + 
+ < / x s d : s i m p l e T y p e > + 
+ < / x s d : e l e m e n t > + 
+ < / x s d : s e q u e n c e > + 
+ < / x s d : e x t e n s i o n > + 
+ < / x s d : c o m p l e x C o n t e n t > + 
+ < / x s d : c o m p l e x T y p e > + 
+ < / x s d : e l e m e n t > + 
+ < x s d : e l e m e n t   n a m e = " M e d i a S e r v i c e D a t e T a k e n "   m a : i n d e x = " 1 6 "   n i l l a b l e = " t r u e "   m a : d i s p l a y N a m e = " M e d i a S e r v i c e D a t e T a k e n "   m a : h i d d e n = " t r u e "   m a : i n t e r n a l N a m e = " M e d i a S e r v i c e D a t e T a k e n "   m a : r e a d O n l y = " t r u e " > + 
+ < x s d : s i m p l e T y p e > + 
+ < x s d : r e s t r i c t i o n   b a s e = " d m s : T e x t " / > + 
+ < / x s d : s i m p l e T y p e > + 
+ < / x s d : e l e m e n t > + 
+ < x s d : e l e m e n t   n a m e = " M e d i a S e r v i c e A u t o T a g s "   m a : i n d e x = " 1 7 "   n i l l a b l e = " t r u e "   m a : d i s p l a y N a m e = " M e d i a S e r v i c e A u t o T a g s "   m a : i n t e r n a l N a m e = " M e d i a S e r v i c e A u t o T a g s "   m a : r e a d O n l y = " t r u e " > + 
+ < x s d : s i m p l e T y p e > + 
+ < x s d : r e s t r i c t i o n   b a s e = " d m s : T e x t " / > + 
+ < / x s d : s i m p l e T y p e > + 
+ < / x s d : e l e m e n t > + 
+ < x s d : e l e m e n t   n a m e = " M e d i a S e r v i c e O C R "   m a : i n d e x = " 1 8 "   n i l l a b l e = " t r u e "   m a : d i s p l a y N a m e = " M e d i a S e r v i c e O C R "   m a : i n t e r n a l N a m e = " M e d i a S e r v i c e O C R "   m a : r e a d O n l y = " t r u e " > + 
+ < x s d : s i m p l e T y p e > + 
+ < x s d : r e s t r i c t i o n   b a s e = " d m s : N o t e " > + 
+ < x s d : m a x L e n g t h   v a l u e = " 2 5 5 " / > + 
+ < / x s d : r e s t r i c t i o n > + 
+ < / x s d : s i m p l e T y p e > + 
+ < / x s d : e l e m e n t > + 
+ < x s d : e l e m e n t   n a m e = " M e d i a S e r v i c e L o c a t i o n "   m a : i n d e x = " 1 9 "   n i l l a b l e = " t r u e "   m a : d i s p l a y N a m e = " M e d i a S e r v i c e L o c a t i o n "   m a : i n t e r n a l N a m e = " M e d i a S e r v i c e L o c a t i o n "   m a : r e a d O n l y = " t r u e " > + 
+ < x s d : s i m p l e T y p e > + 
+ < x s d : r e s t r i c t i o n   b a s e = " d m s : T e x t " / > + 
+ < / x s d : s i m p l e T y p e > + 
+ < / x s d : e l e m e n t > + 
+ < x s d : e l e m e n t   n a m e = " M e d i a S e r v i c e E v e n t H a s h C o d e "   m a : i n d e x = " 2 0 "   n i l l a b l e = " t r u e "   m a : d i s p l a y N a m e = " M e d i a S e r v i c e E v e n t H a s h C o d e "   m a : h i d d e n = " t r u e "   m a : i n t e r n a l N a m e = " M e d i a S e r v i c e E v e n t H a s h C o d e "   m a : r e a d O n l y = " t r u e " > + 
+ < x s d : s i m p l e T y p e > + 
+ < x s d : r e s t r i c t i o n   b a s e = " d m s : T e x t " / > + 
+ < / x s d : s i m p l e T y p e > + 
+ < / x s d : e l e m e n t > + 
+ < x s d : e l e m e n t   n a m e = " M e d i a S e r v i c e G e n e r a t i o n T i m e "   m a : i n d e x = " 2 1 "   n i l l a b l e = " t r u e "   m a : d i s p l a y N a m e = " M e d i a S e r v i c e G e n e r a t i o n T i m e "   m a : h i d d e n = " t r u e "   m a : i n t e r n a l N a m e = " M e d i a S e r v i c e G e n e r a t i o n T i m e "   m a : r e a d O n l y = " t r u e " > + 
+ < x s d : s i m p l e T y p e > + 
+ < x s d : r e s t r i c t i o n   b a s e = " d m s : T e x t " / > + 
+ < / x s d : s i m p l e T y p e > + 
+ < / x s d : e l e m e n t > + 
+ < / x s d : s c h e m a > + 
+ < x s d : s c h e m a   t a r g e t N a m e s p a c e = " b 1 e 4 d 6 e e - 9 f 6 f - 4 3 f 8 - a 6 1 8 - 2 4 f 3 d 8 4 d a 2 8 f "   e l e m e n t F o r m D e f a u l t = " q u a l i f i e d "   x m l n s : x s d = " h t t p : / / w w w . w 3 . o r g / 2 0 0 1 / X M L S c h e m a "   x m l n s : x s = " h t t p : / / w w w . w 3 . o r g / 2 0 0 1 / X M L S c h e m a "   x m l n s : d m s = " h t t p : / / s c h e m a s . m i c r o s o f t . c o m / o f f i c e / 2 0 0 6 / d o c u m e n t M a n a g e m e n t / t y p e s "   x m l n s : p c = " h t t p : / / s c h e m a s . m i c r o s o f t . c o m / o f f i c e / i n f o p a t h / 2 0 0 7 / P a r t n e r C o n t r o l s " > + 
+ < x s d : i m p o r t   n a m e s p a c e = " h t t p : / / s c h e m a s . m i c r o s o f t . c o m / o f f i c e / 2 0 0 6 / d o c u m e n t M a n a g e m e n t / t y p e s " / > + 
+ < x s d : i m p o r t   n a m e s p a c e = " h t t p : / / s c h e m a s . m i c r o s o f t . c o m / o f f i c e / i n f o p a t h / 2 0 0 7 / P a r t n e r C o n t r o l s " / > + 
+ < x s d : e l e m e n t   n a m e = " S h a r e d W i t h U s e r s "   m a : i n d e x = " 1 0 "   n i l l a b l e = " t r u e "   m a : d i s p l a y N a m e = " S h a r e d   W i t h "   m a : i n t e r n a l N a m e = " S h a r e d W i t h U s e r s "   m a : r e a d O n l y = " t r u e " > + 
+ < x s d : c o m p l e x T y p e > + 
+ < x s d : c o m p l e x C o n t e n t > + 
+ < x s d : e x t e n s i o n   b a s e = " d m s : U s e r M u l t i " > + 
+ < x s d : s e q u e n c e > + 
+ < x s d : e l e m e n t   n a m e = " U s e r I n f o "   m i n O c c u r s = " 0 "   m a x O c c u r s = " u n b o u n d e d " > + 
+ < x s d : c o m p l e x T y p e > + 
+ < x s d : s e q u e n c e > + 
+ < x s d : e l e m e n t   n a m e = " D i s p l a y N a m e "   t y p e = " x s d : s t r i n g "   m i n O c c u r s = " 0 " / > + 
+ < x s d : e l e m e n t   n a m e = " A c c o u n t I d "   t y p e = " d m s : U s e r I d "   m i n O c c u r s = " 0 "   n i l l a b l e = " t r u e " / > + 
+ < x s d : e l e m e n t   n a m e = " A c c o u n t T y p e "   t y p e = " x s d : s t r i n g "   m i n O c c u r s = " 0 " / > + 
+ < / x s d : s e q u e n c e > + 
+ < / x s d : c o m p l e x T y p e > + 
+ < / x s d : e l e m e n t > + 
+ < / x s d : s e q u e n c e > + 
+ < / x s d : e x t e n s i o n > + 
+ < / x s d : c o m p l e x C o n t e n t > + 
+ < / x s d : c o m p l e x T y p e > + 
+ < / x s d : e l e m e n t > + 
+ < x s d : e l e m e n t   n a m e = " S h a r e d W i t h D e t a i l s "   m a : i n d e x = " 1 1 "   n i l l a b l e = " t r u e "   m a : d i s p l a y N a m e = " S h a r e d   W i t h   D e t a i l s "   m a : i n t e r n a l N a m e = " S h a r e d W i t h D e t a i l s "   m a : r e a d O n l y = " t r u e " > + 
+ < x s d : s i m p l e T y p e > + 
+ < x s d : r e s t r i c t i o n   b a s e = " d m s : N o t e " > + 
+ < x s d : m a x L e n g t h   v a l u e = " 2 5 5 " / > + 
+ < / x s d : r e s t r i c t i o n > + 
+ < / x s d : s i m p l e T y p e > + 
+ < / x s d : e l e m e n t > + 
+ < x s d : e l e m e n t   n a m e = " L a s t S h a r e d B y U s e r "   m a : i n d e x = " 1 2 "   n i l l a b l e = " t r u e "   m a : d i s p l a y N a m e = " L a s t   S h a r e d   B y   U s e r "   m a : h i d d e n = " t r u e "   m a : i n t e r n a l N a m e = " L a s t S h a r e d B y U s e r "   m a : r e a d O n l y = " t r u e " > + 
+ < x s d : s i m p l e T y p e > + 
+ < x s d : r e s t r i c t i o n   b a s e = " d m s : N o t e " / > + 
+ < / x s d : s i m p l e T y p e > + 
+ < / x s d : e l e m e n t > + 
+ < x s d : e l e m e n t   n a m e = " L a s t S h a r e d B y T i m e "   m a : i n d e x = " 1 3 "   n i l l a b l e = " t r u e "   m a : d i s p l a y N a m e = " L a s t   S h a r e d   B y   T i m e "   m a : h i d d e n = " t r u e "   m a : i n t e r n a l N a m e = " L a s t S h a r e d B y T i m e "   m a : r e a d O n l y = " t r u e " > + 
+ < x s d : s i m p l e T y p e > + 
+ < x s d : r e s t r i c t i o n   b a s e = " d m s : D a t e T i m e " / > + 
+ < / x s d : s i m p l e T y p e > + 
+ < / x s d : e l e m e n t > + 
+ < / x s d : s c h e m a > + 
+ < x s d : s c h e m a   t a r g e t N a m e s p a c e = " h t t p : / / s c h e m a s . o p e n x m l f o r m a t s . o r g / p a c k a g e / 2 0 0 6 / m e t a d a t a / c o r e - p r o p e r t i e s "   e l e m e n t F o r m D e f a u l t = " q u a l i f i e d "   a t t r i b u t e F o r m D e f a u l t = " u n q u a l i f i e d "   b l o c k D e f a u l t = " # a l l "   x m l n s = " h t t p : / / s c h e m a s . o p e n x m l f o r m a t s . o r g / p a c k a g e / 2 0 0 6 / m e t a d a t a / c o r e - p r o p e r t i e s "   x m l n s : x s d = " h t t p : / / w w w . w 3 . o r g / 2 0 0 1 / X M L S c h e m a "   x m l n s : x s i = " h t t p : / / w w w . w 3 . o r g / 2 0 0 1 / X M L S c h e m a - i n s t a n c e "   x m l n s : d c = " h t t p : / / p u r l . o r g / d c / e l e m e n t s / 1 . 1 / "   x m l n s : d c t e r m s = " h t t p : / / p u r l . o r g / d c / t e r m s / "   x m l n s : o d o c = " h t t p : / / s c h e m a s . m i c r o s o f t . c o m / i n t e r n a l / o b d " > + 
+ < x s d : i m p o r t   n a m e s p a c e = " h t t p : / / p u r l . o r g / d c / e l e m e n t s / 1 . 1 / "   s c h e m a L o c a t i o n = " h t t p : / / d u b l i n c o r e . o r g / s c h e m a s / x m l s / q d c / 2 0 0 3 / 0 4 / 0 2 / d c . x s d " / > + 
+ < x s d : i m p o r t   n a m e s p a c e = " h t t p : / / p u r l . o r g / d c / t e r m s / "   s c h e m a L o c a t i o n = " h t t p : / / d u b l i n c o r e . o r g / s c h e m a s / x m l s / q d c / 2 0 0 3 / 0 4 / 0 2 / d c t e r m s . x s d " / > + 
+ < x s d : e l e m e n t   n a m e = " c o r e P r o p e r t i e s "   t y p e = " C T _ c o r e P r o p e r t i e s " / > + 
+ < x s d : c o m p l e x T y p e   n a m e = " C T _ c o r e P r o p e r t i e s " > + 
+ < x s d : a l l > + 
+ < x s d : e l e m e n t   r e f = " d c : c r e a t o r "   m i n O c c u r s = " 0 "   m a x O c c u r s = " 1 " / > + 
+ < x s d : e l e m e n t   r e f = " d c t e r m s : c r e a t e d "   m i n O c c u r s = " 0 "   m a x O c c u r s = " 1 " / > + 
+ < x s d : e l e m e n t   r e f = " d c : i d e n t i f i e r "   m i n O c c u r s = " 0 "   m a x O c c u r s = " 1 " / > + 
+ < x s d : e l e m e n t   n a m e = " c o n t e n t T y p e "   m i n O c c u r s = " 0 "   m a x O c c u r s = " 1 "   t y p e = " x s d : s t r i n g "   m a : i n d e x = " 0 "   m a : d i s p l a y N a m e = " C o n t e n t   T y p e " / > + 
+ < x s d : e l e m e n t   r e f = " d c : t i t l e "   m i n O c c u r s = " 0 "   m a x O c c u r s = " 1 "   m a : i n d e x = " 4 "   m a : d i s p l a y N a m e = " T i t l e " / > + 
+ < x s d : e l e m e n t   r e f = " d c : s u b j e c t "   m i n O c c u r s = " 0 "   m a x O c c u r s = " 1 " / > + 
+ < x s d : e l e m e n t   r e f = " d c : d e s c r i p t i o n "   m i n O c c u r s = " 0 "   m a x O c c u r s = " 1 " / > + 
+ < x s d : e l e m e n t   n a m e = " k e y w o r d s "   m i n O c c u r s = " 0 "   m a x O c c u r s = " 1 "   t y p e = " x s d : s t r i n g " / > + 
+ < x s d : e l e m e n t   r e f = " d c : l a n g u a g e "   m i n O c c u r s = " 0 "   m a x O c c u r s = " 1 " / > + 
+ < x s d : e l e m e n t   n a m e = " c a t e g o r y "   m i n O c c u r s = " 0 "   m a x O c c u r s = " 1 "   t y p e = " x s d : s t r i n g " / > + 
+ < x s d : e l e m e n t   n a m e = " v e r s i o n "   m i n O c c u r s = " 0 "   m a x O c c u r s = " 1 "   t y p e = " x s d : s t r i n g " / > + 
+ < x s d : e l e m e n t   n a m e = " r e v i s i o n "   m i n O c c u r s = " 0 "   m a x O c c u r s = " 1 "   t y p e = " x s d : s t r i n g " > + 
+ < x s d : a n n o t a t i o n > + 
+ < x s d : d o c u m e n t a t i o n > + 
+                                                 T h i s   v a l u e   i n d i c a t e s   t h e   n u m b e r   o f   s a v e s   o r   r e v i s i o n s .   T h e   a p p l i c a t i o n   i s   r e s p o n s i b l e   f o r   u p d a t i n g   t h i s   v a l u e   a f t e r   e a c h   r e v i s i o n . + 
+                                         < / x s d : d o c u m e n t a t i o n > + 
+ < / x s d : a n n o t a t i o n > + 
+ < / x s d : e l e m e n t > + 
+ < x s d : e l e m e n t   n a m e = " l a s t M o d i f i e d B y "   m i n O c c u r s = " 0 "   m a x O c c u r s = " 1 "   t y p e = " x s d : s t r i n g " / > + 
+ < x s d : e l e m e n t   r e f = " d c t e r m s : m o d i f i e d "   m i n O c c u r s = " 0 "   m a x O c c u r s = " 1 " / > + 
+ < x s d : e l e m e n t   n a m e = " c o n t e n t S t a t u s "   m i n O c c u r s = " 0 "   m a x O c c u r s = " 1 "   t y p e = " x s d : s t r i n g " / > + 
+ < / x s d : a l l > + 
+ < / x s d : c o m p l e x T y p e > + 
+ < / x s d : s c h e m a > + 
+ < x s : s c h e m a   t a r g e t N a m e s p a c e = " h t t p : / / s c h e m a s . m i c r o s o f t . c o m / o f f i c e / i n f o p a t h / 2 0 0 7 / P a r t n e r C o n t r o l s "   e l e m e n t F o r m D e f a u l t = " q u a l i f i e d "   a t t r i b u t e F o r m D e f a u l t = " u n q u a l i f i e d "   x m l n s : p c = " h t t p : / / s c h e m a s . m i c r o s o f t . c o m / o f f i c e / i n f o p a t h / 2 0 0 7 / P a r t n e r C o n t r o l s "   x m l n s : x s = " h t t p : / / w w w . w 3 . o r g / 2 0 0 1 / X M L S c h e m a " > + 
+ < x s : e l e m e n t   n a m e = " P e r s o n " > + 
+ < x s : c o m p l e x T y p e > + 
+ < x s : s e q u e n c e > + 
+ < x s : e l e m e n t   r e f = " p c : D i s p l a y N a m e "   m i n O c c u r s = " 0 " > < / x s : e l e m e n t > + 
+ < x s : e l e m e n t   r e f = " p c : A c c o u n t I d "   m i n O c c u r s = " 0 " > < / x s : e l e m e n t > + 
+ < x s : e l e m e n t   r e f = " p c : A c c o u n t T y p e "   m i n O c c u r s = " 0 " > < / x s : e l e m e n t > + 
+ < / x s : s e q u e n c e > + 
+ < / x s : c o m p l e x T y p e > + 
+ < / x s : e l e m e n t > + 
+ < x s : e l e m e n t   n a m e = " D i s p l a y N a m e "   t y p e = " x s : s t r i n g " > < / x s : e l e m e n t > + 
+ < x s : e l e m e n t   n a m e = " A c c o u n t I d "   t y p e = " x s : s t r i n g " > < / x s : e l e m e n t > + 
+ < x s : e l e m e n t   n a m e = " A c c o u n t T y p e "   t y p e = " x s : s t r i n g " > < / x s : e l e m e n t > + 
+ < x s : e l e m e n t   n a m e = " B D C A s s o c i a t e d E n t i t y " > + 
+ < x s : c o m p l e x T y p e > + 
+ < x s : s e q u e n c e > + 
+ < x s : e l e m e n t   r e f = " p c : B D C E n t i t y "   m i n O c c u r s = " 0 "   m a x O c c u r s = " u n b o u n d e d " > < / x s : e l e m e n t > + 
+ < / x s : s e q u e n c e > + 
+ < x s : a t t r i b u t e   r e f = " p c : E n t i t y N a m e s p a c e " > < / x s : a t t r i b u t e > + 
+ < x s : a t t r i b u t e   r e f = " p c : E n t i t y N a m e " > < / x s : a t t r i b u t e > + 
+ < x s : a t t r i b u t e   r e f = " p c : S y s t e m I n s t a n c e N a m e " > < / x s : a t t r i b u t e > + 
+ < x s : a t t r i b u t e   r e f = " p c : A s s o c i a t i o n N a m e " > < / x s : a t t r i b u t e > + 
+ < / x s : c o m p l e x T y p e > + 
+ < / x s : e l e m e n t > + 
+ < x s : a t t r i b u t e   n a m e = " E n t i t y N a m e s p a c e "   t y p e = " x s : s t r i n g " > < / x s : a t t r i b u t e > + 
+ < x s : a t t r i b u t e   n a m e = " E n t i t y N a m e "   t y p e = " x s : s t r i n g " > < / x s : a t t r i b u t e > + 
+ < x s : a t t r i b u t e   n a m e = " S y s t e m I n s t a n c e N a m e "   t y p e = " x s : s t r i n g " > < / x s : a t t r i b u t e > + 
+ < x s : a t t r i b u t e   n a m e = " A s s o c i a t i o n N a m e "   t y p e = " x s : s t r i n g " > < / x s : a t t r i b u t e > + 
+ < x s : e l e m e n t   n a m e = " B D C E n t i t y " > + 
+ < x s : c o m p l e x T y p e > + 
+ < x s : s e q u e n c e > + 
+ < x s : e l e m e n t   r e f = " p c : E n t i t y D i s p l a y N a m e "   m i n O c c u r s = " 0 " > < / x s : e l e m e n t > + 
+ < x s : e l e m e n t   r e f = " p c : E n t i t y I n s t a n c e R e f e r e n c e "   m i n O c c u r s = " 0 " > < / x s : e l e m e n t > + 
+ < x s : e l e m e n t   r e f = " p c : E n t i t y I d 1 "   m i n O c c u r s = " 0 " > < / x s : e l e m e n t > + 
+ < x s : e l e m e n t   r e f = " p c : E n t i t y I d 2 "   m i n O c c u r s = " 0 " > < / x s : e l e m e n t > + 
+ < x s : e l e m e n t   r e f = " p c : E n t i t y I d 3 "   m i n O c c u r s = " 0 " > < / x s : e l e m e n t > + 
+ < x s : e l e m e n t   r e f = " p c : E n t i t y I d 4 "   m i n O c c u r s = " 0 " > < / x s : e l e m e n t > + 
+ < x s : e l e m e n t   r e f = " p c : E n t i t y I d 5 "   m i n O c c u r s = " 0 " > < / x s : e l e m e n t > + 
+ < / x s : s e q u e n c e > + 
+ < / x s : c o m p l e x T y p e > + 
+ < / x s : e l e m e n t > + 
+ < x s : e l e m e n t   n a m e = " E n t i t y D i s p l a y N a m e "   t y p e = " x s : s t r i n g " > < / x s : e l e m e n t > + 
+ < x s : e l e m e n t   n a m e = " E n t i t y I n s t a n c e R e f e r e n c e "   t y p e = " x s : s t r i n g " > < / x s : e l e m e n t > + 
+ < x s : e l e m e n t   n a m e = " E n t i t y I d 1 "   t y p e = " x s : s t r i n g " > < / x s : e l e m e n t > + 
+ < x s : e l e m e n t   n a m e = " E n t i t y I d 2 "   t y p e = " x s : s t r i n g " > < / x s : e l e m e n t > + 
+ < x s : e l e m e n t   n a m e = " E n t i t y I d 3 "   t y p e = " x s : s t r i n g " > < / x s : e l e m e n t > + 
+ < x s : e l e m e n t   n a m e = " E n t i t y I d 4 "   t y p e = " x s : s t r i n g " > < / x s : e l e m e n t > + 
+ < x s : e l e m e n t   n a m e = " E n t i t y I d 5 "   t y p e = " x s : s t r i n g " > < / x s : e l e m e n t > + 
+ < x s : e l e m e n t   n a m e = " T e r m s " > + 
+ < x s : c o m p l e x T y p e > + 
+ < x s : s e q u e n c e > + 
+ < x s : e l e m e n t   r e f = " p c : T e r m I n f o "   m i n O c c u r s = " 0 "   m a x O c c u r s = " u n b o u n d e d " > < / x s : e l e m e n t > + 
+ < / x s : s e q u e n c e > + 
+ < / x s : c o m p l e x T y p e > + 
+ < / x s : e l e m e n t > + 
+ < x s : e l e m e n t   n a m e = " T e r m I n f o " > + 
+ < x s : c o m p l e x T y p e > + 
+ < x s : s e q u e n c e > + 
+ < x s : e l e m e n t   r e f = " p c : T e r m N a m e "   m i n O c c u r s = " 0 " > < / x s : e l e m e n t > + 
+ < x s : e l e m e n t   r e f = " p c : T e r m I d "   m i n O c c u r s = " 0 " > < / x s : e l e m e n t > + 
+ < / x s : s e q u e n c e > + 
+ < / x s : c o m p l e x T y p e > + 
+ < / x s : e l e m e n t > + 
+ < x s : e l e m e n t   n a m e = " T e r m N a m e "   t y p e = " x s : s t r i n g " > < / x s : e l e m e n t > + 
+ < x s : e l e m e n t   n a m e = " T e r m I d "   t y p e = " x s : s t r i n g " > < / x s : e l e m e n t > + 
+ < / x s : s c h e m a > + 
+ < / c t : c o n t e n t T y p e S c h e m a > 
 </file>
 
-<file path=customXml/item2.xml><?xml version="1.0" encoding="utf-8"?>
-<?mso-contentType ?>
-<FormTemplates xmlns="http://schemas.microsoft.com/sharepoint/v3/contenttype/forms">
-  <Display>DocumentLibraryForm</Display>
-  <Edit>DocumentLibraryForm</Edit>
-  <New>DocumentLibraryForm</New>
-</FormTemplates>
+<file path=customXml/item2.xml>��< ? m s o - c o n t e n t T y p e ? > < F o r m T e m p l a t e s   x m l n s = " h t t p : / / s c h e m a s . m i c r o s o f t . c o m / s h a r e p o i n t / v 3 / c o n t e n t t y p e / f o r m s " > < D i s p l a y > D o c u m e n t L i b r a r y F o r m < / D i s p l a y > < E d i t > D o c u m e n t L i b r a r y F o r m < / E d i t > < N e w > D o c u m e n t L i b r a r y F o r m < / N e w > < / F o r m T e m p l a t e s > 
 </file>
 
-<file path=customXml/item3.xml><?xml version="1.0" encoding="utf-8"?>
-<ct:contentTypeSchema xmlns:ct="http://schemas.microsoft.com/office/2006/metadata/contentType" xmlns:ma="http://schemas.microsoft.com/office/2006/metadata/properties/metaAttributes" ct:_="" ma:_="" ma:contentTypeName="Document" ma:contentTypeID="0x010100CD401524DC532D42A0E0ED886331A72B" ma:contentTypeVersion="15" ma:contentTypeDescription="Create a new document." ma:contentTypeScope="" ma:versionID="aba17d7263e5a17e1efe42a3571abb41">
-  <xsd:schema xmlns:xsd="http://www.w3.org/2001/XMLSchema" xmlns:xs="http://www.w3.org/2001/XMLSchema" xmlns:p="http://schemas.microsoft.com/office/2006/metadata/properties" xmlns:ns2="f577acbf-5b0b-4b4f-9948-268e97f8d3a4" xmlns:ns3="b1e4d6ee-9f6f-43f8-a618-24f3d84da28f" targetNamespace="http://schemas.microsoft.com/office/2006/metadata/properties" ma:root="true" ma:fieldsID="e4e3c9c8ed1c3d723d02c9f1cb24d19a" ns2:_="" ns3:_="">
-    <xsd:import namespace="f577acbf-5b0b-4b4f-9948-268e97f8d3a4"/>
-    <xsd:import namespace="b1e4d6ee-9f6f-43f8-a618-24f3d84da28f"/>
-    <xsd:element name="properties">
-      <xsd:complexType>
-        <xsd:sequence>
-          <xsd:element name="documentManagement">
-            <xsd:complexType>
-              <xsd:all>
-                <xsd:element ref="ns2:MediaServiceMetadata" minOccurs="0"/>
-                <xsd:element ref="ns2:MediaServiceFastMetadata" minOccurs="0"/>
-                <xsd:element ref="ns3:SharedWithUsers" minOccurs="0"/>
-                <xsd:element ref="ns3:SharedWithDetails" minOccurs="0"/>
-                <xsd:element ref="ns3:LastSharedByUser" minOccurs="0"/>
-                <xsd:element ref="ns3:LastSharedByTime" minOccurs="0"/>
-                <xsd:element ref="ns2:Document_x0020_Purpose" minOccurs="0"/>
-                <xsd:element ref="ns2:Initiatives" minOccurs="0"/>
-                <xsd:element ref="ns2:MediaServiceDateTaken" minOccurs="0"/>
-                <xsd:element ref="ns2:MediaServiceAutoTags" minOccurs="0"/>
-                <xsd:element ref="ns2:MediaServiceOCR" minOccurs="0"/>
-                <xsd:element ref="ns2:MediaServiceLocation" minOccurs="0"/>
-                <xsd:element ref="ns2:MediaServiceEventHashCode" minOccurs="0"/>
-                <xsd:element ref="ns2:MediaServiceGenerationTime" minOccurs="0"/>
-              </xsd:all>
-            </xsd:complexType>
-          </xsd:element>
-        </xsd:sequence>
-      </xsd:complexType>
-    </xsd:element>
-  </xsd:schema>
-  <xsd:schema xmlns:xsd="http://www.w3.org/2001/XMLSchema" xmlns:xs="http://www.w3.org/2001/XMLSchema" xmlns:dms="http://schemas.microsoft.com/office/2006/documentManagement/types" xmlns:pc="http://schemas.microsoft.com/office/infopath/2007/PartnerControls" targetNamespace="f577acbf-5b0b-4b4f-9948-268e97f8d3a4" elementFormDefault="qualified">
-    <xsd:import namespace="http://schemas.microsoft.com/office/2006/documentManagement/types"/>
-    <xsd:import namespace="http://schemas.microsoft.com/office/infopath/2007/PartnerControls"/>
-    <xsd:element name="MediaServiceMetadata" ma:index="8" nillable="true" ma:displayName="MediaServiceMetadata" ma:hidden="true" ma:internalName="MediaServiceMetadata" ma:readOnly="true">
-      <xsd:simpleType>
-        <xsd:restriction base="dms:Note"/>
-      </xsd:simpleType>
-    </xsd:element>
-    <xsd:element name="MediaServiceFastMetadata" ma:index="9" nillable="true" ma:displayName="MediaServiceFastMetadata" ma:hidden="true" ma:internalName="MediaServiceFastMetadata" ma:readOnly="true">
-      <xsd:simpleType>
-        <xsd:restriction base="dms:Note"/>
-      </xsd:simpleType>
-    </xsd:element>
-    <xsd:element name="Document_x0020_Purpose" ma:index="14" nillable="true" ma:displayName="Document Purpose" ma:default="Informational" ma:format="Dropdown" ma:internalName="Document_x0020_Purpose">
-      <xsd:simpleType>
-        <xsd:restriction base="dms:Choice">
-          <xsd:enumeration value="Informational"/>
-          <xsd:enumeration value="Feature Spec"/>
-          <xsd:enumeration value="Engineering Design"/>
-          <xsd:enumeration value="Planning"/>
-        </xsd:restriction>
-      </xsd:simpleType>
-    </xsd:element>
-    <xsd:element name="Initiatives" ma:index="15" nillable="true" ma:displayName="Initiatives" ma:description="List of initiatives related to this document" ma:internalName="Initiatives">
-      <xsd:complexType>
-        <xsd:complexContent>
-          <xsd:extension base="dms:MultiChoice">
-            <xsd:sequence>
-              <xsd:element name="Value" maxOccurs="unbounded" minOccurs="0" nillable="true">
-                <xsd:simpleType>
-                  <xsd:restriction base="dms:Choice">
-                    <xsd:enumeration value="Add-in MAU"/>
-                    <xsd:enumeration value="Custom Functions"/>
-                    <xsd:enumeration value="Data &amp; Analytics"/>
-                    <xsd:enumeration value="DevEx: Portals &amp; Programs"/>
-                    <xsd:enumeration value="DevEx: Tools &amp; Libraries"/>
-                    <xsd:enumeration value="Engineering"/>
-                    <xsd:enumeration value="Excel API"/>
-                    <xsd:enumeration value="In-Market Support"/>
-                    <xsd:enumeration value="Maker Access"/>
-                    <xsd:enumeration value="SDX Runtime &amp; Partners"/>
-                    <xsd:enumeration value="SDX Service Delivery"/>
-                    <xsd:enumeration value="SDX API &amp; Pipeline"/>
-                    <xsd:enumeration value="Shield &amp; OCE"/>
-                  </xsd:restriction>
-                </xsd:simpleType>
-              </xsd:element>
-            </xsd:sequence>
-          </xsd:extension>
-        </xsd:complexContent>
-      </xsd:complexType>
-    </xsd:element>
-    <xsd:element name="MediaServiceDateTaken" ma:index="16" nillable="true" ma:displayName="MediaServiceDateTaken" ma:hidden="true" ma:internalName="MediaServiceDateTaken" ma:readOnly="true">
-      <xsd:simpleType>
-        <xsd:restriction base="dms:Text"/>
-      </xsd:simpleType>
-    </xsd:element>
-    <xsd:element name="MediaServiceAutoTags" ma:index="17" nillable="true" ma:displayName="MediaServiceAutoTags" ma:internalName="MediaServiceAutoTags" ma:readOnly="true">
-      <xsd:simpleType>
-        <xsd:restriction base="dms:Text"/>
-      </xsd:simpleType>
-    </xsd:element>
-    <xsd:element name="MediaServiceOCR" ma:index="18" nillable="true" ma:displayName="MediaServiceOCR" ma:internalName="MediaServiceOCR" ma:readOnly="true">
-      <xsd:simpleType>
-        <xsd:restriction base="dms:Note">
-          <xsd:maxLength value="255"/>
-        </xsd:restriction>
-      </xsd:simpleType>
-    </xsd:element>
-    <xsd:element name="MediaServiceLocation" ma:index="19" nillable="true" ma:displayName="MediaServiceLocation" ma:internalName="MediaServiceLocation" ma:readOnly="true">
-      <xsd:simpleType>
-        <xsd:restriction base="dms:Text"/>
-      </xsd:simpleType>
-    </xsd:element>
-    <xsd:element name="MediaServiceEventHashCode" ma:index="20" nillable="true" ma:displayName="MediaServiceEventHashCode" ma:hidden="true" ma:internalName="MediaServiceEventHashCode" ma:readOnly="true">
-      <xsd:simpleType>
-        <xsd:restriction base="dms:Text"/>
-      </xsd:simpleType>
-    </xsd:element>
-    <xsd:element name="MediaServiceGenerationTime" ma:index="21" nillable="true" ma:displayName="MediaServiceGenerationTime" ma:hidden="true" ma:internalName="MediaServiceGenerationTime" ma:readOnly="true">
-      <xsd:simpleType>
-        <xsd:restriction base="dms:Text"/>
-      </xsd:simpleType>
-    </xsd:element>
-  </xsd:schema>
-  <xsd:schema xmlns:xsd="http://www.w3.org/2001/XMLSchema" xmlns:xs="http://www.w3.org/2001/XMLSchema" xmlns:dms="http://schemas.microsoft.com/office/2006/documentManagement/types" xmlns:pc="http://schemas.microsoft.com/office/infopath/2007/PartnerControls" targetNamespace="b1e4d6ee-9f6f-43f8-a618-24f3d84da28f" elementFormDefault="qualified">
-    <xsd:import namespace="http://schemas.microsoft.com/office/2006/documentManagement/types"/>
-    <xsd:import namespace="http://schemas.microsoft.com/office/infopath/2007/PartnerControls"/>
-    <xsd:element name="SharedWithUsers" ma:index="10" nillable="true" ma:displayName="Shared With" ma:internalName="SharedWithUsers" ma:readOnly="true">
-      <xsd:complexType>
-        <xsd:complexContent>
-          <xsd:extension base="dms:UserMulti">
-            <xsd:sequence>
-              <xsd:element name="UserInfo" minOccurs="0" maxOccurs="unbounded">
-                <xsd:complexType>
-                  <xsd:sequence>
-                    <xsd:element name="DisplayName" type="xsd:string" minOccurs="0"/>
-                    <xsd:element name="AccountId" type="dms:UserId" minOccurs="0" nillable="true"/>
-                    <xsd:element name="AccountType" type="xsd:string" minOccurs="0"/>
-                  </xsd:sequence>
-                </xsd:complexType>
-              </xsd:element>
-            </xsd:sequence>
-          </xsd:extension>
-        </xsd:complexContent>
-      </xsd:complexType>
-    </xsd:element>
-    <xsd:element name="SharedWithDetails" ma:index="11" nillable="true" ma:displayName="Shared With Details" ma:internalName="SharedWithDetails" ma:readOnly="true">
-      <xsd:simpleType>
-        <xsd:restriction base="dms:Note">
-          <xsd:maxLength value="255"/>
-        </xsd:restriction>
-      </xsd:simpleType>
-    </xsd:element>
-    <xsd:element name="LastSharedByUser" ma:index="12" nillable="true" ma:displayName="Last Shared By User" ma:hidden="true" ma:internalName="LastSharedByUser" ma:readOnly="true">
-      <xsd:simpleType>
-        <xsd:restriction base="dms:Note"/>
-      </xsd:simpleType>
-    </xsd:element>
-    <xsd:element name="LastSharedByTime" ma:index="13" nillable="true" ma:displayName="Last Shared By Time" ma:hidden="true" ma:internalName="LastSharedByTime" ma:readOnly="true">
-      <xsd:simpleType>
-        <xsd:restriction base="dms:DateTime"/>
-      </xsd:simpleType>
-    </xsd:element>
-  </xsd:schema>
-  <xsd:schema xmlns="http://schemas.openxmlformats.org/package/2006/metadata/core-properties" xmlns:xsd="http://www.w3.org/2001/XMLSchema" xmlns:xsi="http://www.w3.org/2001/XMLSchema-instance" xmlns:dc="http://purl.org/dc/elements/1.1/" xmlns:dcterms="http://purl.org/dc/terms/" xmlns:odoc="http://schemas.microsoft.com/internal/obd" targetNamespace="http://schemas.openxmlformats.org/package/2006/metadata/core-properties" elementFormDefault="qualified" attributeFormDefault="unqualified" blockDefault="#all">
-    <xsd:import namespace="http://purl.org/dc/elements/1.1/" schemaLocation="http://dublincore.org/schemas/xmls/qdc/2003/04/02/dc.xsd"/>
-    <xsd:import namespace="http://purl.org/dc/terms/" schemaLocation="http://dublincore.org/schemas/xmls/qdc/2003/04/02/dcterms.xsd"/>
-    <xsd:element name="coreProperties" type="CT_coreProperties"/>
-    <xsd:complexType name="CT_coreProperties">
-      <xsd:all>
-        <xsd:element ref="dc:creator" minOccurs="0" maxOccurs="1"/>
-        <xsd:element ref="dcterms:created" minOccurs="0" maxOccurs="1"/>
-        <xsd:element ref="dc:identifier" minOccurs="0" maxOccurs="1"/>
-        <xsd:element name="contentType" minOccurs="0" maxOccurs="1" type="xsd:string" ma:index="0" ma:displayName="Content Type"/>
-        <xsd:element ref="dc:title" minOccurs="0" maxOccurs="1" ma:index="4" ma:displayName="Title"/>
-        <xsd:element ref="dc:subject" minOccurs="0" maxOccurs="1"/>
-        <xsd:element ref="dc:description" minOccurs="0" maxOccurs="1"/>
-        <xsd:element name="keywords" minOccurs="0" maxOccurs="1" type="xsd:string"/>
-        <xsd:element ref="dc:language" minOccurs="0" maxOccurs="1"/>
-        <xsd:element name="category" minOccurs="0" maxOccurs="1" type="xsd:string"/>
-        <xsd:element name="version" minOccurs="0" maxOccurs="1" type="xsd:string"/>
-        <xsd:element name="revision" minOccurs="0" maxOccurs="1" type="xsd:string">
-          <xsd:annotation>
-            <xsd:documentation>
-                        This value indicates the number of saves or revisions. The application is responsible for updating this value after each revision.
-                    </xsd:documentation>
-          </xsd:annotation>
-        </xsd:element>
-        <xsd:element name="lastModifiedBy" minOccurs="0" maxOccurs="1" type="xsd:string"/>
-        <xsd:element ref="dcterms:modified" minOccurs="0" maxOccurs="1"/>
-        <xsd:element name="contentStatus" minOccurs="0" maxOccurs="1" type="xsd:string"/>
-      </xsd:all>
-    </xsd:complexType>
-  </xsd:schema>
-  <xs:schema xmlns:pc="http://schemas.microsoft.com/office/infopath/2007/PartnerControls" xmlns:xs="http://www.w3.org/2001/XMLSchema" targetNamespace="http://schemas.microsoft.com/office/infopath/2007/PartnerControls" elementFormDefault="qualified" attributeFormDefault="unqualified">
-    <xs:element name="Person">
-      <xs:complexType>
-        <xs:sequence>
-          <xs:element ref="pc:DisplayName" minOccurs="0"/>
-          <xs:element ref="pc:AccountId" minOccurs="0"/>
-          <xs:element ref="pc:AccountType" minOccurs="0"/>
-        </xs:sequence>
-      </xs:complexType>
-    </xs:element>
-    <xs:element name="DisplayName" type="xs:string"/>
-    <xs:element name="AccountId" type="xs:string"/>
-    <xs:element name="AccountType" type="xs:string"/>
-    <xs:element name="BDCAssociatedEntity">
-      <xs:complexType>
-        <xs:sequence>
-          <xs:element ref="pc:BDCEntity" minOccurs="0" maxOccurs="unbounded"/>
-        </xs:sequence>
-        <xs:attribute ref="pc:EntityNamespace"/>
-        <xs:attribute ref="pc:EntityName"/>
-        <xs:attribute ref="pc:SystemInstanceName"/>
-        <xs:attribute ref="pc:AssociationName"/>
-      </xs:complexType>
-    </xs:element>
-    <xs:attribute name="EntityNamespace" type="xs:string"/>
-    <xs:attribute name="EntityName" type="xs:string"/>
-    <xs:attribute name="SystemInstanceName" type="xs:string"/>
-    <xs:attribute name="AssociationName" type="xs:string"/>
-    <xs:element name="BDCEntity">
-      <xs:complexType>
-        <xs:sequence>
-          <xs:element ref="pc:EntityDisplayName" minOccurs="0"/>
-          <xs:element ref="pc:EntityInstanceReference" minOccurs="0"/>
-          <xs:element ref="pc:EntityId1" minOccurs="0"/>
-          <xs:element ref="pc:EntityId2" minOccurs="0"/>
-          <xs:element ref="pc:EntityId3" minOccurs="0"/>
-          <xs:element ref="pc:EntityId4" minOccurs="0"/>
-          <xs:element ref="pc:EntityId5" minOccurs="0"/>
-        </xs:sequence>
-      </xs:complexType>
-    </xs:element>
-    <xs:element name="EntityDisplayName" type="xs:string"/>
-    <xs:element name="EntityInstanceReference" type="xs:string"/>
-    <xs:element name="EntityId1" type="xs:string"/>
-    <xs:element name="EntityId2" type="xs:string"/>
-    <xs:element name="EntityId3" type="xs:string"/>
-    <xs:element name="EntityId4" type="xs:string"/>
-    <xs:element name="EntityId5" type="xs:string"/>
-    <xs:element name="Terms">
-      <xs:complexType>
-        <xs:sequence>
-          <xs:element ref="pc:TermInfo" minOccurs="0" maxOccurs="unbounded"/>
-        </xs:sequence>
-      </xs:complexType>
-    </xs:element>
-    <xs:element name="TermInfo">
-      <xs:complexType>
-        <xs:sequence>
-          <xs:element ref="pc:TermName" minOccurs="0"/>
-          <xs:element ref="pc:TermId" minOccurs="0"/>
-        </xs:sequence>
-      </xs:complexType>
-    </xs:element>
-    <xs:element name="TermName" type="xs:string"/>
-    <xs:element name="TermId" type="xs:string"/>
-  </xs:schema>
-</ct:contentTypeSchema>
+<file path=customXml/item3.xml>��< ? x m l   v e r s i o n = " 1 . 0 " ? > < p : p r o p e r t i e s   x m l n s : p = " h t t p : / / s c h e m a s . m i c r o s o f t . c o m / o f f i c e / 2 0 0 6 / m e t a d a t a / p r o p e r t i e s "   x m l n s : x s i = " h t t p : / / w w w . w 3 . o r g / 2 0 0 1 / X M L S c h e m a - i n s t a n c e "   x m l n s : p c = " h t t p : / / s c h e m a s . m i c r o s o f t . c o m / o f f i c e / i n f o p a t h / 2 0 0 7 / P a r t n e r C o n t r o l s " > < d o c u m e n t M a n a g e m e n t > < D o c u m e n t _ x 0 0 2 0 _ P u r p o s e   x m l n s = " f 5 7 7 a c b f - 5 b 0 b - 4 b 4 f - 9 9 4 8 - 2 6 8 e 9 7 f 8 d 3 a 4 " > I n f o r m a t i o n a l < / D o c u m e n t _ x 0 0 2 0 _ P u r p o s e > < I n i t i a t i v e s   x m l n s = " f 5 7 7 a c b f - 5 b 0 b - 4 b 4 f - 9 9 4 8 - 2 6 8 e 9 7 f 8 d 3 a 4 " / > < / d o c u m e n t M a n a g e m e n t > < / p : p r o p e r t i e s > 
 </file>
 
 <file path=customXml/itemProps1.xml><?xml version="1.0" encoding="utf-8"?>
-<ds:datastoreItem xmlns:ds="http://schemas.openxmlformats.org/officeDocument/2006/customXml" ds:itemID="{617AB1FA-2F28-4684-9230-02ACEB6C0B0A}">
+<ds:datastoreItem xmlns:ds="http://schemas.openxmlformats.org/officeDocument/2006/customXml" ds:itemID="{1DD29C39-1C4E-4B06-A1F4-2510F2DACF6E}">
   <ds:schemaRefs/>
 </ds:datastoreItem>
 </file>
@@ -8666,7 +8891,7 @@
 </file>
 
 <file path=customXml/itemProps3.xml><?xml version="1.0" encoding="utf-8"?>
-<ds:datastoreItem xmlns:ds="http://schemas.openxmlformats.org/officeDocument/2006/customXml" ds:itemID="{1DD29C39-1C4E-4B06-A1F4-2510F2DACF6E}">
+<ds:datastoreItem xmlns:ds="http://schemas.openxmlformats.org/officeDocument/2006/customXml" ds:itemID="{617AB1FA-2F28-4684-9230-02ACEB6C0B0A}">
   <ds:schemaRefs/>
 </ds:datastoreItem>
 </file>
</xml_diff>

<commit_message>
Updated done in presentation on slides 14 , 14 and 16
</commit_message>
<xml_diff>
--- a/Power Point Presentations/Presentation Week 3 Group D.pptx
+++ b/Power Point Presentations/Presentation Week 3 Group D.pptx
@@ -2,25 +2,27 @@
 <file path=ppt/presentation.xml><?xml version="1.0" encoding="utf-8"?>
 <p:presentation xmlns:a="http://schemas.openxmlformats.org/drawingml/2006/main" xmlns:r="http://schemas.openxmlformats.org/officeDocument/2006/relationships" xmlns:p="http://schemas.openxmlformats.org/presentationml/2006/main" autoCompressPictures="0">
   <p:sldMasterIdLst>
-    <p:sldMasterId id="2147483648" r:id="rId1"/>
+    <p:sldMasterId id="2147483648" r:id="rId4"/>
   </p:sldMasterIdLst>
   <p:sldIdLst>
-    <p:sldId id="256" r:id="rId3"/>
-    <p:sldId id="268" r:id="rId4"/>
-    <p:sldId id="261" r:id="rId5"/>
-    <p:sldId id="257" r:id="rId6"/>
-    <p:sldId id="265" r:id="rId7"/>
-    <p:sldId id="266" r:id="rId8"/>
-    <p:sldId id="267" r:id="rId9"/>
-    <p:sldId id="258" r:id="rId10"/>
-    <p:sldId id="259" r:id="rId11"/>
-    <p:sldId id="260" r:id="rId12"/>
-    <p:sldId id="262" r:id="rId13"/>
-    <p:sldId id="264" r:id="rId14"/>
-    <p:sldId id="263" r:id="rId15"/>
-    <p:sldId id="269" r:id="rId16"/>
-    <p:sldId id="270" r:id="rId17"/>
-    <p:sldId id="271" r:id="rId18"/>
+    <p:sldId id="256" r:id="rId5"/>
+    <p:sldId id="268" r:id="rId6"/>
+    <p:sldId id="261" r:id="rId7"/>
+    <p:sldId id="257" r:id="rId8"/>
+    <p:sldId id="265" r:id="rId9"/>
+    <p:sldId id="266" r:id="rId10"/>
+    <p:sldId id="267" r:id="rId11"/>
+    <p:sldId id="258" r:id="rId12"/>
+    <p:sldId id="259" r:id="rId13"/>
+    <p:sldId id="260" r:id="rId14"/>
+    <p:sldId id="262" r:id="rId15"/>
+    <p:sldId id="264" r:id="rId16"/>
+    <p:sldId id="263" r:id="rId17"/>
+    <p:sldId id="272" r:id="rId18"/>
+    <p:sldId id="273" r:id="rId19"/>
+    <p:sldId id="274" r:id="rId20"/>
+    <p:sldId id="270" r:id="rId21"/>
+    <p:sldId id="271" r:id="rId22"/>
   </p:sldIdLst>
   <p:sldSz cx="12192000" cy="6858000"/>
   <p:notesSz cx="6858000" cy="9144000"/>
@@ -119,11 +121,16 @@
       </a:defRPr>
     </a:lvl9pPr>
   </p:defaultTextStyle>
+  <p:extLst>
+    <p:ext uri="{EFAFB233-063F-42B5-8137-9DF3F51BA10A}">
+      <p15:sldGuideLst xmlns:p15="http://schemas.microsoft.com/office/powerpoint/2012/main"/>
+    </p:ext>
+  </p:extLst>
 </p:presentation>
 </file>
 
 <file path=ppt/slideLayouts/slideLayout1.xml><?xml version="1.0" encoding="utf-8"?>
-<p:sldLayout xmlns:a="http://schemas.openxmlformats.org/drawingml/2006/main" xmlns:r="http://schemas.openxmlformats.org/officeDocument/2006/relationships" xmlns:p="http://schemas.openxmlformats.org/presentationml/2006/main" type="title" preserve="1" showMasterSp="0">
+<p:sldLayout xmlns:a="http://schemas.openxmlformats.org/drawingml/2006/main" xmlns:r="http://schemas.openxmlformats.org/officeDocument/2006/relationships" xmlns:p="http://schemas.openxmlformats.org/presentationml/2006/main" showMasterSp="0" type="title" preserve="1">
   <p:cSld name="Title Slide">
     <p:spTree>
       <p:nvGrpSpPr>
@@ -844,6 +851,7 @@
           <a:p>
             <a:fld id="{37A2730A-859E-B540-ADF3-E97069AD1FDB}" type="datetimeFigureOut">
               <a:rPr lang="en-US" smtClean="0"/>
+              <a:t>02-Feb-24</a:t>
             </a:fld>
             <a:endParaRPr lang="en-US"/>
           </a:p>
@@ -885,6 +893,7 @@
           <a:p>
             <a:fld id="{8E05DC9C-C50D-D242-B083-59CEE07163F1}" type="slidenum">
               <a:rPr lang="en-US" smtClean="0"/>
+              <a:t>‹#›</a:t>
             </a:fld>
             <a:endParaRPr lang="en-US"/>
           </a:p>
@@ -1068,7 +1077,6 @@
               <a:rPr lang="en-US"/>
               <a:t>Click to edit Master text styles</a:t>
             </a:r>
-            <a:endParaRPr lang="en-US"/>
           </a:p>
         </p:txBody>
       </p:sp>
@@ -1089,6 +1097,7 @@
           <a:p>
             <a:fld id="{37A2730A-859E-B540-ADF3-E97069AD1FDB}" type="datetimeFigureOut">
               <a:rPr lang="en-US" smtClean="0"/>
+              <a:t>02-Feb-24</a:t>
             </a:fld>
             <a:endParaRPr lang="en-US"/>
           </a:p>
@@ -1130,6 +1139,7 @@
           <a:p>
             <a:fld id="{8E05DC9C-C50D-D242-B083-59CEE07163F1}" type="slidenum">
               <a:rPr lang="en-US" smtClean="0"/>
+              <a:t>‹#›</a:t>
             </a:fld>
             <a:endParaRPr lang="en-US"/>
           </a:p>
@@ -1254,7 +1264,6 @@
               <a:rPr lang="en-US"/>
               <a:t>Click to edit Master text styles</a:t>
             </a:r>
-            <a:endParaRPr lang="en-US"/>
           </a:p>
         </p:txBody>
       </p:sp>
@@ -1377,7 +1386,6 @@
               <a:rPr lang="en-US"/>
               <a:t>Click to edit Master text styles</a:t>
             </a:r>
-            <a:endParaRPr lang="en-US"/>
           </a:p>
         </p:txBody>
       </p:sp>
@@ -1398,6 +1406,7 @@
           <a:p>
             <a:fld id="{37A2730A-859E-B540-ADF3-E97069AD1FDB}" type="datetimeFigureOut">
               <a:rPr lang="en-US" smtClean="0"/>
+              <a:t>02-Feb-24</a:t>
             </a:fld>
             <a:endParaRPr lang="en-US"/>
           </a:p>
@@ -1439,6 +1448,7 @@
           <a:p>
             <a:fld id="{8E05DC9C-C50D-D242-B083-59CEE07163F1}" type="slidenum">
               <a:rPr lang="en-US" smtClean="0"/>
+              <a:t>‹#›</a:t>
             </a:fld>
             <a:endParaRPr lang="en-US"/>
           </a:p>
@@ -1482,19 +1492,6 @@
               </a:rPr>
               <a:t>“</a:t>
             </a:r>
-            <a:endParaRPr lang="en-US" sz="8000" baseline="0" dirty="0">
-              <a:ln w="3175" cmpd="sng">
-                <a:noFill/>
-              </a:ln>
-              <a:solidFill>
-                <a:schemeClr val="accent1">
-                  <a:lumMod val="60000"/>
-                  <a:lumOff val="40000"/>
-                </a:schemeClr>
-              </a:solidFill>
-              <a:effectLst/>
-              <a:latin typeface="Arial" panose="020B0604020202020204"/>
-            </a:endParaRPr>
           </a:p>
         </p:txBody>
       </p:sp>
@@ -1725,7 +1722,6 @@
               <a:rPr lang="en-US"/>
               <a:t>Click to edit Master text styles</a:t>
             </a:r>
-            <a:endParaRPr lang="en-US"/>
           </a:p>
         </p:txBody>
       </p:sp>
@@ -1746,6 +1742,7 @@
           <a:p>
             <a:fld id="{37A2730A-859E-B540-ADF3-E97069AD1FDB}" type="datetimeFigureOut">
               <a:rPr lang="en-US" smtClean="0"/>
+              <a:t>02-Feb-24</a:t>
             </a:fld>
             <a:endParaRPr lang="en-US"/>
           </a:p>
@@ -1787,6 +1784,7 @@
           <a:p>
             <a:fld id="{8E05DC9C-C50D-D242-B083-59CEE07163F1}" type="slidenum">
               <a:rPr lang="en-US" smtClean="0"/>
+              <a:t>‹#›</a:t>
             </a:fld>
             <a:endParaRPr lang="en-US"/>
           </a:p>
@@ -1911,7 +1909,6 @@
               <a:rPr lang="en-US"/>
               <a:t>Click to edit Master text styles</a:t>
             </a:r>
-            <a:endParaRPr lang="en-US"/>
           </a:p>
         </p:txBody>
       </p:sp>
@@ -2034,7 +2031,6 @@
               <a:rPr lang="en-US"/>
               <a:t>Click to edit Master text styles</a:t>
             </a:r>
-            <a:endParaRPr lang="en-US"/>
           </a:p>
         </p:txBody>
       </p:sp>
@@ -2055,6 +2051,7 @@
           <a:p>
             <a:fld id="{37A2730A-859E-B540-ADF3-E97069AD1FDB}" type="datetimeFigureOut">
               <a:rPr lang="en-US" smtClean="0"/>
+              <a:t>02-Feb-24</a:t>
             </a:fld>
             <a:endParaRPr lang="en-US"/>
           </a:p>
@@ -2096,6 +2093,7 @@
           <a:p>
             <a:fld id="{8E05DC9C-C50D-D242-B083-59CEE07163F1}" type="slidenum">
               <a:rPr lang="en-US" smtClean="0"/>
+              <a:t>‹#›</a:t>
             </a:fld>
             <a:endParaRPr lang="en-US"/>
           </a:p>
@@ -2139,19 +2137,6 @@
               </a:rPr>
               <a:t>“</a:t>
             </a:r>
-            <a:endParaRPr lang="en-US" sz="8000" baseline="0" dirty="0">
-              <a:ln w="3175" cmpd="sng">
-                <a:noFill/>
-              </a:ln>
-              <a:solidFill>
-                <a:schemeClr val="accent1">
-                  <a:lumMod val="60000"/>
-                  <a:lumOff val="40000"/>
-                </a:schemeClr>
-              </a:solidFill>
-              <a:effectLst/>
-              <a:latin typeface="Arial" panose="020B0604020202020204"/>
-            </a:endParaRPr>
           </a:p>
         </p:txBody>
       </p:sp>
@@ -2193,19 +2178,6 @@
               </a:rPr>
               <a:t>”</a:t>
             </a:r>
-            <a:endParaRPr lang="en-US" sz="8000" baseline="0" dirty="0">
-              <a:ln w="3175" cmpd="sng">
-                <a:noFill/>
-              </a:ln>
-              <a:solidFill>
-                <a:schemeClr val="accent1">
-                  <a:lumMod val="60000"/>
-                  <a:lumOff val="40000"/>
-                </a:schemeClr>
-              </a:solidFill>
-              <a:effectLst/>
-              <a:latin typeface="Arial" panose="020B0604020202020204"/>
-            </a:endParaRPr>
           </a:p>
         </p:txBody>
       </p:sp>
@@ -2325,7 +2297,6 @@
               <a:rPr lang="en-US"/>
               <a:t>Click to edit Master text styles</a:t>
             </a:r>
-            <a:endParaRPr lang="en-US"/>
           </a:p>
         </p:txBody>
       </p:sp>
@@ -2448,7 +2419,6 @@
               <a:rPr lang="en-US"/>
               <a:t>Click to edit Master text styles</a:t>
             </a:r>
-            <a:endParaRPr lang="en-US"/>
           </a:p>
         </p:txBody>
       </p:sp>
@@ -2469,6 +2439,7 @@
           <a:p>
             <a:fld id="{37A2730A-859E-B540-ADF3-E97069AD1FDB}" type="datetimeFigureOut">
               <a:rPr lang="en-US" smtClean="0"/>
+              <a:t>02-Feb-24</a:t>
             </a:fld>
             <a:endParaRPr lang="en-US"/>
           </a:p>
@@ -2510,6 +2481,7 @@
           <a:p>
             <a:fld id="{8E05DC9C-C50D-D242-B083-59CEE07163F1}" type="slidenum">
               <a:rPr lang="en-US" smtClean="0"/>
+              <a:t>‹#›</a:t>
             </a:fld>
             <a:endParaRPr lang="en-US"/>
           </a:p>
@@ -2583,7 +2555,6 @@
               <a:rPr lang="en-US"/>
               <a:t>Click to edit Master text styles</a:t>
             </a:r>
-            <a:endParaRPr lang="en-US"/>
           </a:p>
           <a:p>
             <a:pPr lvl="1"/>
@@ -2591,7 +2562,6 @@
               <a:rPr lang="en-US"/>
               <a:t>Second level</a:t>
             </a:r>
-            <a:endParaRPr lang="en-US"/>
           </a:p>
           <a:p>
             <a:pPr lvl="2"/>
@@ -2599,7 +2569,6 @@
               <a:rPr lang="en-US"/>
               <a:t>Third level</a:t>
             </a:r>
-            <a:endParaRPr lang="en-US"/>
           </a:p>
           <a:p>
             <a:pPr lvl="3"/>
@@ -2607,7 +2576,6 @@
               <a:rPr lang="en-US"/>
               <a:t>Fourth level</a:t>
             </a:r>
-            <a:endParaRPr lang="en-US"/>
           </a:p>
           <a:p>
             <a:pPr lvl="4"/>
@@ -2636,6 +2604,7 @@
           <a:p>
             <a:fld id="{37A2730A-859E-B540-ADF3-E97069AD1FDB}" type="datetimeFigureOut">
               <a:rPr lang="en-US" smtClean="0"/>
+              <a:t>02-Feb-24</a:t>
             </a:fld>
             <a:endParaRPr lang="en-US"/>
           </a:p>
@@ -2677,6 +2646,7 @@
           <a:p>
             <a:fld id="{8E05DC9C-C50D-D242-B083-59CEE07163F1}" type="slidenum">
               <a:rPr lang="en-US" smtClean="0"/>
+              <a:t>‹#›</a:t>
             </a:fld>
             <a:endParaRPr lang="en-US"/>
           </a:p>
@@ -2760,7 +2730,6 @@
               <a:rPr lang="en-US"/>
               <a:t>Click to edit Master text styles</a:t>
             </a:r>
-            <a:endParaRPr lang="en-US"/>
           </a:p>
           <a:p>
             <a:pPr lvl="1"/>
@@ -2768,7 +2737,6 @@
               <a:rPr lang="en-US"/>
               <a:t>Second level</a:t>
             </a:r>
-            <a:endParaRPr lang="en-US"/>
           </a:p>
           <a:p>
             <a:pPr lvl="2"/>
@@ -2776,7 +2744,6 @@
               <a:rPr lang="en-US"/>
               <a:t>Third level</a:t>
             </a:r>
-            <a:endParaRPr lang="en-US"/>
           </a:p>
           <a:p>
             <a:pPr lvl="3"/>
@@ -2784,7 +2751,6 @@
               <a:rPr lang="en-US"/>
               <a:t>Fourth level</a:t>
             </a:r>
-            <a:endParaRPr lang="en-US"/>
           </a:p>
           <a:p>
             <a:pPr lvl="4"/>
@@ -2813,6 +2779,7 @@
           <a:p>
             <a:fld id="{37A2730A-859E-B540-ADF3-E97069AD1FDB}" type="datetimeFigureOut">
               <a:rPr lang="en-US" smtClean="0"/>
+              <a:t>02-Feb-24</a:t>
             </a:fld>
             <a:endParaRPr lang="en-US"/>
           </a:p>
@@ -2854,6 +2821,7 @@
           <a:p>
             <a:fld id="{8E05DC9C-C50D-D242-B083-59CEE07163F1}" type="slidenum">
               <a:rPr lang="en-US" smtClean="0"/>
+              <a:t>‹#›</a:t>
             </a:fld>
             <a:endParaRPr lang="en-US"/>
           </a:p>
@@ -2933,7 +2901,6 @@
               <a:rPr lang="en-US"/>
               <a:t>Click to edit Master text styles</a:t>
             </a:r>
-            <a:endParaRPr lang="en-US"/>
           </a:p>
           <a:p>
             <a:pPr lvl="1"/>
@@ -2941,7 +2908,6 @@
               <a:rPr lang="en-US"/>
               <a:t>Second level</a:t>
             </a:r>
-            <a:endParaRPr lang="en-US"/>
           </a:p>
           <a:p>
             <a:pPr lvl="2"/>
@@ -2949,7 +2915,6 @@
               <a:rPr lang="en-US"/>
               <a:t>Third level</a:t>
             </a:r>
-            <a:endParaRPr lang="en-US"/>
           </a:p>
           <a:p>
             <a:pPr lvl="3"/>
@@ -2957,7 +2922,6 @@
               <a:rPr lang="en-US"/>
               <a:t>Fourth level</a:t>
             </a:r>
-            <a:endParaRPr lang="en-US"/>
           </a:p>
           <a:p>
             <a:pPr lvl="4"/>
@@ -2986,6 +2950,7 @@
           <a:p>
             <a:fld id="{37A2730A-859E-B540-ADF3-E97069AD1FDB}" type="datetimeFigureOut">
               <a:rPr lang="en-US" smtClean="0"/>
+              <a:t>02-Feb-24</a:t>
             </a:fld>
             <a:endParaRPr lang="en-US"/>
           </a:p>
@@ -3027,6 +2992,7 @@
           <a:p>
             <a:fld id="{8E05DC9C-C50D-D242-B083-59CEE07163F1}" type="slidenum">
               <a:rPr lang="en-US" smtClean="0"/>
+              <a:t>‹#›</a:t>
             </a:fld>
             <a:endParaRPr lang="en-US"/>
           </a:p>
@@ -3206,7 +3172,6 @@
               <a:rPr lang="en-US"/>
               <a:t>Click to edit Master text styles</a:t>
             </a:r>
-            <a:endParaRPr lang="en-US"/>
           </a:p>
         </p:txBody>
       </p:sp>
@@ -3227,6 +3192,7 @@
           <a:p>
             <a:fld id="{37A2730A-859E-B540-ADF3-E97069AD1FDB}" type="datetimeFigureOut">
               <a:rPr lang="en-US" smtClean="0"/>
+              <a:t>02-Feb-24</a:t>
             </a:fld>
             <a:endParaRPr lang="en-US"/>
           </a:p>
@@ -3268,6 +3234,7 @@
           <a:p>
             <a:fld id="{8E05DC9C-C50D-D242-B083-59CEE07163F1}" type="slidenum">
               <a:rPr lang="en-US" smtClean="0"/>
+              <a:t>‹#›</a:t>
             </a:fld>
             <a:endParaRPr lang="en-US"/>
           </a:p>
@@ -3346,7 +3313,6 @@
               <a:rPr lang="en-US"/>
               <a:t>Click to edit Master text styles</a:t>
             </a:r>
-            <a:endParaRPr lang="en-US"/>
           </a:p>
           <a:p>
             <a:pPr lvl="1"/>
@@ -3354,7 +3320,6 @@
               <a:rPr lang="en-US"/>
               <a:t>Second level</a:t>
             </a:r>
-            <a:endParaRPr lang="en-US"/>
           </a:p>
           <a:p>
             <a:pPr lvl="2"/>
@@ -3362,7 +3327,6 @@
               <a:rPr lang="en-US"/>
               <a:t>Third level</a:t>
             </a:r>
-            <a:endParaRPr lang="en-US"/>
           </a:p>
           <a:p>
             <a:pPr lvl="3"/>
@@ -3370,7 +3334,6 @@
               <a:rPr lang="en-US"/>
               <a:t>Fourth level</a:t>
             </a:r>
-            <a:endParaRPr lang="en-US"/>
           </a:p>
           <a:p>
             <a:pPr lvl="4"/>
@@ -3407,7 +3370,6 @@
               <a:rPr lang="en-US"/>
               <a:t>Click to edit Master text styles</a:t>
             </a:r>
-            <a:endParaRPr lang="en-US"/>
           </a:p>
           <a:p>
             <a:pPr lvl="1"/>
@@ -3415,7 +3377,6 @@
               <a:rPr lang="en-US"/>
               <a:t>Second level</a:t>
             </a:r>
-            <a:endParaRPr lang="en-US"/>
           </a:p>
           <a:p>
             <a:pPr lvl="2"/>
@@ -3423,7 +3384,6 @@
               <a:rPr lang="en-US"/>
               <a:t>Third level</a:t>
             </a:r>
-            <a:endParaRPr lang="en-US"/>
           </a:p>
           <a:p>
             <a:pPr lvl="3"/>
@@ -3431,7 +3391,6 @@
               <a:rPr lang="en-US"/>
               <a:t>Fourth level</a:t>
             </a:r>
-            <a:endParaRPr lang="en-US"/>
           </a:p>
           <a:p>
             <a:pPr lvl="4"/>
@@ -3460,6 +3419,7 @@
           <a:p>
             <a:fld id="{37A2730A-859E-B540-ADF3-E97069AD1FDB}" type="datetimeFigureOut">
               <a:rPr lang="en-US" smtClean="0"/>
+              <a:t>02-Feb-24</a:t>
             </a:fld>
             <a:endParaRPr lang="en-US"/>
           </a:p>
@@ -3501,6 +3461,7 @@
           <a:p>
             <a:fld id="{8E05DC9C-C50D-D242-B083-59CEE07163F1}" type="slidenum">
               <a:rPr lang="en-US" smtClean="0"/>
+              <a:t>‹#›</a:t>
             </a:fld>
             <a:endParaRPr lang="en-US"/>
           </a:p>
@@ -3622,7 +3583,6 @@
               <a:rPr lang="en-US"/>
               <a:t>Click to edit Master text styles</a:t>
             </a:r>
-            <a:endParaRPr lang="en-US"/>
           </a:p>
         </p:txBody>
       </p:sp>
@@ -3653,7 +3613,6 @@
               <a:rPr lang="en-US"/>
               <a:t>Click to edit Master text styles</a:t>
             </a:r>
-            <a:endParaRPr lang="en-US"/>
           </a:p>
           <a:p>
             <a:pPr lvl="1"/>
@@ -3661,7 +3620,6 @@
               <a:rPr lang="en-US"/>
               <a:t>Second level</a:t>
             </a:r>
-            <a:endParaRPr lang="en-US"/>
           </a:p>
           <a:p>
             <a:pPr lvl="2"/>
@@ -3669,7 +3627,6 @@
               <a:rPr lang="en-US"/>
               <a:t>Third level</a:t>
             </a:r>
-            <a:endParaRPr lang="en-US"/>
           </a:p>
           <a:p>
             <a:pPr lvl="3"/>
@@ -3677,7 +3634,6 @@
               <a:rPr lang="en-US"/>
               <a:t>Fourth level</a:t>
             </a:r>
-            <a:endParaRPr lang="en-US"/>
           </a:p>
           <a:p>
             <a:pPr lvl="4"/>
@@ -3753,7 +3709,6 @@
               <a:rPr lang="en-US"/>
               <a:t>Click to edit Master text styles</a:t>
             </a:r>
-            <a:endParaRPr lang="en-US"/>
           </a:p>
         </p:txBody>
       </p:sp>
@@ -3784,7 +3739,6 @@
               <a:rPr lang="en-US"/>
               <a:t>Click to edit Master text styles</a:t>
             </a:r>
-            <a:endParaRPr lang="en-US"/>
           </a:p>
           <a:p>
             <a:pPr lvl="1"/>
@@ -3792,7 +3746,6 @@
               <a:rPr lang="en-US"/>
               <a:t>Second level</a:t>
             </a:r>
-            <a:endParaRPr lang="en-US"/>
           </a:p>
           <a:p>
             <a:pPr lvl="2"/>
@@ -3800,7 +3753,6 @@
               <a:rPr lang="en-US"/>
               <a:t>Third level</a:t>
             </a:r>
-            <a:endParaRPr lang="en-US"/>
           </a:p>
           <a:p>
             <a:pPr lvl="3"/>
@@ -3808,7 +3760,6 @@
               <a:rPr lang="en-US"/>
               <a:t>Fourth level</a:t>
             </a:r>
-            <a:endParaRPr lang="en-US"/>
           </a:p>
           <a:p>
             <a:pPr lvl="4"/>
@@ -3837,6 +3788,7 @@
           <a:p>
             <a:fld id="{37A2730A-859E-B540-ADF3-E97069AD1FDB}" type="datetimeFigureOut">
               <a:rPr lang="en-US" smtClean="0"/>
+              <a:t>02-Feb-24</a:t>
             </a:fld>
             <a:endParaRPr lang="en-US"/>
           </a:p>
@@ -3878,6 +3830,7 @@
           <a:p>
             <a:fld id="{8E05DC9C-C50D-D242-B083-59CEE07163F1}" type="slidenum">
               <a:rPr lang="en-US" smtClean="0"/>
+              <a:t>‹#›</a:t>
             </a:fld>
             <a:endParaRPr lang="en-US"/>
           </a:p>
@@ -3953,6 +3906,7 @@
           <a:p>
             <a:fld id="{37A2730A-859E-B540-ADF3-E97069AD1FDB}" type="datetimeFigureOut">
               <a:rPr lang="en-US" smtClean="0"/>
+              <a:t>02-Feb-24</a:t>
             </a:fld>
             <a:endParaRPr lang="en-US"/>
           </a:p>
@@ -3994,6 +3948,7 @@
           <a:p>
             <a:fld id="{8E05DC9C-C50D-D242-B083-59CEE07163F1}" type="slidenum">
               <a:rPr lang="en-US" smtClean="0"/>
+              <a:t>‹#›</a:t>
             </a:fld>
             <a:endParaRPr lang="en-US"/>
           </a:p>
@@ -4041,6 +3996,7 @@
           <a:p>
             <a:fld id="{37A2730A-859E-B540-ADF3-E97069AD1FDB}" type="datetimeFigureOut">
               <a:rPr lang="en-US" smtClean="0"/>
+              <a:t>02-Feb-24</a:t>
             </a:fld>
             <a:endParaRPr lang="en-US"/>
           </a:p>
@@ -4082,6 +4038,7 @@
           <a:p>
             <a:fld id="{8E05DC9C-C50D-D242-B083-59CEE07163F1}" type="slidenum">
               <a:rPr lang="en-US" smtClean="0"/>
+              <a:t>‹#›</a:t>
             </a:fld>
             <a:endParaRPr lang="en-US"/>
           </a:p>
@@ -4173,7 +4130,6 @@
               <a:rPr lang="en-US"/>
               <a:t>Click to edit Master text styles</a:t>
             </a:r>
-            <a:endParaRPr lang="en-US"/>
           </a:p>
           <a:p>
             <a:pPr lvl="1"/>
@@ -4181,7 +4137,6 @@
               <a:rPr lang="en-US"/>
               <a:t>Second level</a:t>
             </a:r>
-            <a:endParaRPr lang="en-US"/>
           </a:p>
           <a:p>
             <a:pPr lvl="2"/>
@@ -4189,7 +4144,6 @@
               <a:rPr lang="en-US"/>
               <a:t>Third level</a:t>
             </a:r>
-            <a:endParaRPr lang="en-US"/>
           </a:p>
           <a:p>
             <a:pPr lvl="3"/>
@@ -4197,7 +4151,6 @@
               <a:rPr lang="en-US"/>
               <a:t>Fourth level</a:t>
             </a:r>
-            <a:endParaRPr lang="en-US"/>
           </a:p>
           <a:p>
             <a:pPr lvl="4"/>
@@ -4273,7 +4226,6 @@
               <a:rPr lang="en-US"/>
               <a:t>Click to edit Master text styles</a:t>
             </a:r>
-            <a:endParaRPr lang="en-US"/>
           </a:p>
         </p:txBody>
       </p:sp>
@@ -4294,6 +4246,7 @@
           <a:p>
             <a:fld id="{37A2730A-859E-B540-ADF3-E97069AD1FDB}" type="datetimeFigureOut">
               <a:rPr lang="en-US" smtClean="0"/>
+              <a:t>02-Feb-24</a:t>
             </a:fld>
             <a:endParaRPr lang="en-US"/>
           </a:p>
@@ -4335,6 +4288,7 @@
           <a:p>
             <a:fld id="{8E05DC9C-C50D-D242-B083-59CEE07163F1}" type="slidenum">
               <a:rPr lang="en-US" smtClean="0"/>
+              <a:t>‹#›</a:t>
             </a:fld>
             <a:endParaRPr lang="en-US"/>
           </a:p>
@@ -4530,7 +4484,6 @@
               <a:rPr lang="en-US"/>
               <a:t>Click to edit Master text styles</a:t>
             </a:r>
-            <a:endParaRPr lang="en-US"/>
           </a:p>
         </p:txBody>
       </p:sp>
@@ -4551,6 +4504,7 @@
           <a:p>
             <a:fld id="{37A2730A-859E-B540-ADF3-E97069AD1FDB}" type="datetimeFigureOut">
               <a:rPr lang="en-US" smtClean="0"/>
+              <a:t>02-Feb-24</a:t>
             </a:fld>
             <a:endParaRPr lang="en-US"/>
           </a:p>
@@ -4592,6 +4546,7 @@
           <a:p>
             <a:fld id="{8E05DC9C-C50D-D242-B083-59CEE07163F1}" type="slidenum">
               <a:rPr lang="en-US" smtClean="0"/>
+              <a:t>‹#›</a:t>
             </a:fld>
             <a:endParaRPr lang="en-US"/>
           </a:p>
@@ -5220,7 +5175,6 @@
               <a:rPr lang="en-US"/>
               <a:t>Click to edit Master text styles</a:t>
             </a:r>
-            <a:endParaRPr lang="en-US"/>
           </a:p>
           <a:p>
             <a:pPr lvl="1"/>
@@ -5228,7 +5182,6 @@
               <a:rPr lang="en-US"/>
               <a:t>Second level</a:t>
             </a:r>
-            <a:endParaRPr lang="en-US"/>
           </a:p>
           <a:p>
             <a:pPr lvl="2"/>
@@ -5236,7 +5189,6 @@
               <a:rPr lang="en-US"/>
               <a:t>Third level</a:t>
             </a:r>
-            <a:endParaRPr lang="en-US"/>
           </a:p>
           <a:p>
             <a:pPr lvl="3"/>
@@ -5244,7 +5196,6 @@
               <a:rPr lang="en-US"/>
               <a:t>Fourth level</a:t>
             </a:r>
-            <a:endParaRPr lang="en-US"/>
           </a:p>
           <a:p>
             <a:pPr lvl="4"/>
@@ -5291,6 +5242,7 @@
           <a:p>
             <a:fld id="{37A2730A-859E-B540-ADF3-E97069AD1FDB}" type="datetimeFigureOut">
               <a:rPr lang="en-US" smtClean="0"/>
+              <a:t>02-Feb-24</a:t>
             </a:fld>
             <a:endParaRPr lang="en-US"/>
           </a:p>
@@ -5366,6 +5318,7 @@
           <a:p>
             <a:fld id="{8E05DC9C-C50D-D242-B083-59CEE07163F1}" type="slidenum">
               <a:rPr lang="en-US" smtClean="0"/>
+              <a:t>‹#›</a:t>
             </a:fld>
             <a:endParaRPr lang="en-US"/>
           </a:p>
@@ -5825,7 +5778,7 @@
           <p:nvPr/>
         </p:nvPicPr>
         <p:blipFill rotWithShape="1">
-          <a:blip r:embed="rId1"/>
+          <a:blip r:embed="rId2"/>
           <a:srcRect l="34682" r="21069"/>
           <a:stretch>
             <a:fillRect/>
@@ -5902,6 +5855,10 @@
             <a:br>
               <a:rPr lang="en-US" dirty="0"/>
             </a:br>
+            <a:r>
+              <a:rPr lang="en-US" dirty="0"/>
+              <a:t/>
+            </a:r>
             <a:br>
               <a:rPr lang="en-US" dirty="0"/>
             </a:br>
@@ -5918,11 +5875,11 @@
   <p:clrMapOvr>
     <a:masterClrMapping/>
   </p:clrMapOvr>
-  <mc:AlternateContent xmlns:mc="http://schemas.openxmlformats.org/markup-compatibility/2006">
-    <mc:Choice xmlns:p14="http://schemas.microsoft.com/office/powerpoint/2010/main" Requires="p14">
+  <mc:AlternateContent xmlns:mc="http://schemas.openxmlformats.org/markup-compatibility/2006" xmlns:p14="http://schemas.microsoft.com/office/powerpoint/2010/main">
+    <mc:Choice Requires="p14">
       <p:transition spd="slow" p14:dur="2000" advTm="3835"/>
     </mc:Choice>
-    <mc:Fallback>
+    <mc:Fallback xmlns="">
       <p:transition spd="slow" advTm="3835"/>
     </mc:Fallback>
   </mc:AlternateContent>
@@ -6083,7 +6040,6 @@
               <a:rPr lang="en-US" dirty="0"/>
               <a:t>We retrieved our data from Kaggle, which is a subsidiary from Google, and it’s an online community for engineers of all fields, that allows the users to find and access datasets used to build AI models.</a:t>
             </a:r>
-            <a:endParaRPr lang="en-US" dirty="0"/>
           </a:p>
           <a:p>
             <a:pPr marL="0" indent="0">
@@ -6207,11 +6163,6 @@
               </a:rPr>
               <a:t>It contains 9 columns</a:t>
             </a:r>
-            <a:endParaRPr lang="en-US" dirty="0">
-              <a:solidFill>
-                <a:srgbClr val="FF0000"/>
-              </a:solidFill>
-            </a:endParaRPr>
           </a:p>
           <a:p>
             <a:r>
@@ -6222,11 +6173,6 @@
               </a:rPr>
               <a:t>It contains 72946 registers or rows</a:t>
             </a:r>
-            <a:endParaRPr lang="en-US" dirty="0">
-              <a:solidFill>
-                <a:srgbClr val="FF0000"/>
-              </a:solidFill>
-            </a:endParaRPr>
           </a:p>
           <a:p>
             <a:r>
@@ -6237,11 +6183,6 @@
               </a:rPr>
               <a:t>It contains info for 56 different cryptos</a:t>
             </a:r>
-            <a:endParaRPr lang="en-US" dirty="0">
-              <a:solidFill>
-                <a:srgbClr val="FF0000"/>
-              </a:solidFill>
-            </a:endParaRPr>
           </a:p>
           <a:p>
             <a:r>
@@ -6252,11 +6193,6 @@
               </a:rPr>
               <a:t>The start and end date for our data is 2013-05-05 / 2022-10-23</a:t>
             </a:r>
-            <a:endParaRPr lang="en-US" dirty="0">
-              <a:solidFill>
-                <a:srgbClr val="FF0000"/>
-              </a:solidFill>
-            </a:endParaRPr>
           </a:p>
           <a:p>
             <a:r>
@@ -6283,11 +6219,6 @@
               </a:rPr>
               <a:t>value can highly be affected by external factor as well.</a:t>
             </a:r>
-            <a:endParaRPr lang="en-US" dirty="0">
-              <a:solidFill>
-                <a:srgbClr val="FF0000"/>
-              </a:solidFill>
-            </a:endParaRPr>
           </a:p>
           <a:p>
             <a:r>
@@ -6298,11 +6229,6 @@
               </a:rPr>
               <a:t>The columns that we would be using to train our model probably are: open, low, high, close, volume, crypto name, date</a:t>
             </a:r>
-            <a:endParaRPr lang="en-US" dirty="0">
-              <a:solidFill>
-                <a:srgbClr val="FF0000"/>
-              </a:solidFill>
-            </a:endParaRPr>
           </a:p>
         </p:txBody>
       </p:sp>
@@ -6460,14 +6386,12 @@
               <a:rPr lang="en-US" dirty="0"/>
               <a:t> notebook, pandas and python. </a:t>
             </a:r>
-            <a:endParaRPr lang="en-US" dirty="0"/>
           </a:p>
           <a:p>
             <a:r>
               <a:rPr lang="en-US" dirty="0"/>
               <a:t>By doing so we give each member of both teams the basic tools they need to access and start manipulating the data. </a:t>
             </a:r>
-            <a:endParaRPr lang="en-US" dirty="0"/>
           </a:p>
           <a:p>
             <a:endParaRPr lang="en-US" dirty="0"/>
@@ -6516,7 +6440,13 @@
       </p:grpSpPr>
       <p:sp>
         <p:nvSpPr>
-          <p:cNvPr id="2" name="Title 1"/>
+          <p:cNvPr id="2" name="Title 1">
+            <a:extLst>
+              <a:ext uri="{FF2B5EF4-FFF2-40B4-BE49-F238E27FC236}">
+                <a16:creationId xmlns:a16="http://schemas.microsoft.com/office/drawing/2014/main" id="{7A79DED7-1FB0-FF32-F611-ABB3E9B772ED}"/>
+              </a:ext>
+            </a:extLst>
+          </p:cNvPr>
           <p:cNvSpPr>
             <a:spLocks noGrp="1"/>
           </p:cNvSpPr>
@@ -6524,7 +6454,12 @@
             <p:ph type="title"/>
           </p:nvPr>
         </p:nvSpPr>
-        <p:spPr/>
+        <p:spPr>
+          <a:xfrm>
+            <a:off x="756464" y="196362"/>
+            <a:ext cx="8596668" cy="1320800"/>
+          </a:xfrm>
+        </p:spPr>
         <p:txBody>
           <a:bodyPr/>
           <a:lstStyle/>
@@ -6539,36 +6474,557 @@
       </p:sp>
       <p:sp>
         <p:nvSpPr>
-          <p:cNvPr id="3" name="Content Placeholder 2"/>
-          <p:cNvSpPr>
-            <a:spLocks noGrp="1"/>
+          <p:cNvPr id="4" name="Rectangle 1"/>
+          <p:cNvSpPr>
+            <a:spLocks noGrp="1" noChangeArrowheads="1"/>
           </p:cNvSpPr>
           <p:nvPr>
             <p:ph idx="1"/>
           </p:nvPr>
         </p:nvSpPr>
-        <p:spPr/>
-        <p:txBody>
-          <a:bodyPr/>
-          <a:lstStyle/>
-          <a:p>
-            <a:r>
-              <a:rPr lang="en-US" dirty="0">
-                <a:solidFill>
-                  <a:srgbClr val="FF0000"/>
+        <p:spPr bwMode="auto">
+          <a:xfrm>
+            <a:off x="457525" y="4241814"/>
+            <a:ext cx="9460197" cy="2247284"/>
+          </a:xfrm>
+          <a:prstGeom prst="rect">
+            <a:avLst/>
+          </a:prstGeom>
+          <a:noFill/>
+          <a:ln>
+            <a:noFill/>
+          </a:ln>
+          <a:effectLst/>
+          <a:extLst>
+            <a:ext uri="{909E8E84-426E-40DD-AFC4-6F175D3DCCD1}">
+              <a14:hiddenFill xmlns:a14="http://schemas.microsoft.com/office/drawing/2010/main">
+                <a:solidFill>
+                  <a:schemeClr val="accent1"/>
+                </a:solidFill>
+              </a14:hiddenFill>
+            </a:ext>
+            <a:ext uri="{91240B29-F687-4F45-9708-019B960494DF}">
+              <a14:hiddenLine xmlns:a14="http://schemas.microsoft.com/office/drawing/2010/main" w="9525">
+                <a:solidFill>
+                  <a:schemeClr val="tx1"/>
+                </a:solidFill>
+                <a:miter lim="800000"/>
+                <a:headEnd/>
+                <a:tailEnd/>
+              </a14:hiddenLine>
+            </a:ext>
+            <a:ext uri="{AF507438-7753-43E0-B8FC-AC1667EBCBE1}">
+              <a14:hiddenEffects xmlns:a14="http://schemas.microsoft.com/office/drawing/2010/main">
+                <a:effectLst>
+                  <a:outerShdw dist="35921" dir="2700000" algn="ctr" rotWithShape="0">
+                    <a:schemeClr val="bg2"/>
+                  </a:outerShdw>
+                </a:effectLst>
+              </a14:hiddenEffects>
+            </a:ext>
+          </a:extLst>
+        </p:spPr>
+        <p:txBody>
+          <a:bodyPr vert="horz" wrap="square" lIns="0" tIns="198375" rIns="0" bIns="198375" numCol="1" anchor="ctr" anchorCtr="0" compatLnSpc="1">
+            <a:prstTxWarp prst="textNoShape">
+              <a:avLst/>
+            </a:prstTxWarp>
+            <a:spAutoFit/>
+          </a:bodyPr>
+          <a:lstStyle/>
+          <a:p>
+            <a:pPr marL="0" lvl="0" indent="0" defTabSz="914400" eaLnBrk="0" fontAlgn="base" hangingPunct="0">
+              <a:spcBef>
+                <a:spcPct val="0"/>
+              </a:spcBef>
+              <a:spcAft>
+                <a:spcPct val="0"/>
+              </a:spcAft>
+              <a:buClrTx/>
+              <a:buSzTx/>
+              <a:buNone/>
+            </a:pPr>
+            <a:r>
+              <a:rPr lang="en-US" altLang="en-US" sz="1200" dirty="0">
+                <a:solidFill>
+                  <a:schemeClr val="tx1"/>
                 </a:solidFill>
               </a:rPr>
-              <a:t>Insert the code we are currently developing:</a:t>
-            </a:r>
-            <a:endParaRPr lang="de-DE" dirty="0">
+              <a:t>The provided code and explanations showcase the initial steps of data analysis using Python libraries. </a:t>
+            </a:r>
+            <a:endParaRPr lang="en-US" altLang="en-US" sz="1200" dirty="0" smtClean="0">
               <a:solidFill>
-                <a:srgbClr val="FF0000"/>
+                <a:schemeClr val="tx1"/>
               </a:solidFill>
             </a:endParaRPr>
           </a:p>
-        </p:txBody>
-      </p:sp>
+          <a:p>
+            <a:pPr marL="0" lvl="0" indent="0" defTabSz="914400" eaLnBrk="0" fontAlgn="base" hangingPunct="0">
+              <a:spcBef>
+                <a:spcPct val="0"/>
+              </a:spcBef>
+              <a:spcAft>
+                <a:spcPct val="0"/>
+              </a:spcAft>
+              <a:buClrTx/>
+              <a:buSzTx/>
+              <a:buNone/>
+            </a:pPr>
+            <a:r>
+              <a:rPr lang="en-US" altLang="en-US" sz="1200" dirty="0" smtClean="0">
+                <a:solidFill>
+                  <a:schemeClr val="tx1"/>
+                </a:solidFill>
+              </a:rPr>
+              <a:t>By </a:t>
+            </a:r>
+            <a:r>
+              <a:rPr lang="en-US" altLang="en-US" sz="1200" dirty="0">
+                <a:solidFill>
+                  <a:schemeClr val="tx1"/>
+                </a:solidFill>
+              </a:rPr>
+              <a:t>importing Pandas as `</a:t>
+            </a:r>
+            <a:r>
+              <a:rPr lang="en-US" altLang="en-US" sz="1200" dirty="0" err="1">
+                <a:solidFill>
+                  <a:schemeClr val="tx1"/>
+                </a:solidFill>
+              </a:rPr>
+              <a:t>pd</a:t>
+            </a:r>
+            <a:r>
+              <a:rPr lang="en-US" altLang="en-US" sz="1200" dirty="0">
+                <a:solidFill>
+                  <a:schemeClr val="tx1"/>
+                </a:solidFill>
+              </a:rPr>
+              <a:t>` and </a:t>
+            </a:r>
+            <a:r>
+              <a:rPr lang="en-US" altLang="en-US" sz="1200" dirty="0" err="1">
+                <a:solidFill>
+                  <a:schemeClr val="tx1"/>
+                </a:solidFill>
+              </a:rPr>
+              <a:t>Matplotlib's</a:t>
+            </a:r>
+            <a:r>
+              <a:rPr lang="en-US" altLang="en-US" sz="1200" dirty="0">
+                <a:solidFill>
+                  <a:schemeClr val="tx1"/>
+                </a:solidFill>
+              </a:rPr>
+              <a:t> </a:t>
+            </a:r>
+            <a:r>
+              <a:rPr lang="en-US" altLang="en-US" sz="1200" dirty="0" err="1">
+                <a:solidFill>
+                  <a:schemeClr val="tx1"/>
+                </a:solidFill>
+              </a:rPr>
+              <a:t>pyplot</a:t>
+            </a:r>
+            <a:r>
+              <a:rPr lang="en-US" altLang="en-US" sz="1200" dirty="0">
+                <a:solidFill>
+                  <a:schemeClr val="tx1"/>
+                </a:solidFill>
+              </a:rPr>
+              <a:t> as `</a:t>
+            </a:r>
+            <a:r>
+              <a:rPr lang="en-US" altLang="en-US" sz="1200" dirty="0" err="1">
+                <a:solidFill>
+                  <a:schemeClr val="tx1"/>
+                </a:solidFill>
+              </a:rPr>
+              <a:t>plt</a:t>
+            </a:r>
+            <a:r>
+              <a:rPr lang="en-US" altLang="en-US" sz="1200" dirty="0">
+                <a:solidFill>
+                  <a:schemeClr val="tx1"/>
+                </a:solidFill>
+              </a:rPr>
+              <a:t>`, the script establishes a foundation for data manipulation and visualization. The subsequent use of `</a:t>
+            </a:r>
+            <a:r>
+              <a:rPr lang="en-US" altLang="en-US" sz="1200" dirty="0" err="1">
+                <a:solidFill>
+                  <a:schemeClr val="tx1"/>
+                </a:solidFill>
+              </a:rPr>
+              <a:t>pd.read_csv</a:t>
+            </a:r>
+            <a:r>
+              <a:rPr lang="en-US" altLang="en-US" sz="1200" dirty="0">
+                <a:solidFill>
+                  <a:schemeClr val="tx1"/>
+                </a:solidFill>
+              </a:rPr>
+              <a:t>('dataset.csv')` loads tabular data from a CSV file named 'dataset.csv' into a </a:t>
+            </a:r>
+            <a:r>
+              <a:rPr lang="en-US" altLang="en-US" sz="1200" dirty="0" err="1">
+                <a:solidFill>
+                  <a:schemeClr val="tx1"/>
+                </a:solidFill>
+              </a:rPr>
+              <a:t>DataFrame</a:t>
+            </a:r>
+            <a:r>
+              <a:rPr lang="en-US" altLang="en-US" sz="1200" dirty="0">
+                <a:solidFill>
+                  <a:schemeClr val="tx1"/>
+                </a:solidFill>
+              </a:rPr>
+              <a:t> named `</a:t>
+            </a:r>
+            <a:r>
+              <a:rPr lang="en-US" altLang="en-US" sz="1200" dirty="0" err="1">
+                <a:solidFill>
+                  <a:schemeClr val="tx1"/>
+                </a:solidFill>
+              </a:rPr>
+              <a:t>df_raw</a:t>
+            </a:r>
+            <a:r>
+              <a:rPr lang="en-US" altLang="en-US" sz="1200" dirty="0" smtClean="0">
+                <a:solidFill>
+                  <a:schemeClr val="tx1"/>
+                </a:solidFill>
+              </a:rPr>
+              <a:t>`.</a:t>
+            </a:r>
+          </a:p>
+          <a:p>
+            <a:pPr marL="0" lvl="0" indent="0" defTabSz="914400" eaLnBrk="0" fontAlgn="base" hangingPunct="0">
+              <a:spcBef>
+                <a:spcPct val="0"/>
+              </a:spcBef>
+              <a:spcAft>
+                <a:spcPct val="0"/>
+              </a:spcAft>
+              <a:buClrTx/>
+              <a:buSzTx/>
+              <a:buNone/>
+            </a:pPr>
+            <a:r>
+              <a:rPr lang="en-US" altLang="en-US" sz="1200" dirty="0" smtClean="0">
+                <a:solidFill>
+                  <a:schemeClr val="tx1"/>
+                </a:solidFill>
+              </a:rPr>
+              <a:t> </a:t>
+            </a:r>
+            <a:r>
+              <a:rPr lang="en-US" altLang="en-US" sz="1200" dirty="0">
+                <a:solidFill>
+                  <a:schemeClr val="tx1"/>
+                </a:solidFill>
+              </a:rPr>
+              <a:t>This </a:t>
+            </a:r>
+            <a:r>
+              <a:rPr lang="en-US" altLang="en-US" sz="1200" dirty="0" err="1">
+                <a:solidFill>
+                  <a:schemeClr val="tx1"/>
+                </a:solidFill>
+              </a:rPr>
+              <a:t>DataFrame</a:t>
+            </a:r>
+            <a:r>
+              <a:rPr lang="en-US" altLang="en-US" sz="1200" dirty="0">
+                <a:solidFill>
+                  <a:schemeClr val="tx1"/>
+                </a:solidFill>
+              </a:rPr>
+              <a:t> acts as a structured table, making it easy to work with rows and columns of data. The command `</a:t>
+            </a:r>
+            <a:r>
+              <a:rPr lang="en-US" altLang="en-US" sz="1200" dirty="0" err="1">
+                <a:solidFill>
+                  <a:schemeClr val="tx1"/>
+                </a:solidFill>
+              </a:rPr>
+              <a:t>df_raw.head</a:t>
+            </a:r>
+            <a:r>
+              <a:rPr lang="en-US" altLang="en-US" sz="1200" dirty="0" smtClean="0">
+                <a:solidFill>
+                  <a:schemeClr val="tx1"/>
+                </a:solidFill>
+              </a:rPr>
+              <a:t>()`</a:t>
+            </a:r>
+          </a:p>
+          <a:p>
+            <a:pPr marL="0" lvl="0" indent="0" defTabSz="914400" eaLnBrk="0" fontAlgn="base" hangingPunct="0">
+              <a:spcBef>
+                <a:spcPct val="0"/>
+              </a:spcBef>
+              <a:spcAft>
+                <a:spcPct val="0"/>
+              </a:spcAft>
+              <a:buClrTx/>
+              <a:buSzTx/>
+              <a:buNone/>
+            </a:pPr>
+            <a:r>
+              <a:rPr lang="en-US" altLang="en-US" sz="1200" dirty="0" smtClean="0">
+                <a:solidFill>
+                  <a:schemeClr val="tx1"/>
+                </a:solidFill>
+              </a:rPr>
+              <a:t> </a:t>
+            </a:r>
+            <a:r>
+              <a:rPr lang="en-US" altLang="en-US" sz="1200" dirty="0">
+                <a:solidFill>
+                  <a:schemeClr val="tx1"/>
+                </a:solidFill>
+              </a:rPr>
+              <a:t>offers a glimpse of the first few rows, providing a quick overview of the dataset's content. Additionally, `</a:t>
+            </a:r>
+            <a:r>
+              <a:rPr lang="en-US" altLang="en-US" sz="1200" dirty="0" err="1">
+                <a:solidFill>
+                  <a:schemeClr val="tx1"/>
+                </a:solidFill>
+              </a:rPr>
+              <a:t>df_raw.shape</a:t>
+            </a:r>
+            <a:r>
+              <a:rPr lang="en-US" altLang="en-US" sz="1200" dirty="0">
+                <a:solidFill>
+                  <a:schemeClr val="tx1"/>
+                </a:solidFill>
+              </a:rPr>
+              <a:t>` is employed </a:t>
+            </a:r>
+            <a:endParaRPr lang="en-US" altLang="en-US" sz="1200" dirty="0" smtClean="0">
+              <a:solidFill>
+                <a:schemeClr val="tx1"/>
+              </a:solidFill>
+            </a:endParaRPr>
+          </a:p>
+          <a:p>
+            <a:pPr marL="0" lvl="0" indent="0" defTabSz="914400" eaLnBrk="0" fontAlgn="base" hangingPunct="0">
+              <a:spcBef>
+                <a:spcPct val="0"/>
+              </a:spcBef>
+              <a:spcAft>
+                <a:spcPct val="0"/>
+              </a:spcAft>
+              <a:buClrTx/>
+              <a:buSzTx/>
+              <a:buNone/>
+            </a:pPr>
+            <a:r>
+              <a:rPr lang="en-US" altLang="en-US" sz="1200" dirty="0" smtClean="0">
+                <a:solidFill>
+                  <a:schemeClr val="tx1"/>
+                </a:solidFill>
+              </a:rPr>
+              <a:t>to </a:t>
+            </a:r>
+            <a:r>
+              <a:rPr lang="en-US" altLang="en-US" sz="1200" dirty="0">
+                <a:solidFill>
+                  <a:schemeClr val="tx1"/>
+                </a:solidFill>
+              </a:rPr>
+              <a:t>reveal the dimensions of the </a:t>
+            </a:r>
+            <a:r>
+              <a:rPr lang="en-US" altLang="en-US" sz="1200" dirty="0" err="1">
+                <a:solidFill>
+                  <a:schemeClr val="tx1"/>
+                </a:solidFill>
+              </a:rPr>
+              <a:t>DataFrame</a:t>
+            </a:r>
+            <a:r>
+              <a:rPr lang="en-US" altLang="en-US" sz="1200" dirty="0">
+                <a:solidFill>
+                  <a:schemeClr val="tx1"/>
+                </a:solidFill>
+              </a:rPr>
+              <a:t>, specifying the number of rows and columns</a:t>
+            </a:r>
+            <a:r>
+              <a:rPr lang="en-US" altLang="en-US" sz="1200" dirty="0" smtClean="0">
+                <a:solidFill>
+                  <a:schemeClr val="tx1"/>
+                </a:solidFill>
+              </a:rPr>
+              <a:t>.</a:t>
+            </a:r>
+          </a:p>
+          <a:p>
+            <a:pPr marL="0" lvl="0" indent="0" defTabSz="914400" eaLnBrk="0" fontAlgn="base" hangingPunct="0">
+              <a:spcBef>
+                <a:spcPct val="0"/>
+              </a:spcBef>
+              <a:spcAft>
+                <a:spcPct val="0"/>
+              </a:spcAft>
+              <a:buClrTx/>
+              <a:buSzTx/>
+              <a:buNone/>
+            </a:pPr>
+            <a:r>
+              <a:rPr lang="en-US" altLang="en-US" sz="1200" dirty="0" smtClean="0">
+                <a:solidFill>
+                  <a:schemeClr val="tx1"/>
+                </a:solidFill>
+              </a:rPr>
+              <a:t> </a:t>
+            </a:r>
+            <a:r>
+              <a:rPr lang="en-US" altLang="en-US" sz="1200" dirty="0">
+                <a:solidFill>
+                  <a:schemeClr val="tx1"/>
+                </a:solidFill>
+              </a:rPr>
+              <a:t>Finally, `</a:t>
+            </a:r>
+            <a:r>
+              <a:rPr lang="en-US" altLang="en-US" sz="1200" dirty="0" err="1">
+                <a:solidFill>
+                  <a:schemeClr val="tx1"/>
+                </a:solidFill>
+              </a:rPr>
+              <a:t>df_raw.describe</a:t>
+            </a:r>
+            <a:r>
+              <a:rPr lang="en-US" altLang="en-US" sz="1200" dirty="0">
+                <a:solidFill>
+                  <a:schemeClr val="tx1"/>
+                </a:solidFill>
+              </a:rPr>
+              <a:t>()` generates a statistical summary, presenting key metrics like mean, standard deviation, and </a:t>
+            </a:r>
+            <a:endParaRPr lang="en-US" altLang="en-US" sz="1200" dirty="0" smtClean="0">
+              <a:solidFill>
+                <a:schemeClr val="tx1"/>
+              </a:solidFill>
+            </a:endParaRPr>
+          </a:p>
+          <a:p>
+            <a:pPr marL="0" lvl="0" indent="0" defTabSz="914400" eaLnBrk="0" fontAlgn="base" hangingPunct="0">
+              <a:spcBef>
+                <a:spcPct val="0"/>
+              </a:spcBef>
+              <a:spcAft>
+                <a:spcPct val="0"/>
+              </a:spcAft>
+              <a:buClrTx/>
+              <a:buSzTx/>
+              <a:buNone/>
+            </a:pPr>
+            <a:r>
+              <a:rPr lang="en-US" altLang="en-US" sz="1200" dirty="0" smtClean="0">
+                <a:solidFill>
+                  <a:schemeClr val="tx1"/>
+                </a:solidFill>
+              </a:rPr>
+              <a:t>quartiles </a:t>
+            </a:r>
+            <a:r>
+              <a:rPr lang="en-US" altLang="en-US" sz="1200" dirty="0">
+                <a:solidFill>
+                  <a:schemeClr val="tx1"/>
+                </a:solidFill>
+              </a:rPr>
+              <a:t>for numerical columns. Collectively, these steps lay the groundwork for further exploration and analysis of the dataset</a:t>
+            </a:r>
+            <a:r>
+              <a:rPr lang="en-US" altLang="en-US" sz="1200" dirty="0" smtClean="0">
+                <a:solidFill>
+                  <a:schemeClr val="tx1"/>
+                </a:solidFill>
+              </a:rPr>
+              <a:t>,</a:t>
+            </a:r>
+          </a:p>
+          <a:p>
+            <a:pPr marL="0" lvl="0" indent="0" defTabSz="914400" eaLnBrk="0" fontAlgn="base" hangingPunct="0">
+              <a:spcBef>
+                <a:spcPct val="0"/>
+              </a:spcBef>
+              <a:spcAft>
+                <a:spcPct val="0"/>
+              </a:spcAft>
+              <a:buClrTx/>
+              <a:buSzTx/>
+              <a:buNone/>
+            </a:pPr>
+            <a:r>
+              <a:rPr lang="en-US" altLang="en-US" sz="1200" dirty="0" smtClean="0">
+                <a:solidFill>
+                  <a:schemeClr val="tx1"/>
+                </a:solidFill>
+              </a:rPr>
+              <a:t> </a:t>
+            </a:r>
+            <a:r>
+              <a:rPr lang="en-US" altLang="en-US" sz="1200" dirty="0">
+                <a:solidFill>
+                  <a:schemeClr val="tx1"/>
+                </a:solidFill>
+              </a:rPr>
+              <a:t>offering insights into its structure and statistical characteristics.</a:t>
+            </a:r>
+            <a:endParaRPr kumimoji="0" lang="en-US" altLang="en-US" sz="1200" i="0" u="none" strike="noStrike" cap="none" normalizeH="0" baseline="0" dirty="0" smtClean="0">
+              <a:ln>
+                <a:noFill/>
+              </a:ln>
+              <a:solidFill>
+                <a:schemeClr val="tx1"/>
+              </a:solidFill>
+              <a:effectLst/>
+            </a:endParaRPr>
+          </a:p>
+        </p:txBody>
+      </p:sp>
+      <p:pic>
+        <p:nvPicPr>
+          <p:cNvPr id="9" name="Picture 8"/>
+          <p:cNvPicPr>
+            <a:picLocks noChangeAspect="1"/>
+          </p:cNvPicPr>
+          <p:nvPr/>
+        </p:nvPicPr>
+        <p:blipFill rotWithShape="1">
+          <a:blip r:embed="rId2">
+            <a:extLst>
+              <a:ext uri="{28A0092B-C50C-407E-A947-70E740481C1C}">
+                <a14:useLocalDpi xmlns:a14="http://schemas.microsoft.com/office/drawing/2010/main" val="0"/>
+              </a:ext>
+            </a:extLst>
+          </a:blip>
+          <a:srcRect l="12412" t="27351" r="13199" b="5827"/>
+          <a:stretch/>
+        </p:blipFill>
+        <p:spPr>
+          <a:xfrm>
+            <a:off x="1248508" y="856762"/>
+            <a:ext cx="6436848" cy="3252461"/>
+          </a:xfrm>
+          <a:prstGeom prst="rect">
+            <a:avLst/>
+          </a:prstGeom>
+        </p:spPr>
+      </p:pic>
     </p:spTree>
+    <p:extLst>
+      <p:ext uri="{BB962C8B-B14F-4D97-AF65-F5344CB8AC3E}">
+        <p14:creationId xmlns:p14="http://schemas.microsoft.com/office/powerpoint/2010/main" val="398702275"/>
+      </p:ext>
+    </p:extLst>
   </p:cSld>
   <p:clrMapOvr>
     <a:masterClrMapping/>
@@ -6595,6 +7051,368 @@
       </p:grpSpPr>
       <p:sp>
         <p:nvSpPr>
+          <p:cNvPr id="3" name="Content Placeholder 2"/>
+          <p:cNvSpPr>
+            <a:spLocks noGrp="1"/>
+          </p:cNvSpPr>
+          <p:nvPr>
+            <p:ph idx="1"/>
+          </p:nvPr>
+        </p:nvSpPr>
+        <p:spPr>
+          <a:xfrm>
+            <a:off x="422357" y="3745523"/>
+            <a:ext cx="8712851" cy="3543299"/>
+          </a:xfrm>
+        </p:spPr>
+        <p:txBody>
+          <a:bodyPr>
+            <a:normAutofit/>
+          </a:bodyPr>
+          <a:lstStyle/>
+          <a:p>
+            <a:pPr marL="0" indent="0">
+              <a:buNone/>
+            </a:pPr>
+            <a:r>
+              <a:rPr lang="en-US" sz="1600" dirty="0"/>
+              <a:t>The provided code and explanations are like a recipe for analyzing data. There's a special function called `</a:t>
+            </a:r>
+            <a:r>
+              <a:rPr lang="en-US" sz="1600" dirty="0" err="1"/>
+              <a:t>plot_boxplot</a:t>
+            </a:r>
+            <a:r>
+              <a:rPr lang="en-US" sz="1600" dirty="0"/>
+              <a:t>` that makes graphs called boxplots, helping us understand how data is spread out. Inside this function, it uses tools from a library called Pandas to create the actual plot and make it look clean by removing gridlines. The result is shown on the screen. When we use this function with the command `</a:t>
+            </a:r>
+            <a:r>
+              <a:rPr lang="en-US" sz="1600" dirty="0" err="1"/>
+              <a:t>plot_boxplot</a:t>
+            </a:r>
+            <a:r>
+              <a:rPr lang="en-US" sz="1600" dirty="0"/>
+              <a:t>(</a:t>
+            </a:r>
+            <a:r>
+              <a:rPr lang="en-US" sz="1600" dirty="0" err="1"/>
+              <a:t>df_raw</a:t>
+            </a:r>
+            <a:r>
+              <a:rPr lang="en-US" sz="1600" dirty="0"/>
+              <a:t>, "</a:t>
+            </a:r>
+            <a:r>
+              <a:rPr lang="en-US" sz="1600" dirty="0" err="1"/>
+              <a:t>marketCap</a:t>
+            </a:r>
+            <a:r>
+              <a:rPr lang="en-US" sz="1600" dirty="0"/>
+              <a:t>")`, it makes a boxplot specifically for the "</a:t>
+            </a:r>
+            <a:r>
+              <a:rPr lang="en-US" sz="1600" dirty="0" err="1"/>
+              <a:t>marketCap</a:t>
+            </a:r>
+            <a:r>
+              <a:rPr lang="en-US" sz="1600" dirty="0"/>
+              <a:t>" column in our data. Additionally, there's another tool introduced to find potential unusual values in the data, called outliers. These outliers are identified based on specific rules using percentiles and ranges. The code then creates a list of positions where these outliers are found. This approach helps us clean up the data by removing potential outliers, making it more reliable for further analysis. So, it's like a step-by-step guide for understanding and cleaning up data using visualizations and statistical methods.</a:t>
+            </a:r>
+          </a:p>
+        </p:txBody>
+      </p:sp>
+      <p:pic>
+        <p:nvPicPr>
+          <p:cNvPr id="4" name="Picture 3"/>
+          <p:cNvPicPr>
+            <a:picLocks noChangeAspect="1"/>
+          </p:cNvPicPr>
+          <p:nvPr/>
+        </p:nvPicPr>
+        <p:blipFill rotWithShape="1">
+          <a:blip r:embed="rId2"/>
+          <a:srcRect l="13147" t="19504" r="13104" b="6036"/>
+          <a:stretch/>
+        </p:blipFill>
+        <p:spPr>
+          <a:xfrm>
+            <a:off x="1588018" y="121304"/>
+            <a:ext cx="6381528" cy="3624219"/>
+          </a:xfrm>
+          <a:prstGeom prst="rect">
+            <a:avLst/>
+          </a:prstGeom>
+        </p:spPr>
+      </p:pic>
+    </p:spTree>
+    <p:extLst>
+      <p:ext uri="{BB962C8B-B14F-4D97-AF65-F5344CB8AC3E}">
+        <p14:creationId xmlns:p14="http://schemas.microsoft.com/office/powerpoint/2010/main" val="3236117349"/>
+      </p:ext>
+    </p:extLst>
+  </p:cSld>
+  <p:clrMapOvr>
+    <a:masterClrMapping/>
+  </p:clrMapOvr>
+</p:sld>
+</file>
+
+<file path=ppt/slides/slide16.xml><?xml version="1.0" encoding="utf-8"?>
+<p:sld xmlns:a="http://schemas.openxmlformats.org/drawingml/2006/main" xmlns:r="http://schemas.openxmlformats.org/officeDocument/2006/relationships" xmlns:p="http://schemas.openxmlformats.org/presentationml/2006/main">
+  <p:cSld>
+    <p:spTree>
+      <p:nvGrpSpPr>
+        <p:cNvPr id="1" name=""/>
+        <p:cNvGrpSpPr/>
+        <p:nvPr/>
+      </p:nvGrpSpPr>
+      <p:grpSpPr>
+        <a:xfrm>
+          <a:off x="0" y="0"/>
+          <a:ext cx="0" cy="0"/>
+          <a:chOff x="0" y="0"/>
+          <a:chExt cx="0" cy="0"/>
+        </a:xfrm>
+      </p:grpSpPr>
+      <p:sp>
+        <p:nvSpPr>
+          <p:cNvPr id="15" name="Rectangle 10"/>
+          <p:cNvSpPr>
+            <a:spLocks noChangeArrowheads="1"/>
+          </p:cNvSpPr>
+          <p:nvPr/>
+        </p:nvSpPr>
+        <p:spPr bwMode="auto">
+          <a:xfrm>
+            <a:off x="0" y="43934"/>
+            <a:ext cx="184731" cy="369332"/>
+          </a:xfrm>
+          <a:prstGeom prst="rect">
+            <a:avLst/>
+          </a:prstGeom>
+          <a:noFill/>
+          <a:ln>
+            <a:noFill/>
+          </a:ln>
+          <a:effectLst/>
+          <a:extLst>
+            <a:ext uri="{909E8E84-426E-40DD-AFC4-6F175D3DCCD1}">
+              <a14:hiddenFill xmlns:a14="http://schemas.microsoft.com/office/drawing/2010/main">
+                <a:solidFill>
+                  <a:schemeClr val="accent1"/>
+                </a:solidFill>
+              </a14:hiddenFill>
+            </a:ext>
+            <a:ext uri="{91240B29-F687-4F45-9708-019B960494DF}">
+              <a14:hiddenLine xmlns:a14="http://schemas.microsoft.com/office/drawing/2010/main" w="9525">
+                <a:solidFill>
+                  <a:schemeClr val="tx1"/>
+                </a:solidFill>
+                <a:miter lim="800000"/>
+                <a:headEnd/>
+                <a:tailEnd/>
+              </a14:hiddenLine>
+            </a:ext>
+            <a:ext uri="{AF507438-7753-43E0-B8FC-AC1667EBCBE1}">
+              <a14:hiddenEffects xmlns:a14="http://schemas.microsoft.com/office/drawing/2010/main">
+                <a:effectLst>
+                  <a:outerShdw dist="35921" dir="2700000" algn="ctr" rotWithShape="0">
+                    <a:schemeClr val="bg2"/>
+                  </a:outerShdw>
+                </a:effectLst>
+              </a14:hiddenEffects>
+            </a:ext>
+          </a:extLst>
+        </p:spPr>
+        <p:txBody>
+          <a:bodyPr vert="horz" wrap="none" lIns="91440" tIns="45720" rIns="91440" bIns="45720" numCol="1" anchor="ctr" anchorCtr="0" compatLnSpc="1">
+            <a:prstTxWarp prst="textNoShape">
+              <a:avLst/>
+            </a:prstTxWarp>
+            <a:spAutoFit/>
+          </a:bodyPr>
+          <a:lstStyle/>
+          <a:p>
+            <a:pPr marL="0" marR="0" lvl="0" indent="0" algn="l" defTabSz="914400" rtl="0" eaLnBrk="0" fontAlgn="base" latinLnBrk="0" hangingPunct="0">
+              <a:lnSpc>
+                <a:spcPct val="100000"/>
+              </a:lnSpc>
+              <a:spcBef>
+                <a:spcPct val="0"/>
+              </a:spcBef>
+              <a:spcAft>
+                <a:spcPct val="0"/>
+              </a:spcAft>
+              <a:buClrTx/>
+              <a:buSzTx/>
+              <a:buFontTx/>
+              <a:buNone/>
+              <a:tabLst/>
+            </a:pPr>
+            <a:endParaRPr kumimoji="0" lang="en-US" altLang="en-US" sz="1800" b="0" i="0" u="none" strike="noStrike" cap="none" normalizeH="0" baseline="0" dirty="0" smtClean="0">
+              <a:ln>
+                <a:noFill/>
+              </a:ln>
+              <a:solidFill>
+                <a:schemeClr val="tx1"/>
+              </a:solidFill>
+              <a:effectLst/>
+              <a:latin typeface="Arial" panose="020B0604020202020204" pitchFamily="34" charset="0"/>
+            </a:endParaRPr>
+          </a:p>
+        </p:txBody>
+      </p:sp>
+      <p:pic>
+        <p:nvPicPr>
+          <p:cNvPr id="19" name="Picture 18"/>
+          <p:cNvPicPr>
+            <a:picLocks noChangeAspect="1"/>
+          </p:cNvPicPr>
+          <p:nvPr/>
+        </p:nvPicPr>
+        <p:blipFill rotWithShape="1">
+          <a:blip r:embed="rId2"/>
+          <a:srcRect l="12313" t="23041" r="14847" b="6221"/>
+          <a:stretch/>
+        </p:blipFill>
+        <p:spPr>
+          <a:xfrm>
+            <a:off x="184731" y="167054"/>
+            <a:ext cx="5504613" cy="3006969"/>
+          </a:xfrm>
+          <a:prstGeom prst="rect">
+            <a:avLst/>
+          </a:prstGeom>
+        </p:spPr>
+      </p:pic>
+      <p:pic>
+        <p:nvPicPr>
+          <p:cNvPr id="20" name="Picture 19"/>
+          <p:cNvPicPr>
+            <a:picLocks noChangeAspect="1"/>
+          </p:cNvPicPr>
+          <p:nvPr/>
+        </p:nvPicPr>
+        <p:blipFill rotWithShape="1">
+          <a:blip r:embed="rId3"/>
+          <a:srcRect l="11940" t="23061" r="48123" b="5999"/>
+          <a:stretch/>
+        </p:blipFill>
+        <p:spPr>
+          <a:xfrm>
+            <a:off x="5741376" y="167054"/>
+            <a:ext cx="3490548" cy="3487597"/>
+          </a:xfrm>
+          <a:prstGeom prst="rect">
+            <a:avLst/>
+          </a:prstGeom>
+        </p:spPr>
+      </p:pic>
+      <p:sp>
+        <p:nvSpPr>
+          <p:cNvPr id="21" name="TextBox 20"/>
+          <p:cNvSpPr txBox="1"/>
+          <p:nvPr/>
+        </p:nvSpPr>
+        <p:spPr>
+          <a:xfrm>
+            <a:off x="448408" y="3877408"/>
+            <a:ext cx="8203223" cy="2800767"/>
+          </a:xfrm>
+          <a:prstGeom prst="rect">
+            <a:avLst/>
+          </a:prstGeom>
+          <a:noFill/>
+        </p:spPr>
+        <p:txBody>
+          <a:bodyPr wrap="square" rtlCol="0">
+            <a:spAutoFit/>
+          </a:bodyPr>
+          <a:lstStyle/>
+          <a:p>
+            <a:r>
+              <a:rPr lang="en-US" sz="1600" dirty="0" smtClean="0"/>
+              <a:t>This code </a:t>
+            </a:r>
+            <a:r>
+              <a:rPr lang="en-US" sz="1600" dirty="0"/>
+              <a:t>explain how to find and deal with unusual values, called outliers, in a dataset using Python. Initially, an empty list, `</a:t>
+            </a:r>
+            <a:r>
+              <a:rPr lang="en-US" sz="1600" dirty="0" err="1"/>
+              <a:t>index_list</a:t>
+            </a:r>
+            <a:r>
+              <a:rPr lang="en-US" sz="1600" dirty="0"/>
+              <a:t>`, is created to remember the positions of these unusual values. The code looks at two features, '</a:t>
+            </a:r>
+            <a:r>
+              <a:rPr lang="en-US" sz="1600" dirty="0" err="1"/>
+              <a:t>marketCap</a:t>
+            </a:r>
+            <a:r>
+              <a:rPr lang="en-US" sz="1600" dirty="0"/>
+              <a:t>' and 'volume', and figures out which rows have unusual values for each feature. The positions of these unusual values are stored in `</a:t>
+            </a:r>
+            <a:r>
+              <a:rPr lang="en-US" sz="1600" dirty="0" err="1"/>
+              <a:t>index_list</a:t>
+            </a:r>
+            <a:r>
+              <a:rPr lang="en-US" sz="1600" dirty="0"/>
+              <a:t>`. Then, this list is organized to keep only the unique positions and sorted in order. Using this sorted list, rows with unusual values are removed from the original dataset, creating a cleaned dataset called `</a:t>
+            </a:r>
+            <a:r>
+              <a:rPr lang="en-US" sz="1600" dirty="0" err="1"/>
+              <a:t>df_cleaned</a:t>
+            </a:r>
+            <a:r>
+              <a:rPr lang="en-US" sz="1600" dirty="0"/>
+              <a:t>`. Finally, boxplots are made for both '</a:t>
+            </a:r>
+            <a:r>
+              <a:rPr lang="en-US" sz="1600" dirty="0" err="1"/>
+              <a:t>marketCap</a:t>
+            </a:r>
+            <a:r>
+              <a:rPr lang="en-US" sz="1600" dirty="0"/>
+              <a:t>' and 'volume' in the cleaned dataset, helping to see how the data looks after getting rid of the unusual values. This process is like cleaning up the data to make sure it's reliable and ready for analysis.</a:t>
+            </a:r>
+          </a:p>
+        </p:txBody>
+      </p:sp>
+    </p:spTree>
+    <p:extLst>
+      <p:ext uri="{BB962C8B-B14F-4D97-AF65-F5344CB8AC3E}">
+        <p14:creationId xmlns:p14="http://schemas.microsoft.com/office/powerpoint/2010/main" val="4088028335"/>
+      </p:ext>
+    </p:extLst>
+  </p:cSld>
+  <p:clrMapOvr>
+    <a:masterClrMapping/>
+  </p:clrMapOvr>
+</p:sld>
+</file>
+
+<file path=ppt/slides/slide17.xml><?xml version="1.0" encoding="utf-8"?>
+<p:sld xmlns:a="http://schemas.openxmlformats.org/drawingml/2006/main" xmlns:r="http://schemas.openxmlformats.org/officeDocument/2006/relationships" xmlns:p="http://schemas.openxmlformats.org/presentationml/2006/main">
+  <p:cSld>
+    <p:spTree>
+      <p:nvGrpSpPr>
+        <p:cNvPr id="1" name=""/>
+        <p:cNvGrpSpPr/>
+        <p:nvPr/>
+      </p:nvGrpSpPr>
+      <p:grpSpPr>
+        <a:xfrm>
+          <a:off x="0" y="0"/>
+          <a:ext cx="0" cy="0"/>
+          <a:chOff x="0" y="0"/>
+          <a:chExt cx="0" cy="0"/>
+        </a:xfrm>
+      </p:grpSpPr>
+      <p:sp>
+        <p:nvSpPr>
           <p:cNvPr id="2" name="Title 1"/>
           <p:cNvSpPr>
             <a:spLocks noGrp="1"/>
@@ -6648,7 +7466,7 @@
           <p:nvPr/>
         </p:nvPicPr>
         <p:blipFill>
-          <a:blip r:embed="rId1"/>
+          <a:blip r:embed="rId2"/>
           <a:stretch>
             <a:fillRect/>
           </a:stretch>
@@ -6671,7 +7489,7 @@
 </p:sld>
 </file>
 
-<file path=ppt/slides/slide16.xml><?xml version="1.0" encoding="utf-8"?>
+<file path=ppt/slides/slide18.xml><?xml version="1.0" encoding="utf-8"?>
 <p:sld xmlns:a="http://schemas.openxmlformats.org/drawingml/2006/main" xmlns:r="http://schemas.openxmlformats.org/officeDocument/2006/relationships" xmlns:p="http://schemas.openxmlformats.org/presentationml/2006/main">
   <p:cSld>
     <p:spTree>
@@ -6823,8 +7641,20 @@
                 <a:tableStyleId>{5C22544A-7EE6-4342-B048-85BDC9FD1C3A}</a:tableStyleId>
               </a:tblPr>
               <a:tblGrid>
-                <a:gridCol w="2553666"/>
-                <a:gridCol w="3432796"/>
+                <a:gridCol w="2553666">
+                  <a:extLst>
+                    <a:ext uri="{9D8B030D-6E8A-4147-A177-3AD203B41FA5}">
+                      <a16:colId xmlns:a16="http://schemas.microsoft.com/office/drawing/2014/main" val="20000"/>
+                    </a:ext>
+                  </a:extLst>
+                </a:gridCol>
+                <a:gridCol w="3432796">
+                  <a:extLst>
+                    <a:ext uri="{9D8B030D-6E8A-4147-A177-3AD203B41FA5}">
+                      <a16:colId xmlns:a16="http://schemas.microsoft.com/office/drawing/2014/main" val="20001"/>
+                    </a:ext>
+                  </a:extLst>
+                </a:gridCol>
               </a:tblGrid>
               <a:tr h="372886">
                 <a:tc>
@@ -6873,6 +7703,11 @@
                   </a:txBody>
                   <a:tcPr marL="3810" marR="3810" marT="3810" marB="0" anchor="b"/>
                 </a:tc>
+                <a:extLst>
+                  <a:ext uri="{0D108BD9-81ED-4DB2-BD59-A6C34878D82A}">
+                    <a16:rowId xmlns:a16="http://schemas.microsoft.com/office/drawing/2014/main" val="10000"/>
+                  </a:ext>
+                </a:extLst>
               </a:tr>
               <a:tr h="372886">
                 <a:tc>
@@ -6921,6 +7756,11 @@
                   </a:txBody>
                   <a:tcPr marL="3810" marR="3810" marT="3810" marB="0" anchor="b"/>
                 </a:tc>
+                <a:extLst>
+                  <a:ext uri="{0D108BD9-81ED-4DB2-BD59-A6C34878D82A}">
+                    <a16:rowId xmlns:a16="http://schemas.microsoft.com/office/drawing/2014/main" val="10001"/>
+                  </a:ext>
+                </a:extLst>
               </a:tr>
               <a:tr h="372886">
                 <a:tc>
@@ -6969,6 +7809,11 @@
                   </a:txBody>
                   <a:tcPr marL="3810" marR="3810" marT="3810" marB="0" anchor="b"/>
                 </a:tc>
+                <a:extLst>
+                  <a:ext uri="{0D108BD9-81ED-4DB2-BD59-A6C34878D82A}">
+                    <a16:rowId xmlns:a16="http://schemas.microsoft.com/office/drawing/2014/main" val="10002"/>
+                  </a:ext>
+                </a:extLst>
               </a:tr>
               <a:tr h="372886">
                 <a:tc>
@@ -7017,6 +7862,11 @@
                   </a:txBody>
                   <a:tcPr marL="3810" marR="3810" marT="3810" marB="0" anchor="b"/>
                 </a:tc>
+                <a:extLst>
+                  <a:ext uri="{0D108BD9-81ED-4DB2-BD59-A6C34878D82A}">
+                    <a16:rowId xmlns:a16="http://schemas.microsoft.com/office/drawing/2014/main" val="10003"/>
+                  </a:ext>
+                </a:extLst>
               </a:tr>
               <a:tr h="372886">
                 <a:tc>
@@ -7065,6 +7915,11 @@
                   </a:txBody>
                   <a:tcPr marL="3810" marR="3810" marT="3810" marB="0" anchor="b"/>
                 </a:tc>
+                <a:extLst>
+                  <a:ext uri="{0D108BD9-81ED-4DB2-BD59-A6C34878D82A}">
+                    <a16:rowId xmlns:a16="http://schemas.microsoft.com/office/drawing/2014/main" val="10004"/>
+                  </a:ext>
+                </a:extLst>
               </a:tr>
               <a:tr h="372886">
                 <a:tc>
@@ -7113,6 +7968,11 @@
                   </a:txBody>
                   <a:tcPr marL="3810" marR="3810" marT="3810" marB="0" anchor="b"/>
                 </a:tc>
+                <a:extLst>
+                  <a:ext uri="{0D108BD9-81ED-4DB2-BD59-A6C34878D82A}">
+                    <a16:rowId xmlns:a16="http://schemas.microsoft.com/office/drawing/2014/main" val="10005"/>
+                  </a:ext>
+                </a:extLst>
               </a:tr>
               <a:tr h="372886">
                 <a:tc>
@@ -7161,6 +8021,11 @@
                   </a:txBody>
                   <a:tcPr marL="3810" marR="3810" marT="3810" marB="0" anchor="b"/>
                 </a:tc>
+                <a:extLst>
+                  <a:ext uri="{0D108BD9-81ED-4DB2-BD59-A6C34878D82A}">
+                    <a16:rowId xmlns:a16="http://schemas.microsoft.com/office/drawing/2014/main" val="10006"/>
+                  </a:ext>
+                </a:extLst>
               </a:tr>
               <a:tr h="372886">
                 <a:tc>
@@ -7209,6 +8074,11 @@
                   </a:txBody>
                   <a:tcPr marL="3810" marR="3810" marT="3810" marB="0" anchor="b"/>
                 </a:tc>
+                <a:extLst>
+                  <a:ext uri="{0D108BD9-81ED-4DB2-BD59-A6C34878D82A}">
+                    <a16:rowId xmlns:a16="http://schemas.microsoft.com/office/drawing/2014/main" val="10007"/>
+                  </a:ext>
+                </a:extLst>
               </a:tr>
               <a:tr h="372886">
                 <a:tc>
@@ -7257,6 +8127,11 @@
                   </a:txBody>
                   <a:tcPr marL="3810" marR="3810" marT="3810" marB="0" anchor="b"/>
                 </a:tc>
+                <a:extLst>
+                  <a:ext uri="{0D108BD9-81ED-4DB2-BD59-A6C34878D82A}">
+                    <a16:rowId xmlns:a16="http://schemas.microsoft.com/office/drawing/2014/main" val="10008"/>
+                  </a:ext>
+                </a:extLst>
               </a:tr>
             </a:tbl>
           </a:graphicData>
@@ -7329,21 +8204,18 @@
               <a:rPr lang="en-US" dirty="0"/>
               <a:t>We choose this topic for some reasons:</a:t>
             </a:r>
-            <a:endParaRPr lang="en-US" dirty="0"/>
           </a:p>
           <a:p>
             <a:r>
               <a:rPr lang="en-US" dirty="0"/>
               <a:t>1-Our main topic included image processing which supposed a more advance project with topics that we still haven’t seen on college, so we decided to choose a project that let us put in practice some of the concepts we’ve seen so far.</a:t>
             </a:r>
-            <a:endParaRPr lang="en-US" dirty="0"/>
           </a:p>
           <a:p>
             <a:r>
               <a:rPr lang="en-US" dirty="0"/>
               <a:t>2-Considering that the majority of projects in school tend to be about house pricing or health, we wanted to avoid the common projects.</a:t>
             </a:r>
-            <a:endParaRPr lang="en-US" dirty="0"/>
           </a:p>
           <a:p>
             <a:r>
@@ -7421,7 +8293,6 @@
               <a:rPr lang="en-US" dirty="0"/>
               <a:t>In simple terms based on the historical data of the crypto currency prices we want to predict the trend of prices for the future values of the price.</a:t>
             </a:r>
-            <a:endParaRPr lang="en-US" dirty="0"/>
           </a:p>
           <a:p>
             <a:endParaRPr lang="en-US" dirty="0"/>
@@ -7581,7 +8452,7 @@
           <a:p>
             <a:r>
               <a:rPr lang="de-DE" dirty="0">
-                <a:hlinkClick r:id="rId1"/>
+                <a:hlinkClick r:id="rId2"/>
               </a:rPr>
               <a:t>https://app.clickup.com/9017184916/v/g/8cqemmm-417</a:t>
             </a:r>
@@ -7601,7 +8472,7 @@
           <p:nvPr/>
         </p:nvPicPr>
         <p:blipFill>
-          <a:blip r:embed="rId2"/>
+          <a:blip r:embed="rId3"/>
           <a:stretch>
             <a:fillRect/>
           </a:stretch>
@@ -7717,7 +8588,7 @@
           <p:nvPr/>
         </p:nvPicPr>
         <p:blipFill>
-          <a:blip r:embed="rId1"/>
+          <a:blip r:embed="rId2"/>
           <a:stretch>
             <a:fillRect/>
           </a:stretch>
@@ -7872,7 +8743,7 @@
           <p:nvPr/>
         </p:nvPicPr>
         <p:blipFill>
-          <a:blip r:embed="rId1"/>
+          <a:blip r:embed="rId2"/>
           <a:stretch>
             <a:fillRect/>
           </a:stretch>
@@ -7896,7 +8767,7 @@
           <p:nvPr/>
         </p:nvPicPr>
         <p:blipFill>
-          <a:blip r:embed="rId2"/>
+          <a:blip r:embed="rId3"/>
           <a:stretch>
             <a:fillRect/>
           </a:stretch>
@@ -7986,7 +8857,6 @@
               <a:rPr lang="en-US" dirty="0"/>
               <a:t> ML and what does it mean to train a model.</a:t>
             </a:r>
-            <a:endParaRPr lang="en-US" dirty="0"/>
           </a:p>
           <a:p>
             <a:endParaRPr lang="en-US" dirty="0"/>
@@ -8070,28 +8940,24 @@
               <a:rPr lang="en-US" dirty="0"/>
               <a:t>A statistical method known as regression establishes a relationship between a dependent variable and one or more independent (explanatory) variables.</a:t>
             </a:r>
-            <a:endParaRPr lang="en-US" dirty="0"/>
           </a:p>
           <a:p>
             <a:r>
               <a:rPr lang="en-US" dirty="0"/>
               <a:t>A regression model can show whether changes observed in the dependent variable are associated with changes in one or more of the explanatory variables.</a:t>
             </a:r>
-            <a:endParaRPr lang="en-US" dirty="0"/>
           </a:p>
           <a:p>
             <a:r>
               <a:rPr lang="en-US" dirty="0"/>
               <a:t>In essence, it fits a best-fit line and observes how the data is distributed around it to do this.</a:t>
             </a:r>
-            <a:endParaRPr lang="en-US" dirty="0"/>
           </a:p>
           <a:p>
             <a:r>
               <a:rPr lang="en-US" dirty="0"/>
               <a:t>It helps the analyst to help to make asset valuations and making prediction.</a:t>
             </a:r>
-            <a:endParaRPr lang="en-US" dirty="0"/>
           </a:p>
           <a:p>
             <a:r>
@@ -8357,6 +9223,8 @@
       </a:bgFillStyleLst>
     </a:fmtScheme>
   </a:themeElements>
+  <a:objectDefaults/>
+  <a:extraClrSchemeLst/>
   <a:extLst>
     <a:ext uri="{05A4C25C-085E-4340-85A3-A5531E510DB2}">
       <thm15:themeFamily xmlns:thm15="http://schemas.microsoft.com/office/thememl/2012/main" name="Office Theme" id="{62F939B6-93AF-4DB8-9C6B-D6C7DFDC589F}" vid="{4A3C46E8-61CC-4603-A589-7422A47A8E4A}"/>
@@ -8365,521 +9233,282 @@
 </a:theme>
 </file>
 
-<file path=customXml/item1.xml>��< ? x m l   v e r s i o n = " 1 . 0 " ? > < c t : c o n t e n t T y p e S c h e m a   c t : _ = " "   m a : _ = " "   m a : c o n t e n t T y p e N a m e = " D o c u m e n t "   m a : c o n t e n t T y p e I D = " 0 x 0 1 0 1 0 0 C D 4 0 1 5 2 4 D C 5 3 2 D 4 2 A 0 E 0 E D 8 8 6 3 3 1 A 7 2 B "   m a : c o n t e n t T y p e V e r s i o n = " 1 5 "   m a : c o n t e n t T y p e D e s c r i p t i o n = " C r e a t e   a   n e w   d o c u m e n t . "   m a : c o n t e n t T y p e S c o p e = " "   m a : v e r s i o n I D = " a b a 1 7 d 7 2 6 3 e 5 a 1 7 e 1 e f e 4 2 a 3 5 7 1 a b b 4 1 "   x m l n s : c t = " h t t p : / / s c h e m a s . m i c r o s o f t . c o m / o f f i c e / 2 0 0 6 / m e t a d a t a / c o n t e n t T y p e "   x m l n s : m a = " h t t p : / / s c h e m a s . m i c r o s o f t . c o m / o f f i c e / 2 0 0 6 / m e t a d a t a / p r o p e r t i e s / m e t a A t t r i b u t e s " > - 
- < x s d : s c h e m a   t a r g e t N a m e s p a c e = " h t t p : / / s c h e m a s . m i c r o s o f t . c o m / o f f i c e / 2 0 0 6 / m e t a d a t a / p r o p e r t i e s "   m a : r o o t = " t r u e "   m a : f i e l d s I D = " e 4 e 3 c 9 c 8 e d 1 c 3 d 7 2 3 d 0 2 c 9 f 1 c b 2 4 d 1 9 a "   n s 2 : _ = " "   n s 3 : _ = " "   x m l n s : x s d = " h t t p : / / w w w . w 3 . o r g / 2 0 0 1 / X M L S c h e m a "   x m l n s : x s = " h t t p : / / w w w . w 3 . o r g / 2 0 0 1 / X M L S c h e m a "   x m l n s : p = " h t t p : / / s c h e m a s . m i c r o s o f t . c o m / o f f i c e / 2 0 0 6 / m e t a d a t a / p r o p e r t i e s "   x m l n s : n s 2 = " f 5 7 7 a c b f - 5 b 0 b - 4 b 4 f - 9 9 4 8 - 2 6 8 e 9 7 f 8 d 3 a 4 "   x m l n s : n s 3 = " b 1 e 4 d 6 e e - 9 f 6 f - 4 3 f 8 - a 6 1 8 - 2 4 f 3 d 8 4 d a 2 8 f " > - 
- < x s d : i m p o r t   n a m e s p a c e = " f 5 7 7 a c b f - 5 b 0 b - 4 b 4 f - 9 9 4 8 - 2 6 8 e 9 7 f 8 d 3 a 4 " / > - 
- < x s d : i m p o r t   n a m e s p a c e = " b 1 e 4 d 6 e e - 9 f 6 f - 4 3 f 8 - a 6 1 8 - 2 4 f 3 d 8 4 d a 2 8 f " / > - 
- < x s d : e l e m e n t   n a m e = " p r o p e r t i e s " > - 
- < x s d : c o m p l e x T y p e > - 
- < x s d : s e q u e n c e > - 
- < x s d : e l e m e n t   n a m e = " d o c u m e n t M a n a g e m e n t " > - 
- < x s d : c o m p l e x T y p e > - 
- < x s d : a l l > - 
- < x s d : e l e m e n t   r e f = " n s 2 : M e d i a S e r v i c e M e t a d a t a "   m i n O c c u r s = " 0 " / > - 
- < x s d : e l e m e n t   r e f = " n s 2 : M e d i a S e r v i c e F a s t M e t a d a t a "   m i n O c c u r s = " 0 " / > - 
- < x s d : e l e m e n t   r e f = " n s 3 : S h a r e d W i t h U s e r s "   m i n O c c u r s = " 0 " / > - 
- < x s d : e l e m e n t   r e f = " n s 3 : S h a r e d W i t h D e t a i l s "   m i n O c c u r s = " 0 " / > - 
- < x s d : e l e m e n t   r e f = " n s 3 : L a s t S h a r e d B y U s e r "   m i n O c c u r s = " 0 " / > - 
- < x s d : e l e m e n t   r e f = " n s 3 : L a s t S h a r e d B y T i m e "   m i n O c c u r s = " 0 " / > - 
- < x s d : e l e m e n t   r e f = " n s 2 : D o c u m e n t _ x 0 0 2 0 _ P u r p o s e "   m i n O c c u r s = " 0 " / > - 
- < x s d : e l e m e n t   r e f = " n s 2 : I n i t i a t i v e s "   m i n O c c u r s = " 0 " / > - 
- < x s d : e l e m e n t   r e f = " n s 2 : M e d i a S e r v i c e D a t e T a k e n "   m i n O c c u r s = " 0 " / > - 
- < x s d : e l e m e n t   r e f = " n s 2 : M e d i a S e r v i c e A u t o T a g s "   m i n O c c u r s = " 0 " / > - 
- < x s d : e l e m e n t   r e f = " n s 2 : M e d i a S e r v i c e O C R "   m i n O c c u r s = " 0 " / > - 
- < x s d : e l e m e n t   r e f = " n s 2 : M e d i a S e r v i c e L o c a t i o n "   m i n O c c u r s = " 0 " / > - 
- < x s d : e l e m e n t   r e f = " n s 2 : M e d i a S e r v i c e E v e n t H a s h C o d e "   m i n O c c u r s = " 0 " / > - 
- < x s d : e l e m e n t   r e f = " n s 2 : M e d i a S e r v i c e G e n e r a t i o n T i m e "   m i n O c c u r s = " 0 " / > - 
- < / x s d : a l l > - 
- < / x s d : c o m p l e x T y p e > - 
- < / x s d : e l e m e n t > - 
- < / x s d : s e q u e n c e > - 
- < / x s d : c o m p l e x T y p e > - 
- < / x s d : e l e m e n t > - 
- < / x s d : s c h e m a > - 
- < x s d : s c h e m a   t a r g e t N a m e s p a c e = " f 5 7 7 a c b f - 5 b 0 b - 4 b 4 f - 9 9 4 8 - 2 6 8 e 9 7 f 8 d 3 a 4 "   e l e m e n t F o r m D e f a u l t = " q u a l i f i e d "   x m l n s : x s d = " h t t p : / / w w w . w 3 . o r g / 2 0 0 1 / X M L S c h e m a "   x m l n s : x s = " h t t p : / / w w w . w 3 . o r g / 2 0 0 1 / X M L S c h e m a "   x m l n s : d m s = " h t t p : / / s c h e m a s . m i c r o s o f t . c o m / o f f i c e / 2 0 0 6 / d o c u m e n t M a n a g e m e n t / t y p e s "   x m l n s : p c = " h t t p : / / s c h e m a s . m i c r o s o f t . c o m / o f f i c e / i n f o p a t h / 2 0 0 7 / P a r t n e r C o n t r o l s " > - 
- < x s d : i m p o r t   n a m e s p a c e = " h t t p : / / s c h e m a s . m i c r o s o f t . c o m / o f f i c e / 2 0 0 6 / d o c u m e n t M a n a g e m e n t / t y p e s " / > - 
- < x s d : i m p o r t   n a m e s p a c e = " h t t p : / / s c h e m a s . m i c r o s o f t . c o m / o f f i c e / i n f o p a t h / 2 0 0 7 / P a r t n e r C o n t r o l s " / > - 
- < x s d : e l e m e n t   n a m e = " M e d i a S e r v i c e M e t a d a t a "   m a : i n d e x = " 8 "   n i l l a b l e = " t r u e "   m a : d i s p l a y N a m e = " M e d i a S e r v i c e M e t a d a t a "   m a : h i d d e n = " t r u e "   m a : i n t e r n a l N a m e = " M e d i a S e r v i c e M e t a d a t a "   m a : r e a d O n l y = " t r u e " > - 
- < x s d : s i m p l e T y p e > - 
- < x s d : r e s t r i c t i o n   b a s e = " d m s : N o t e " / > - 
- < / x s d : s i m p l e T y p e > - 
- < / x s d : e l e m e n t > - 
- < x s d : e l e m e n t   n a m e = " M e d i a S e r v i c e F a s t M e t a d a t a "   m a : i n d e x = " 9 "   n i l l a b l e = " t r u e "   m a : d i s p l a y N a m e = " M e d i a S e r v i c e F a s t M e t a d a t a "   m a : h i d d e n = " t r u e "   m a : i n t e r n a l N a m e = " M e d i a S e r v i c e F a s t M e t a d a t a "   m a : r e a d O n l y = " t r u e " > - 
- < x s d : s i m p l e T y p e > - 
- < x s d : r e s t r i c t i o n   b a s e = " d m s : N o t e " / > - 
- < / x s d : s i m p l e T y p e > - 
- < / x s d : e l e m e n t > - 
- < x s d : e l e m e n t   n a m e = " D o c u m e n t _ x 0 0 2 0 _ P u r p o s e "   m a : i n d e x = " 1 4 "   n i l l a b l e = " t r u e "   m a : d i s p l a y N a m e = " D o c u m e n t   P u r p o s e "   m a : d e f a u l t = " I n f o r m a t i o n a l "   m a : f o r m a t = " D r o p d o w n "   m a : i n t e r n a l N a m e = " D o c u m e n t _ x 0 0 2 0 _ P u r p o s e " > - 
- < x s d : s i m p l e T y p e > - 
- < x s d : r e s t r i c t i o n   b a s e = " d m s : C h o i c e " > - 
- < x s d : e n u m e r a t i o n   v a l u e = " I n f o r m a t i o n a l " / > - 
- < x s d : e n u m e r a t i o n   v a l u e = " F e a t u r e   S p e c " / > - 
- < x s d : e n u m e r a t i o n   v a l u e = " E n g i n e e r i n g   D e s i g n " / > - 
- < x s d : e n u m e r a t i o n   v a l u e = " P l a n n i n g " / > - 
- < / x s d : r e s t r i c t i o n > - 
- < / x s d : s i m p l e T y p e > - 
- < / x s d : e l e m e n t > - 
- < x s d : e l e m e n t   n a m e = " I n i t i a t i v e s "   m a : i n d e x = " 1 5 "   n i l l a b l e = " t r u e "   m a : d i s p l a y N a m e = " I n i t i a t i v e s "   m a : d e s c r i p t i o n = " L i s t   o f   i n i t i a t i v e s   r e l a t e d   t o   t h i s   d o c u m e n t "   m a : i n t e r n a l N a m e = " I n i t i a t i v e s " > - 
- < x s d : c o m p l e x T y p e > - 
- < x s d : c o m p l e x C o n t e n t > - 
- < x s d : e x t e n s i o n   b a s e = " d m s : M u l t i C h o i c e " > - 
- < x s d : s e q u e n c e > - 
- < x s d : e l e m e n t   n a m e = " V a l u e "   m a x O c c u r s = " u n b o u n d e d "   m i n O c c u r s = " 0 "   n i l l a b l e = " t r u e " > - 
- < x s d : s i m p l e T y p e > - 
- < x s d : r e s t r i c t i o n   b a s e = " d m s : C h o i c e " > - 
- < x s d : e n u m e r a t i o n   v a l u e = " A d d - i n   M A U " / > - 
- < x s d : e n u m e r a t i o n   v a l u e = " C u s t o m   F u n c t i o n s " / > - 
- < x s d : e n u m e r a t i o n   v a l u e = " D a t a   & a m p ;   A n a l y t i c s " / > - 
- < x s d : e n u m e r a t i o n   v a l u e = " D e v E x :   P o r t a l s   & a m p ;   P r o g r a m s " / > - 
- < x s d : e n u m e r a t i o n   v a l u e = " D e v E x :   T o o l s   & a m p ;   L i b r a r i e s " / > - 
- < x s d : e n u m e r a t i o n   v a l u e = " E n g i n e e r i n g " / > - 
- < x s d : e n u m e r a t i o n   v a l u e = " E x c e l   A P I " / > - 
- < x s d : e n u m e r a t i o n   v a l u e = " I n - M a r k e t   S u p p o r t " / > - 
- < x s d : e n u m e r a t i o n   v a l u e = " M a k e r   A c c e s s " / > - 
- < x s d : e n u m e r a t i o n   v a l u e = " S D X   R u n t i m e   & a m p ;   P a r t n e r s " / > - 
- < x s d : e n u m e r a t i o n   v a l u e = " S D X   S e r v i c e   D e l i v e r y " / > - 
- < x s d : e n u m e r a t i o n   v a l u e = " S D X   A P I   & a m p ;   P i p e l i n e " / > - 
- < x s d : e n u m e r a t i o n   v a l u e = " S h i e l d   & a m p ;   O C E " / > - 
- < / x s d : r e s t r i c t i o n > - 
- < / x s d : s i m p l e T y p e > - 
- < / x s d : e l e m e n t > - 
- < / x s d : s e q u e n c e > - 
- < / x s d : e x t e n s i o n > - 
- < / x s d : c o m p l e x C o n t e n t > - 
- < / x s d : c o m p l e x T y p e > - 
- < / x s d : e l e m e n t > - 
- < x s d : e l e m e n t   n a m e = " M e d i a S e r v i c e D a t e T a k e n "   m a : i n d e x = " 1 6 "   n i l l a b l e = " t r u e "   m a : d i s p l a y N a m e = " M e d i a S e r v i c e D a t e T a k e n "   m a : h i d d e n = " t r u e "   m a : i n t e r n a l N a m e = " M e d i a S e r v i c e D a t e T a k e n "   m a : r e a d O n l y = " t r u e " > - 
- < x s d : s i m p l e T y p e > - 
- < x s d : r e s t r i c t i o n   b a s e = " d m s : T e x t " / > - 
- < / x s d : s i m p l e T y p e > - 
- < / x s d : e l e m e n t > - 
- < x s d : e l e m e n t   n a m e = " M e d i a S e r v i c e A u t o T a g s "   m a : i n d e x = " 1 7 "   n i l l a b l e = " t r u e "   m a : d i s p l a y N a m e = " M e d i a S e r v i c e A u t o T a g s "   m a : i n t e r n a l N a m e = " M e d i a S e r v i c e A u t o T a g s "   m a : r e a d O n l y = " t r u e " > - 
- < x s d : s i m p l e T y p e > - 
- < x s d : r e s t r i c t i o n   b a s e = " d m s : T e x t " / > - 
- < / x s d : s i m p l e T y p e > - 
- < / x s d : e l e m e n t > - 
- < x s d : e l e m e n t   n a m e = " M e d i a S e r v i c e O C R "   m a : i n d e x = " 1 8 "   n i l l a b l e = " t r u e "   m a : d i s p l a y N a m e = " M e d i a S e r v i c e O C R "   m a : i n t e r n a l N a m e = " M e d i a S e r v i c e O C R "   m a : r e a d O n l y = " t r u e " > - 
- < x s d : s i m p l e T y p e > - 
- < x s d : r e s t r i c t i o n   b a s e = " d m s : N o t e " > - 
- < x s d : m a x L e n g t h   v a l u e = " 2 5 5 " / > - 
- < / x s d : r e s t r i c t i o n > - 
- < / x s d : s i m p l e T y p e > - 
- < / x s d : e l e m e n t > - 
- < x s d : e l e m e n t   n a m e = " M e d i a S e r v i c e L o c a t i o n "   m a : i n d e x = " 1 9 "   n i l l a b l e = " t r u e "   m a : d i s p l a y N a m e = " M e d i a S e r v i c e L o c a t i o n "   m a : i n t e r n a l N a m e = " M e d i a S e r v i c e L o c a t i o n "   m a : r e a d O n l y = " t r u e " > - 
- < x s d : s i m p l e T y p e > - 
- < x s d : r e s t r i c t i o n   b a s e = " d m s : T e x t " / > - 
- < / x s d : s i m p l e T y p e > - 
- < / x s d : e l e m e n t > - 
- < x s d : e l e m e n t   n a m e = " M e d i a S e r v i c e E v e n t H a s h C o d e "   m a : i n d e x = " 2 0 "   n i l l a b l e = " t r u e "   m a : d i s p l a y N a m e = " M e d i a S e r v i c e E v e n t H a s h C o d e "   m a : h i d d e n = " t r u e "   m a : i n t e r n a l N a m e = " M e d i a S e r v i c e E v e n t H a s h C o d e "   m a : r e a d O n l y = " t r u e " > - 
- < x s d : s i m p l e T y p e > - 
- < x s d : r e s t r i c t i o n   b a s e = " d m s : T e x t " / > - 
- < / x s d : s i m p l e T y p e > - 
- < / x s d : e l e m e n t > - 
- < x s d : e l e m e n t   n a m e = " M e d i a S e r v i c e G e n e r a t i o n T i m e "   m a : i n d e x = " 2 1 "   n i l l a b l e = " t r u e "   m a : d i s p l a y N a m e = " M e d i a S e r v i c e G e n e r a t i o n T i m e "   m a : h i d d e n = " t r u e "   m a : i n t e r n a l N a m e = " M e d i a S e r v i c e G e n e r a t i o n T i m e "   m a : r e a d O n l y = " t r u e " > - 
- < x s d : s i m p l e T y p e > - 
- < x s d : r e s t r i c t i o n   b a s e = " d m s : T e x t " / > - 
- < / x s d : s i m p l e T y p e > - 
- < / x s d : e l e m e n t > - 
- < / x s d : s c h e m a > - 
- < x s d : s c h e m a   t a r g e t N a m e s p a c e = " b 1 e 4 d 6 e e - 9 f 6 f - 4 3 f 8 - a 6 1 8 - 2 4 f 3 d 8 4 d a 2 8 f "   e l e m e n t F o r m D e f a u l t = " q u a l i f i e d "   x m l n s : x s d = " h t t p : / / w w w . w 3 . o r g / 2 0 0 1 / X M L S c h e m a "   x m l n s : x s = " h t t p : / / w w w . w 3 . o r g / 2 0 0 1 / X M L S c h e m a "   x m l n s : d m s = " h t t p : / / s c h e m a s . m i c r o s o f t . c o m / o f f i c e / 2 0 0 6 / d o c u m e n t M a n a g e m e n t / t y p e s "   x m l n s : p c = " h t t p : / / s c h e m a s . m i c r o s o f t . c o m / o f f i c e / i n f o p a t h / 2 0 0 7 / P a r t n e r C o n t r o l s " > - 
- < x s d : i m p o r t   n a m e s p a c e = " h t t p : / / s c h e m a s . m i c r o s o f t . c o m / o f f i c e / 2 0 0 6 / d o c u m e n t M a n a g e m e n t / t y p e s " / > - 
- < x s d : i m p o r t   n a m e s p a c e = " h t t p : / / s c h e m a s . m i c r o s o f t . c o m / o f f i c e / i n f o p a t h / 2 0 0 7 / P a r t n e r C o n t r o l s " / > - 
- < x s d : e l e m e n t   n a m e = " S h a r e d W i t h U s e r s "   m a : i n d e x = " 1 0 "   n i l l a b l e = " t r u e "   m a : d i s p l a y N a m e = " S h a r e d   W i t h "   m a : i n t e r n a l N a m e = " S h a r e d W i t h U s e r s "   m a : r e a d O n l y = " t r u e " > - 
- < x s d : c o m p l e x T y p e > - 
- < x s d : c o m p l e x C o n t e n t > - 
- < x s d : e x t e n s i o n   b a s e = " d m s : U s e r M u l t i " > - 
- < x s d : s e q u e n c e > - 
- < x s d : e l e m e n t   n a m e = " U s e r I n f o "   m i n O c c u r s = " 0 "   m a x O c c u r s = " u n b o u n d e d " > - 
- < x s d : c o m p l e x T y p e > - 
- < x s d : s e q u e n c e > - 
- < x s d : e l e m e n t   n a m e = " D i s p l a y N a m e "   t y p e = " x s d : s t r i n g "   m i n O c c u r s = " 0 " / > - 
- < x s d : e l e m e n t   n a m e = " A c c o u n t I d "   t y p e = " d m s : U s e r I d "   m i n O c c u r s = " 0 "   n i l l a b l e = " t r u e " / > - 
- < x s d : e l e m e n t   n a m e = " A c c o u n t T y p e "   t y p e = " x s d : s t r i n g "   m i n O c c u r s = " 0 " / > - 
- < / x s d : s e q u e n c e > - 
- < / x s d : c o m p l e x T y p e > - 
- < / x s d : e l e m e n t > - 
- < / x s d : s e q u e n c e > - 
- < / x s d : e x t e n s i o n > - 
- < / x s d : c o m p l e x C o n t e n t > - 
- < / x s d : c o m p l e x T y p e > - 
- < / x s d : e l e m e n t > - 
- < x s d : e l e m e n t   n a m e = " S h a r e d W i t h D e t a i l s "   m a : i n d e x = " 1 1 "   n i l l a b l e = " t r u e "   m a : d i s p l a y N a m e = " S h a r e d   W i t h   D e t a i l s "   m a : i n t e r n a l N a m e = " S h a r e d W i t h D e t a i l s "   m a : r e a d O n l y = " t r u e " > - 
- < x s d : s i m p l e T y p e > - 
- < x s d : r e s t r i c t i o n   b a s e = " d m s : N o t e " > - 
- < x s d : m a x L e n g t h   v a l u e = " 2 5 5 " / > - 
- < / x s d : r e s t r i c t i o n > - 
- < / x s d : s i m p l e T y p e > - 
- < / x s d : e l e m e n t > - 
- < x s d : e l e m e n t   n a m e = " L a s t S h a r e d B y U s e r "   m a : i n d e x = " 1 2 "   n i l l a b l e = " t r u e "   m a : d i s p l a y N a m e = " L a s t   S h a r e d   B y   U s e r "   m a : h i d d e n = " t r u e "   m a : i n t e r n a l N a m e = " L a s t S h a r e d B y U s e r "   m a : r e a d O n l y = " t r u e " > - 
- < x s d : s i m p l e T y p e > - 
- < x s d : r e s t r i c t i o n   b a s e = " d m s : N o t e " / > - 
- < / x s d : s i m p l e T y p e > - 
- < / x s d : e l e m e n t > - 
- < x s d : e l e m e n t   n a m e = " L a s t S h a r e d B y T i m e "   m a : i n d e x = " 1 3 "   n i l l a b l e = " t r u e "   m a : d i s p l a y N a m e = " L a s t   S h a r e d   B y   T i m e "   m a : h i d d e n = " t r u e "   m a : i n t e r n a l N a m e = " L a s t S h a r e d B y T i m e "   m a : r e a d O n l y = " t r u e " > - 
- < x s d : s i m p l e T y p e > - 
- < x s d : r e s t r i c t i o n   b a s e = " d m s : D a t e T i m e " / > - 
- < / x s d : s i m p l e T y p e > - 
- < / x s d : e l e m e n t > - 
- < / x s d : s c h e m a > - 
- < x s d : s c h e m a   t a r g e t N a m e s p a c e = " h t t p : / / s c h e m a s . o p e n x m l f o r m a t s . o r g / p a c k a g e / 2 0 0 6 / m e t a d a t a / c o r e - p r o p e r t i e s "   e l e m e n t F o r m D e f a u l t = " q u a l i f i e d "   a t t r i b u t e F o r m D e f a u l t = " u n q u a l i f i e d "   b l o c k D e f a u l t = " # a l l "   x m l n s = " h t t p : / / s c h e m a s . o p e n x m l f o r m a t s . o r g / p a c k a g e / 2 0 0 6 / m e t a d a t a / c o r e - p r o p e r t i e s "   x m l n s : x s d = " h t t p : / / w w w . w 3 . o r g / 2 0 0 1 / X M L S c h e m a "   x m l n s : x s i = " h t t p : / / w w w . w 3 . o r g / 2 0 0 1 / X M L S c h e m a - i n s t a n c e "   x m l n s : d c = " h t t p : / / p u r l . o r g / d c / e l e m e n t s / 1 . 1 / "   x m l n s : d c t e r m s = " h t t p : / / p u r l . o r g / d c / t e r m s / "   x m l n s : o d o c = " h t t p : / / s c h e m a s . m i c r o s o f t . c o m / i n t e r n a l / o b d " > - 
- < x s d : i m p o r t   n a m e s p a c e = " h t t p : / / p u r l . o r g / d c / e l e m e n t s / 1 . 1 / "   s c h e m a L o c a t i o n = " h t t p : / / d u b l i n c o r e . o r g / s c h e m a s / x m l s / q d c / 2 0 0 3 / 0 4 / 0 2 / d c . x s d " / > - 
- < x s d : i m p o r t   n a m e s p a c e = " h t t p : / / p u r l . o r g / d c / t e r m s / "   s c h e m a L o c a t i o n = " h t t p : / / d u b l i n c o r e . o r g / s c h e m a s / x m l s / q d c / 2 0 0 3 / 0 4 / 0 2 / d c t e r m s . x s d " / > - 
- < x s d : e l e m e n t   n a m e = " c o r e P r o p e r t i e s "   t y p e = " C T _ c o r e P r o p e r t i e s " / > - 
- < x s d : c o m p l e x T y p e   n a m e = " C T _ c o r e P r o p e r t i e s " > - 
- < x s d : a l l > - 
- < x s d : e l e m e n t   r e f = " d c : c r e a t o r "   m i n O c c u r s = " 0 "   m a x O c c u r s = " 1 " / > - 
- < x s d : e l e m e n t   r e f = " d c t e r m s : c r e a t e d "   m i n O c c u r s = " 0 "   m a x O c c u r s = " 1 " / > - 
- < x s d : e l e m e n t   r e f = " d c : i d e n t i f i e r "   m i n O c c u r s = " 0 "   m a x O c c u r s = " 1 " / > - 
- < x s d : e l e m e n t   n a m e = " c o n t e n t T y p e "   m i n O c c u r s = " 0 "   m a x O c c u r s = " 1 "   t y p e = " x s d : s t r i n g "   m a : i n d e x = " 0 "   m a : d i s p l a y N a m e = " C o n t e n t   T y p e " / > - 
- < x s d : e l e m e n t   r e f = " d c : t i t l e "   m i n O c c u r s = " 0 "   m a x O c c u r s = " 1 "   m a : i n d e x = " 4 "   m a : d i s p l a y N a m e = " T i t l e " / > - 
- < x s d : e l e m e n t   r e f = " d c : s u b j e c t "   m i n O c c u r s = " 0 "   m a x O c c u r s = " 1 " / > - 
- < x s d : e l e m e n t   r e f = " d c : d e s c r i p t i o n "   m i n O c c u r s = " 0 "   m a x O c c u r s = " 1 " / > - 
- < x s d : e l e m e n t   n a m e = " k e y w o r d s "   m i n O c c u r s = " 0 "   m a x O c c u r s = " 1 "   t y p e = " x s d : s t r i n g " / > - 
- < x s d : e l e m e n t   r e f = " d c : l a n g u a g e "   m i n O c c u r s = " 0 "   m a x O c c u r s = " 1 " / > - 
- < x s d : e l e m e n t   n a m e = " c a t e g o r y "   m i n O c c u r s = " 0 "   m a x O c c u r s = " 1 "   t y p e = " x s d : s t r i n g " / > - 
- < x s d : e l e m e n t   n a m e = " v e r s i o n "   m i n O c c u r s = " 0 "   m a x O c c u r s = " 1 "   t y p e = " x s d : s t r i n g " / > - 
- < x s d : e l e m e n t   n a m e = " r e v i s i o n "   m i n O c c u r s = " 0 "   m a x O c c u r s = " 1 "   t y p e = " x s d : s t r i n g " > - 
- < x s d : a n n o t a t i o n > - 
- < x s d : d o c u m e n t a t i o n > - 
-                                                 T h i s   v a l u e   i n d i c a t e s   t h e   n u m b e r   o f   s a v e s   o r   r e v i s i o n s .   T h e   a p p l i c a t i o n   i s   r e s p o n s i b l e   f o r   u p d a t i n g   t h i s   v a l u e   a f t e r   e a c h   r e v i s i o n . - 
-                                         < / x s d : d o c u m e n t a t i o n > - 
- < / x s d : a n n o t a t i o n > - 
- < / x s d : e l e m e n t > - 
- < x s d : e l e m e n t   n a m e = " l a s t M o d i f i e d B y "   m i n O c c u r s = " 0 "   m a x O c c u r s = " 1 "   t y p e = " x s d : s t r i n g " / > - 
- < x s d : e l e m e n t   r e f = " d c t e r m s : m o d i f i e d "   m i n O c c u r s = " 0 "   m a x O c c u r s = " 1 " / > - 
- < x s d : e l e m e n t   n a m e = " c o n t e n t S t a t u s "   m i n O c c u r s = " 0 "   m a x O c c u r s = " 1 "   t y p e = " x s d : s t r i n g " / > - 
- < / x s d : a l l > - 
- < / x s d : c o m p l e x T y p e > - 
- < / x s d : s c h e m a > - 
- < x s : s c h e m a   t a r g e t N a m e s p a c e = " h t t p : / / s c h e m a s . m i c r o s o f t . c o m / o f f i c e / i n f o p a t h / 2 0 0 7 / P a r t n e r C o n t r o l s "   e l e m e n t F o r m D e f a u l t = " q u a l i f i e d "   a t t r i b u t e F o r m D e f a u l t = " u n q u a l i f i e d "   x m l n s : p c = " h t t p : / / s c h e m a s . m i c r o s o f t . c o m / o f f i c e / i n f o p a t h / 2 0 0 7 / P a r t n e r C o n t r o l s "   x m l n s : x s = " h t t p : / / w w w . w 3 . o r g / 2 0 0 1 / X M L S c h e m a " > - 
- < x s : e l e m e n t   n a m e = " P e r s o n " > - 
- < x s : c o m p l e x T y p e > - 
- < x s : s e q u e n c e > - 
- < x s : e l e m e n t   r e f = " p c : D i s p l a y N a m e "   m i n O c c u r s = " 0 " > < / x s : e l e m e n t > - 
- < x s : e l e m e n t   r e f = " p c : A c c o u n t I d "   m i n O c c u r s = " 0 " > < / x s : e l e m e n t > - 
- < x s : e l e m e n t   r e f = " p c : A c c o u n t T y p e "   m i n O c c u r s = " 0 " > < / x s : e l e m e n t > - 
- < / x s : s e q u e n c e > - 
- < / x s : c o m p l e x T y p e > - 
- < / x s : e l e m e n t > - 
- < x s : e l e m e n t   n a m e = " D i s p l a y N a m e "   t y p e = " x s : s t r i n g " > < / x s : e l e m e n t > - 
- < x s : e l e m e n t   n a m e = " A c c o u n t I d "   t y p e = " x s : s t r i n g " > < / x s : e l e m e n t > - 
- < x s : e l e m e n t   n a m e = " A c c o u n t T y p e "   t y p e = " x s : s t r i n g " > < / x s : e l e m e n t > - 
- < x s : e l e m e n t   n a m e = " B D C A s s o c i a t e d E n t i t y " > - 
- < x s : c o m p l e x T y p e > - 
- < x s : s e q u e n c e > - 
- < x s : e l e m e n t   r e f = " p c : B D C E n t i t y "   m i n O c c u r s = " 0 "   m a x O c c u r s = " u n b o u n d e d " > < / x s : e l e m e n t > - 
- < / x s : s e q u e n c e > - 
- < x s : a t t r i b u t e   r e f = " p c : E n t i t y N a m e s p a c e " > < / x s : a t t r i b u t e > - 
- < x s : a t t r i b u t e   r e f = " p c : E n t i t y N a m e " > < / x s : a t t r i b u t e > - 
- < x s : a t t r i b u t e   r e f = " p c : S y s t e m I n s t a n c e N a m e " > < / x s : a t t r i b u t e > - 
- < x s : a t t r i b u t e   r e f = " p c : A s s o c i a t i o n N a m e " > < / x s : a t t r i b u t e > - 
- < / x s : c o m p l e x T y p e > - 
- < / x s : e l e m e n t > - 
- < x s : a t t r i b u t e   n a m e = " E n t i t y N a m e s p a c e "   t y p e = " x s : s t r i n g " > < / x s : a t t r i b u t e > - 
- < x s : a t t r i b u t e   n a m e = " E n t i t y N a m e "   t y p e = " x s : s t r i n g " > < / x s : a t t r i b u t e > - 
- < x s : a t t r i b u t e   n a m e = " S y s t e m I n s t a n c e N a m e "   t y p e = " x s : s t r i n g " > < / x s : a t t r i b u t e > - 
- < x s : a t t r i b u t e   n a m e = " A s s o c i a t i o n N a m e "   t y p e = " x s : s t r i n g " > < / x s : a t t r i b u t e > - 
- < x s : e l e m e n t   n a m e = " B D C E n t i t y " > - 
- < x s : c o m p l e x T y p e > - 
- < x s : s e q u e n c e > - 
- < x s : e l e m e n t   r e f = " p c : E n t i t y D i s p l a y N a m e "   m i n O c c u r s = " 0 " > < / x s : e l e m e n t > - 
- < x s : e l e m e n t   r e f = " p c : E n t i t y I n s t a n c e R e f e r e n c e "   m i n O c c u r s = " 0 " > < / x s : e l e m e n t > - 
- < x s : e l e m e n t   r e f = " p c : E n t i t y I d 1 "   m i n O c c u r s = " 0 " > < / x s : e l e m e n t > - 
- < x s : e l e m e n t   r e f = " p c : E n t i t y I d 2 "   m i n O c c u r s = " 0 " > < / x s : e l e m e n t > - 
- < x s : e l e m e n t   r e f = " p c : E n t i t y I d 3 "   m i n O c c u r s = " 0 " > < / x s : e l e m e n t > - 
- < x s : e l e m e n t   r e f = " p c : E n t i t y I d 4 "   m i n O c c u r s = " 0 " > < / x s : e l e m e n t > - 
- < x s : e l e m e n t   r e f = " p c : E n t i t y I d 5 "   m i n O c c u r s = " 0 " > < / x s : e l e m e n t > - 
- < / x s : s e q u e n c e > - 
- < / x s : c o m p l e x T y p e > - 
- < / x s : e l e m e n t > - 
- < x s : e l e m e n t   n a m e = " E n t i t y D i s p l a y N a m e "   t y p e = " x s : s t r i n g " > < / x s : e l e m e n t > - 
- < x s : e l e m e n t   n a m e = " E n t i t y I n s t a n c e R e f e r e n c e "   t y p e = " x s : s t r i n g " > < / x s : e l e m e n t > - 
- < x s : e l e m e n t   n a m e = " E n t i t y I d 1 "   t y p e = " x s : s t r i n g " > < / x s : e l e m e n t > - 
- < x s : e l e m e n t   n a m e = " E n t i t y I d 2 "   t y p e = " x s : s t r i n g " > < / x s : e l e m e n t > - 
- < x s : e l e m e n t   n a m e = " E n t i t y I d 3 "   t y p e = " x s : s t r i n g " > < / x s : e l e m e n t > - 
- < x s : e l e m e n t   n a m e = " E n t i t y I d 4 "   t y p e = " x s : s t r i n g " > < / x s : e l e m e n t > - 
- < x s : e l e m e n t   n a m e = " E n t i t y I d 5 "   t y p e = " x s : s t r i n g " > < / x s : e l e m e n t > - 
- < x s : e l e m e n t   n a m e = " T e r m s " > - 
- < x s : c o m p l e x T y p e > - 
- < x s : s e q u e n c e > - 
- < x s : e l e m e n t   r e f = " p c : T e r m I n f o "   m i n O c c u r s = " 0 "   m a x O c c u r s = " u n b o u n d e d " > < / x s : e l e m e n t > - 
- < / x s : s e q u e n c e > - 
- < / x s : c o m p l e x T y p e > - 
- < / x s : e l e m e n t > - 
- < x s : e l e m e n t   n a m e = " T e r m I n f o " > - 
- < x s : c o m p l e x T y p e > - 
- < x s : s e q u e n c e > - 
- < x s : e l e m e n t   r e f = " p c : T e r m N a m e "   m i n O c c u r s = " 0 " > < / x s : e l e m e n t > - 
- < x s : e l e m e n t   r e f = " p c : T e r m I d "   m i n O c c u r s = " 0 " > < / x s : e l e m e n t > - 
- < / x s : s e q u e n c e > - 
- < / x s : c o m p l e x T y p e > - 
- < / x s : e l e m e n t > - 
- < x s : e l e m e n t   n a m e = " T e r m N a m e "   t y p e = " x s : s t r i n g " > < / x s : e l e m e n t > - 
- < x s : e l e m e n t   n a m e = " T e r m I d "   t y p e = " x s : s t r i n g " > < / x s : e l e m e n t > - 
- < / x s : s c h e m a > - 
- < / c t : c o n t e n t T y p e S c h e m a > 
+<file path=customXml/item1.xml><?xml version="1.0" encoding="utf-8"?>
+<p:properties xmlns:p="http://schemas.microsoft.com/office/2006/metadata/properties" xmlns:xsi="http://www.w3.org/2001/XMLSchema-instance" xmlns:pc="http://schemas.microsoft.com/office/infopath/2007/PartnerControls">
+  <documentManagement>
+    <Document_x0020_Purpose xmlns="f577acbf-5b0b-4b4f-9948-268e97f8d3a4">Informational</Document_x0020_Purpose>
+    <Initiatives xmlns="f577acbf-5b0b-4b4f-9948-268e97f8d3a4"/>
+  </documentManagement>
+</p:properties>
 </file>
 
-<file path=customXml/item2.xml>��< ? m s o - c o n t e n t T y p e ? > < F o r m T e m p l a t e s   x m l n s = " h t t p : / / s c h e m a s . m i c r o s o f t . c o m / s h a r e p o i n t / v 3 / c o n t e n t t y p e / f o r m s " > < D i s p l a y > D o c u m e n t L i b r a r y F o r m < / D i s p l a y > < E d i t > D o c u m e n t L i b r a r y F o r m < / E d i t > < N e w > D o c u m e n t L i b r a r y F o r m < / N e w > < / F o r m T e m p l a t e s > 
+<file path=customXml/item2.xml><?xml version="1.0" encoding="utf-8"?>
+<?mso-contentType ?>
+<FormTemplates xmlns="http://schemas.microsoft.com/sharepoint/v3/contenttype/forms">
+  <Display>DocumentLibraryForm</Display>
+  <Edit>DocumentLibraryForm</Edit>
+  <New>DocumentLibraryForm</New>
+</FormTemplates>
 </file>
 
-<file path=customXml/item3.xml>��< ? x m l   v e r s i o n = " 1 . 0 " ? > < p : p r o p e r t i e s   x m l n s : p = " h t t p : / / s c h e m a s . m i c r o s o f t . c o m / o f f i c e / 2 0 0 6 / m e t a d a t a / p r o p e r t i e s "   x m l n s : x s i = " h t t p : / / w w w . w 3 . o r g / 2 0 0 1 / X M L S c h e m a - i n s t a n c e "   x m l n s : p c = " h t t p : / / s c h e m a s . m i c r o s o f t . c o m / o f f i c e / i n f o p a t h / 2 0 0 7 / P a r t n e r C o n t r o l s " > < d o c u m e n t M a n a g e m e n t > < D o c u m e n t _ x 0 0 2 0 _ P u r p o s e   x m l n s = " f 5 7 7 a c b f - 5 b 0 b - 4 b 4 f - 9 9 4 8 - 2 6 8 e 9 7 f 8 d 3 a 4 " > I n f o r m a t i o n a l < / D o c u m e n t _ x 0 0 2 0 _ P u r p o s e > < I n i t i a t i v e s   x m l n s = " f 5 7 7 a c b f - 5 b 0 b - 4 b 4 f - 9 9 4 8 - 2 6 8 e 9 7 f 8 d 3 a 4 " / > < / d o c u m e n t M a n a g e m e n t > < / p : p r o p e r t i e s > 
+<file path=customXml/item3.xml><?xml version="1.0" encoding="utf-8"?>
+<ct:contentTypeSchema xmlns:ct="http://schemas.microsoft.com/office/2006/metadata/contentType" xmlns:ma="http://schemas.microsoft.com/office/2006/metadata/properties/metaAttributes" ct:_="" ma:_="" ma:contentTypeName="Document" ma:contentTypeID="0x010100CD401524DC532D42A0E0ED886331A72B" ma:contentTypeVersion="15" ma:contentTypeDescription="Create a new document." ma:contentTypeScope="" ma:versionID="aba17d7263e5a17e1efe42a3571abb41">
+  <xsd:schema xmlns:xsd="http://www.w3.org/2001/XMLSchema" xmlns:xs="http://www.w3.org/2001/XMLSchema" xmlns:p="http://schemas.microsoft.com/office/2006/metadata/properties" xmlns:ns2="f577acbf-5b0b-4b4f-9948-268e97f8d3a4" xmlns:ns3="b1e4d6ee-9f6f-43f8-a618-24f3d84da28f" targetNamespace="http://schemas.microsoft.com/office/2006/metadata/properties" ma:root="true" ma:fieldsID="e4e3c9c8ed1c3d723d02c9f1cb24d19a" ns2:_="" ns3:_="">
+    <xsd:import namespace="f577acbf-5b0b-4b4f-9948-268e97f8d3a4"/>
+    <xsd:import namespace="b1e4d6ee-9f6f-43f8-a618-24f3d84da28f"/>
+    <xsd:element name="properties">
+      <xsd:complexType>
+        <xsd:sequence>
+          <xsd:element name="documentManagement">
+            <xsd:complexType>
+              <xsd:all>
+                <xsd:element ref="ns2:MediaServiceMetadata" minOccurs="0"/>
+                <xsd:element ref="ns2:MediaServiceFastMetadata" minOccurs="0"/>
+                <xsd:element ref="ns3:SharedWithUsers" minOccurs="0"/>
+                <xsd:element ref="ns3:SharedWithDetails" minOccurs="0"/>
+                <xsd:element ref="ns3:LastSharedByUser" minOccurs="0"/>
+                <xsd:element ref="ns3:LastSharedByTime" minOccurs="0"/>
+                <xsd:element ref="ns2:Document_x0020_Purpose" minOccurs="0"/>
+                <xsd:element ref="ns2:Initiatives" minOccurs="0"/>
+                <xsd:element ref="ns2:MediaServiceDateTaken" minOccurs="0"/>
+                <xsd:element ref="ns2:MediaServiceAutoTags" minOccurs="0"/>
+                <xsd:element ref="ns2:MediaServiceOCR" minOccurs="0"/>
+                <xsd:element ref="ns2:MediaServiceLocation" minOccurs="0"/>
+                <xsd:element ref="ns2:MediaServiceEventHashCode" minOccurs="0"/>
+                <xsd:element ref="ns2:MediaServiceGenerationTime" minOccurs="0"/>
+              </xsd:all>
+            </xsd:complexType>
+          </xsd:element>
+        </xsd:sequence>
+      </xsd:complexType>
+    </xsd:element>
+  </xsd:schema>
+  <xsd:schema xmlns:xsd="http://www.w3.org/2001/XMLSchema" xmlns:xs="http://www.w3.org/2001/XMLSchema" xmlns:dms="http://schemas.microsoft.com/office/2006/documentManagement/types" xmlns:pc="http://schemas.microsoft.com/office/infopath/2007/PartnerControls" targetNamespace="f577acbf-5b0b-4b4f-9948-268e97f8d3a4" elementFormDefault="qualified">
+    <xsd:import namespace="http://schemas.microsoft.com/office/2006/documentManagement/types"/>
+    <xsd:import namespace="http://schemas.microsoft.com/office/infopath/2007/PartnerControls"/>
+    <xsd:element name="MediaServiceMetadata" ma:index="8" nillable="true" ma:displayName="MediaServiceMetadata" ma:hidden="true" ma:internalName="MediaServiceMetadata" ma:readOnly="true">
+      <xsd:simpleType>
+        <xsd:restriction base="dms:Note"/>
+      </xsd:simpleType>
+    </xsd:element>
+    <xsd:element name="MediaServiceFastMetadata" ma:index="9" nillable="true" ma:displayName="MediaServiceFastMetadata" ma:hidden="true" ma:internalName="MediaServiceFastMetadata" ma:readOnly="true">
+      <xsd:simpleType>
+        <xsd:restriction base="dms:Note"/>
+      </xsd:simpleType>
+    </xsd:element>
+    <xsd:element name="Document_x0020_Purpose" ma:index="14" nillable="true" ma:displayName="Document Purpose" ma:default="Informational" ma:format="Dropdown" ma:internalName="Document_x0020_Purpose">
+      <xsd:simpleType>
+        <xsd:restriction base="dms:Choice">
+          <xsd:enumeration value="Informational"/>
+          <xsd:enumeration value="Feature Spec"/>
+          <xsd:enumeration value="Engineering Design"/>
+          <xsd:enumeration value="Planning"/>
+        </xsd:restriction>
+      </xsd:simpleType>
+    </xsd:element>
+    <xsd:element name="Initiatives" ma:index="15" nillable="true" ma:displayName="Initiatives" ma:description="List of initiatives related to this document" ma:internalName="Initiatives">
+      <xsd:complexType>
+        <xsd:complexContent>
+          <xsd:extension base="dms:MultiChoice">
+            <xsd:sequence>
+              <xsd:element name="Value" maxOccurs="unbounded" minOccurs="0" nillable="true">
+                <xsd:simpleType>
+                  <xsd:restriction base="dms:Choice">
+                    <xsd:enumeration value="Add-in MAU"/>
+                    <xsd:enumeration value="Custom Functions"/>
+                    <xsd:enumeration value="Data &amp; Analytics"/>
+                    <xsd:enumeration value="DevEx: Portals &amp; Programs"/>
+                    <xsd:enumeration value="DevEx: Tools &amp; Libraries"/>
+                    <xsd:enumeration value="Engineering"/>
+                    <xsd:enumeration value="Excel API"/>
+                    <xsd:enumeration value="In-Market Support"/>
+                    <xsd:enumeration value="Maker Access"/>
+                    <xsd:enumeration value="SDX Runtime &amp; Partners"/>
+                    <xsd:enumeration value="SDX Service Delivery"/>
+                    <xsd:enumeration value="SDX API &amp; Pipeline"/>
+                    <xsd:enumeration value="Shield &amp; OCE"/>
+                  </xsd:restriction>
+                </xsd:simpleType>
+              </xsd:element>
+            </xsd:sequence>
+          </xsd:extension>
+        </xsd:complexContent>
+      </xsd:complexType>
+    </xsd:element>
+    <xsd:element name="MediaServiceDateTaken" ma:index="16" nillable="true" ma:displayName="MediaServiceDateTaken" ma:hidden="true" ma:internalName="MediaServiceDateTaken" ma:readOnly="true">
+      <xsd:simpleType>
+        <xsd:restriction base="dms:Text"/>
+      </xsd:simpleType>
+    </xsd:element>
+    <xsd:element name="MediaServiceAutoTags" ma:index="17" nillable="true" ma:displayName="MediaServiceAutoTags" ma:internalName="MediaServiceAutoTags" ma:readOnly="true">
+      <xsd:simpleType>
+        <xsd:restriction base="dms:Text"/>
+      </xsd:simpleType>
+    </xsd:element>
+    <xsd:element name="MediaServiceOCR" ma:index="18" nillable="true" ma:displayName="MediaServiceOCR" ma:internalName="MediaServiceOCR" ma:readOnly="true">
+      <xsd:simpleType>
+        <xsd:restriction base="dms:Note">
+          <xsd:maxLength value="255"/>
+        </xsd:restriction>
+      </xsd:simpleType>
+    </xsd:element>
+    <xsd:element name="MediaServiceLocation" ma:index="19" nillable="true" ma:displayName="MediaServiceLocation" ma:internalName="MediaServiceLocation" ma:readOnly="true">
+      <xsd:simpleType>
+        <xsd:restriction base="dms:Text"/>
+      </xsd:simpleType>
+    </xsd:element>
+    <xsd:element name="MediaServiceEventHashCode" ma:index="20" nillable="true" ma:displayName="MediaServiceEventHashCode" ma:hidden="true" ma:internalName="MediaServiceEventHashCode" ma:readOnly="true">
+      <xsd:simpleType>
+        <xsd:restriction base="dms:Text"/>
+      </xsd:simpleType>
+    </xsd:element>
+    <xsd:element name="MediaServiceGenerationTime" ma:index="21" nillable="true" ma:displayName="MediaServiceGenerationTime" ma:hidden="true" ma:internalName="MediaServiceGenerationTime" ma:readOnly="true">
+      <xsd:simpleType>
+        <xsd:restriction base="dms:Text"/>
+      </xsd:simpleType>
+    </xsd:element>
+  </xsd:schema>
+  <xsd:schema xmlns:xsd="http://www.w3.org/2001/XMLSchema" xmlns:xs="http://www.w3.org/2001/XMLSchema" xmlns:dms="http://schemas.microsoft.com/office/2006/documentManagement/types" xmlns:pc="http://schemas.microsoft.com/office/infopath/2007/PartnerControls" targetNamespace="b1e4d6ee-9f6f-43f8-a618-24f3d84da28f" elementFormDefault="qualified">
+    <xsd:import namespace="http://schemas.microsoft.com/office/2006/documentManagement/types"/>
+    <xsd:import namespace="http://schemas.microsoft.com/office/infopath/2007/PartnerControls"/>
+    <xsd:element name="SharedWithUsers" ma:index="10" nillable="true" ma:displayName="Shared With" ma:internalName="SharedWithUsers" ma:readOnly="true">
+      <xsd:complexType>
+        <xsd:complexContent>
+          <xsd:extension base="dms:UserMulti">
+            <xsd:sequence>
+              <xsd:element name="UserInfo" minOccurs="0" maxOccurs="unbounded">
+                <xsd:complexType>
+                  <xsd:sequence>
+                    <xsd:element name="DisplayName" type="xsd:string" minOccurs="0"/>
+                    <xsd:element name="AccountId" type="dms:UserId" minOccurs="0" nillable="true"/>
+                    <xsd:element name="AccountType" type="xsd:string" minOccurs="0"/>
+                  </xsd:sequence>
+                </xsd:complexType>
+              </xsd:element>
+            </xsd:sequence>
+          </xsd:extension>
+        </xsd:complexContent>
+      </xsd:complexType>
+    </xsd:element>
+    <xsd:element name="SharedWithDetails" ma:index="11" nillable="true" ma:displayName="Shared With Details" ma:internalName="SharedWithDetails" ma:readOnly="true">
+      <xsd:simpleType>
+        <xsd:restriction base="dms:Note">
+          <xsd:maxLength value="255"/>
+        </xsd:restriction>
+      </xsd:simpleType>
+    </xsd:element>
+    <xsd:element name="LastSharedByUser" ma:index="12" nillable="true" ma:displayName="Last Shared By User" ma:hidden="true" ma:internalName="LastSharedByUser" ma:readOnly="true">
+      <xsd:simpleType>
+        <xsd:restriction base="dms:Note"/>
+      </xsd:simpleType>
+    </xsd:element>
+    <xsd:element name="LastSharedByTime" ma:index="13" nillable="true" ma:displayName="Last Shared By Time" ma:hidden="true" ma:internalName="LastSharedByTime" ma:readOnly="true">
+      <xsd:simpleType>
+        <xsd:restriction base="dms:DateTime"/>
+      </xsd:simpleType>
+    </xsd:element>
+  </xsd:schema>
+  <xsd:schema xmlns="http://schemas.openxmlformats.org/package/2006/metadata/core-properties" xmlns:xsd="http://www.w3.org/2001/XMLSchema" xmlns:xsi="http://www.w3.org/2001/XMLSchema-instance" xmlns:dc="http://purl.org/dc/elements/1.1/" xmlns:dcterms="http://purl.org/dc/terms/" xmlns:odoc="http://schemas.microsoft.com/internal/obd" targetNamespace="http://schemas.openxmlformats.org/package/2006/metadata/core-properties" elementFormDefault="qualified" attributeFormDefault="unqualified" blockDefault="#all">
+    <xsd:import namespace="http://purl.org/dc/elements/1.1/" schemaLocation="http://dublincore.org/schemas/xmls/qdc/2003/04/02/dc.xsd"/>
+    <xsd:import namespace="http://purl.org/dc/terms/" schemaLocation="http://dublincore.org/schemas/xmls/qdc/2003/04/02/dcterms.xsd"/>
+    <xsd:element name="coreProperties" type="CT_coreProperties"/>
+    <xsd:complexType name="CT_coreProperties">
+      <xsd:all>
+        <xsd:element ref="dc:creator" minOccurs="0" maxOccurs="1"/>
+        <xsd:element ref="dcterms:created" minOccurs="0" maxOccurs="1"/>
+        <xsd:element ref="dc:identifier" minOccurs="0" maxOccurs="1"/>
+        <xsd:element name="contentType" minOccurs="0" maxOccurs="1" type="xsd:string" ma:index="0" ma:displayName="Content Type"/>
+        <xsd:element ref="dc:title" minOccurs="0" maxOccurs="1" ma:index="4" ma:displayName="Title"/>
+        <xsd:element ref="dc:subject" minOccurs="0" maxOccurs="1"/>
+        <xsd:element ref="dc:description" minOccurs="0" maxOccurs="1"/>
+        <xsd:element name="keywords" minOccurs="0" maxOccurs="1" type="xsd:string"/>
+        <xsd:element ref="dc:language" minOccurs="0" maxOccurs="1"/>
+        <xsd:element name="category" minOccurs="0" maxOccurs="1" type="xsd:string"/>
+        <xsd:element name="version" minOccurs="0" maxOccurs="1" type="xsd:string"/>
+        <xsd:element name="revision" minOccurs="0" maxOccurs="1" type="xsd:string">
+          <xsd:annotation>
+            <xsd:documentation>
+                        This value indicates the number of saves or revisions. The application is responsible for updating this value after each revision.
+                    </xsd:documentation>
+          </xsd:annotation>
+        </xsd:element>
+        <xsd:element name="lastModifiedBy" minOccurs="0" maxOccurs="1" type="xsd:string"/>
+        <xsd:element ref="dcterms:modified" minOccurs="0" maxOccurs="1"/>
+        <xsd:element name="contentStatus" minOccurs="0" maxOccurs="1" type="xsd:string"/>
+      </xsd:all>
+    </xsd:complexType>
+  </xsd:schema>
+  <xs:schema xmlns:pc="http://schemas.microsoft.com/office/infopath/2007/PartnerControls" xmlns:xs="http://www.w3.org/2001/XMLSchema" targetNamespace="http://schemas.microsoft.com/office/infopath/2007/PartnerControls" elementFormDefault="qualified" attributeFormDefault="unqualified">
+    <xs:element name="Person">
+      <xs:complexType>
+        <xs:sequence>
+          <xs:element ref="pc:DisplayName" minOccurs="0"/>
+          <xs:element ref="pc:AccountId" minOccurs="0"/>
+          <xs:element ref="pc:AccountType" minOccurs="0"/>
+        </xs:sequence>
+      </xs:complexType>
+    </xs:element>
+    <xs:element name="DisplayName" type="xs:string"/>
+    <xs:element name="AccountId" type="xs:string"/>
+    <xs:element name="AccountType" type="xs:string"/>
+    <xs:element name="BDCAssociatedEntity">
+      <xs:complexType>
+        <xs:sequence>
+          <xs:element ref="pc:BDCEntity" minOccurs="0" maxOccurs="unbounded"/>
+        </xs:sequence>
+        <xs:attribute ref="pc:EntityNamespace"/>
+        <xs:attribute ref="pc:EntityName"/>
+        <xs:attribute ref="pc:SystemInstanceName"/>
+        <xs:attribute ref="pc:AssociationName"/>
+      </xs:complexType>
+    </xs:element>
+    <xs:attribute name="EntityNamespace" type="xs:string"/>
+    <xs:attribute name="EntityName" type="xs:string"/>
+    <xs:attribute name="SystemInstanceName" type="xs:string"/>
+    <xs:attribute name="AssociationName" type="xs:string"/>
+    <xs:element name="BDCEntity">
+      <xs:complexType>
+        <xs:sequence>
+          <xs:element ref="pc:EntityDisplayName" minOccurs="0"/>
+          <xs:element ref="pc:EntityInstanceReference" minOccurs="0"/>
+          <xs:element ref="pc:EntityId1" minOccurs="0"/>
+          <xs:element ref="pc:EntityId2" minOccurs="0"/>
+          <xs:element ref="pc:EntityId3" minOccurs="0"/>
+          <xs:element ref="pc:EntityId4" minOccurs="0"/>
+          <xs:element ref="pc:EntityId5" minOccurs="0"/>
+        </xs:sequence>
+      </xs:complexType>
+    </xs:element>
+    <xs:element name="EntityDisplayName" type="xs:string"/>
+    <xs:element name="EntityInstanceReference" type="xs:string"/>
+    <xs:element name="EntityId1" type="xs:string"/>
+    <xs:element name="EntityId2" type="xs:string"/>
+    <xs:element name="EntityId3" type="xs:string"/>
+    <xs:element name="EntityId4" type="xs:string"/>
+    <xs:element name="EntityId5" type="xs:string"/>
+    <xs:element name="Terms">
+      <xs:complexType>
+        <xs:sequence>
+          <xs:element ref="pc:TermInfo" minOccurs="0" maxOccurs="unbounded"/>
+        </xs:sequence>
+      </xs:complexType>
+    </xs:element>
+    <xs:element name="TermInfo">
+      <xs:complexType>
+        <xs:sequence>
+          <xs:element ref="pc:TermName" minOccurs="0"/>
+          <xs:element ref="pc:TermId" minOccurs="0"/>
+        </xs:sequence>
+      </xs:complexType>
+    </xs:element>
+    <xs:element name="TermName" type="xs:string"/>
+    <xs:element name="TermId" type="xs:string"/>
+  </xs:schema>
+</ct:contentTypeSchema>
 </file>
 
 <file path=customXml/itemProps1.xml><?xml version="1.0" encoding="utf-8"?>
-<ds:datastoreItem xmlns:ds="http://schemas.openxmlformats.org/officeDocument/2006/customXml" ds:itemID="{1DD29C39-1C4E-4B06-A1F4-2510F2DACF6E}">
+<ds:datastoreItem xmlns:ds="http://schemas.openxmlformats.org/officeDocument/2006/customXml" ds:itemID="{617AB1FA-2F28-4684-9230-02ACEB6C0B0A}">
   <ds:schemaRefs/>
 </ds:datastoreItem>
 </file>
@@ -8891,7 +9520,7 @@
 </file>
 
 <file path=customXml/itemProps3.xml><?xml version="1.0" encoding="utf-8"?>
-<ds:datastoreItem xmlns:ds="http://schemas.openxmlformats.org/officeDocument/2006/customXml" ds:itemID="{617AB1FA-2F28-4684-9230-02ACEB6C0B0A}">
+<ds:datastoreItem xmlns:ds="http://schemas.openxmlformats.org/officeDocument/2006/customXml" ds:itemID="{1DD29C39-1C4E-4B06-A1F4-2510F2DACF6E}">
   <ds:schemaRefs/>
 </ds:datastoreItem>
 </file>
</xml_diff>

<commit_message>
explained briefly what is cryptocurrency
</commit_message>
<xml_diff>
--- a/Power Point Presentations/Presentation Week 3 Group D.pptx
+++ b/Power Point Presentations/Presentation Week 3 Group D.pptx
@@ -14,15 +14,16 @@
     <p:sldId id="267" r:id="rId11"/>
     <p:sldId id="258" r:id="rId12"/>
     <p:sldId id="259" r:id="rId13"/>
-    <p:sldId id="260" r:id="rId14"/>
-    <p:sldId id="262" r:id="rId15"/>
-    <p:sldId id="264" r:id="rId16"/>
-    <p:sldId id="263" r:id="rId17"/>
-    <p:sldId id="272" r:id="rId18"/>
-    <p:sldId id="273" r:id="rId19"/>
-    <p:sldId id="274" r:id="rId20"/>
-    <p:sldId id="270" r:id="rId21"/>
-    <p:sldId id="271" r:id="rId22"/>
+    <p:sldId id="275" r:id="rId14"/>
+    <p:sldId id="260" r:id="rId15"/>
+    <p:sldId id="262" r:id="rId16"/>
+    <p:sldId id="264" r:id="rId17"/>
+    <p:sldId id="263" r:id="rId18"/>
+    <p:sldId id="272" r:id="rId19"/>
+    <p:sldId id="273" r:id="rId20"/>
+    <p:sldId id="274" r:id="rId21"/>
+    <p:sldId id="270" r:id="rId22"/>
+    <p:sldId id="271" r:id="rId23"/>
   </p:sldIdLst>
   <p:sldSz cx="12192000" cy="6858000"/>
   <p:notesSz cx="6858000" cy="9144000"/>
@@ -851,7 +852,7 @@
           <a:p>
             <a:fld id="{37A2730A-859E-B540-ADF3-E97069AD1FDB}" type="datetimeFigureOut">
               <a:rPr lang="en-US" smtClean="0"/>
-              <a:t>02-Feb-24</a:t>
+              <a:t>2/2/24</a:t>
             </a:fld>
             <a:endParaRPr lang="en-US"/>
           </a:p>
@@ -1097,7 +1098,7 @@
           <a:p>
             <a:fld id="{37A2730A-859E-B540-ADF3-E97069AD1FDB}" type="datetimeFigureOut">
               <a:rPr lang="en-US" smtClean="0"/>
-              <a:t>02-Feb-24</a:t>
+              <a:t>2/2/24</a:t>
             </a:fld>
             <a:endParaRPr lang="en-US"/>
           </a:p>
@@ -1406,7 +1407,7 @@
           <a:p>
             <a:fld id="{37A2730A-859E-B540-ADF3-E97069AD1FDB}" type="datetimeFigureOut">
               <a:rPr lang="en-US" smtClean="0"/>
-              <a:t>02-Feb-24</a:t>
+              <a:t>2/2/24</a:t>
             </a:fld>
             <a:endParaRPr lang="en-US"/>
           </a:p>
@@ -1742,7 +1743,7 @@
           <a:p>
             <a:fld id="{37A2730A-859E-B540-ADF3-E97069AD1FDB}" type="datetimeFigureOut">
               <a:rPr lang="en-US" smtClean="0"/>
-              <a:t>02-Feb-24</a:t>
+              <a:t>2/2/24</a:t>
             </a:fld>
             <a:endParaRPr lang="en-US"/>
           </a:p>
@@ -2051,7 +2052,7 @@
           <a:p>
             <a:fld id="{37A2730A-859E-B540-ADF3-E97069AD1FDB}" type="datetimeFigureOut">
               <a:rPr lang="en-US" smtClean="0"/>
-              <a:t>02-Feb-24</a:t>
+              <a:t>2/2/24</a:t>
             </a:fld>
             <a:endParaRPr lang="en-US"/>
           </a:p>
@@ -2439,7 +2440,7 @@
           <a:p>
             <a:fld id="{37A2730A-859E-B540-ADF3-E97069AD1FDB}" type="datetimeFigureOut">
               <a:rPr lang="en-US" smtClean="0"/>
-              <a:t>02-Feb-24</a:t>
+              <a:t>2/2/24</a:t>
             </a:fld>
             <a:endParaRPr lang="en-US"/>
           </a:p>
@@ -2604,7 +2605,7 @@
           <a:p>
             <a:fld id="{37A2730A-859E-B540-ADF3-E97069AD1FDB}" type="datetimeFigureOut">
               <a:rPr lang="en-US" smtClean="0"/>
-              <a:t>02-Feb-24</a:t>
+              <a:t>2/2/24</a:t>
             </a:fld>
             <a:endParaRPr lang="en-US"/>
           </a:p>
@@ -2779,7 +2780,7 @@
           <a:p>
             <a:fld id="{37A2730A-859E-B540-ADF3-E97069AD1FDB}" type="datetimeFigureOut">
               <a:rPr lang="en-US" smtClean="0"/>
-              <a:t>02-Feb-24</a:t>
+              <a:t>2/2/24</a:t>
             </a:fld>
             <a:endParaRPr lang="en-US"/>
           </a:p>
@@ -2950,7 +2951,7 @@
           <a:p>
             <a:fld id="{37A2730A-859E-B540-ADF3-E97069AD1FDB}" type="datetimeFigureOut">
               <a:rPr lang="en-US" smtClean="0"/>
-              <a:t>02-Feb-24</a:t>
+              <a:t>2/2/24</a:t>
             </a:fld>
             <a:endParaRPr lang="en-US"/>
           </a:p>
@@ -3192,7 +3193,7 @@
           <a:p>
             <a:fld id="{37A2730A-859E-B540-ADF3-E97069AD1FDB}" type="datetimeFigureOut">
               <a:rPr lang="en-US" smtClean="0"/>
-              <a:t>02-Feb-24</a:t>
+              <a:t>2/2/24</a:t>
             </a:fld>
             <a:endParaRPr lang="en-US"/>
           </a:p>
@@ -3419,7 +3420,7 @@
           <a:p>
             <a:fld id="{37A2730A-859E-B540-ADF3-E97069AD1FDB}" type="datetimeFigureOut">
               <a:rPr lang="en-US" smtClean="0"/>
-              <a:t>02-Feb-24</a:t>
+              <a:t>2/2/24</a:t>
             </a:fld>
             <a:endParaRPr lang="en-US"/>
           </a:p>
@@ -3788,7 +3789,7 @@
           <a:p>
             <a:fld id="{37A2730A-859E-B540-ADF3-E97069AD1FDB}" type="datetimeFigureOut">
               <a:rPr lang="en-US" smtClean="0"/>
-              <a:t>02-Feb-24</a:t>
+              <a:t>2/2/24</a:t>
             </a:fld>
             <a:endParaRPr lang="en-US"/>
           </a:p>
@@ -3906,7 +3907,7 @@
           <a:p>
             <a:fld id="{37A2730A-859E-B540-ADF3-E97069AD1FDB}" type="datetimeFigureOut">
               <a:rPr lang="en-US" smtClean="0"/>
-              <a:t>02-Feb-24</a:t>
+              <a:t>2/2/24</a:t>
             </a:fld>
             <a:endParaRPr lang="en-US"/>
           </a:p>
@@ -3996,7 +3997,7 @@
           <a:p>
             <a:fld id="{37A2730A-859E-B540-ADF3-E97069AD1FDB}" type="datetimeFigureOut">
               <a:rPr lang="en-US" smtClean="0"/>
-              <a:t>02-Feb-24</a:t>
+              <a:t>2/2/24</a:t>
             </a:fld>
             <a:endParaRPr lang="en-US"/>
           </a:p>
@@ -4246,7 +4247,7 @@
           <a:p>
             <a:fld id="{37A2730A-859E-B540-ADF3-E97069AD1FDB}" type="datetimeFigureOut">
               <a:rPr lang="en-US" smtClean="0"/>
-              <a:t>02-Feb-24</a:t>
+              <a:t>2/2/24</a:t>
             </a:fld>
             <a:endParaRPr lang="en-US"/>
           </a:p>
@@ -4504,7 +4505,7 @@
           <a:p>
             <a:fld id="{37A2730A-859E-B540-ADF3-E97069AD1FDB}" type="datetimeFigureOut">
               <a:rPr lang="en-US" smtClean="0"/>
-              <a:t>02-Feb-24</a:t>
+              <a:t>2/2/24</a:t>
             </a:fld>
             <a:endParaRPr lang="en-US"/>
           </a:p>
@@ -5242,7 +5243,7 @@
           <a:p>
             <a:fld id="{37A2730A-859E-B540-ADF3-E97069AD1FDB}" type="datetimeFigureOut">
               <a:rPr lang="en-US" smtClean="0"/>
-              <a:t>02-Feb-24</a:t>
+              <a:t>2/2/24</a:t>
             </a:fld>
             <a:endParaRPr lang="en-US"/>
           </a:p>
@@ -5855,10 +5856,6 @@
             <a:br>
               <a:rPr lang="en-US" dirty="0"/>
             </a:br>
-            <a:r>
-              <a:rPr lang="en-US" dirty="0"/>
-              <a:t/>
-            </a:r>
             <a:br>
               <a:rPr lang="en-US" dirty="0"/>
             </a:br>
@@ -5997,7 +5994,13 @@
       </p:grpSpPr>
       <p:sp>
         <p:nvSpPr>
-          <p:cNvPr id="2" name="Title 1"/>
+          <p:cNvPr id="2" name="Title 1">
+            <a:extLst>
+              <a:ext uri="{FF2B5EF4-FFF2-40B4-BE49-F238E27FC236}">
+                <a16:creationId xmlns:a16="http://schemas.microsoft.com/office/drawing/2014/main" id="{9089B3E2-EB90-780B-5185-CFAB59201657}"/>
+              </a:ext>
+            </a:extLst>
+          </p:cNvPr>
           <p:cNvSpPr>
             <a:spLocks noGrp="1"/>
           </p:cNvSpPr>
@@ -6012,15 +6015,20 @@
           <a:p>
             <a:r>
               <a:rPr lang="en-US" dirty="0"/>
-              <a:t>The data itself</a:t>
-            </a:r>
-            <a:endParaRPr lang="de-DE" dirty="0"/>
-          </a:p>
-        </p:txBody>
-      </p:sp>
-      <p:sp>
-        <p:nvSpPr>
-          <p:cNvPr id="3" name="Content Placeholder 2"/>
+              <a:t>What is Cryptocurrency</a:t>
+            </a:r>
+          </a:p>
+        </p:txBody>
+      </p:sp>
+      <p:sp>
+        <p:nvSpPr>
+          <p:cNvPr id="3" name="Content Placeholder 2">
+            <a:extLst>
+              <a:ext uri="{FF2B5EF4-FFF2-40B4-BE49-F238E27FC236}">
+                <a16:creationId xmlns:a16="http://schemas.microsoft.com/office/drawing/2014/main" id="{7CB8E7AC-02E1-A2CF-B610-2F8BEF861B5C}"/>
+              </a:ext>
+            </a:extLst>
+          </p:cNvPr>
           <p:cNvSpPr>
             <a:spLocks noGrp="1"/>
           </p:cNvSpPr>
@@ -6028,71 +6036,63 @@
             <p:ph idx="1"/>
           </p:nvPr>
         </p:nvSpPr>
-        <p:spPr/>
-        <p:txBody>
-          <a:bodyPr/>
-          <a:lstStyle/>
-          <a:p>
-            <a:pPr marL="0" indent="0">
-              <a:buNone/>
-            </a:pPr>
-            <a:r>
-              <a:rPr lang="en-US" dirty="0"/>
-              <a:t>We retrieved our data from Kaggle, which is a subsidiary from Google, and it’s an online community for engineers of all fields, that allows the users to find and access datasets used to build AI models.</a:t>
-            </a:r>
-          </a:p>
-          <a:p>
-            <a:pPr marL="0" indent="0">
-              <a:buNone/>
-            </a:pPr>
+        <p:spPr>
+          <a:xfrm>
+            <a:off x="677334" y="1822877"/>
+            <a:ext cx="8596668" cy="3880773"/>
+          </a:xfrm>
+        </p:spPr>
+        <p:txBody>
+          <a:bodyPr>
+            <a:normAutofit/>
+          </a:bodyPr>
+          <a:lstStyle/>
+          <a:p>
+            <a:r>
+              <a:rPr lang="en-CA" b="0" i="0" u="none" strike="noStrike" dirty="0">
+                <a:solidFill>
+                  <a:srgbClr val="1F1F1F"/>
+                </a:solidFill>
+                <a:effectLst/>
+                <a:latin typeface="Source Sans Pro" panose="020F0502020204030204" pitchFamily="34" charset="0"/>
+              </a:rPr>
+              <a:t>Cryptocurrency, or crypto, is a digital payment platform that eliminates the need to carry physical money. It exists only in digital form, and although people mainly use it for online transactions, you can make some physical purchases. Unlike traditional money printed only by the government, several companies sell cryptocurrency. </a:t>
+            </a:r>
+          </a:p>
+          <a:p>
+            <a:pPr algn="l"/>
+            <a:r>
+              <a:rPr lang="en-CA" b="0" i="0" u="none" strike="noStrike" dirty="0">
+                <a:solidFill>
+                  <a:srgbClr val="1F1F1F"/>
+                </a:solidFill>
+                <a:effectLst/>
+                <a:latin typeface="Source Sans Pro" panose="020B0503030403020204" pitchFamily="34" charset="0"/>
+              </a:rPr>
+              <a:t>Transactions are then verified and recorded on a blockchain, an unchangeable ledger that tracks and records assets and trades.   </a:t>
+            </a:r>
+          </a:p>
+          <a:p>
+            <a:r>
+              <a:rPr lang="en-CA" b="0" i="0" u="none" strike="noStrike" dirty="0">
+                <a:solidFill>
+                  <a:srgbClr val="1F1F1F"/>
+                </a:solidFill>
+                <a:effectLst/>
+                <a:latin typeface="Source Sans Pro" panose="020B0503030403020204" pitchFamily="34" charset="0"/>
+              </a:rPr>
+              <a:t>Cryptocurrency is available as coins or tokens. The difference between them is that tokens are assets that exist on a blockchain, while coins can be virtual, digital, or tangible. </a:t>
+            </a:r>
             <a:endParaRPr lang="en-US" dirty="0"/>
           </a:p>
-          <a:p>
-            <a:pPr marL="0" indent="0">
-              <a:buNone/>
-            </a:pPr>
-            <a:r>
-              <a:rPr lang="en-US" dirty="0">
-                <a:solidFill>
-                  <a:srgbClr val="FF0000"/>
-                </a:solidFill>
-              </a:rPr>
-              <a:t>This is the link for our dataset: </a:t>
-            </a:r>
-            <a:r>
-              <a:rPr lang="en-US" dirty="0">
-                <a:solidFill>
-                  <a:srgbClr val="0070C0"/>
-                </a:solidFill>
-                <a:sym typeface="+mn-ea"/>
-              </a:rPr>
-              <a:t>https://www.kaggle.com/datasets/maharshipandya/-cryptocurrency-historical-prices-dataset</a:t>
-            </a:r>
-            <a:endParaRPr lang="en-US" dirty="0">
-              <a:solidFill>
-                <a:srgbClr val="FF0000"/>
-              </a:solidFill>
-            </a:endParaRPr>
-          </a:p>
-          <a:p>
-            <a:pPr marL="0" indent="0">
-              <a:buNone/>
-            </a:pPr>
-            <a:endParaRPr lang="en-US" dirty="0"/>
-          </a:p>
-          <a:p>
-            <a:pPr marL="0" indent="0">
-              <a:buNone/>
-            </a:pPr>
-            <a:r>
-              <a:rPr lang="en-US" dirty="0"/>
-              <a:t>Now lets see the data itself!</a:t>
-            </a:r>
-            <a:endParaRPr lang="de-DE" dirty="0"/>
-          </a:p>
         </p:txBody>
       </p:sp>
     </p:spTree>
+    <p:extLst>
+      <p:ext uri="{BB962C8B-B14F-4D97-AF65-F5344CB8AC3E}">
+        <p14:creationId xmlns:p14="http://schemas.microsoft.com/office/powerpoint/2010/main" val="1634564367"/>
+      </p:ext>
+    </p:extLst>
   </p:cSld>
   <p:clrMapOvr>
     <a:masterClrMapping/>
@@ -6134,7 +6134,7 @@
           <a:p>
             <a:r>
               <a:rPr lang="en-US" dirty="0"/>
-              <a:t>The Dataset</a:t>
+              <a:t>The data itself</a:t>
             </a:r>
             <a:endParaRPr lang="de-DE" dirty="0"/>
           </a:p>
@@ -6155,80 +6155,62 @@
           <a:bodyPr/>
           <a:lstStyle/>
           <a:p>
+            <a:pPr marL="0" indent="0">
+              <a:buNone/>
+            </a:pPr>
+            <a:r>
+              <a:rPr lang="en-US" dirty="0"/>
+              <a:t>We retrieved our data from Kaggle, which is a subsidiary from Google, and it’s an online community for engineers of all fields, that allows the users to find and access datasets used to build AI models.</a:t>
+            </a:r>
+          </a:p>
+          <a:p>
+            <a:pPr marL="0" indent="0">
+              <a:buNone/>
+            </a:pPr>
+            <a:endParaRPr lang="en-US" dirty="0"/>
+          </a:p>
+          <a:p>
+            <a:pPr marL="0" indent="0">
+              <a:buNone/>
+            </a:pPr>
             <a:r>
               <a:rPr lang="en-US" dirty="0">
                 <a:solidFill>
-                  <a:srgbClr val="FF0000"/>
+                  <a:schemeClr val="tx1"/>
                 </a:solidFill>
               </a:rPr>
-              <a:t>It contains 9 columns</a:t>
-            </a:r>
-          </a:p>
-          <a:p>
+              <a:t>This is the link for our dataset: </a:t>
+            </a:r>
             <a:r>
               <a:rPr lang="en-US" dirty="0">
                 <a:solidFill>
-                  <a:srgbClr val="FF0000"/>
-                </a:solidFill>
+                  <a:srgbClr val="0070C0"/>
+                </a:solidFill>
+                <a:sym typeface="+mn-ea"/>
               </a:rPr>
-              <a:t>It contains 72946 registers or rows</a:t>
-            </a:r>
-          </a:p>
-          <a:p>
-            <a:r>
-              <a:rPr lang="en-US" dirty="0">
-                <a:solidFill>
-                  <a:srgbClr val="FF0000"/>
-                </a:solidFill>
-              </a:rPr>
-              <a:t>It contains info for 56 different cryptos</a:t>
-            </a:r>
-          </a:p>
-          <a:p>
-            <a:r>
-              <a:rPr lang="en-US" dirty="0">
-                <a:solidFill>
-                  <a:srgbClr val="FF0000"/>
-                </a:solidFill>
-              </a:rPr>
-              <a:t>The start and end date for our data is 2013-05-05 / 2022-10-23</a:t>
-            </a:r>
-          </a:p>
-          <a:p>
-            <a:r>
-              <a:rPr lang="en-US" dirty="0">
-                <a:solidFill>
-                  <a:srgbClr val="FF0000"/>
-                </a:solidFill>
-              </a:rPr>
-              <a:t>Some potential challenges we saw during the exploration were: Value of crypto totally depends upon the investor and market demands. </a:t>
-            </a:r>
-            <a:r>
-              <a:rPr lang="en-US">
-                <a:solidFill>
-                  <a:srgbClr val="FF0000"/>
-                </a:solidFill>
-              </a:rPr>
-              <a:t>So, market </a:t>
-            </a:r>
-            <a:r>
-              <a:rPr lang="en-US" dirty="0">
-                <a:solidFill>
-                  <a:srgbClr val="FF0000"/>
-                </a:solidFill>
-              </a:rPr>
-              <a:t>value can highly be affected by external factor as well.</a:t>
-            </a:r>
-          </a:p>
-          <a:p>
-            <a:r>
-              <a:rPr lang="en-US" dirty="0">
-                <a:solidFill>
-                  <a:srgbClr val="FF0000"/>
-                </a:solidFill>
-              </a:rPr>
-              <a:t>The columns that we would be using to train our model probably are: open, low, high, close, volume, crypto name, date</a:t>
-            </a:r>
+              <a:t>https://www.kaggle.com/datasets/maharshipandya/-cryptocurrency-historical-prices-dataset</a:t>
+            </a:r>
+            <a:endParaRPr lang="en-US" dirty="0">
+              <a:solidFill>
+                <a:srgbClr val="FF0000"/>
+              </a:solidFill>
+            </a:endParaRPr>
+          </a:p>
+          <a:p>
+            <a:pPr marL="0" indent="0">
+              <a:buNone/>
+            </a:pPr>
+            <a:endParaRPr lang="en-US" dirty="0"/>
+          </a:p>
+          <a:p>
+            <a:pPr marL="0" indent="0">
+              <a:buNone/>
+            </a:pPr>
+            <a:r>
+              <a:rPr lang="en-US" dirty="0"/>
+              <a:t>Now let’s see the data itself!</a:t>
+            </a:r>
+            <a:endParaRPr lang="de-DE" dirty="0"/>
           </a:p>
         </p:txBody>
       </p:sp>
@@ -6298,16 +6280,61 @@
             <a:r>
               <a:rPr lang="en-US" dirty="0">
                 <a:solidFill>
-                  <a:srgbClr val="FF0000"/>
+                  <a:schemeClr val="tx1"/>
                 </a:solidFill>
               </a:rPr>
-              <a:t>Insert Image of the excel dataset</a:t>
-            </a:r>
-            <a:endParaRPr lang="de-DE" dirty="0">
-              <a:solidFill>
-                <a:srgbClr val="FF0000"/>
-              </a:solidFill>
-            </a:endParaRPr>
+              <a:t>It contains 9 columns</a:t>
+            </a:r>
+          </a:p>
+          <a:p>
+            <a:r>
+              <a:rPr lang="en-US" dirty="0">
+                <a:solidFill>
+                  <a:schemeClr val="tx1"/>
+                </a:solidFill>
+              </a:rPr>
+              <a:t>It contains 72946 registers or rows</a:t>
+            </a:r>
+          </a:p>
+          <a:p>
+            <a:r>
+              <a:rPr lang="en-US" dirty="0">
+                <a:solidFill>
+                  <a:schemeClr val="tx1"/>
+                </a:solidFill>
+              </a:rPr>
+              <a:t>It contains info for 56 different cryptos</a:t>
+            </a:r>
+          </a:p>
+          <a:p>
+            <a:r>
+              <a:rPr lang="en-US" dirty="0">
+                <a:solidFill>
+                  <a:schemeClr val="tx1"/>
+                </a:solidFill>
+              </a:rPr>
+              <a:t>The start and end date for our data is 2013-05-05 / 2022-10-23</a:t>
+            </a:r>
+          </a:p>
+          <a:p>
+            <a:r>
+              <a:rPr lang="en-US" dirty="0">
+                <a:solidFill>
+                  <a:schemeClr val="tx1"/>
+                </a:solidFill>
+              </a:rPr>
+              <a:t>Some potential challenges we saw during the exploration were: Value of crypto totally depends upon the investor and market demands. So, market value can highly be affected by external factor as well.</a:t>
+            </a:r>
+          </a:p>
+          <a:p>
+            <a:r>
+              <a:rPr lang="en-US" dirty="0">
+                <a:solidFill>
+                  <a:schemeClr val="tx1"/>
+                </a:solidFill>
+              </a:rPr>
+              <a:t>The columns that we would be using to train our model probably are: open, low, high, close, volume, crypto name, date</a:t>
+            </a:r>
           </a:p>
         </p:txBody>
       </p:sp>
@@ -6353,7 +6380,7 @@
           <a:p>
             <a:r>
               <a:rPr lang="en-US" dirty="0"/>
-              <a:t>Exploring the data</a:t>
+              <a:t>The Dataset</a:t>
             </a:r>
             <a:endParaRPr lang="de-DE" dirty="0"/>
           </a:p>
@@ -6374,37 +6401,6 @@
           <a:bodyPr/>
           <a:lstStyle/>
           <a:p>
-            <a:r>
-              <a:rPr lang="en-US" dirty="0"/>
-              <a:t>In order to start the data exploration, we mixed our group with Leandro’s group during the weekend to deliver 2 hour training on: </a:t>
-            </a:r>
-            <a:r>
-              <a:rPr lang="en-US" dirty="0" err="1"/>
-              <a:t>Jupyter</a:t>
-            </a:r>
-            <a:r>
-              <a:rPr lang="en-US" dirty="0"/>
-              <a:t> notebook, pandas and python. </a:t>
-            </a:r>
-          </a:p>
-          <a:p>
-            <a:r>
-              <a:rPr lang="en-US" dirty="0"/>
-              <a:t>By doing so we give each member of both teams the basic tools they need to access and start manipulating the data. </a:t>
-            </a:r>
-          </a:p>
-          <a:p>
-            <a:endParaRPr lang="en-US" dirty="0"/>
-          </a:p>
-          <a:p>
-            <a:r>
-              <a:rPr lang="en-US" dirty="0">
-                <a:solidFill>
-                  <a:srgbClr val="FF0000"/>
-                </a:solidFill>
-              </a:rPr>
-              <a:t>Link to the training recording: </a:t>
-            </a:r>
             <a:endParaRPr lang="de-DE" dirty="0">
               <a:solidFill>
                 <a:srgbClr val="FF0000"/>
@@ -6413,6 +6409,36 @@
           </a:p>
         </p:txBody>
       </p:sp>
+      <p:pic>
+        <p:nvPicPr>
+          <p:cNvPr id="6" name="Picture 5" descr="A screenshot of a spreadsheet&#10;&#10;Description automatically generated">
+            <a:extLst>
+              <a:ext uri="{FF2B5EF4-FFF2-40B4-BE49-F238E27FC236}">
+                <a16:creationId xmlns:a16="http://schemas.microsoft.com/office/drawing/2014/main" id="{62E93624-3D77-CD52-8CDF-7D23A5A33DB3}"/>
+              </a:ext>
+            </a:extLst>
+          </p:cNvPr>
+          <p:cNvPicPr>
+            <a:picLocks noChangeAspect="1"/>
+          </p:cNvPicPr>
+          <p:nvPr/>
+        </p:nvPicPr>
+        <p:blipFill>
+          <a:blip r:embed="rId2"/>
+          <a:stretch>
+            <a:fillRect/>
+          </a:stretch>
+        </p:blipFill>
+        <p:spPr>
+          <a:xfrm>
+            <a:off x="677333" y="1270000"/>
+            <a:ext cx="8983501" cy="5428093"/>
+          </a:xfrm>
+          <a:prstGeom prst="rect">
+            <a:avLst/>
+          </a:prstGeom>
+        </p:spPr>
+      </p:pic>
     </p:spTree>
   </p:cSld>
   <p:clrMapOvr>
@@ -6440,6 +6466,108 @@
       </p:grpSpPr>
       <p:sp>
         <p:nvSpPr>
+          <p:cNvPr id="2" name="Title 1"/>
+          <p:cNvSpPr>
+            <a:spLocks noGrp="1"/>
+          </p:cNvSpPr>
+          <p:nvPr>
+            <p:ph type="title"/>
+          </p:nvPr>
+        </p:nvSpPr>
+        <p:spPr/>
+        <p:txBody>
+          <a:bodyPr/>
+          <a:lstStyle/>
+          <a:p>
+            <a:r>
+              <a:rPr lang="en-US" dirty="0"/>
+              <a:t>Exploring the data</a:t>
+            </a:r>
+            <a:endParaRPr lang="de-DE" dirty="0"/>
+          </a:p>
+        </p:txBody>
+      </p:sp>
+      <p:sp>
+        <p:nvSpPr>
+          <p:cNvPr id="3" name="Content Placeholder 2"/>
+          <p:cNvSpPr>
+            <a:spLocks noGrp="1"/>
+          </p:cNvSpPr>
+          <p:nvPr>
+            <p:ph idx="1"/>
+          </p:nvPr>
+        </p:nvSpPr>
+        <p:spPr/>
+        <p:txBody>
+          <a:bodyPr/>
+          <a:lstStyle/>
+          <a:p>
+            <a:r>
+              <a:rPr lang="en-US" dirty="0"/>
+              <a:t>In order to start the data exploration, we mixed our group with Leandro’s group during the weekend to deliver 2-hour training on: </a:t>
+            </a:r>
+            <a:r>
+              <a:rPr lang="en-US" dirty="0" err="1"/>
+              <a:t>Jupyter</a:t>
+            </a:r>
+            <a:r>
+              <a:rPr lang="en-US" dirty="0"/>
+              <a:t> notebook, pandas and python. </a:t>
+            </a:r>
+          </a:p>
+          <a:p>
+            <a:r>
+              <a:rPr lang="en-US" dirty="0"/>
+              <a:t>By doing so we give each member of both teams the basic tools they need to access and start manipulating the data. </a:t>
+            </a:r>
+          </a:p>
+          <a:p>
+            <a:endParaRPr lang="en-US" dirty="0"/>
+          </a:p>
+          <a:p>
+            <a:r>
+              <a:rPr lang="en-US" dirty="0">
+                <a:solidFill>
+                  <a:srgbClr val="FF0000"/>
+                </a:solidFill>
+              </a:rPr>
+              <a:t>Link to the training recording: </a:t>
+            </a:r>
+            <a:endParaRPr lang="de-DE" dirty="0">
+              <a:solidFill>
+                <a:srgbClr val="FF0000"/>
+              </a:solidFill>
+            </a:endParaRPr>
+          </a:p>
+        </p:txBody>
+      </p:sp>
+    </p:spTree>
+  </p:cSld>
+  <p:clrMapOvr>
+    <a:masterClrMapping/>
+  </p:clrMapOvr>
+</p:sld>
+</file>
+
+<file path=ppt/slides/slide15.xml><?xml version="1.0" encoding="utf-8"?>
+<p:sld xmlns:a="http://schemas.openxmlformats.org/drawingml/2006/main" xmlns:r="http://schemas.openxmlformats.org/officeDocument/2006/relationships" xmlns:p="http://schemas.openxmlformats.org/presentationml/2006/main">
+  <p:cSld>
+    <p:spTree>
+      <p:nvGrpSpPr>
+        <p:cNvPr id="1" name=""/>
+        <p:cNvGrpSpPr/>
+        <p:nvPr/>
+      </p:nvGrpSpPr>
+      <p:grpSpPr>
+        <a:xfrm>
+          <a:off x="0" y="0"/>
+          <a:ext cx="0" cy="0"/>
+          <a:chOff x="0" y="0"/>
+          <a:chExt cx="0" cy="0"/>
+        </a:xfrm>
+      </p:grpSpPr>
+      <p:sp>
+        <p:nvSpPr>
           <p:cNvPr id="2" name="Title 1">
             <a:extLst>
               <a:ext uri="{FF2B5EF4-FFF2-40B4-BE49-F238E27FC236}">
@@ -6552,11 +6680,6 @@
               </a:rPr>
               <a:t>The provided code and explanations showcase the initial steps of data analysis using Python libraries. </a:t>
             </a:r>
-            <a:endParaRPr lang="en-US" altLang="en-US" sz="1200" dirty="0" smtClean="0">
-              <a:solidFill>
-                <a:schemeClr val="tx1"/>
-              </a:solidFill>
-            </a:endParaRPr>
           </a:p>
           <a:p>
             <a:pPr marL="0" lvl="0" indent="0" defTabSz="914400" eaLnBrk="0" fontAlgn="base" hangingPunct="0">
@@ -6571,20 +6694,12 @@
               <a:buNone/>
             </a:pPr>
             <a:r>
-              <a:rPr lang="en-US" altLang="en-US" sz="1200" dirty="0" smtClean="0">
+              <a:rPr lang="en-US" altLang="en-US" sz="1200" dirty="0">
                 <a:solidFill>
                   <a:schemeClr val="tx1"/>
                 </a:solidFill>
               </a:rPr>
-              <a:t>By </a:t>
-            </a:r>
-            <a:r>
-              <a:rPr lang="en-US" altLang="en-US" sz="1200" dirty="0">
-                <a:solidFill>
-                  <a:schemeClr val="tx1"/>
-                </a:solidFill>
-              </a:rPr>
-              <a:t>importing Pandas as `</a:t>
+              <a:t>By importing Pandas as `</a:t>
             </a:r>
             <a:r>
               <a:rPr lang="en-US" altLang="en-US" sz="1200" dirty="0" err="1">
@@ -6691,7 +6806,7 @@
               <a:t>df_raw</a:t>
             </a:r>
             <a:r>
-              <a:rPr lang="en-US" altLang="en-US" sz="1200" dirty="0" smtClean="0">
+              <a:rPr lang="en-US" altLang="en-US" sz="1200" dirty="0">
                 <a:solidFill>
                   <a:schemeClr val="tx1"/>
                 </a:solidFill>
@@ -6712,20 +6827,12 @@
               <a:buNone/>
             </a:pPr>
             <a:r>
-              <a:rPr lang="en-US" altLang="en-US" sz="1200" dirty="0" smtClean="0">
+              <a:rPr lang="en-US" altLang="en-US" sz="1200" dirty="0">
                 <a:solidFill>
                   <a:schemeClr val="tx1"/>
                 </a:solidFill>
               </a:rPr>
-              <a:t> </a:t>
-            </a:r>
-            <a:r>
-              <a:rPr lang="en-US" altLang="en-US" sz="1200" dirty="0">
-                <a:solidFill>
-                  <a:schemeClr val="tx1"/>
-                </a:solidFill>
-              </a:rPr>
-              <a:t>This </a:t>
+              <a:t> This </a:t>
             </a:r>
             <a:r>
               <a:rPr lang="en-US" altLang="en-US" sz="1200" dirty="0" err="1">
@@ -6752,7 +6859,7 @@
               <a:t>df_raw.head</a:t>
             </a:r>
             <a:r>
-              <a:rPr lang="en-US" altLang="en-US" sz="1200" dirty="0" smtClean="0">
+              <a:rPr lang="en-US" altLang="en-US" sz="1200" dirty="0">
                 <a:solidFill>
                   <a:schemeClr val="tx1"/>
                 </a:solidFill>
@@ -6773,20 +6880,12 @@
               <a:buNone/>
             </a:pPr>
             <a:r>
-              <a:rPr lang="en-US" altLang="en-US" sz="1200" dirty="0" smtClean="0">
+              <a:rPr lang="en-US" altLang="en-US" sz="1200" dirty="0">
                 <a:solidFill>
                   <a:schemeClr val="tx1"/>
                 </a:solidFill>
               </a:rPr>
-              <a:t> </a:t>
-            </a:r>
-            <a:r>
-              <a:rPr lang="en-US" altLang="en-US" sz="1200" dirty="0">
-                <a:solidFill>
-                  <a:schemeClr val="tx1"/>
-                </a:solidFill>
-              </a:rPr>
-              <a:t>offers a glimpse of the first few rows, providing a quick overview of the dataset's content. Additionally, `</a:t>
+              <a:t> offers a glimpse of the first few rows, providing a quick overview of the dataset's content. Additionally, `</a:t>
             </a:r>
             <a:r>
               <a:rPr lang="en-US" altLang="en-US" sz="1200" dirty="0" err="1">
@@ -6804,11 +6903,6 @@
               </a:rPr>
               <a:t>` is employed </a:t>
             </a:r>
-            <a:endParaRPr lang="en-US" altLang="en-US" sz="1200" dirty="0" smtClean="0">
-              <a:solidFill>
-                <a:schemeClr val="tx1"/>
-              </a:solidFill>
-            </a:endParaRPr>
           </a:p>
           <a:p>
             <a:pPr marL="0" lvl="0" indent="0" defTabSz="914400" eaLnBrk="0" fontAlgn="base" hangingPunct="0">
@@ -6823,20 +6917,12 @@
               <a:buNone/>
             </a:pPr>
             <a:r>
-              <a:rPr lang="en-US" altLang="en-US" sz="1200" dirty="0" smtClean="0">
+              <a:rPr lang="en-US" altLang="en-US" sz="1200" dirty="0">
                 <a:solidFill>
                   <a:schemeClr val="tx1"/>
                 </a:solidFill>
               </a:rPr>
-              <a:t>to </a:t>
-            </a:r>
-            <a:r>
-              <a:rPr lang="en-US" altLang="en-US" sz="1200" dirty="0">
-                <a:solidFill>
-                  <a:schemeClr val="tx1"/>
-                </a:solidFill>
-              </a:rPr>
-              <a:t>reveal the dimensions of the </a:t>
+              <a:t>to reveal the dimensions of the </a:t>
             </a:r>
             <a:r>
               <a:rPr lang="en-US" altLang="en-US" sz="1200" dirty="0" err="1">
@@ -6852,15 +6938,7 @@
                   <a:schemeClr val="tx1"/>
                 </a:solidFill>
               </a:rPr>
-              <a:t>, specifying the number of rows and columns</a:t>
-            </a:r>
-            <a:r>
-              <a:rPr lang="en-US" altLang="en-US" sz="1200" dirty="0" smtClean="0">
-                <a:solidFill>
-                  <a:schemeClr val="tx1"/>
-                </a:solidFill>
-              </a:rPr>
-              <a:t>.</a:t>
+              <a:t>, specifying the number of rows and columns.</a:t>
             </a:r>
           </a:p>
           <a:p>
@@ -6876,20 +6954,12 @@
               <a:buNone/>
             </a:pPr>
             <a:r>
-              <a:rPr lang="en-US" altLang="en-US" sz="1200" dirty="0" smtClean="0">
+              <a:rPr lang="en-US" altLang="en-US" sz="1200" dirty="0">
                 <a:solidFill>
                   <a:schemeClr val="tx1"/>
                 </a:solidFill>
               </a:rPr>
-              <a:t> </a:t>
-            </a:r>
-            <a:r>
-              <a:rPr lang="en-US" altLang="en-US" sz="1200" dirty="0">
-                <a:solidFill>
-                  <a:schemeClr val="tx1"/>
-                </a:solidFill>
-              </a:rPr>
-              <a:t>Finally, `</a:t>
+              <a:t> Finally, `</a:t>
             </a:r>
             <a:r>
               <a:rPr lang="en-US" altLang="en-US" sz="1200" dirty="0" err="1">
@@ -6907,11 +6977,6 @@
               </a:rPr>
               <a:t>()` generates a statistical summary, presenting key metrics like mean, standard deviation, and </a:t>
             </a:r>
-            <a:endParaRPr lang="en-US" altLang="en-US" sz="1200" dirty="0" smtClean="0">
-              <a:solidFill>
-                <a:schemeClr val="tx1"/>
-              </a:solidFill>
-            </a:endParaRPr>
           </a:p>
           <a:p>
             <a:pPr marL="0" lvl="0" indent="0" defTabSz="914400" eaLnBrk="0" fontAlgn="base" hangingPunct="0">
@@ -6926,28 +6991,12 @@
               <a:buNone/>
             </a:pPr>
             <a:r>
-              <a:rPr lang="en-US" altLang="en-US" sz="1200" dirty="0" smtClean="0">
+              <a:rPr lang="en-US" altLang="en-US" sz="1200" dirty="0">
                 <a:solidFill>
                   <a:schemeClr val="tx1"/>
                 </a:solidFill>
               </a:rPr>
-              <a:t>quartiles </a:t>
-            </a:r>
-            <a:r>
-              <a:rPr lang="en-US" altLang="en-US" sz="1200" dirty="0">
-                <a:solidFill>
-                  <a:schemeClr val="tx1"/>
-                </a:solidFill>
-              </a:rPr>
-              <a:t>for numerical columns. Collectively, these steps lay the groundwork for further exploration and analysis of the dataset</a:t>
-            </a:r>
-            <a:r>
-              <a:rPr lang="en-US" altLang="en-US" sz="1200" dirty="0" smtClean="0">
-                <a:solidFill>
-                  <a:schemeClr val="tx1"/>
-                </a:solidFill>
-              </a:rPr>
-              <a:t>,</a:t>
+              <a:t>quartiles for numerical columns. Collectively, these steps lay the groundwork for further exploration and analysis of the dataset,</a:t>
             </a:r>
           </a:p>
           <a:p>
@@ -6963,22 +7012,14 @@
               <a:buNone/>
             </a:pPr>
             <a:r>
-              <a:rPr lang="en-US" altLang="en-US" sz="1200" dirty="0" smtClean="0">
+              <a:rPr lang="en-US" altLang="en-US" sz="1200" dirty="0">
                 <a:solidFill>
                   <a:schemeClr val="tx1"/>
                 </a:solidFill>
               </a:rPr>
-              <a:t> </a:t>
-            </a:r>
-            <a:r>
-              <a:rPr lang="en-US" altLang="en-US" sz="1200" dirty="0">
-                <a:solidFill>
-                  <a:schemeClr val="tx1"/>
-                </a:solidFill>
-              </a:rPr>
-              <a:t>offering insights into its structure and statistical characteristics.</a:t>
-            </a:r>
-            <a:endParaRPr kumimoji="0" lang="en-US" altLang="en-US" sz="1200" i="0" u="none" strike="noStrike" cap="none" normalizeH="0" baseline="0" dirty="0" smtClean="0">
+              <a:t> offering insights into its structure and statistical characteristics.</a:t>
+            </a:r>
+            <a:endParaRPr kumimoji="0" lang="en-US" altLang="en-US" sz="1200" i="0" u="none" strike="noStrike" cap="none" normalizeH="0" baseline="0" dirty="0">
               <a:ln>
                 <a:noFill/>
               </a:ln>
@@ -7032,7 +7073,7 @@
 </p:sld>
 </file>
 
-<file path=ppt/slides/slide15.xml><?xml version="1.0" encoding="utf-8"?>
+<file path=ppt/slides/slide16.xml><?xml version="1.0" encoding="utf-8"?>
 <p:sld xmlns:a="http://schemas.openxmlformats.org/drawingml/2006/main" xmlns:r="http://schemas.openxmlformats.org/officeDocument/2006/relationships" xmlns:p="http://schemas.openxmlformats.org/presentationml/2006/main">
   <p:cSld>
     <p:spTree>
@@ -7157,7 +7198,7 @@
 </p:sld>
 </file>
 
-<file path=ppt/slides/slide16.xml><?xml version="1.0" encoding="utf-8"?>
+<file path=ppt/slides/slide17.xml><?xml version="1.0" encoding="utf-8"?>
 <p:sld xmlns:a="http://schemas.openxmlformats.org/drawingml/2006/main" xmlns:r="http://schemas.openxmlformats.org/officeDocument/2006/relationships" xmlns:p="http://schemas.openxmlformats.org/presentationml/2006/main">
   <p:cSld>
     <p:spTree>
@@ -7249,7 +7290,7 @@
               <a:buNone/>
               <a:tabLst/>
             </a:pPr>
-            <a:endParaRPr kumimoji="0" lang="en-US" altLang="en-US" sz="1800" b="0" i="0" u="none" strike="noStrike" cap="none" normalizeH="0" baseline="0" dirty="0" smtClean="0">
+            <a:endParaRPr kumimoji="0" lang="en-US" altLang="en-US" sz="1800" b="0" i="0" u="none" strike="noStrike" cap="none" normalizeH="0" baseline="0" dirty="0">
               <a:ln>
                 <a:noFill/>
               </a:ln>
@@ -7331,12 +7372,8 @@
           <a:lstStyle/>
           <a:p>
             <a:r>
-              <a:rPr lang="en-US" sz="1600" dirty="0" smtClean="0"/>
-              <a:t>This code </a:t>
-            </a:r>
-            <a:r>
               <a:rPr lang="en-US" sz="1600" dirty="0"/>
-              <a:t>explain how to find and deal with unusual values, called outliers, in a dataset using Python. Initially, an empty list, `</a:t>
+              <a:t>This code explain how to find and deal with unusual values, called outliers, in a dataset using Python. Initially, an empty list, `</a:t>
             </a:r>
             <a:r>
               <a:rPr lang="en-US" sz="1600" dirty="0" err="1"/>
@@ -7394,7 +7431,7 @@
 </p:sld>
 </file>
 
-<file path=ppt/slides/slide17.xml><?xml version="1.0" encoding="utf-8"?>
+<file path=ppt/slides/slide18.xml><?xml version="1.0" encoding="utf-8"?>
 <p:sld xmlns:a="http://schemas.openxmlformats.org/drawingml/2006/main" xmlns:r="http://schemas.openxmlformats.org/officeDocument/2006/relationships" xmlns:p="http://schemas.openxmlformats.org/presentationml/2006/main">
   <p:cSld>
     <p:spTree>
@@ -7451,7 +7488,7 @@
           <a:p>
             <a:r>
               <a:rPr lang="en-US" dirty="0"/>
-              <a:t>So for week 5 our next milestone is to start with the model selection </a:t>
+              <a:t>In week 5 our next milestone is to start with the model selection </a:t>
             </a:r>
             <a:endParaRPr lang="de-DE" dirty="0"/>
           </a:p>
@@ -7489,7 +7526,7 @@
 </p:sld>
 </file>
 
-<file path=ppt/slides/slide18.xml><?xml version="1.0" encoding="utf-8"?>
+<file path=ppt/slides/slide19.xml><?xml version="1.0" encoding="utf-8"?>
 <p:sld xmlns:a="http://schemas.openxmlformats.org/drawingml/2006/main" xmlns:r="http://schemas.openxmlformats.org/officeDocument/2006/relationships" xmlns:p="http://schemas.openxmlformats.org/presentationml/2006/main">
   <p:cSld>
     <p:spTree>
@@ -8291,7 +8328,7 @@
           <a:p>
             <a:r>
               <a:rPr lang="en-US" dirty="0"/>
-              <a:t>In simple terms based on the historical data of the crypto currency prices we want to predict the trend of prices for the future values of the price.</a:t>
+              <a:t>In simple terms based on the historical data of the cryptocurrency prices we want to predict the trend of prices for the future values of the price.</a:t>
             </a:r>
           </a:p>
           <a:p>
@@ -8375,7 +8412,7 @@
             </a:r>
             <a:r>
               <a:rPr lang="en-US" dirty="0" err="1"/>
-              <a:t>ClikUp</a:t>
+              <a:t>ClickUp</a:t>
             </a:r>
             <a:r>
               <a:rPr lang="en-US" dirty="0"/>
@@ -8383,7 +8420,7 @@
             </a:r>
             <a:r>
               <a:rPr lang="en-US" dirty="0" err="1"/>
-              <a:t>gant</a:t>
+              <a:t>gantt</a:t>
             </a:r>
             <a:r>
               <a:rPr lang="en-US" dirty="0"/>
@@ -8565,15 +8602,7 @@
             </a:r>
             <a:r>
               <a:rPr lang="en-US" dirty="0"/>
-              <a:t> diagram, on week 4 we continue with the data </a:t>
-            </a:r>
-            <a:r>
-              <a:rPr lang="en-US" dirty="0" err="1"/>
-              <a:t>explration</a:t>
-            </a:r>
-            <a:r>
-              <a:rPr lang="en-US" dirty="0"/>
-              <a:t>, we searched for outliers and anomalies as well, we identified missing data.</a:t>
+              <a:t> diagram, on week 4 we continue with the data exploration, we searched for outliers and anomalies as well, we identified missing data.</a:t>
             </a:r>
             <a:endParaRPr lang="de-DE" dirty="0"/>
           </a:p>
@@ -8842,34 +8871,46 @@
         </p:nvSpPr>
         <p:spPr/>
         <p:txBody>
-          <a:bodyPr/>
-          <a:lstStyle/>
-          <a:p>
+          <a:bodyPr>
+            <a:normAutofit/>
+          </a:bodyPr>
+          <a:lstStyle/>
+          <a:p>
+            <a:pPr marL="0" indent="0">
+              <a:buNone/>
+            </a:pPr>
             <a:r>
               <a:rPr lang="en-US" dirty="0"/>
-              <a:t>First of all lets explain </a:t>
-            </a:r>
-            <a:r>
-              <a:rPr lang="en-US" dirty="0" err="1"/>
-              <a:t>whats</a:t>
-            </a:r>
+              <a:t>Firstly,  let’s explain what is ML and what does it mean to train a model.</a:t>
+            </a:r>
+          </a:p>
+          <a:p>
+            <a:pPr lvl="0"/>
             <a:r>
               <a:rPr lang="en-US" dirty="0"/>
-              <a:t> ML and what does it mean to train a model.</a:t>
-            </a:r>
-          </a:p>
-          <a:p>
-            <a:endParaRPr lang="en-US" dirty="0"/>
-          </a:p>
-          <a:p>
-            <a:endParaRPr lang="en-US" dirty="0"/>
-          </a:p>
-          <a:p>
+              <a:t>In Machine Learning(ML) the machines learn a relationship between input data and the desired output for input data based on an algorithm.</a:t>
+            </a:r>
+          </a:p>
+          <a:p>
+            <a:pPr lvl="0"/>
             <a:r>
               <a:rPr lang="en-US" dirty="0"/>
-              <a:t>In our particular case given that the data that we are using is a continuous set of numbers, we need to use a supervised training to accomplish a regression. </a:t>
-            </a:r>
-            <a:endParaRPr lang="de-DE" dirty="0"/>
+              <a:t>Machine learning uses supervised, unsupervised and reinforcement learning techniques.  </a:t>
+            </a:r>
+          </a:p>
+          <a:p>
+            <a:pPr lvl="0"/>
+            <a:r>
+              <a:rPr lang="en-US" dirty="0"/>
+              <a:t>Supervised learning trains a model based on an algorithm using existing data and corresponding output labels or values and then the trained model is used to make predictions on new data samples.</a:t>
+            </a:r>
+          </a:p>
+          <a:p>
+            <a:pPr lvl="0"/>
+            <a:r>
+              <a:rPr lang="en-US" dirty="0"/>
+              <a:t>In our particular case given that the data that we are using is a continuous set of numbers, we need to use supervised training to accomplish a regression. </a:t>
+            </a:r>
           </a:p>
         </p:txBody>
       </p:sp>

</xml_diff>